<commit_message>
Updates to powerpoint and readme
</commit_message>
<xml_diff>
--- a/Team_Code Blue Final Project.pptx
+++ b/Team_Code Blue Final Project.pptx
@@ -5,13 +5,22 @@
     <p:sldMasterId id="2147483648" r:id="rId1"/>
   </p:sldMasterIdLst>
   <p:notesMasterIdLst>
-    <p:notesMasterId r:id="rId6"/>
+    <p:notesMasterId r:id="rId15"/>
   </p:notesMasterIdLst>
   <p:sldIdLst>
     <p:sldId id="256" r:id="rId2"/>
     <p:sldId id="258" r:id="rId3"/>
     <p:sldId id="259" r:id="rId4"/>
-    <p:sldId id="260" r:id="rId5"/>
+    <p:sldId id="266" r:id="rId5"/>
+    <p:sldId id="262" r:id="rId6"/>
+    <p:sldId id="263" r:id="rId7"/>
+    <p:sldId id="269" r:id="rId8"/>
+    <p:sldId id="265" r:id="rId9"/>
+    <p:sldId id="267" r:id="rId10"/>
+    <p:sldId id="268" r:id="rId11"/>
+    <p:sldId id="260" r:id="rId12"/>
+    <p:sldId id="270" r:id="rId13"/>
+    <p:sldId id="264" r:id="rId14"/>
   </p:sldIdLst>
   <p:sldSz cx="12192000" cy="6858000"/>
   <p:notesSz cx="6858000" cy="9144000"/>
@@ -200,7 +209,7 @@
           <a:p>
             <a:fld id="{0363ABCA-FF1C-45B5-BA0C-BA609BC88931}" type="datetimeFigureOut">
               <a:rPr lang="en-US" smtClean="0"/>
-              <a:t>11/4/2021</a:t>
+              <a:t>11/6/2021</a:t>
             </a:fld>
             <a:endParaRPr lang="en-US"/>
           </a:p>
@@ -551,6 +560,1084 @@
 </p:notes>
 </file>
 
+<file path=ppt/notesSlides/notesSlide10.xml><?xml version="1.0" encoding="utf-8"?>
+<p:notes xmlns:a="http://schemas.openxmlformats.org/drawingml/2006/main" xmlns:r="http://schemas.openxmlformats.org/officeDocument/2006/relationships" xmlns:p="http://schemas.openxmlformats.org/presentationml/2006/main">
+  <p:cSld>
+    <p:spTree>
+      <p:nvGrpSpPr>
+        <p:cNvPr id="1" name=""/>
+        <p:cNvGrpSpPr/>
+        <p:nvPr/>
+      </p:nvGrpSpPr>
+      <p:grpSpPr>
+        <a:xfrm>
+          <a:off x="0" y="0"/>
+          <a:ext cx="0" cy="0"/>
+          <a:chOff x="0" y="0"/>
+          <a:chExt cx="0" cy="0"/>
+        </a:xfrm>
+      </p:grpSpPr>
+      <p:sp>
+        <p:nvSpPr>
+          <p:cNvPr id="2" name="Slide Image Placeholder 1"/>
+          <p:cNvSpPr>
+            <a:spLocks noGrp="1" noRot="1" noChangeAspect="1"/>
+          </p:cNvSpPr>
+          <p:nvPr>
+            <p:ph type="sldImg"/>
+          </p:nvPr>
+        </p:nvSpPr>
+        <p:spPr/>
+      </p:sp>
+      <p:sp>
+        <p:nvSpPr>
+          <p:cNvPr id="3" name="Notes Placeholder 2"/>
+          <p:cNvSpPr>
+            <a:spLocks noGrp="1"/>
+          </p:cNvSpPr>
+          <p:nvPr>
+            <p:ph type="body" idx="1"/>
+          </p:nvPr>
+        </p:nvSpPr>
+        <p:spPr/>
+        <p:txBody>
+          <a:bodyPr/>
+          <a:lstStyle/>
+          <a:p>
+            <a:r>
+              <a:rPr lang="en-US" dirty="0"/>
+              <a:t>We have a fully functioning and interactive dashboard in Tableau. Our analysis will be displayed with a storyboard that provides clear data visualizations. Follow the link to see the charts and graphs that show insightful relationships in our data and images of our analysis.</a:t>
+            </a:r>
+          </a:p>
+        </p:txBody>
+      </p:sp>
+      <p:sp>
+        <p:nvSpPr>
+          <p:cNvPr id="4" name="Slide Number Placeholder 3"/>
+          <p:cNvSpPr>
+            <a:spLocks noGrp="1"/>
+          </p:cNvSpPr>
+          <p:nvPr>
+            <p:ph type="sldNum" sz="quarter" idx="5"/>
+          </p:nvPr>
+        </p:nvSpPr>
+        <p:spPr/>
+        <p:txBody>
+          <a:bodyPr/>
+          <a:lstStyle/>
+          <a:p>
+            <a:fld id="{0837621E-2D94-4874-8D2F-F90746483814}" type="slidenum">
+              <a:rPr lang="en-US" smtClean="0"/>
+              <a:t>13</a:t>
+            </a:fld>
+            <a:endParaRPr lang="en-US"/>
+          </a:p>
+        </p:txBody>
+      </p:sp>
+    </p:spTree>
+    <p:extLst>
+      <p:ext uri="{BB962C8B-B14F-4D97-AF65-F5344CB8AC3E}">
+        <p14:creationId xmlns:p14="http://schemas.microsoft.com/office/powerpoint/2010/main" val="3021058822"/>
+      </p:ext>
+    </p:extLst>
+  </p:cSld>
+  <p:clrMapOvr>
+    <a:masterClrMapping/>
+  </p:clrMapOvr>
+</p:notes>
+</file>
+
+<file path=ppt/notesSlides/notesSlide2.xml><?xml version="1.0" encoding="utf-8"?>
+<p:notes xmlns:a="http://schemas.openxmlformats.org/drawingml/2006/main" xmlns:r="http://schemas.openxmlformats.org/officeDocument/2006/relationships" xmlns:p="http://schemas.openxmlformats.org/presentationml/2006/main">
+  <p:cSld>
+    <p:spTree>
+      <p:nvGrpSpPr>
+        <p:cNvPr id="1" name=""/>
+        <p:cNvGrpSpPr/>
+        <p:nvPr/>
+      </p:nvGrpSpPr>
+      <p:grpSpPr>
+        <a:xfrm>
+          <a:off x="0" y="0"/>
+          <a:ext cx="0" cy="0"/>
+          <a:chOff x="0" y="0"/>
+          <a:chExt cx="0" cy="0"/>
+        </a:xfrm>
+      </p:grpSpPr>
+      <p:sp>
+        <p:nvSpPr>
+          <p:cNvPr id="2" name="Slide Image Placeholder 1"/>
+          <p:cNvSpPr>
+            <a:spLocks noGrp="1" noRot="1" noChangeAspect="1"/>
+          </p:cNvSpPr>
+          <p:nvPr>
+            <p:ph type="sldImg"/>
+          </p:nvPr>
+        </p:nvSpPr>
+        <p:spPr/>
+      </p:sp>
+      <p:sp>
+        <p:nvSpPr>
+          <p:cNvPr id="3" name="Notes Placeholder 2"/>
+          <p:cNvSpPr>
+            <a:spLocks noGrp="1"/>
+          </p:cNvSpPr>
+          <p:nvPr>
+            <p:ph type="body" idx="1"/>
+          </p:nvPr>
+        </p:nvSpPr>
+        <p:spPr/>
+        <p:txBody>
+          <a:bodyPr/>
+          <a:lstStyle/>
+          <a:p>
+            <a:r>
+              <a:rPr lang="en-US" dirty="0"/>
+              <a:t>To develop our disease prediction machine learning model required the use of multiple technologies and programming languages. We used </a:t>
+            </a:r>
+            <a:r>
+              <a:rPr lang="en-US" dirty="0" err="1"/>
+              <a:t>Jupyter</a:t>
+            </a:r>
+            <a:r>
+              <a:rPr lang="en-US" dirty="0"/>
+              <a:t> Notebook to write Python code for both data preprocessing and our machine learning model. A SQL database was created with </a:t>
+            </a:r>
+            <a:r>
+              <a:rPr lang="en-US" dirty="0" err="1"/>
+              <a:t>pgAdmin</a:t>
+            </a:r>
+            <a:r>
+              <a:rPr lang="en-US" dirty="0"/>
+              <a:t>. A Tableau storyboard was developed for interactive data visualizations. The following slides will provide detailed explanations of how each technology was used. </a:t>
+            </a:r>
+          </a:p>
+        </p:txBody>
+      </p:sp>
+      <p:sp>
+        <p:nvSpPr>
+          <p:cNvPr id="4" name="Slide Number Placeholder 3"/>
+          <p:cNvSpPr>
+            <a:spLocks noGrp="1"/>
+          </p:cNvSpPr>
+          <p:nvPr>
+            <p:ph type="sldNum" sz="quarter" idx="5"/>
+          </p:nvPr>
+        </p:nvSpPr>
+        <p:spPr/>
+        <p:txBody>
+          <a:bodyPr/>
+          <a:lstStyle/>
+          <a:p>
+            <a:fld id="{0837621E-2D94-4874-8D2F-F90746483814}" type="slidenum">
+              <a:rPr lang="en-US" smtClean="0"/>
+              <a:t>4</a:t>
+            </a:fld>
+            <a:endParaRPr lang="en-US"/>
+          </a:p>
+        </p:txBody>
+      </p:sp>
+    </p:spTree>
+    <p:extLst>
+      <p:ext uri="{BB962C8B-B14F-4D97-AF65-F5344CB8AC3E}">
+        <p14:creationId xmlns:p14="http://schemas.microsoft.com/office/powerpoint/2010/main" val="1884022343"/>
+      </p:ext>
+    </p:extLst>
+  </p:cSld>
+  <p:clrMapOvr>
+    <a:masterClrMapping/>
+  </p:clrMapOvr>
+</p:notes>
+</file>
+
+<file path=ppt/notesSlides/notesSlide3.xml><?xml version="1.0" encoding="utf-8"?>
+<p:notes xmlns:a="http://schemas.openxmlformats.org/drawingml/2006/main" xmlns:r="http://schemas.openxmlformats.org/officeDocument/2006/relationships" xmlns:p="http://schemas.openxmlformats.org/presentationml/2006/main">
+  <p:cSld>
+    <p:spTree>
+      <p:nvGrpSpPr>
+        <p:cNvPr id="1" name=""/>
+        <p:cNvGrpSpPr/>
+        <p:nvPr/>
+      </p:nvGrpSpPr>
+      <p:grpSpPr>
+        <a:xfrm>
+          <a:off x="0" y="0"/>
+          <a:ext cx="0" cy="0"/>
+          <a:chOff x="0" y="0"/>
+          <a:chExt cx="0" cy="0"/>
+        </a:xfrm>
+      </p:grpSpPr>
+      <p:sp>
+        <p:nvSpPr>
+          <p:cNvPr id="2" name="Slide Image Placeholder 1"/>
+          <p:cNvSpPr>
+            <a:spLocks noGrp="1" noRot="1" noChangeAspect="1"/>
+          </p:cNvSpPr>
+          <p:nvPr>
+            <p:ph type="sldImg"/>
+          </p:nvPr>
+        </p:nvSpPr>
+        <p:spPr/>
+      </p:sp>
+      <p:sp>
+        <p:nvSpPr>
+          <p:cNvPr id="3" name="Notes Placeholder 2"/>
+          <p:cNvSpPr>
+            <a:spLocks noGrp="1"/>
+          </p:cNvSpPr>
+          <p:nvPr>
+            <p:ph type="body" idx="1"/>
+          </p:nvPr>
+        </p:nvSpPr>
+        <p:spPr/>
+        <p:txBody>
+          <a:bodyPr/>
+          <a:lstStyle/>
+          <a:p>
+            <a:pPr marL="0" marR="0" lvl="0" indent="0" algn="l" defTabSz="914400" rtl="0" eaLnBrk="1" fontAlgn="auto" latinLnBrk="0" hangingPunct="1">
+              <a:lnSpc>
+                <a:spcPct val="100000"/>
+              </a:lnSpc>
+              <a:spcBef>
+                <a:spcPts val="0"/>
+              </a:spcBef>
+              <a:spcAft>
+                <a:spcPts val="0"/>
+              </a:spcAft>
+              <a:buClrTx/>
+              <a:buSzTx/>
+              <a:buFontTx/>
+              <a:buNone/>
+              <a:tabLst/>
+              <a:defRPr/>
+            </a:pPr>
+            <a:r>
+              <a:rPr lang="en-US" dirty="0"/>
+              <a:t>To begin the preprocessing the two CSV datasets were imported and assigned as to variables </a:t>
+            </a:r>
+            <a:r>
+              <a:rPr lang="en-US" dirty="0" err="1"/>
+              <a:t>train_data</a:t>
+            </a:r>
+            <a:r>
+              <a:rPr lang="en-US" dirty="0"/>
+              <a:t> and </a:t>
+            </a:r>
+            <a:r>
+              <a:rPr lang="en-US" dirty="0" err="1"/>
+              <a:t>test_test</a:t>
+            </a:r>
+            <a:r>
+              <a:rPr lang="en-US" dirty="0"/>
+              <a:t>.  A key part of the data exploration phase is preprocessing the data. This allows us to learn about the data characteristics and identify potential problems. We used the pandas info and describe functions to explore the data. For the model to function correctly all data in both data sets has to be in the correct data type. We also needed to isolate columns with null data and drop that data. The </a:t>
+            </a:r>
+            <a:r>
+              <a:rPr lang="en-US" dirty="0" err="1"/>
+              <a:t>isnull</a:t>
+            </a:r>
+            <a:r>
+              <a:rPr lang="en-US" dirty="0"/>
+              <a:t> with any functions identified the null values then the drop function was used to remove it from the </a:t>
+            </a:r>
+            <a:r>
+              <a:rPr lang="en-US" dirty="0" err="1"/>
+              <a:t>dataframe</a:t>
+            </a:r>
+            <a:r>
+              <a:rPr lang="en-US" dirty="0"/>
+              <a:t>.</a:t>
+            </a:r>
+          </a:p>
+          <a:p>
+            <a:pPr marL="0" marR="0" lvl="0" indent="0" algn="l" defTabSz="914400" rtl="0" eaLnBrk="1" fontAlgn="auto" latinLnBrk="0" hangingPunct="1">
+              <a:lnSpc>
+                <a:spcPct val="100000"/>
+              </a:lnSpc>
+              <a:spcBef>
+                <a:spcPts val="0"/>
+              </a:spcBef>
+              <a:spcAft>
+                <a:spcPts val="0"/>
+              </a:spcAft>
+              <a:buClrTx/>
+              <a:buSzTx/>
+              <a:buFontTx/>
+              <a:buNone/>
+              <a:tabLst/>
+              <a:defRPr/>
+            </a:pPr>
+            <a:endParaRPr lang="en-US" dirty="0"/>
+          </a:p>
+          <a:p>
+            <a:endParaRPr lang="en-US" dirty="0"/>
+          </a:p>
+        </p:txBody>
+      </p:sp>
+      <p:sp>
+        <p:nvSpPr>
+          <p:cNvPr id="4" name="Slide Number Placeholder 3"/>
+          <p:cNvSpPr>
+            <a:spLocks noGrp="1"/>
+          </p:cNvSpPr>
+          <p:nvPr>
+            <p:ph type="sldNum" sz="quarter" idx="5"/>
+          </p:nvPr>
+        </p:nvSpPr>
+        <p:spPr/>
+        <p:txBody>
+          <a:bodyPr/>
+          <a:lstStyle/>
+          <a:p>
+            <a:fld id="{0837621E-2D94-4874-8D2F-F90746483814}" type="slidenum">
+              <a:rPr lang="en-US" smtClean="0"/>
+              <a:t>5</a:t>
+            </a:fld>
+            <a:endParaRPr lang="en-US"/>
+          </a:p>
+        </p:txBody>
+      </p:sp>
+    </p:spTree>
+    <p:extLst>
+      <p:ext uri="{BB962C8B-B14F-4D97-AF65-F5344CB8AC3E}">
+        <p14:creationId xmlns:p14="http://schemas.microsoft.com/office/powerpoint/2010/main" val="2020664582"/>
+      </p:ext>
+    </p:extLst>
+  </p:cSld>
+  <p:clrMapOvr>
+    <a:masterClrMapping/>
+  </p:clrMapOvr>
+</p:notes>
+</file>
+
+<file path=ppt/notesSlides/notesSlide4.xml><?xml version="1.0" encoding="utf-8"?>
+<p:notes xmlns:a="http://schemas.openxmlformats.org/drawingml/2006/main" xmlns:r="http://schemas.openxmlformats.org/officeDocument/2006/relationships" xmlns:p="http://schemas.openxmlformats.org/presentationml/2006/main">
+  <p:cSld>
+    <p:spTree>
+      <p:nvGrpSpPr>
+        <p:cNvPr id="1" name=""/>
+        <p:cNvGrpSpPr/>
+        <p:nvPr/>
+      </p:nvGrpSpPr>
+      <p:grpSpPr>
+        <a:xfrm>
+          <a:off x="0" y="0"/>
+          <a:ext cx="0" cy="0"/>
+          <a:chOff x="0" y="0"/>
+          <a:chExt cx="0" cy="0"/>
+        </a:xfrm>
+      </p:grpSpPr>
+      <p:sp>
+        <p:nvSpPr>
+          <p:cNvPr id="2" name="Slide Image Placeholder 1"/>
+          <p:cNvSpPr>
+            <a:spLocks noGrp="1" noRot="1" noChangeAspect="1"/>
+          </p:cNvSpPr>
+          <p:nvPr>
+            <p:ph type="sldImg"/>
+          </p:nvPr>
+        </p:nvSpPr>
+        <p:spPr/>
+      </p:sp>
+      <p:sp>
+        <p:nvSpPr>
+          <p:cNvPr id="3" name="Notes Placeholder 2"/>
+          <p:cNvSpPr>
+            <a:spLocks noGrp="1"/>
+          </p:cNvSpPr>
+          <p:nvPr>
+            <p:ph type="body" idx="1"/>
+          </p:nvPr>
+        </p:nvSpPr>
+        <p:spPr/>
+        <p:txBody>
+          <a:bodyPr/>
+          <a:lstStyle/>
+          <a:p>
+            <a:pPr marL="0" marR="0" lvl="0" indent="0" algn="l" defTabSz="914400" rtl="0" eaLnBrk="1" fontAlgn="auto" latinLnBrk="0" hangingPunct="1">
+              <a:lnSpc>
+                <a:spcPct val="100000"/>
+              </a:lnSpc>
+              <a:spcBef>
+                <a:spcPts val="0"/>
+              </a:spcBef>
+              <a:spcAft>
+                <a:spcPts val="0"/>
+              </a:spcAft>
+              <a:buClrTx/>
+              <a:buSzTx/>
+              <a:buFontTx/>
+              <a:buNone/>
+              <a:tabLst/>
+              <a:defRPr/>
+            </a:pPr>
+            <a:r>
+              <a:rPr lang="en-US" dirty="0"/>
+              <a:t>Machine learning utilizes both training and testing data.</a:t>
+            </a:r>
+          </a:p>
+          <a:p>
+            <a:pPr marL="0" marR="0" lvl="0" indent="0" algn="l" defTabSz="914400" rtl="0" eaLnBrk="1" fontAlgn="auto" latinLnBrk="0" hangingPunct="1">
+              <a:lnSpc>
+                <a:spcPct val="100000"/>
+              </a:lnSpc>
+              <a:spcBef>
+                <a:spcPts val="0"/>
+              </a:spcBef>
+              <a:spcAft>
+                <a:spcPts val="0"/>
+              </a:spcAft>
+              <a:buClrTx/>
+              <a:buSzTx/>
+              <a:buFontTx/>
+              <a:buNone/>
+              <a:tabLst/>
+              <a:defRPr/>
+            </a:pPr>
+            <a:r>
+              <a:rPr lang="en-US" dirty="0"/>
+              <a:t>To prepare the data for the machine learning models we created our features and targets.</a:t>
+            </a:r>
+          </a:p>
+          <a:p>
+            <a:pPr marL="0" marR="0" lvl="0" indent="0" algn="l" defTabSz="914400" rtl="0" eaLnBrk="1" fontAlgn="auto" latinLnBrk="0" hangingPunct="1">
+              <a:lnSpc>
+                <a:spcPct val="100000"/>
+              </a:lnSpc>
+              <a:spcBef>
+                <a:spcPts val="0"/>
+              </a:spcBef>
+              <a:spcAft>
+                <a:spcPts val="0"/>
+              </a:spcAft>
+              <a:buClrTx/>
+              <a:buSzTx/>
+              <a:buFontTx/>
+              <a:buNone/>
+              <a:tabLst/>
+              <a:defRPr/>
+            </a:pPr>
+            <a:endParaRPr lang="en-US" dirty="0"/>
+          </a:p>
+          <a:p>
+            <a:pPr marL="0" marR="0" lvl="0" indent="0" algn="l" defTabSz="914400" rtl="0" eaLnBrk="1" fontAlgn="auto" latinLnBrk="0" hangingPunct="1">
+              <a:lnSpc>
+                <a:spcPct val="100000"/>
+              </a:lnSpc>
+              <a:spcBef>
+                <a:spcPts val="0"/>
+              </a:spcBef>
+              <a:spcAft>
+                <a:spcPts val="0"/>
+              </a:spcAft>
+              <a:buClrTx/>
+              <a:buSzTx/>
+              <a:buFontTx/>
+              <a:buNone/>
+              <a:tabLst/>
+              <a:defRPr/>
+            </a:pPr>
+            <a:r>
+              <a:rPr lang="en-US" dirty="0"/>
+              <a:t>The unique() function is used to find the unique elements of an array. It returns the sorted unique elements of an array.</a:t>
+            </a:r>
+          </a:p>
+          <a:p>
+            <a:endParaRPr lang="en-US" dirty="0"/>
+          </a:p>
+        </p:txBody>
+      </p:sp>
+      <p:sp>
+        <p:nvSpPr>
+          <p:cNvPr id="4" name="Slide Number Placeholder 3"/>
+          <p:cNvSpPr>
+            <a:spLocks noGrp="1"/>
+          </p:cNvSpPr>
+          <p:nvPr>
+            <p:ph type="sldNum" sz="quarter" idx="5"/>
+          </p:nvPr>
+        </p:nvSpPr>
+        <p:spPr/>
+        <p:txBody>
+          <a:bodyPr/>
+          <a:lstStyle/>
+          <a:p>
+            <a:fld id="{0837621E-2D94-4874-8D2F-F90746483814}" type="slidenum">
+              <a:rPr lang="en-US" smtClean="0"/>
+              <a:t>6</a:t>
+            </a:fld>
+            <a:endParaRPr lang="en-US"/>
+          </a:p>
+        </p:txBody>
+      </p:sp>
+    </p:spTree>
+    <p:extLst>
+      <p:ext uri="{BB962C8B-B14F-4D97-AF65-F5344CB8AC3E}">
+        <p14:creationId xmlns:p14="http://schemas.microsoft.com/office/powerpoint/2010/main" val="3665236893"/>
+      </p:ext>
+    </p:extLst>
+  </p:cSld>
+  <p:clrMapOvr>
+    <a:masterClrMapping/>
+  </p:clrMapOvr>
+</p:notes>
+</file>
+
+<file path=ppt/notesSlides/notesSlide5.xml><?xml version="1.0" encoding="utf-8"?>
+<p:notes xmlns:a="http://schemas.openxmlformats.org/drawingml/2006/main" xmlns:r="http://schemas.openxmlformats.org/officeDocument/2006/relationships" xmlns:p="http://schemas.openxmlformats.org/presentationml/2006/main">
+  <p:cSld>
+    <p:spTree>
+      <p:nvGrpSpPr>
+        <p:cNvPr id="1" name=""/>
+        <p:cNvGrpSpPr/>
+        <p:nvPr/>
+      </p:nvGrpSpPr>
+      <p:grpSpPr>
+        <a:xfrm>
+          <a:off x="0" y="0"/>
+          <a:ext cx="0" cy="0"/>
+          <a:chOff x="0" y="0"/>
+          <a:chExt cx="0" cy="0"/>
+        </a:xfrm>
+      </p:grpSpPr>
+      <p:sp>
+        <p:nvSpPr>
+          <p:cNvPr id="2" name="Slide Image Placeholder 1"/>
+          <p:cNvSpPr>
+            <a:spLocks noGrp="1" noRot="1" noChangeAspect="1"/>
+          </p:cNvSpPr>
+          <p:nvPr>
+            <p:ph type="sldImg"/>
+          </p:nvPr>
+        </p:nvSpPr>
+        <p:spPr/>
+      </p:sp>
+      <p:sp>
+        <p:nvSpPr>
+          <p:cNvPr id="3" name="Notes Placeholder 2"/>
+          <p:cNvSpPr>
+            <a:spLocks noGrp="1"/>
+          </p:cNvSpPr>
+          <p:nvPr>
+            <p:ph type="body" idx="1"/>
+          </p:nvPr>
+        </p:nvSpPr>
+        <p:spPr/>
+        <p:txBody>
+          <a:bodyPr/>
+          <a:lstStyle/>
+          <a:p>
+            <a:r>
+              <a:rPr lang="en-US" dirty="0"/>
+              <a:t>A list of symptoms for all diseases was created to allow for a GUI in our machine learning model where symptoms could be selected from a drop down box.</a:t>
+            </a:r>
+          </a:p>
+          <a:p>
+            <a:endParaRPr lang="en-US" dirty="0"/>
+          </a:p>
+        </p:txBody>
+      </p:sp>
+      <p:sp>
+        <p:nvSpPr>
+          <p:cNvPr id="4" name="Slide Number Placeholder 3"/>
+          <p:cNvSpPr>
+            <a:spLocks noGrp="1"/>
+          </p:cNvSpPr>
+          <p:nvPr>
+            <p:ph type="sldNum" sz="quarter" idx="5"/>
+          </p:nvPr>
+        </p:nvSpPr>
+        <p:spPr/>
+        <p:txBody>
+          <a:bodyPr/>
+          <a:lstStyle/>
+          <a:p>
+            <a:fld id="{0837621E-2D94-4874-8D2F-F90746483814}" type="slidenum">
+              <a:rPr lang="en-US" smtClean="0"/>
+              <a:t>7</a:t>
+            </a:fld>
+            <a:endParaRPr lang="en-US"/>
+          </a:p>
+        </p:txBody>
+      </p:sp>
+    </p:spTree>
+    <p:extLst>
+      <p:ext uri="{BB962C8B-B14F-4D97-AF65-F5344CB8AC3E}">
+        <p14:creationId xmlns:p14="http://schemas.microsoft.com/office/powerpoint/2010/main" val="2106080391"/>
+      </p:ext>
+    </p:extLst>
+  </p:cSld>
+  <p:clrMapOvr>
+    <a:masterClrMapping/>
+  </p:clrMapOvr>
+</p:notes>
+</file>
+
+<file path=ppt/notesSlides/notesSlide6.xml><?xml version="1.0" encoding="utf-8"?>
+<p:notes xmlns:a="http://schemas.openxmlformats.org/drawingml/2006/main" xmlns:r="http://schemas.openxmlformats.org/officeDocument/2006/relationships" xmlns:p="http://schemas.openxmlformats.org/presentationml/2006/main">
+  <p:cSld>
+    <p:spTree>
+      <p:nvGrpSpPr>
+        <p:cNvPr id="1" name=""/>
+        <p:cNvGrpSpPr/>
+        <p:nvPr/>
+      </p:nvGrpSpPr>
+      <p:grpSpPr>
+        <a:xfrm>
+          <a:off x="0" y="0"/>
+          <a:ext cx="0" cy="0"/>
+          <a:chOff x="0" y="0"/>
+          <a:chExt cx="0" cy="0"/>
+        </a:xfrm>
+      </p:grpSpPr>
+      <p:sp>
+        <p:nvSpPr>
+          <p:cNvPr id="2" name="Slide Image Placeholder 1"/>
+          <p:cNvSpPr>
+            <a:spLocks noGrp="1" noRot="1" noChangeAspect="1"/>
+          </p:cNvSpPr>
+          <p:nvPr>
+            <p:ph type="sldImg"/>
+          </p:nvPr>
+        </p:nvSpPr>
+        <p:spPr/>
+      </p:sp>
+      <p:sp>
+        <p:nvSpPr>
+          <p:cNvPr id="3" name="Notes Placeholder 2"/>
+          <p:cNvSpPr>
+            <a:spLocks noGrp="1"/>
+          </p:cNvSpPr>
+          <p:nvPr>
+            <p:ph type="body" idx="1"/>
+          </p:nvPr>
+        </p:nvSpPr>
+        <p:spPr/>
+        <p:txBody>
+          <a:bodyPr/>
+          <a:lstStyle/>
+          <a:p>
+            <a:r>
+              <a:rPr lang="en-US" dirty="0"/>
+              <a:t>The preprocessed </a:t>
+            </a:r>
+            <a:r>
+              <a:rPr lang="en-US" dirty="0" err="1"/>
+              <a:t>train_data</a:t>
+            </a:r>
+            <a:r>
+              <a:rPr lang="en-US" dirty="0"/>
+              <a:t>, </a:t>
+            </a:r>
+            <a:r>
+              <a:rPr lang="en-US" dirty="0" err="1"/>
+              <a:t>test_data</a:t>
+            </a:r>
+            <a:r>
+              <a:rPr lang="en-US" dirty="0"/>
+              <a:t> and </a:t>
+            </a:r>
+            <a:r>
+              <a:rPr lang="en-US" dirty="0" err="1"/>
+              <a:t>sympt_df</a:t>
+            </a:r>
+            <a:r>
+              <a:rPr lang="en-US" dirty="0"/>
+              <a:t> data sets were exported into </a:t>
+            </a:r>
+            <a:r>
+              <a:rPr lang="en-US" dirty="0" err="1"/>
+              <a:t>PostgresSQL</a:t>
+            </a:r>
+            <a:r>
+              <a:rPr lang="en-US" dirty="0"/>
+              <a:t> as three </a:t>
+            </a:r>
+            <a:r>
+              <a:rPr lang="en-US" dirty="0" err="1"/>
+              <a:t>seperate</a:t>
+            </a:r>
+            <a:r>
+              <a:rPr lang="en-US" dirty="0"/>
+              <a:t> tables.</a:t>
+            </a:r>
+          </a:p>
+          <a:p>
+            <a:r>
+              <a:rPr lang="en-US" dirty="0"/>
+              <a:t>This created a static database in </a:t>
+            </a:r>
+            <a:r>
+              <a:rPr lang="en-US" dirty="0" err="1"/>
+              <a:t>pgAdmin</a:t>
+            </a:r>
+            <a:r>
+              <a:rPr lang="en-US" dirty="0"/>
+              <a:t> for use during the project.</a:t>
+            </a:r>
+          </a:p>
+          <a:p>
+            <a:r>
+              <a:rPr lang="en-US" dirty="0"/>
+              <a:t>There is a detailed ERD the displays the relationships.</a:t>
+            </a:r>
+          </a:p>
+          <a:p>
+            <a:r>
+              <a:rPr lang="en-US" dirty="0"/>
+              <a:t>A join was performed on the tables.</a:t>
+            </a:r>
+          </a:p>
+          <a:p>
+            <a:r>
+              <a:rPr lang="en-US" dirty="0"/>
+              <a:t>The database interfaces with [</a:t>
+            </a:r>
+            <a:r>
+              <a:rPr lang="en-US" dirty="0" err="1"/>
+              <a:t>Disease_Prediction_ML.ipynb</a:t>
+            </a:r>
+            <a:r>
+              <a:rPr lang="en-US" dirty="0"/>
+              <a:t>](</a:t>
+            </a:r>
+            <a:r>
+              <a:rPr lang="en-US" dirty="0" err="1"/>
+              <a:t>Disease_Prediction_ML.ipynb</a:t>
+            </a:r>
+            <a:r>
+              <a:rPr lang="en-US" dirty="0"/>
+              <a:t>).</a:t>
+            </a:r>
+          </a:p>
+          <a:p>
+            <a:r>
+              <a:rPr lang="en-US" dirty="0"/>
+              <a:t>Using from </a:t>
+            </a:r>
+            <a:r>
+              <a:rPr lang="en-US" dirty="0" err="1"/>
+              <a:t>sqlalchemy</a:t>
+            </a:r>
+            <a:r>
+              <a:rPr lang="en-US" dirty="0"/>
+              <a:t> import </a:t>
+            </a:r>
+            <a:r>
+              <a:rPr lang="en-US" dirty="0" err="1"/>
+              <a:t>create_engine</a:t>
+            </a:r>
+            <a:r>
+              <a:rPr lang="en-US" dirty="0"/>
+              <a:t> the </a:t>
+            </a:r>
+            <a:r>
+              <a:rPr lang="en-US" dirty="0" err="1"/>
+              <a:t>PostgresSQL</a:t>
+            </a:r>
+            <a:r>
+              <a:rPr lang="en-US" dirty="0"/>
+              <a:t> data is used in our machine learning model.</a:t>
+            </a:r>
+          </a:p>
+          <a:p>
+            <a:endParaRPr lang="en-US" dirty="0"/>
+          </a:p>
+        </p:txBody>
+      </p:sp>
+      <p:sp>
+        <p:nvSpPr>
+          <p:cNvPr id="4" name="Slide Number Placeholder 3"/>
+          <p:cNvSpPr>
+            <a:spLocks noGrp="1"/>
+          </p:cNvSpPr>
+          <p:nvPr>
+            <p:ph type="sldNum" sz="quarter" idx="5"/>
+          </p:nvPr>
+        </p:nvSpPr>
+        <p:spPr/>
+        <p:txBody>
+          <a:bodyPr/>
+          <a:lstStyle/>
+          <a:p>
+            <a:fld id="{0837621E-2D94-4874-8D2F-F90746483814}" type="slidenum">
+              <a:rPr lang="en-US" smtClean="0"/>
+              <a:t>8</a:t>
+            </a:fld>
+            <a:endParaRPr lang="en-US"/>
+          </a:p>
+        </p:txBody>
+      </p:sp>
+    </p:spTree>
+    <p:extLst>
+      <p:ext uri="{BB962C8B-B14F-4D97-AF65-F5344CB8AC3E}">
+        <p14:creationId xmlns:p14="http://schemas.microsoft.com/office/powerpoint/2010/main" val="3209129602"/>
+      </p:ext>
+    </p:extLst>
+  </p:cSld>
+  <p:clrMapOvr>
+    <a:masterClrMapping/>
+  </p:clrMapOvr>
+</p:notes>
+</file>
+
+<file path=ppt/notesSlides/notesSlide7.xml><?xml version="1.0" encoding="utf-8"?>
+<p:notes xmlns:a="http://schemas.openxmlformats.org/drawingml/2006/main" xmlns:r="http://schemas.openxmlformats.org/officeDocument/2006/relationships" xmlns:p="http://schemas.openxmlformats.org/presentationml/2006/main">
+  <p:cSld>
+    <p:spTree>
+      <p:nvGrpSpPr>
+        <p:cNvPr id="1" name=""/>
+        <p:cNvGrpSpPr/>
+        <p:nvPr/>
+      </p:nvGrpSpPr>
+      <p:grpSpPr>
+        <a:xfrm>
+          <a:off x="0" y="0"/>
+          <a:ext cx="0" cy="0"/>
+          <a:chOff x="0" y="0"/>
+          <a:chExt cx="0" cy="0"/>
+        </a:xfrm>
+      </p:grpSpPr>
+      <p:sp>
+        <p:nvSpPr>
+          <p:cNvPr id="2" name="Slide Image Placeholder 1"/>
+          <p:cNvSpPr>
+            <a:spLocks noGrp="1" noRot="1" noChangeAspect="1"/>
+          </p:cNvSpPr>
+          <p:nvPr>
+            <p:ph type="sldImg"/>
+          </p:nvPr>
+        </p:nvSpPr>
+        <p:spPr/>
+      </p:sp>
+      <p:sp>
+        <p:nvSpPr>
+          <p:cNvPr id="3" name="Notes Placeholder 2"/>
+          <p:cNvSpPr>
+            <a:spLocks noGrp="1"/>
+          </p:cNvSpPr>
+          <p:nvPr>
+            <p:ph type="body" idx="1"/>
+          </p:nvPr>
+        </p:nvSpPr>
+        <p:spPr/>
+        <p:txBody>
+          <a:bodyPr/>
+          <a:lstStyle/>
+          <a:p>
+            <a:endParaRPr lang="en-US" dirty="0"/>
+          </a:p>
+        </p:txBody>
+      </p:sp>
+      <p:sp>
+        <p:nvSpPr>
+          <p:cNvPr id="4" name="Slide Number Placeholder 3"/>
+          <p:cNvSpPr>
+            <a:spLocks noGrp="1"/>
+          </p:cNvSpPr>
+          <p:nvPr>
+            <p:ph type="sldNum" sz="quarter" idx="5"/>
+          </p:nvPr>
+        </p:nvSpPr>
+        <p:spPr/>
+        <p:txBody>
+          <a:bodyPr/>
+          <a:lstStyle/>
+          <a:p>
+            <a:fld id="{0837621E-2D94-4874-8D2F-F90746483814}" type="slidenum">
+              <a:rPr lang="en-US" smtClean="0"/>
+              <a:t>9</a:t>
+            </a:fld>
+            <a:endParaRPr lang="en-US"/>
+          </a:p>
+        </p:txBody>
+      </p:sp>
+    </p:spTree>
+    <p:extLst>
+      <p:ext uri="{BB962C8B-B14F-4D97-AF65-F5344CB8AC3E}">
+        <p14:creationId xmlns:p14="http://schemas.microsoft.com/office/powerpoint/2010/main" val="51153677"/>
+      </p:ext>
+    </p:extLst>
+  </p:cSld>
+  <p:clrMapOvr>
+    <a:masterClrMapping/>
+  </p:clrMapOvr>
+</p:notes>
+</file>
+
+<file path=ppt/notesSlides/notesSlide8.xml><?xml version="1.0" encoding="utf-8"?>
+<p:notes xmlns:a="http://schemas.openxmlformats.org/drawingml/2006/main" xmlns:r="http://schemas.openxmlformats.org/officeDocument/2006/relationships" xmlns:p="http://schemas.openxmlformats.org/presentationml/2006/main">
+  <p:cSld>
+    <p:spTree>
+      <p:nvGrpSpPr>
+        <p:cNvPr id="1" name=""/>
+        <p:cNvGrpSpPr/>
+        <p:nvPr/>
+      </p:nvGrpSpPr>
+      <p:grpSpPr>
+        <a:xfrm>
+          <a:off x="0" y="0"/>
+          <a:ext cx="0" cy="0"/>
+          <a:chOff x="0" y="0"/>
+          <a:chExt cx="0" cy="0"/>
+        </a:xfrm>
+      </p:grpSpPr>
+      <p:sp>
+        <p:nvSpPr>
+          <p:cNvPr id="2" name="Slide Image Placeholder 1"/>
+          <p:cNvSpPr>
+            <a:spLocks noGrp="1" noRot="1" noChangeAspect="1"/>
+          </p:cNvSpPr>
+          <p:nvPr>
+            <p:ph type="sldImg"/>
+          </p:nvPr>
+        </p:nvSpPr>
+        <p:spPr/>
+      </p:sp>
+      <p:sp>
+        <p:nvSpPr>
+          <p:cNvPr id="3" name="Notes Placeholder 2"/>
+          <p:cNvSpPr>
+            <a:spLocks noGrp="1"/>
+          </p:cNvSpPr>
+          <p:nvPr>
+            <p:ph type="body" idx="1"/>
+          </p:nvPr>
+        </p:nvSpPr>
+        <p:spPr/>
+        <p:txBody>
+          <a:bodyPr/>
+          <a:lstStyle/>
+          <a:p>
+            <a:endParaRPr lang="en-US" dirty="0"/>
+          </a:p>
+        </p:txBody>
+      </p:sp>
+      <p:sp>
+        <p:nvSpPr>
+          <p:cNvPr id="4" name="Slide Number Placeholder 3"/>
+          <p:cNvSpPr>
+            <a:spLocks noGrp="1"/>
+          </p:cNvSpPr>
+          <p:nvPr>
+            <p:ph type="sldNum" sz="quarter" idx="5"/>
+          </p:nvPr>
+        </p:nvSpPr>
+        <p:spPr/>
+        <p:txBody>
+          <a:bodyPr/>
+          <a:lstStyle/>
+          <a:p>
+            <a:fld id="{0837621E-2D94-4874-8D2F-F90746483814}" type="slidenum">
+              <a:rPr lang="en-US" smtClean="0"/>
+              <a:t>10</a:t>
+            </a:fld>
+            <a:endParaRPr lang="en-US"/>
+          </a:p>
+        </p:txBody>
+      </p:sp>
+    </p:spTree>
+    <p:extLst>
+      <p:ext uri="{BB962C8B-B14F-4D97-AF65-F5344CB8AC3E}">
+        <p14:creationId xmlns:p14="http://schemas.microsoft.com/office/powerpoint/2010/main" val="3728578688"/>
+      </p:ext>
+    </p:extLst>
+  </p:cSld>
+  <p:clrMapOvr>
+    <a:masterClrMapping/>
+  </p:clrMapOvr>
+</p:notes>
+</file>
+
+<file path=ppt/notesSlides/notesSlide9.xml><?xml version="1.0" encoding="utf-8"?>
+<p:notes xmlns:a="http://schemas.openxmlformats.org/drawingml/2006/main" xmlns:r="http://schemas.openxmlformats.org/officeDocument/2006/relationships" xmlns:p="http://schemas.openxmlformats.org/presentationml/2006/main">
+  <p:cSld>
+    <p:spTree>
+      <p:nvGrpSpPr>
+        <p:cNvPr id="1" name=""/>
+        <p:cNvGrpSpPr/>
+        <p:nvPr/>
+      </p:nvGrpSpPr>
+      <p:grpSpPr>
+        <a:xfrm>
+          <a:off x="0" y="0"/>
+          <a:ext cx="0" cy="0"/>
+          <a:chOff x="0" y="0"/>
+          <a:chExt cx="0" cy="0"/>
+        </a:xfrm>
+      </p:grpSpPr>
+      <p:sp>
+        <p:nvSpPr>
+          <p:cNvPr id="2" name="Slide Image Placeholder 1"/>
+          <p:cNvSpPr>
+            <a:spLocks noGrp="1" noRot="1" noChangeAspect="1"/>
+          </p:cNvSpPr>
+          <p:nvPr>
+            <p:ph type="sldImg"/>
+          </p:nvPr>
+        </p:nvSpPr>
+        <p:spPr/>
+      </p:sp>
+      <p:sp>
+        <p:nvSpPr>
+          <p:cNvPr id="3" name="Notes Placeholder 2"/>
+          <p:cNvSpPr>
+            <a:spLocks noGrp="1"/>
+          </p:cNvSpPr>
+          <p:nvPr>
+            <p:ph type="body" idx="1"/>
+          </p:nvPr>
+        </p:nvSpPr>
+        <p:spPr/>
+        <p:txBody>
+          <a:bodyPr/>
+          <a:lstStyle/>
+          <a:p>
+            <a:r>
+              <a:rPr lang="en-US" dirty="0"/>
+              <a:t>With a clean data set the data analysis phase can begin. There are many modeling techniques that can be used to analyze data. Our binary dataset is optimal for a logistical regression model because the prediction is categorical. A machine learning logistical regression algorithm can be used to predict the outcome of dependent variables based on previous training data. </a:t>
+            </a:r>
+          </a:p>
+          <a:p>
+            <a:endParaRPr lang="en-US" dirty="0"/>
+          </a:p>
+        </p:txBody>
+      </p:sp>
+      <p:sp>
+        <p:nvSpPr>
+          <p:cNvPr id="4" name="Slide Number Placeholder 3"/>
+          <p:cNvSpPr>
+            <a:spLocks noGrp="1"/>
+          </p:cNvSpPr>
+          <p:nvPr>
+            <p:ph type="sldNum" sz="quarter" idx="5"/>
+          </p:nvPr>
+        </p:nvSpPr>
+        <p:spPr/>
+        <p:txBody>
+          <a:bodyPr/>
+          <a:lstStyle/>
+          <a:p>
+            <a:fld id="{0837621E-2D94-4874-8D2F-F90746483814}" type="slidenum">
+              <a:rPr lang="en-US" smtClean="0"/>
+              <a:t>11</a:t>
+            </a:fld>
+            <a:endParaRPr lang="en-US"/>
+          </a:p>
+        </p:txBody>
+      </p:sp>
+    </p:spTree>
+    <p:extLst>
+      <p:ext uri="{BB962C8B-B14F-4D97-AF65-F5344CB8AC3E}">
+        <p14:creationId xmlns:p14="http://schemas.microsoft.com/office/powerpoint/2010/main" val="2308451573"/>
+      </p:ext>
+    </p:extLst>
+  </p:cSld>
+  <p:clrMapOvr>
+    <a:masterClrMapping/>
+  </p:clrMapOvr>
+</p:notes>
+</file>
+
 <file path=ppt/slideLayouts/slideLayout1.xml><?xml version="1.0" encoding="utf-8"?>
 <p:sldLayout xmlns:a="http://schemas.openxmlformats.org/drawingml/2006/main" xmlns:r="http://schemas.openxmlformats.org/officeDocument/2006/relationships" xmlns:p="http://schemas.openxmlformats.org/presentationml/2006/main" type="title" preserve="1">
   <p:cSld name="Title Slide">
@@ -734,7 +1821,7 @@
           <a:p>
             <a:fld id="{4AAD347D-5ACD-4C99-B74B-A9C85AD731AF}" type="datetimeFigureOut">
               <a:rPr lang="en-US" dirty="0"/>
-              <a:t>11/4/2021</a:t>
+              <a:t>11/6/2021</a:t>
             </a:fld>
             <a:endParaRPr lang="en-US" dirty="0"/>
           </a:p>
@@ -1004,7 +2091,7 @@
           <a:p>
             <a:fld id="{4509A250-FF31-4206-8172-F9D3106AACB1}" type="datetimeFigureOut">
               <a:rPr lang="en-US" dirty="0"/>
-              <a:t>11/4/2021</a:t>
+              <a:t>11/6/2021</a:t>
             </a:fld>
             <a:endParaRPr lang="en-US" dirty="0"/>
           </a:p>
@@ -1193,7 +2280,7 @@
           <a:p>
             <a:fld id="{4509A250-FF31-4206-8172-F9D3106AACB1}" type="datetimeFigureOut">
               <a:rPr lang="en-US" dirty="0"/>
-              <a:t>11/4/2021</a:t>
+              <a:t>11/6/2021</a:t>
             </a:fld>
             <a:endParaRPr lang="en-US" dirty="0"/>
           </a:p>
@@ -1456,7 +2543,7 @@
           <a:p>
             <a:fld id="{4509A250-FF31-4206-8172-F9D3106AACB1}" type="datetimeFigureOut">
               <a:rPr lang="en-US" dirty="0"/>
-              <a:t>11/4/2021</a:t>
+              <a:t>11/6/2021</a:t>
             </a:fld>
             <a:endParaRPr lang="en-US" dirty="0"/>
           </a:p>
@@ -1783,7 +2870,7 @@
           <a:p>
             <a:fld id="{4509A250-FF31-4206-8172-F9D3106AACB1}" type="datetimeFigureOut">
               <a:rPr lang="en-US" dirty="0"/>
-              <a:t>11/4/2021</a:t>
+              <a:t>11/6/2021</a:t>
             </a:fld>
             <a:endParaRPr lang="en-US" dirty="0"/>
           </a:p>
@@ -2388,7 +3475,7 @@
           <a:p>
             <a:fld id="{4509A250-FF31-4206-8172-F9D3106AACB1}" type="datetimeFigureOut">
               <a:rPr lang="en-US" dirty="0"/>
-              <a:t>11/4/2021</a:t>
+              <a:t>11/6/2021</a:t>
             </a:fld>
             <a:endParaRPr lang="en-US" dirty="0"/>
           </a:p>
@@ -3230,7 +4317,7 @@
           <a:p>
             <a:fld id="{4509A250-FF31-4206-8172-F9D3106AACB1}" type="datetimeFigureOut">
               <a:rPr lang="en-US" dirty="0"/>
-              <a:t>11/4/2021</a:t>
+              <a:t>11/6/2021</a:t>
             </a:fld>
             <a:endParaRPr lang="en-US" dirty="0"/>
           </a:p>
@@ -3395,7 +4482,7 @@
           <a:p>
             <a:fld id="{4509A250-FF31-4206-8172-F9D3106AACB1}" type="datetimeFigureOut">
               <a:rPr lang="en-US" dirty="0"/>
-              <a:t>11/4/2021</a:t>
+              <a:t>11/6/2021</a:t>
             </a:fld>
             <a:endParaRPr lang="en-US" dirty="0"/>
           </a:p>
@@ -3570,7 +4657,7 @@
           <a:p>
             <a:fld id="{4509A250-FF31-4206-8172-F9D3106AACB1}" type="datetimeFigureOut">
               <a:rPr lang="en-US" dirty="0"/>
-              <a:t>11/4/2021</a:t>
+              <a:t>11/6/2021</a:t>
             </a:fld>
             <a:endParaRPr lang="en-US" dirty="0"/>
           </a:p>
@@ -3735,7 +4822,7 @@
           <a:p>
             <a:fld id="{4509A250-FF31-4206-8172-F9D3106AACB1}" type="datetimeFigureOut">
               <a:rPr lang="en-US" dirty="0"/>
-              <a:t>11/4/2021</a:t>
+              <a:t>11/6/2021</a:t>
             </a:fld>
             <a:endParaRPr lang="en-US" dirty="0"/>
           </a:p>
@@ -3974,7 +5061,7 @@
           <a:p>
             <a:fld id="{4509A250-FF31-4206-8172-F9D3106AACB1}" type="datetimeFigureOut">
               <a:rPr lang="en-US" dirty="0"/>
-              <a:t>11/4/2021</a:t>
+              <a:t>11/6/2021</a:t>
             </a:fld>
             <a:endParaRPr lang="en-US" dirty="0"/>
           </a:p>
@@ -4261,7 +5348,7 @@
           <a:p>
             <a:fld id="{4509A250-FF31-4206-8172-F9D3106AACB1}" type="datetimeFigureOut">
               <a:rPr lang="en-US" dirty="0"/>
-              <a:t>11/4/2021</a:t>
+              <a:t>11/6/2021</a:t>
             </a:fld>
             <a:endParaRPr lang="en-US" dirty="0"/>
           </a:p>
@@ -4694,7 +5781,7 @@
           <a:p>
             <a:fld id="{4509A250-FF31-4206-8172-F9D3106AACB1}" type="datetimeFigureOut">
               <a:rPr lang="en-US" dirty="0"/>
-              <a:t>11/4/2021</a:t>
+              <a:t>11/6/2021</a:t>
             </a:fld>
             <a:endParaRPr lang="en-US" dirty="0"/>
           </a:p>
@@ -4807,7 +5894,7 @@
           <a:p>
             <a:fld id="{4509A250-FF31-4206-8172-F9D3106AACB1}" type="datetimeFigureOut">
               <a:rPr lang="en-US" dirty="0"/>
-              <a:t>11/4/2021</a:t>
+              <a:t>11/6/2021</a:t>
             </a:fld>
             <a:endParaRPr lang="en-US" dirty="0"/>
           </a:p>
@@ -4897,7 +5984,7 @@
           <a:p>
             <a:fld id="{4509A250-FF31-4206-8172-F9D3106AACB1}" type="datetimeFigureOut">
               <a:rPr lang="en-US" dirty="0"/>
-              <a:t>11/4/2021</a:t>
+              <a:t>11/6/2021</a:t>
             </a:fld>
             <a:endParaRPr lang="en-US" dirty="0"/>
           </a:p>
@@ -5171,7 +6258,7 @@
           <a:p>
             <a:fld id="{4509A250-FF31-4206-8172-F9D3106AACB1}" type="datetimeFigureOut">
               <a:rPr lang="en-US" dirty="0"/>
-              <a:t>11/4/2021</a:t>
+              <a:t>11/6/2021</a:t>
             </a:fld>
             <a:endParaRPr lang="en-US" dirty="0"/>
           </a:p>
@@ -5441,7 +6528,7 @@
           <a:p>
             <a:fld id="{4509A250-FF31-4206-8172-F9D3106AACB1}" type="datetimeFigureOut">
               <a:rPr lang="en-US" dirty="0"/>
-              <a:t>11/4/2021</a:t>
+              <a:t>11/6/2021</a:t>
             </a:fld>
             <a:endParaRPr lang="en-US" dirty="0"/>
           </a:p>
@@ -5865,7 +6952,7 @@
           <a:p>
             <a:fld id="{4509A250-FF31-4206-8172-F9D3106AACB1}" type="datetimeFigureOut">
               <a:rPr lang="en-US" dirty="0"/>
-              <a:t>11/4/2021</a:t>
+              <a:t>11/6/2021</a:t>
             </a:fld>
             <a:endParaRPr lang="en-US" dirty="0"/>
           </a:p>
@@ -6380,8 +7467,8 @@
         </p:nvSpPr>
         <p:spPr>
           <a:xfrm>
-            <a:off x="1154955" y="1447800"/>
-            <a:ext cx="8825658" cy="2790713"/>
+            <a:off x="864348" y="638287"/>
+            <a:ext cx="10463304" cy="2944009"/>
           </a:xfrm>
         </p:spPr>
         <p:txBody>
@@ -6413,7 +7500,7 @@
         </p:nvSpPr>
         <p:spPr>
           <a:xfrm>
-            <a:off x="1154955" y="4238513"/>
+            <a:off x="982832" y="4195482"/>
             <a:ext cx="8825658" cy="1400287"/>
           </a:xfrm>
         </p:spPr>
@@ -6473,6 +7560,412 @@
     <p:extLst>
       <p:ext uri="{BB962C8B-B14F-4D97-AF65-F5344CB8AC3E}">
         <p14:creationId xmlns:p14="http://schemas.microsoft.com/office/powerpoint/2010/main" val="536422157"/>
+      </p:ext>
+    </p:extLst>
+  </p:cSld>
+  <p:clrMapOvr>
+    <a:masterClrMapping/>
+  </p:clrMapOvr>
+</p:sld>
+</file>
+
+<file path=ppt/slides/slide10.xml><?xml version="1.0" encoding="utf-8"?>
+<p:sld xmlns:a="http://schemas.openxmlformats.org/drawingml/2006/main" xmlns:r="http://schemas.openxmlformats.org/officeDocument/2006/relationships" xmlns:p="http://schemas.openxmlformats.org/presentationml/2006/main">
+  <p:cSld>
+    <p:spTree>
+      <p:nvGrpSpPr>
+        <p:cNvPr id="1" name=""/>
+        <p:cNvGrpSpPr/>
+        <p:nvPr/>
+      </p:nvGrpSpPr>
+      <p:grpSpPr>
+        <a:xfrm>
+          <a:off x="0" y="0"/>
+          <a:ext cx="0" cy="0"/>
+          <a:chOff x="0" y="0"/>
+          <a:chExt cx="0" cy="0"/>
+        </a:xfrm>
+      </p:grpSpPr>
+      <p:sp>
+        <p:nvSpPr>
+          <p:cNvPr id="2" name="Title 1">
+            <a:extLst>
+              <a:ext uri="{FF2B5EF4-FFF2-40B4-BE49-F238E27FC236}">
+                <a16:creationId xmlns:a16="http://schemas.microsoft.com/office/drawing/2014/main" id="{52A2E9C3-F530-467F-91D5-B565842DB174}"/>
+              </a:ext>
+            </a:extLst>
+          </p:cNvPr>
+          <p:cNvSpPr>
+            <a:spLocks noGrp="1"/>
+          </p:cNvSpPr>
+          <p:nvPr>
+            <p:ph type="title"/>
+          </p:nvPr>
+        </p:nvSpPr>
+        <p:spPr/>
+        <p:txBody>
+          <a:bodyPr/>
+          <a:lstStyle/>
+          <a:p>
+            <a:r>
+              <a:rPr lang="en-US" dirty="0"/>
+              <a:t>Database - </a:t>
+            </a:r>
+            <a:r>
+              <a:rPr lang="en-US" dirty="0" err="1"/>
+              <a:t>pgAdmin</a:t>
+            </a:r>
+            <a:r>
+              <a:rPr lang="en-US" dirty="0"/>
+              <a:t> </a:t>
+            </a:r>
+            <a:br>
+              <a:rPr lang="en-US" dirty="0"/>
+            </a:br>
+            <a:endParaRPr lang="en-US" dirty="0"/>
+          </a:p>
+        </p:txBody>
+      </p:sp>
+      <p:pic>
+        <p:nvPicPr>
+          <p:cNvPr id="4" name="Picture 3">
+            <a:extLst>
+              <a:ext uri="{FF2B5EF4-FFF2-40B4-BE49-F238E27FC236}">
+                <a16:creationId xmlns:a16="http://schemas.microsoft.com/office/drawing/2014/main" id="{0AC9D65A-834E-4CD7-84F5-768446241EA0}"/>
+              </a:ext>
+            </a:extLst>
+          </p:cNvPr>
+          <p:cNvPicPr>
+            <a:picLocks noChangeAspect="1"/>
+          </p:cNvPicPr>
+          <p:nvPr/>
+        </p:nvPicPr>
+        <p:blipFill>
+          <a:blip r:embed="rId3"/>
+          <a:stretch>
+            <a:fillRect/>
+          </a:stretch>
+        </p:blipFill>
+        <p:spPr>
+          <a:xfrm>
+            <a:off x="724343" y="1593333"/>
+            <a:ext cx="5750885" cy="4531457"/>
+          </a:xfrm>
+          <a:prstGeom prst="rect">
+            <a:avLst/>
+          </a:prstGeom>
+        </p:spPr>
+      </p:pic>
+    </p:spTree>
+    <p:extLst>
+      <p:ext uri="{BB962C8B-B14F-4D97-AF65-F5344CB8AC3E}">
+        <p14:creationId xmlns:p14="http://schemas.microsoft.com/office/powerpoint/2010/main" val="1507510308"/>
+      </p:ext>
+    </p:extLst>
+  </p:cSld>
+  <p:clrMapOvr>
+    <a:masterClrMapping/>
+  </p:clrMapOvr>
+</p:sld>
+</file>
+
+<file path=ppt/slides/slide11.xml><?xml version="1.0" encoding="utf-8"?>
+<p:sld xmlns:a="http://schemas.openxmlformats.org/drawingml/2006/main" xmlns:r="http://schemas.openxmlformats.org/officeDocument/2006/relationships" xmlns:p="http://schemas.openxmlformats.org/presentationml/2006/main">
+  <p:cSld>
+    <p:spTree>
+      <p:nvGrpSpPr>
+        <p:cNvPr id="1" name=""/>
+        <p:cNvGrpSpPr/>
+        <p:nvPr/>
+      </p:nvGrpSpPr>
+      <p:grpSpPr>
+        <a:xfrm>
+          <a:off x="0" y="0"/>
+          <a:ext cx="0" cy="0"/>
+          <a:chOff x="0" y="0"/>
+          <a:chExt cx="0" cy="0"/>
+        </a:xfrm>
+      </p:grpSpPr>
+      <p:sp>
+        <p:nvSpPr>
+          <p:cNvPr id="2" name="Title 1">
+            <a:extLst>
+              <a:ext uri="{FF2B5EF4-FFF2-40B4-BE49-F238E27FC236}">
+                <a16:creationId xmlns:a16="http://schemas.microsoft.com/office/drawing/2014/main" id="{D758362C-ABAD-4436-8BB9-062BA36322E7}"/>
+              </a:ext>
+            </a:extLst>
+          </p:cNvPr>
+          <p:cNvSpPr>
+            <a:spLocks noGrp="1"/>
+          </p:cNvSpPr>
+          <p:nvPr>
+            <p:ph type="title"/>
+          </p:nvPr>
+        </p:nvSpPr>
+        <p:spPr/>
+        <p:txBody>
+          <a:bodyPr/>
+          <a:lstStyle/>
+          <a:p>
+            <a:r>
+              <a:rPr lang="en-US" dirty="0"/>
+              <a:t>Data Analysis Phase</a:t>
+            </a:r>
+          </a:p>
+        </p:txBody>
+      </p:sp>
+      <p:sp>
+        <p:nvSpPr>
+          <p:cNvPr id="3" name="Content Placeholder 2">
+            <a:extLst>
+              <a:ext uri="{FF2B5EF4-FFF2-40B4-BE49-F238E27FC236}">
+                <a16:creationId xmlns:a16="http://schemas.microsoft.com/office/drawing/2014/main" id="{8B2325B3-2749-4BDA-A7F6-36A97F538A10}"/>
+              </a:ext>
+            </a:extLst>
+          </p:cNvPr>
+          <p:cNvSpPr>
+            <a:spLocks noGrp="1"/>
+          </p:cNvSpPr>
+          <p:nvPr>
+            <p:ph idx="1"/>
+          </p:nvPr>
+        </p:nvSpPr>
+        <p:spPr/>
+        <p:txBody>
+          <a:bodyPr/>
+          <a:lstStyle/>
+          <a:p>
+            <a:r>
+              <a:rPr lang="en-US" dirty="0"/>
+              <a:t>Choosing a model</a:t>
+            </a:r>
+          </a:p>
+          <a:p>
+            <a:pPr lvl="1" indent="-342900">
+              <a:buAutoNum type="arabicPeriod"/>
+            </a:pPr>
+            <a:r>
+              <a:rPr lang="en-US" dirty="0"/>
+              <a:t>Logistic Regression</a:t>
+            </a:r>
+          </a:p>
+          <a:p>
+            <a:pPr lvl="1" indent="-342900">
+              <a:buAutoNum type="arabicPeriod"/>
+            </a:pPr>
+            <a:r>
+              <a:rPr lang="en-US" dirty="0"/>
+              <a:t>Decision Tree</a:t>
+            </a:r>
+          </a:p>
+          <a:p>
+            <a:pPr lvl="1" indent="-342900">
+              <a:buAutoNum type="arabicPeriod"/>
+            </a:pPr>
+            <a:r>
+              <a:rPr lang="en-US" dirty="0"/>
+              <a:t>Random Forest</a:t>
+            </a:r>
+          </a:p>
+          <a:p>
+            <a:pPr lvl="1" indent="-342900">
+              <a:buAutoNum type="arabicPeriod"/>
+            </a:pPr>
+            <a:r>
+              <a:rPr lang="en-US" dirty="0"/>
+              <a:t>Naïve Bayes</a:t>
+            </a:r>
+          </a:p>
+        </p:txBody>
+      </p:sp>
+    </p:spTree>
+    <p:extLst>
+      <p:ext uri="{BB962C8B-B14F-4D97-AF65-F5344CB8AC3E}">
+        <p14:creationId xmlns:p14="http://schemas.microsoft.com/office/powerpoint/2010/main" val="2883907546"/>
+      </p:ext>
+    </p:extLst>
+  </p:cSld>
+  <p:clrMapOvr>
+    <a:masterClrMapping/>
+  </p:clrMapOvr>
+</p:sld>
+</file>
+
+<file path=ppt/slides/slide12.xml><?xml version="1.0" encoding="utf-8"?>
+<p:sld xmlns:a="http://schemas.openxmlformats.org/drawingml/2006/main" xmlns:r="http://schemas.openxmlformats.org/officeDocument/2006/relationships" xmlns:p="http://schemas.openxmlformats.org/presentationml/2006/main">
+  <p:cSld>
+    <p:spTree>
+      <p:nvGrpSpPr>
+        <p:cNvPr id="1" name=""/>
+        <p:cNvGrpSpPr/>
+        <p:nvPr/>
+      </p:nvGrpSpPr>
+      <p:grpSpPr>
+        <a:xfrm>
+          <a:off x="0" y="0"/>
+          <a:ext cx="0" cy="0"/>
+          <a:chOff x="0" y="0"/>
+          <a:chExt cx="0" cy="0"/>
+        </a:xfrm>
+      </p:grpSpPr>
+      <p:sp>
+        <p:nvSpPr>
+          <p:cNvPr id="2" name="Title 1">
+            <a:extLst>
+              <a:ext uri="{FF2B5EF4-FFF2-40B4-BE49-F238E27FC236}">
+                <a16:creationId xmlns:a16="http://schemas.microsoft.com/office/drawing/2014/main" id="{6E28F757-57B2-4B04-9283-FA574FD47DA1}"/>
+              </a:ext>
+            </a:extLst>
+          </p:cNvPr>
+          <p:cNvSpPr>
+            <a:spLocks noGrp="1"/>
+          </p:cNvSpPr>
+          <p:nvPr>
+            <p:ph type="title"/>
+          </p:nvPr>
+        </p:nvSpPr>
+        <p:spPr/>
+        <p:txBody>
+          <a:bodyPr/>
+          <a:lstStyle/>
+          <a:p>
+            <a:r>
+              <a:rPr lang="en-US" dirty="0"/>
+              <a:t>Machine Learning</a:t>
+            </a:r>
+          </a:p>
+        </p:txBody>
+      </p:sp>
+      <p:sp>
+        <p:nvSpPr>
+          <p:cNvPr id="3" name="Content Placeholder 2">
+            <a:extLst>
+              <a:ext uri="{FF2B5EF4-FFF2-40B4-BE49-F238E27FC236}">
+                <a16:creationId xmlns:a16="http://schemas.microsoft.com/office/drawing/2014/main" id="{0B8C2DD4-FE9F-4DB0-A174-04A3B52DE626}"/>
+              </a:ext>
+            </a:extLst>
+          </p:cNvPr>
+          <p:cNvSpPr>
+            <a:spLocks noGrp="1"/>
+          </p:cNvSpPr>
+          <p:nvPr>
+            <p:ph idx="1"/>
+          </p:nvPr>
+        </p:nvSpPr>
+        <p:spPr/>
+        <p:txBody>
+          <a:bodyPr/>
+          <a:lstStyle/>
+          <a:p>
+            <a:endParaRPr lang="en-US"/>
+          </a:p>
+        </p:txBody>
+      </p:sp>
+    </p:spTree>
+    <p:extLst>
+      <p:ext uri="{BB962C8B-B14F-4D97-AF65-F5344CB8AC3E}">
+        <p14:creationId xmlns:p14="http://schemas.microsoft.com/office/powerpoint/2010/main" val="1953016850"/>
+      </p:ext>
+    </p:extLst>
+  </p:cSld>
+  <p:clrMapOvr>
+    <a:masterClrMapping/>
+  </p:clrMapOvr>
+</p:sld>
+</file>
+
+<file path=ppt/slides/slide13.xml><?xml version="1.0" encoding="utf-8"?>
+<p:sld xmlns:a="http://schemas.openxmlformats.org/drawingml/2006/main" xmlns:r="http://schemas.openxmlformats.org/officeDocument/2006/relationships" xmlns:p="http://schemas.openxmlformats.org/presentationml/2006/main">
+  <p:cSld>
+    <p:spTree>
+      <p:nvGrpSpPr>
+        <p:cNvPr id="1" name=""/>
+        <p:cNvGrpSpPr/>
+        <p:nvPr/>
+      </p:nvGrpSpPr>
+      <p:grpSpPr>
+        <a:xfrm>
+          <a:off x="0" y="0"/>
+          <a:ext cx="0" cy="0"/>
+          <a:chOff x="0" y="0"/>
+          <a:chExt cx="0" cy="0"/>
+        </a:xfrm>
+      </p:grpSpPr>
+      <p:sp>
+        <p:nvSpPr>
+          <p:cNvPr id="2" name="Title 1">
+            <a:extLst>
+              <a:ext uri="{FF2B5EF4-FFF2-40B4-BE49-F238E27FC236}">
+                <a16:creationId xmlns:a16="http://schemas.microsoft.com/office/drawing/2014/main" id="{0D8C7776-FDA1-4F89-ACE0-A5C058D0589D}"/>
+              </a:ext>
+            </a:extLst>
+          </p:cNvPr>
+          <p:cNvSpPr>
+            <a:spLocks noGrp="1"/>
+          </p:cNvSpPr>
+          <p:nvPr>
+            <p:ph type="title"/>
+          </p:nvPr>
+        </p:nvSpPr>
+        <p:spPr/>
+        <p:txBody>
+          <a:bodyPr/>
+          <a:lstStyle/>
+          <a:p>
+            <a:r>
+              <a:rPr lang="en-US" dirty="0"/>
+              <a:t>Dashboard</a:t>
+            </a:r>
+          </a:p>
+        </p:txBody>
+      </p:sp>
+      <p:sp>
+        <p:nvSpPr>
+          <p:cNvPr id="3" name="Content Placeholder 2">
+            <a:extLst>
+              <a:ext uri="{FF2B5EF4-FFF2-40B4-BE49-F238E27FC236}">
+                <a16:creationId xmlns:a16="http://schemas.microsoft.com/office/drawing/2014/main" id="{7F889976-0B08-40AE-9EB7-1DE55CE6DF65}"/>
+              </a:ext>
+            </a:extLst>
+          </p:cNvPr>
+          <p:cNvSpPr>
+            <a:spLocks noGrp="1"/>
+          </p:cNvSpPr>
+          <p:nvPr>
+            <p:ph idx="1"/>
+          </p:nvPr>
+        </p:nvSpPr>
+        <p:spPr/>
+        <p:txBody>
+          <a:bodyPr/>
+          <a:lstStyle/>
+          <a:p>
+            <a:r>
+              <a:rPr lang="en-US" sz="2800" dirty="0"/>
+              <a:t>Interactive storyboard created in Tableau</a:t>
+            </a:r>
+          </a:p>
+          <a:p>
+            <a:pPr marL="0" indent="0">
+              <a:buNone/>
+            </a:pPr>
+            <a:endParaRPr lang="en-US" dirty="0"/>
+          </a:p>
+          <a:p>
+            <a:pPr marL="0" indent="0">
+              <a:buNone/>
+            </a:pPr>
+            <a:r>
+              <a:rPr lang="en-US" dirty="0"/>
+              <a:t>Follow the link below:</a:t>
+            </a:r>
+          </a:p>
+        </p:txBody>
+      </p:sp>
+    </p:spTree>
+    <p:extLst>
+      <p:ext uri="{BB962C8B-B14F-4D97-AF65-F5344CB8AC3E}">
+        <p14:creationId xmlns:p14="http://schemas.microsoft.com/office/powerpoint/2010/main" val="1688324141"/>
       </p:ext>
     </p:extLst>
   </p:cSld>
@@ -6557,8 +8050,14 @@
             <a:pPr lvl="1"/>
             <a:r>
               <a:rPr lang="en-US" dirty="0"/>
-              <a:t>Developing a model where select symptoms can be input to make disease predictions can help diagnosing diseases faster</a:t>
-            </a:r>
+              <a:t>Developing a model where a list of symptoms can be input to make disease predictions can help diagnosing diseases faster</a:t>
+            </a:r>
+          </a:p>
+          <a:p>
+            <a:pPr marL="457200" lvl="1" indent="0">
+              <a:buNone/>
+            </a:pPr>
+            <a:endParaRPr lang="en-US" dirty="0"/>
           </a:p>
           <a:p>
             <a:r>
@@ -6570,14 +8069,14 @@
             <a:pPr lvl="1"/>
             <a:r>
               <a:rPr lang="en-US" dirty="0"/>
-              <a:t>The data we used is two csv file downloaded from Kaggle. </a:t>
+              <a:t>The data used is two csv files downloaded from Kaggle. </a:t>
             </a:r>
           </a:p>
           <a:p>
             <a:pPr lvl="1"/>
             <a:r>
               <a:rPr lang="en-US" dirty="0"/>
-              <a:t>The dataset provided is in a csv testing and csv training file.</a:t>
+              <a:t>The dataset utilized from a csv testing and csv training file.</a:t>
             </a:r>
           </a:p>
           <a:p>
@@ -6742,7 +8241,7 @@
           <p:cNvPr id="2" name="Title 1">
             <a:extLst>
               <a:ext uri="{FF2B5EF4-FFF2-40B4-BE49-F238E27FC236}">
-                <a16:creationId xmlns:a16="http://schemas.microsoft.com/office/drawing/2014/main" id="{D758362C-ABAD-4436-8BB9-062BA36322E7}"/>
+                <a16:creationId xmlns:a16="http://schemas.microsoft.com/office/drawing/2014/main" id="{7FA67A2B-8F06-4C08-AA3B-735A11D451AE}"/>
               </a:ext>
             </a:extLst>
           </p:cNvPr>
@@ -6760,7 +8259,7 @@
           <a:p>
             <a:r>
               <a:rPr lang="en-US" dirty="0"/>
-              <a:t>Disease Prediction using Machine Learning</a:t>
+              <a:t>Technologies and Languages</a:t>
             </a:r>
           </a:p>
         </p:txBody>
@@ -6770,7 +8269,7 @@
           <p:cNvPr id="3" name="Content Placeholder 2">
             <a:extLst>
               <a:ext uri="{FF2B5EF4-FFF2-40B4-BE49-F238E27FC236}">
-                <a16:creationId xmlns:a16="http://schemas.microsoft.com/office/drawing/2014/main" id="{8B2325B3-2749-4BDA-A7F6-36A97F538A10}"/>
+                <a16:creationId xmlns:a16="http://schemas.microsoft.com/office/drawing/2014/main" id="{59929EAB-D0FC-4492-9485-EBC78DA3EDFB}"/>
               </a:ext>
             </a:extLst>
           </p:cNvPr>
@@ -6788,41 +8287,47 @@
           <a:p>
             <a:r>
               <a:rPr lang="en-US" dirty="0"/>
-              <a:t>Description of Data Exploration and Analysis </a:t>
-            </a:r>
+              <a:t>Python</a:t>
+            </a:r>
+          </a:p>
+          <a:p>
+            <a:pPr lvl="1"/>
+            <a:r>
+              <a:rPr lang="en-US" dirty="0"/>
+              <a:t>Pandas</a:t>
+            </a:r>
+          </a:p>
+          <a:p>
+            <a:pPr lvl="1"/>
             <a:r>
               <a:rPr lang="en-US" dirty="0" err="1"/>
-              <a:t>Phas</a:t>
-            </a:r>
-            <a:r>
-              <a:rPr lang="en-US" dirty="0"/>
-              <a:t>	e</a:t>
-            </a:r>
-          </a:p>
-          <a:p>
-            <a:pPr lvl="1"/>
-            <a:r>
-              <a:rPr lang="en-US" dirty="0"/>
-              <a:t>A key part of the data exploration phase is preprocessing the data.	</a:t>
-            </a:r>
-          </a:p>
-          <a:p>
-            <a:pPr lvl="2"/>
-            <a:r>
-              <a:rPr lang="en-US" dirty="0"/>
-              <a:t>Data Types evaluated</a:t>
-            </a:r>
-          </a:p>
-          <a:p>
-            <a:pPr lvl="2"/>
-            <a:r>
-              <a:rPr lang="en-US" dirty="0"/>
-              <a:t>Null </a:t>
-            </a:r>
-            <a:r>
-              <a:rPr lang="en-US"/>
-              <a:t>values removed</a:t>
-            </a:r>
+              <a:t>MatPlotLib</a:t>
+            </a:r>
+            <a:endParaRPr lang="en-US" dirty="0"/>
+          </a:p>
+          <a:p>
+            <a:r>
+              <a:rPr lang="en-US" dirty="0" err="1"/>
+              <a:t>pgAdmin</a:t>
+            </a:r>
+            <a:endParaRPr lang="en-US" dirty="0"/>
+          </a:p>
+          <a:p>
+            <a:r>
+              <a:rPr lang="en-US" dirty="0"/>
+              <a:t>PostgreSQL</a:t>
+            </a:r>
+          </a:p>
+          <a:p>
+            <a:r>
+              <a:rPr lang="en-US" dirty="0"/>
+              <a:t>Tableau</a:t>
+            </a:r>
+          </a:p>
+          <a:p>
+            <a:endParaRPr lang="en-US" dirty="0"/>
+          </a:p>
+          <a:p>
             <a:endParaRPr lang="en-US" dirty="0"/>
           </a:p>
         </p:txBody>
@@ -6830,7 +8335,979 @@
     </p:spTree>
     <p:extLst>
       <p:ext uri="{BB962C8B-B14F-4D97-AF65-F5344CB8AC3E}">
-        <p14:creationId xmlns:p14="http://schemas.microsoft.com/office/powerpoint/2010/main" val="2883907546"/>
+        <p14:creationId xmlns:p14="http://schemas.microsoft.com/office/powerpoint/2010/main" val="2959090660"/>
+      </p:ext>
+    </p:extLst>
+  </p:cSld>
+  <p:clrMapOvr>
+    <a:masterClrMapping/>
+  </p:clrMapOvr>
+</p:sld>
+</file>
+
+<file path=ppt/slides/slide5.xml><?xml version="1.0" encoding="utf-8"?>
+<p:sld xmlns:a="http://schemas.openxmlformats.org/drawingml/2006/main" xmlns:r="http://schemas.openxmlformats.org/officeDocument/2006/relationships" xmlns:p="http://schemas.openxmlformats.org/presentationml/2006/main">
+  <p:cSld>
+    <p:spTree>
+      <p:nvGrpSpPr>
+        <p:cNvPr id="1" name=""/>
+        <p:cNvGrpSpPr/>
+        <p:nvPr/>
+      </p:nvGrpSpPr>
+      <p:grpSpPr>
+        <a:xfrm>
+          <a:off x="0" y="0"/>
+          <a:ext cx="0" cy="0"/>
+          <a:chOff x="0" y="0"/>
+          <a:chExt cx="0" cy="0"/>
+        </a:xfrm>
+      </p:grpSpPr>
+      <p:sp>
+        <p:nvSpPr>
+          <p:cNvPr id="2" name="Title 1">
+            <a:extLst>
+              <a:ext uri="{FF2B5EF4-FFF2-40B4-BE49-F238E27FC236}">
+                <a16:creationId xmlns:a16="http://schemas.microsoft.com/office/drawing/2014/main" id="{723334D1-B7E0-45E3-AF80-4731396B9AAC}"/>
+              </a:ext>
+            </a:extLst>
+          </p:cNvPr>
+          <p:cNvSpPr>
+            <a:spLocks noGrp="1"/>
+          </p:cNvSpPr>
+          <p:nvPr>
+            <p:ph type="title"/>
+          </p:nvPr>
+        </p:nvSpPr>
+        <p:spPr/>
+        <p:txBody>
+          <a:bodyPr/>
+          <a:lstStyle/>
+          <a:p>
+            <a:r>
+              <a:rPr lang="en-US" dirty="0"/>
+              <a:t>Data Exploration Phase</a:t>
+            </a:r>
+          </a:p>
+        </p:txBody>
+      </p:sp>
+      <p:sp>
+        <p:nvSpPr>
+          <p:cNvPr id="3" name="Text Placeholder 2">
+            <a:extLst>
+              <a:ext uri="{FF2B5EF4-FFF2-40B4-BE49-F238E27FC236}">
+                <a16:creationId xmlns:a16="http://schemas.microsoft.com/office/drawing/2014/main" id="{FEDEB578-263A-4026-8966-6821C32338B9}"/>
+              </a:ext>
+            </a:extLst>
+          </p:cNvPr>
+          <p:cNvSpPr>
+            <a:spLocks noGrp="1"/>
+          </p:cNvSpPr>
+          <p:nvPr>
+            <p:ph type="body" idx="1"/>
+          </p:nvPr>
+        </p:nvSpPr>
+        <p:spPr>
+          <a:xfrm>
+            <a:off x="1103312" y="1161729"/>
+            <a:ext cx="4396338" cy="576262"/>
+          </a:xfrm>
+        </p:spPr>
+        <p:txBody>
+          <a:bodyPr/>
+          <a:lstStyle/>
+          <a:p>
+            <a:r>
+              <a:rPr lang="en-US" b="1" u="sng" dirty="0"/>
+              <a:t>Preprocessing Data</a:t>
+            </a:r>
+          </a:p>
+        </p:txBody>
+      </p:sp>
+      <p:sp>
+        <p:nvSpPr>
+          <p:cNvPr id="4" name="Content Placeholder 3">
+            <a:extLst>
+              <a:ext uri="{FF2B5EF4-FFF2-40B4-BE49-F238E27FC236}">
+                <a16:creationId xmlns:a16="http://schemas.microsoft.com/office/drawing/2014/main" id="{113B55E9-5F54-4095-9350-D567D2D57927}"/>
+              </a:ext>
+            </a:extLst>
+          </p:cNvPr>
+          <p:cNvSpPr>
+            <a:spLocks noGrp="1"/>
+          </p:cNvSpPr>
+          <p:nvPr>
+            <p:ph sz="half" idx="2"/>
+          </p:nvPr>
+        </p:nvSpPr>
+        <p:spPr>
+          <a:xfrm>
+            <a:off x="1103311" y="1853248"/>
+            <a:ext cx="4992689" cy="3741738"/>
+          </a:xfrm>
+        </p:spPr>
+        <p:txBody>
+          <a:bodyPr/>
+          <a:lstStyle/>
+          <a:p>
+            <a:r>
+              <a:rPr lang="en-US" dirty="0"/>
+              <a:t>Data Types evaluated</a:t>
+            </a:r>
+          </a:p>
+          <a:p>
+            <a:pPr lvl="1"/>
+            <a:r>
+              <a:rPr lang="en-US" dirty="0"/>
+              <a:t>train_data.info()</a:t>
+            </a:r>
+          </a:p>
+          <a:p>
+            <a:pPr lvl="1"/>
+            <a:r>
+              <a:rPr lang="en-US" dirty="0"/>
+              <a:t>test_data.info()</a:t>
+            </a:r>
+          </a:p>
+          <a:p>
+            <a:pPr lvl="1"/>
+            <a:r>
+              <a:rPr lang="en-US" dirty="0"/>
+              <a:t>train_data.describe()</a:t>
+            </a:r>
+          </a:p>
+          <a:p>
+            <a:pPr lvl="1"/>
+            <a:r>
+              <a:rPr lang="en-US" dirty="0"/>
+              <a:t>test_data.describe()</a:t>
+            </a:r>
+          </a:p>
+          <a:p>
+            <a:r>
+              <a:rPr lang="en-US" dirty="0"/>
+              <a:t>Null values removed</a:t>
+            </a:r>
+          </a:p>
+          <a:p>
+            <a:pPr lvl="1"/>
+            <a:r>
+              <a:rPr lang="en-US" dirty="0" err="1"/>
+              <a:t>train_data.isnull</a:t>
+            </a:r>
+            <a:r>
+              <a:rPr lang="en-US" dirty="0"/>
+              <a:t>().any()</a:t>
+            </a:r>
+          </a:p>
+          <a:p>
+            <a:pPr lvl="1"/>
+            <a:r>
+              <a:rPr lang="en-US" dirty="0" err="1"/>
+              <a:t>train_data.drop</a:t>
+            </a:r>
+            <a:r>
+              <a:rPr lang="en-US" dirty="0"/>
+              <a:t>(["Unnamed: 133"], axis=1, </a:t>
+            </a:r>
+            <a:r>
+              <a:rPr lang="en-US" dirty="0" err="1"/>
+              <a:t>inplace</a:t>
+            </a:r>
+            <a:r>
+              <a:rPr lang="en-US" dirty="0"/>
+              <a:t>=True)</a:t>
+            </a:r>
+          </a:p>
+          <a:p>
+            <a:endParaRPr lang="en-US" dirty="0"/>
+          </a:p>
+        </p:txBody>
+      </p:sp>
+      <p:pic>
+        <p:nvPicPr>
+          <p:cNvPr id="8" name="Content Placeholder 7">
+            <a:extLst>
+              <a:ext uri="{FF2B5EF4-FFF2-40B4-BE49-F238E27FC236}">
+                <a16:creationId xmlns:a16="http://schemas.microsoft.com/office/drawing/2014/main" id="{4FB8A4E8-B36B-445E-A0C9-9BCC9FA6EC03}"/>
+              </a:ext>
+            </a:extLst>
+          </p:cNvPr>
+          <p:cNvPicPr>
+            <a:picLocks noGrp="1" noChangeAspect="1"/>
+          </p:cNvPicPr>
+          <p:nvPr>
+            <p:ph sz="quarter" idx="4"/>
+          </p:nvPr>
+        </p:nvPicPr>
+        <p:blipFill>
+          <a:blip r:embed="rId3"/>
+          <a:stretch>
+            <a:fillRect/>
+          </a:stretch>
+        </p:blipFill>
+        <p:spPr>
+          <a:xfrm>
+            <a:off x="6759463" y="1853248"/>
+            <a:ext cx="4619682" cy="3239481"/>
+          </a:xfrm>
+        </p:spPr>
+      </p:pic>
+    </p:spTree>
+    <p:extLst>
+      <p:ext uri="{BB962C8B-B14F-4D97-AF65-F5344CB8AC3E}">
+        <p14:creationId xmlns:p14="http://schemas.microsoft.com/office/powerpoint/2010/main" val="3363762451"/>
+      </p:ext>
+    </p:extLst>
+  </p:cSld>
+  <p:clrMapOvr>
+    <a:masterClrMapping/>
+  </p:clrMapOvr>
+</p:sld>
+</file>
+
+<file path=ppt/slides/slide6.xml><?xml version="1.0" encoding="utf-8"?>
+<p:sld xmlns:a="http://schemas.openxmlformats.org/drawingml/2006/main" xmlns:r="http://schemas.openxmlformats.org/officeDocument/2006/relationships" xmlns:p="http://schemas.openxmlformats.org/presentationml/2006/main">
+  <p:cSld>
+    <p:spTree>
+      <p:nvGrpSpPr>
+        <p:cNvPr id="1" name=""/>
+        <p:cNvGrpSpPr/>
+        <p:nvPr/>
+      </p:nvGrpSpPr>
+      <p:grpSpPr>
+        <a:xfrm>
+          <a:off x="0" y="0"/>
+          <a:ext cx="0" cy="0"/>
+          <a:chOff x="0" y="0"/>
+          <a:chExt cx="0" cy="0"/>
+        </a:xfrm>
+      </p:grpSpPr>
+      <p:sp>
+        <p:nvSpPr>
+          <p:cNvPr id="2" name="Title 1">
+            <a:extLst>
+              <a:ext uri="{FF2B5EF4-FFF2-40B4-BE49-F238E27FC236}">
+                <a16:creationId xmlns:a16="http://schemas.microsoft.com/office/drawing/2014/main" id="{2E48FF0A-0204-4E26-9EF8-D41CBE569E98}"/>
+              </a:ext>
+            </a:extLst>
+          </p:cNvPr>
+          <p:cNvSpPr>
+            <a:spLocks noGrp="1"/>
+          </p:cNvSpPr>
+          <p:nvPr>
+            <p:ph type="title"/>
+          </p:nvPr>
+        </p:nvSpPr>
+        <p:spPr/>
+        <p:txBody>
+          <a:bodyPr/>
+          <a:lstStyle/>
+          <a:p>
+            <a:r>
+              <a:rPr lang="en-US" dirty="0"/>
+              <a:t>Training and Testing Data</a:t>
+            </a:r>
+          </a:p>
+        </p:txBody>
+      </p:sp>
+      <p:sp>
+        <p:nvSpPr>
+          <p:cNvPr id="3" name="Content Placeholder 2">
+            <a:extLst>
+              <a:ext uri="{FF2B5EF4-FFF2-40B4-BE49-F238E27FC236}">
+                <a16:creationId xmlns:a16="http://schemas.microsoft.com/office/drawing/2014/main" id="{262B6239-AE27-4B7C-ADDC-8920468BBDFC}"/>
+              </a:ext>
+            </a:extLst>
+          </p:cNvPr>
+          <p:cNvSpPr>
+            <a:spLocks noGrp="1"/>
+          </p:cNvSpPr>
+          <p:nvPr>
+            <p:ph idx="1"/>
+          </p:nvPr>
+        </p:nvSpPr>
+        <p:spPr>
+          <a:xfrm>
+            <a:off x="1103313" y="2052918"/>
+            <a:ext cx="4598240" cy="4195481"/>
+          </a:xfrm>
+        </p:spPr>
+        <p:txBody>
+          <a:bodyPr/>
+          <a:lstStyle/>
+          <a:p>
+            <a:r>
+              <a:rPr lang="en-US" dirty="0"/>
+              <a:t>Create Feature</a:t>
+            </a:r>
+          </a:p>
+        </p:txBody>
+      </p:sp>
+      <p:pic>
+        <p:nvPicPr>
+          <p:cNvPr id="5" name="Picture 4">
+            <a:extLst>
+              <a:ext uri="{FF2B5EF4-FFF2-40B4-BE49-F238E27FC236}">
+                <a16:creationId xmlns:a16="http://schemas.microsoft.com/office/drawing/2014/main" id="{2689E90B-E9F4-46F8-88A8-DFAE10944A9A}"/>
+              </a:ext>
+            </a:extLst>
+          </p:cNvPr>
+          <p:cNvPicPr>
+            <a:picLocks noChangeAspect="1"/>
+          </p:cNvPicPr>
+          <p:nvPr/>
+        </p:nvPicPr>
+        <p:blipFill>
+          <a:blip r:embed="rId3"/>
+          <a:stretch>
+            <a:fillRect/>
+          </a:stretch>
+        </p:blipFill>
+        <p:spPr>
+          <a:xfrm>
+            <a:off x="1232232" y="2693502"/>
+            <a:ext cx="4171950" cy="1019175"/>
+          </a:xfrm>
+          <a:prstGeom prst="rect">
+            <a:avLst/>
+          </a:prstGeom>
+        </p:spPr>
+      </p:pic>
+      <p:sp>
+        <p:nvSpPr>
+          <p:cNvPr id="6" name="Content Placeholder 2">
+            <a:extLst>
+              <a:ext uri="{FF2B5EF4-FFF2-40B4-BE49-F238E27FC236}">
+                <a16:creationId xmlns:a16="http://schemas.microsoft.com/office/drawing/2014/main" id="{63DA0C8B-725B-4F78-8907-98C458D0FFAD}"/>
+              </a:ext>
+            </a:extLst>
+          </p:cNvPr>
+          <p:cNvSpPr txBox="1">
+            <a:spLocks/>
+          </p:cNvSpPr>
+          <p:nvPr/>
+        </p:nvSpPr>
+        <p:spPr>
+          <a:xfrm>
+            <a:off x="6224920" y="2052917"/>
+            <a:ext cx="4992688" cy="4195481"/>
+          </a:xfrm>
+          <a:prstGeom prst="rect">
+            <a:avLst/>
+          </a:prstGeom>
+        </p:spPr>
+        <p:txBody>
+          <a:bodyPr vert="horz" lIns="91440" tIns="45720" rIns="91440" bIns="45720" rtlCol="0">
+            <a:normAutofit/>
+          </a:bodyPr>
+          <a:lstStyle>
+            <a:lvl1pPr marL="342900" indent="-342900" algn="l" defTabSz="457200" rtl="0" eaLnBrk="1" latinLnBrk="0" hangingPunct="1">
+              <a:spcBef>
+                <a:spcPts val="1000"/>
+              </a:spcBef>
+              <a:spcAft>
+                <a:spcPts val="0"/>
+              </a:spcAft>
+              <a:buClr>
+                <a:schemeClr val="accent1"/>
+              </a:buClr>
+              <a:buSzPct val="80000"/>
+              <a:buFont typeface="Wingdings 3" charset="2"/>
+              <a:buChar char=""/>
+              <a:defRPr sz="2000" b="0" i="0" kern="1200">
+                <a:solidFill>
+                  <a:schemeClr val="tx1"/>
+                </a:solidFill>
+                <a:latin typeface="+mj-lt"/>
+                <a:ea typeface="+mj-ea"/>
+                <a:cs typeface="+mj-cs"/>
+              </a:defRPr>
+            </a:lvl1pPr>
+            <a:lvl2pPr marL="742950" indent="-285750" algn="l" defTabSz="457200" rtl="0" eaLnBrk="1" latinLnBrk="0" hangingPunct="1">
+              <a:spcBef>
+                <a:spcPts val="1000"/>
+              </a:spcBef>
+              <a:spcAft>
+                <a:spcPts val="0"/>
+              </a:spcAft>
+              <a:buClr>
+                <a:schemeClr val="accent1"/>
+              </a:buClr>
+              <a:buSzPct val="80000"/>
+              <a:buFont typeface="Wingdings 3" charset="2"/>
+              <a:buChar char=""/>
+              <a:defRPr sz="1800" b="0" i="0" kern="1200">
+                <a:solidFill>
+                  <a:schemeClr val="tx1"/>
+                </a:solidFill>
+                <a:latin typeface="+mj-lt"/>
+                <a:ea typeface="+mj-ea"/>
+                <a:cs typeface="+mj-cs"/>
+              </a:defRPr>
+            </a:lvl2pPr>
+            <a:lvl3pPr marL="1143000" indent="-228600" algn="l" defTabSz="457200" rtl="0" eaLnBrk="1" latinLnBrk="0" hangingPunct="1">
+              <a:spcBef>
+                <a:spcPts val="1000"/>
+              </a:spcBef>
+              <a:spcAft>
+                <a:spcPts val="0"/>
+              </a:spcAft>
+              <a:buClr>
+                <a:schemeClr val="accent1"/>
+              </a:buClr>
+              <a:buSzPct val="80000"/>
+              <a:buFont typeface="Wingdings 3" charset="2"/>
+              <a:buChar char=""/>
+              <a:defRPr sz="1600" b="0" i="0" kern="1200">
+                <a:solidFill>
+                  <a:schemeClr val="tx1"/>
+                </a:solidFill>
+                <a:latin typeface="+mj-lt"/>
+                <a:ea typeface="+mj-ea"/>
+                <a:cs typeface="+mj-cs"/>
+              </a:defRPr>
+            </a:lvl3pPr>
+            <a:lvl4pPr marL="1600200" indent="-228600" algn="l" defTabSz="457200" rtl="0" eaLnBrk="1" latinLnBrk="0" hangingPunct="1">
+              <a:spcBef>
+                <a:spcPts val="1000"/>
+              </a:spcBef>
+              <a:spcAft>
+                <a:spcPts val="0"/>
+              </a:spcAft>
+              <a:buClr>
+                <a:schemeClr val="accent1"/>
+              </a:buClr>
+              <a:buSzPct val="80000"/>
+              <a:buFont typeface="Wingdings 3" charset="2"/>
+              <a:buChar char=""/>
+              <a:defRPr sz="1400" b="0" i="0" kern="1200">
+                <a:solidFill>
+                  <a:schemeClr val="tx1"/>
+                </a:solidFill>
+                <a:latin typeface="+mj-lt"/>
+                <a:ea typeface="+mj-ea"/>
+                <a:cs typeface="+mj-cs"/>
+              </a:defRPr>
+            </a:lvl4pPr>
+            <a:lvl5pPr marL="2057400" indent="-228600" algn="l" defTabSz="457200" rtl="0" eaLnBrk="1" latinLnBrk="0" hangingPunct="1">
+              <a:spcBef>
+                <a:spcPts val="1000"/>
+              </a:spcBef>
+              <a:spcAft>
+                <a:spcPts val="0"/>
+              </a:spcAft>
+              <a:buClr>
+                <a:schemeClr val="accent1"/>
+              </a:buClr>
+              <a:buSzPct val="80000"/>
+              <a:buFont typeface="Wingdings 3" charset="2"/>
+              <a:buChar char=""/>
+              <a:defRPr sz="1400" b="0" i="0" kern="1200">
+                <a:solidFill>
+                  <a:schemeClr val="tx1"/>
+                </a:solidFill>
+                <a:latin typeface="+mj-lt"/>
+                <a:ea typeface="+mj-ea"/>
+                <a:cs typeface="+mj-cs"/>
+              </a:defRPr>
+            </a:lvl5pPr>
+            <a:lvl6pPr marL="2514600" indent="-228600" algn="l" defTabSz="457200" rtl="0" eaLnBrk="1" latinLnBrk="0" hangingPunct="1">
+              <a:spcBef>
+                <a:spcPts val="1000"/>
+              </a:spcBef>
+              <a:spcAft>
+                <a:spcPts val="0"/>
+              </a:spcAft>
+              <a:buClr>
+                <a:schemeClr val="accent1"/>
+              </a:buClr>
+              <a:buSzPct val="80000"/>
+              <a:buFont typeface="Wingdings 3" charset="2"/>
+              <a:buChar char=""/>
+              <a:defRPr sz="1400" b="0" i="0" kern="1200">
+                <a:solidFill>
+                  <a:schemeClr val="tx1"/>
+                </a:solidFill>
+                <a:latin typeface="+mj-lt"/>
+                <a:ea typeface="+mj-ea"/>
+                <a:cs typeface="+mj-cs"/>
+              </a:defRPr>
+            </a:lvl6pPr>
+            <a:lvl7pPr marL="2971800" indent="-228600" algn="l" defTabSz="457200" rtl="0" eaLnBrk="1" latinLnBrk="0" hangingPunct="1">
+              <a:spcBef>
+                <a:spcPts val="1000"/>
+              </a:spcBef>
+              <a:spcAft>
+                <a:spcPts val="0"/>
+              </a:spcAft>
+              <a:buClr>
+                <a:schemeClr val="accent1"/>
+              </a:buClr>
+              <a:buSzPct val="80000"/>
+              <a:buFont typeface="Wingdings 3" charset="2"/>
+              <a:buChar char=""/>
+              <a:defRPr sz="1400" b="0" i="0" kern="1200">
+                <a:solidFill>
+                  <a:schemeClr val="tx1"/>
+                </a:solidFill>
+                <a:latin typeface="+mj-lt"/>
+                <a:ea typeface="+mj-ea"/>
+                <a:cs typeface="+mj-cs"/>
+              </a:defRPr>
+            </a:lvl7pPr>
+            <a:lvl8pPr marL="3429000" indent="-228600" algn="l" defTabSz="457200" rtl="0" eaLnBrk="1" latinLnBrk="0" hangingPunct="1">
+              <a:spcBef>
+                <a:spcPts val="1000"/>
+              </a:spcBef>
+              <a:spcAft>
+                <a:spcPts val="0"/>
+              </a:spcAft>
+              <a:buClr>
+                <a:schemeClr val="accent1"/>
+              </a:buClr>
+              <a:buSzPct val="80000"/>
+              <a:buFont typeface="Wingdings 3" charset="2"/>
+              <a:buChar char=""/>
+              <a:defRPr sz="1400" b="0" i="0" kern="1200">
+                <a:solidFill>
+                  <a:schemeClr val="tx1"/>
+                </a:solidFill>
+                <a:latin typeface="+mj-lt"/>
+                <a:ea typeface="+mj-ea"/>
+                <a:cs typeface="+mj-cs"/>
+              </a:defRPr>
+            </a:lvl8pPr>
+            <a:lvl9pPr marL="3886200" indent="-228600" algn="l" defTabSz="457200" rtl="0" eaLnBrk="1" latinLnBrk="0" hangingPunct="1">
+              <a:spcBef>
+                <a:spcPts val="1000"/>
+              </a:spcBef>
+              <a:spcAft>
+                <a:spcPts val="0"/>
+              </a:spcAft>
+              <a:buClr>
+                <a:schemeClr val="accent1"/>
+              </a:buClr>
+              <a:buSzPct val="80000"/>
+              <a:buFont typeface="Wingdings 3" charset="2"/>
+              <a:buChar char=""/>
+              <a:defRPr sz="1400" b="0" i="0" kern="1200">
+                <a:solidFill>
+                  <a:schemeClr val="tx1"/>
+                </a:solidFill>
+                <a:latin typeface="+mj-lt"/>
+                <a:ea typeface="+mj-ea"/>
+                <a:cs typeface="+mj-cs"/>
+              </a:defRPr>
+            </a:lvl9pPr>
+          </a:lstStyle>
+          <a:p>
+            <a:r>
+              <a:rPr lang="en-US" dirty="0"/>
+              <a:t>Create Target</a:t>
+            </a:r>
+          </a:p>
+          <a:p>
+            <a:endParaRPr lang="en-US" dirty="0"/>
+          </a:p>
+        </p:txBody>
+      </p:sp>
+      <p:pic>
+        <p:nvPicPr>
+          <p:cNvPr id="8" name="Picture 7">
+            <a:extLst>
+              <a:ext uri="{FF2B5EF4-FFF2-40B4-BE49-F238E27FC236}">
+                <a16:creationId xmlns:a16="http://schemas.microsoft.com/office/drawing/2014/main" id="{59D7E894-A33B-49CA-988F-7C6282A68F8C}"/>
+              </a:ext>
+            </a:extLst>
+          </p:cNvPr>
+          <p:cNvPicPr>
+            <a:picLocks noChangeAspect="1"/>
+          </p:cNvPicPr>
+          <p:nvPr/>
+        </p:nvPicPr>
+        <p:blipFill>
+          <a:blip r:embed="rId4"/>
+          <a:stretch>
+            <a:fillRect/>
+          </a:stretch>
+        </p:blipFill>
+        <p:spPr>
+          <a:xfrm>
+            <a:off x="6589732" y="2553148"/>
+            <a:ext cx="5196632" cy="3481891"/>
+          </a:xfrm>
+          <a:prstGeom prst="rect">
+            <a:avLst/>
+          </a:prstGeom>
+        </p:spPr>
+      </p:pic>
+    </p:spTree>
+    <p:extLst>
+      <p:ext uri="{BB962C8B-B14F-4D97-AF65-F5344CB8AC3E}">
+        <p14:creationId xmlns:p14="http://schemas.microsoft.com/office/powerpoint/2010/main" val="486515582"/>
+      </p:ext>
+    </p:extLst>
+  </p:cSld>
+  <p:clrMapOvr>
+    <a:masterClrMapping/>
+  </p:clrMapOvr>
+</p:sld>
+</file>
+
+<file path=ppt/slides/slide7.xml><?xml version="1.0" encoding="utf-8"?>
+<p:sld xmlns:a="http://schemas.openxmlformats.org/drawingml/2006/main" xmlns:r="http://schemas.openxmlformats.org/officeDocument/2006/relationships" xmlns:p="http://schemas.openxmlformats.org/presentationml/2006/main">
+  <p:cSld>
+    <p:spTree>
+      <p:nvGrpSpPr>
+        <p:cNvPr id="1" name=""/>
+        <p:cNvGrpSpPr/>
+        <p:nvPr/>
+      </p:nvGrpSpPr>
+      <p:grpSpPr>
+        <a:xfrm>
+          <a:off x="0" y="0"/>
+          <a:ext cx="0" cy="0"/>
+          <a:chOff x="0" y="0"/>
+          <a:chExt cx="0" cy="0"/>
+        </a:xfrm>
+      </p:grpSpPr>
+      <p:sp>
+        <p:nvSpPr>
+          <p:cNvPr id="2" name="Title 1">
+            <a:extLst>
+              <a:ext uri="{FF2B5EF4-FFF2-40B4-BE49-F238E27FC236}">
+                <a16:creationId xmlns:a16="http://schemas.microsoft.com/office/drawing/2014/main" id="{317EA6FF-B935-4595-886F-B65A9CD94EB3}"/>
+              </a:ext>
+            </a:extLst>
+          </p:cNvPr>
+          <p:cNvSpPr>
+            <a:spLocks noGrp="1"/>
+          </p:cNvSpPr>
+          <p:nvPr>
+            <p:ph type="title"/>
+          </p:nvPr>
+        </p:nvSpPr>
+        <p:spPr/>
+        <p:txBody>
+          <a:bodyPr/>
+          <a:lstStyle/>
+          <a:p>
+            <a:r>
+              <a:rPr lang="en-US" dirty="0"/>
+              <a:t>Create Symptoms </a:t>
+            </a:r>
+            <a:r>
+              <a:rPr lang="en-US" dirty="0" err="1"/>
+              <a:t>DataFrame</a:t>
+            </a:r>
+            <a:r>
+              <a:rPr lang="en-US" dirty="0"/>
+              <a:t> by Disease</a:t>
+            </a:r>
+          </a:p>
+        </p:txBody>
+      </p:sp>
+      <p:sp>
+        <p:nvSpPr>
+          <p:cNvPr id="3" name="Content Placeholder 2">
+            <a:extLst>
+              <a:ext uri="{FF2B5EF4-FFF2-40B4-BE49-F238E27FC236}">
+                <a16:creationId xmlns:a16="http://schemas.microsoft.com/office/drawing/2014/main" id="{97160B89-84B4-43D9-BEC0-4226A28EC36B}"/>
+              </a:ext>
+            </a:extLst>
+          </p:cNvPr>
+          <p:cNvSpPr>
+            <a:spLocks noGrp="1"/>
+          </p:cNvSpPr>
+          <p:nvPr>
+            <p:ph idx="1"/>
+          </p:nvPr>
+        </p:nvSpPr>
+        <p:spPr/>
+        <p:txBody>
+          <a:bodyPr/>
+          <a:lstStyle/>
+          <a:p>
+            <a:endParaRPr lang="en-US"/>
+          </a:p>
+        </p:txBody>
+      </p:sp>
+    </p:spTree>
+    <p:extLst>
+      <p:ext uri="{BB962C8B-B14F-4D97-AF65-F5344CB8AC3E}">
+        <p14:creationId xmlns:p14="http://schemas.microsoft.com/office/powerpoint/2010/main" val="749126173"/>
+      </p:ext>
+    </p:extLst>
+  </p:cSld>
+  <p:clrMapOvr>
+    <a:masterClrMapping/>
+  </p:clrMapOvr>
+</p:sld>
+</file>
+
+<file path=ppt/slides/slide8.xml><?xml version="1.0" encoding="utf-8"?>
+<p:sld xmlns:a="http://schemas.openxmlformats.org/drawingml/2006/main" xmlns:r="http://schemas.openxmlformats.org/officeDocument/2006/relationships" xmlns:p="http://schemas.openxmlformats.org/presentationml/2006/main">
+  <p:cSld>
+    <p:spTree>
+      <p:nvGrpSpPr>
+        <p:cNvPr id="1" name=""/>
+        <p:cNvGrpSpPr/>
+        <p:nvPr/>
+      </p:nvGrpSpPr>
+      <p:grpSpPr>
+        <a:xfrm>
+          <a:off x="0" y="0"/>
+          <a:ext cx="0" cy="0"/>
+          <a:chOff x="0" y="0"/>
+          <a:chExt cx="0" cy="0"/>
+        </a:xfrm>
+      </p:grpSpPr>
+      <p:sp>
+        <p:nvSpPr>
+          <p:cNvPr id="2" name="Title 1">
+            <a:extLst>
+              <a:ext uri="{FF2B5EF4-FFF2-40B4-BE49-F238E27FC236}">
+                <a16:creationId xmlns:a16="http://schemas.microsoft.com/office/drawing/2014/main" id="{52A2E9C3-F530-467F-91D5-B565842DB174}"/>
+              </a:ext>
+            </a:extLst>
+          </p:cNvPr>
+          <p:cNvSpPr>
+            <a:spLocks noGrp="1"/>
+          </p:cNvSpPr>
+          <p:nvPr>
+            <p:ph type="title"/>
+          </p:nvPr>
+        </p:nvSpPr>
+        <p:spPr/>
+        <p:txBody>
+          <a:bodyPr/>
+          <a:lstStyle/>
+          <a:p>
+            <a:r>
+              <a:rPr lang="en-US" dirty="0"/>
+              <a:t>Database - </a:t>
+            </a:r>
+            <a:r>
+              <a:rPr lang="en-US" dirty="0" err="1"/>
+              <a:t>pgAdmin</a:t>
+            </a:r>
+            <a:r>
+              <a:rPr lang="en-US" dirty="0"/>
+              <a:t> </a:t>
+            </a:r>
+            <a:br>
+              <a:rPr lang="en-US" dirty="0"/>
+            </a:br>
+            <a:endParaRPr lang="en-US" dirty="0"/>
+          </a:p>
+        </p:txBody>
+      </p:sp>
+      <p:sp>
+        <p:nvSpPr>
+          <p:cNvPr id="3" name="Content Placeholder 2">
+            <a:extLst>
+              <a:ext uri="{FF2B5EF4-FFF2-40B4-BE49-F238E27FC236}">
+                <a16:creationId xmlns:a16="http://schemas.microsoft.com/office/drawing/2014/main" id="{D4A12589-BAD7-4848-8481-8095BDA2E573}"/>
+              </a:ext>
+            </a:extLst>
+          </p:cNvPr>
+          <p:cNvSpPr>
+            <a:spLocks noGrp="1"/>
+          </p:cNvSpPr>
+          <p:nvPr>
+            <p:ph idx="1"/>
+          </p:nvPr>
+        </p:nvSpPr>
+        <p:spPr>
+          <a:xfrm>
+            <a:off x="1103312" y="2052918"/>
+            <a:ext cx="2830735" cy="4195481"/>
+          </a:xfrm>
+        </p:spPr>
+        <p:txBody>
+          <a:bodyPr/>
+          <a:lstStyle/>
+          <a:p>
+            <a:r>
+              <a:rPr lang="en-US" dirty="0"/>
+              <a:t>3 Tables:</a:t>
+            </a:r>
+          </a:p>
+          <a:p>
+            <a:pPr marL="857250" lvl="1" indent="-457200">
+              <a:buFont typeface="+mj-lt"/>
+              <a:buAutoNum type="arabicPeriod"/>
+            </a:pPr>
+            <a:r>
+              <a:rPr lang="en-US" sz="2000" dirty="0" err="1"/>
+              <a:t>Train_data</a:t>
+            </a:r>
+            <a:endParaRPr lang="en-US" sz="2000" dirty="0"/>
+          </a:p>
+          <a:p>
+            <a:pPr marL="857250" lvl="1" indent="-457200">
+              <a:buFont typeface="+mj-lt"/>
+              <a:buAutoNum type="arabicPeriod"/>
+            </a:pPr>
+            <a:r>
+              <a:rPr lang="en-US" sz="2000" dirty="0" err="1"/>
+              <a:t>Test_data</a:t>
+            </a:r>
+            <a:endParaRPr lang="en-US" sz="2000" dirty="0"/>
+          </a:p>
+          <a:p>
+            <a:pPr marL="857250" lvl="1" indent="-457200">
+              <a:buFont typeface="+mj-lt"/>
+              <a:buAutoNum type="arabicPeriod"/>
+            </a:pPr>
+            <a:r>
+              <a:rPr lang="en-US" sz="2000" dirty="0" err="1"/>
+              <a:t>Sypt_df</a:t>
+            </a:r>
+            <a:endParaRPr lang="en-US" sz="2000" dirty="0"/>
+          </a:p>
+          <a:p>
+            <a:pPr marL="400050" lvl="1" indent="0">
+              <a:buNone/>
+            </a:pPr>
+            <a:endParaRPr lang="en-US" dirty="0"/>
+          </a:p>
+        </p:txBody>
+      </p:sp>
+      <p:pic>
+        <p:nvPicPr>
+          <p:cNvPr id="13" name="Picture 12">
+            <a:extLst>
+              <a:ext uri="{FF2B5EF4-FFF2-40B4-BE49-F238E27FC236}">
+                <a16:creationId xmlns:a16="http://schemas.microsoft.com/office/drawing/2014/main" id="{99C1090C-9E8F-4A9F-8E69-B35F6C359460}"/>
+              </a:ext>
+            </a:extLst>
+          </p:cNvPr>
+          <p:cNvPicPr>
+            <a:picLocks noChangeAspect="1"/>
+          </p:cNvPicPr>
+          <p:nvPr/>
+        </p:nvPicPr>
+        <p:blipFill>
+          <a:blip r:embed="rId3"/>
+          <a:stretch>
+            <a:fillRect/>
+          </a:stretch>
+        </p:blipFill>
+        <p:spPr>
+          <a:xfrm>
+            <a:off x="4052333" y="2201714"/>
+            <a:ext cx="7277100" cy="3305175"/>
+          </a:xfrm>
+          <a:prstGeom prst="rect">
+            <a:avLst/>
+          </a:prstGeom>
+        </p:spPr>
+      </p:pic>
+    </p:spTree>
+    <p:extLst>
+      <p:ext uri="{BB962C8B-B14F-4D97-AF65-F5344CB8AC3E}">
+        <p14:creationId xmlns:p14="http://schemas.microsoft.com/office/powerpoint/2010/main" val="1202981632"/>
+      </p:ext>
+    </p:extLst>
+  </p:cSld>
+  <p:clrMapOvr>
+    <a:masterClrMapping/>
+  </p:clrMapOvr>
+</p:sld>
+</file>
+
+<file path=ppt/slides/slide9.xml><?xml version="1.0" encoding="utf-8"?>
+<p:sld xmlns:a="http://schemas.openxmlformats.org/drawingml/2006/main" xmlns:r="http://schemas.openxmlformats.org/officeDocument/2006/relationships" xmlns:p="http://schemas.openxmlformats.org/presentationml/2006/main">
+  <p:cSld>
+    <p:spTree>
+      <p:nvGrpSpPr>
+        <p:cNvPr id="1" name=""/>
+        <p:cNvGrpSpPr/>
+        <p:nvPr/>
+      </p:nvGrpSpPr>
+      <p:grpSpPr>
+        <a:xfrm>
+          <a:off x="0" y="0"/>
+          <a:ext cx="0" cy="0"/>
+          <a:chOff x="0" y="0"/>
+          <a:chExt cx="0" cy="0"/>
+        </a:xfrm>
+      </p:grpSpPr>
+      <p:sp>
+        <p:nvSpPr>
+          <p:cNvPr id="2" name="Title 1">
+            <a:extLst>
+              <a:ext uri="{FF2B5EF4-FFF2-40B4-BE49-F238E27FC236}">
+                <a16:creationId xmlns:a16="http://schemas.microsoft.com/office/drawing/2014/main" id="{52A2E9C3-F530-467F-91D5-B565842DB174}"/>
+              </a:ext>
+            </a:extLst>
+          </p:cNvPr>
+          <p:cNvSpPr>
+            <a:spLocks noGrp="1"/>
+          </p:cNvSpPr>
+          <p:nvPr>
+            <p:ph type="title"/>
+          </p:nvPr>
+        </p:nvSpPr>
+        <p:spPr/>
+        <p:txBody>
+          <a:bodyPr/>
+          <a:lstStyle/>
+          <a:p>
+            <a:r>
+              <a:rPr lang="en-US" dirty="0"/>
+              <a:t>Database - </a:t>
+            </a:r>
+            <a:r>
+              <a:rPr lang="en-US" dirty="0" err="1"/>
+              <a:t>pgAdmin</a:t>
+            </a:r>
+            <a:r>
+              <a:rPr lang="en-US" dirty="0"/>
+              <a:t> </a:t>
+            </a:r>
+            <a:br>
+              <a:rPr lang="en-US" dirty="0"/>
+            </a:br>
+            <a:endParaRPr lang="en-US" dirty="0"/>
+          </a:p>
+        </p:txBody>
+      </p:sp>
+      <p:pic>
+        <p:nvPicPr>
+          <p:cNvPr id="5" name="Picture 4">
+            <a:extLst>
+              <a:ext uri="{FF2B5EF4-FFF2-40B4-BE49-F238E27FC236}">
+                <a16:creationId xmlns:a16="http://schemas.microsoft.com/office/drawing/2014/main" id="{CA13A414-A5AD-4F5E-88AA-6CA2E2DED866}"/>
+              </a:ext>
+            </a:extLst>
+          </p:cNvPr>
+          <p:cNvPicPr>
+            <a:picLocks noChangeAspect="1"/>
+          </p:cNvPicPr>
+          <p:nvPr/>
+        </p:nvPicPr>
+        <p:blipFill>
+          <a:blip r:embed="rId3"/>
+          <a:stretch>
+            <a:fillRect/>
+          </a:stretch>
+        </p:blipFill>
+        <p:spPr>
+          <a:xfrm>
+            <a:off x="881283" y="1853248"/>
+            <a:ext cx="7324725" cy="3438525"/>
+          </a:xfrm>
+          <a:prstGeom prst="rect">
+            <a:avLst/>
+          </a:prstGeom>
+        </p:spPr>
+      </p:pic>
+    </p:spTree>
+    <p:extLst>
+      <p:ext uri="{BB962C8B-B14F-4D97-AF65-F5344CB8AC3E}">
+        <p14:creationId xmlns:p14="http://schemas.microsoft.com/office/powerpoint/2010/main" val="2419336511"/>
       </p:ext>
     </p:extLst>
   </p:cSld>

</xml_diff>

<commit_message>
Segment 2 - updates
</commit_message>
<xml_diff>
--- a/Team_Code Blue Final Project.pptx
+++ b/Team_Code Blue Final Project.pptx
@@ -5,7 +5,7 @@
     <p:sldMasterId id="2147483648" r:id="rId1"/>
   </p:sldMasterIdLst>
   <p:notesMasterIdLst>
-    <p:notesMasterId r:id="rId15"/>
+    <p:notesMasterId r:id="rId19"/>
   </p:notesMasterIdLst>
   <p:sldIdLst>
     <p:sldId id="256" r:id="rId2"/>
@@ -20,7 +20,11 @@
     <p:sldId id="268" r:id="rId11"/>
     <p:sldId id="260" r:id="rId12"/>
     <p:sldId id="270" r:id="rId13"/>
-    <p:sldId id="264" r:id="rId14"/>
+    <p:sldId id="272" r:id="rId14"/>
+    <p:sldId id="271" r:id="rId15"/>
+    <p:sldId id="273" r:id="rId16"/>
+    <p:sldId id="274" r:id="rId17"/>
+    <p:sldId id="264" r:id="rId18"/>
   </p:sldIdLst>
   <p:sldSz cx="12192000" cy="6858000"/>
   <p:notesSz cx="6858000" cy="9144000"/>
@@ -209,7 +213,7 @@
           <a:p>
             <a:fld id="{0363ABCA-FF1C-45B5-BA0C-BA609BC88931}" type="datetimeFigureOut">
               <a:rPr lang="en-US" smtClean="0"/>
-              <a:t>11/6/2021</a:t>
+              <a:t>11/7/2021</a:t>
             </a:fld>
             <a:endParaRPr lang="en-US"/>
           </a:p>
@@ -606,7 +610,109 @@
           <a:p>
             <a:r>
               <a:rPr lang="en-US" dirty="0"/>
-              <a:t>We have a fully functioning and interactive dashboard in Tableau. Our analysis will be displayed with a storyboard that provides clear data visualizations. Follow the link to see the charts and graphs that show insightful relationships in our data and images of our analysis.</a:t>
+              <a:t>Our binary dataset is optimal for a logistical regression model. </a:t>
+            </a:r>
+          </a:p>
+          <a:p>
+            <a:r>
+              <a:rPr lang="en-US" dirty="0"/>
+              <a:t>A machine learning logistical regression algorithm can be used to predict the outcome of dependent variables based on training data.</a:t>
+            </a:r>
+          </a:p>
+          <a:p>
+            <a:r>
+              <a:rPr lang="en-US" dirty="0"/>
+              <a:t>It uses a combination of input variables to predict the probability of the input data belonging to categories.</a:t>
+            </a:r>
+          </a:p>
+          <a:p>
+            <a:endParaRPr lang="en-US" dirty="0"/>
+          </a:p>
+        </p:txBody>
+      </p:sp>
+      <p:sp>
+        <p:nvSpPr>
+          <p:cNvPr id="4" name="Slide Number Placeholder 3"/>
+          <p:cNvSpPr>
+            <a:spLocks noGrp="1"/>
+          </p:cNvSpPr>
+          <p:nvPr>
+            <p:ph type="sldNum" sz="quarter" idx="5"/>
+          </p:nvPr>
+        </p:nvSpPr>
+        <p:spPr/>
+        <p:txBody>
+          <a:bodyPr/>
+          <a:lstStyle/>
+          <a:p>
+            <a:fld id="{0837621E-2D94-4874-8D2F-F90746483814}" type="slidenum">
+              <a:rPr lang="en-US" smtClean="0"/>
+              <a:t>12</a:t>
+            </a:fld>
+            <a:endParaRPr lang="en-US"/>
+          </a:p>
+        </p:txBody>
+      </p:sp>
+    </p:spTree>
+    <p:extLst>
+      <p:ext uri="{BB962C8B-B14F-4D97-AF65-F5344CB8AC3E}">
+        <p14:creationId xmlns:p14="http://schemas.microsoft.com/office/powerpoint/2010/main" val="413936703"/>
+      </p:ext>
+    </p:extLst>
+  </p:cSld>
+  <p:clrMapOvr>
+    <a:masterClrMapping/>
+  </p:clrMapOvr>
+</p:notes>
+</file>
+
+<file path=ppt/notesSlides/notesSlide11.xml><?xml version="1.0" encoding="utf-8"?>
+<p:notes xmlns:a="http://schemas.openxmlformats.org/drawingml/2006/main" xmlns:r="http://schemas.openxmlformats.org/officeDocument/2006/relationships" xmlns:p="http://schemas.openxmlformats.org/presentationml/2006/main">
+  <p:cSld>
+    <p:spTree>
+      <p:nvGrpSpPr>
+        <p:cNvPr id="1" name=""/>
+        <p:cNvGrpSpPr/>
+        <p:nvPr/>
+      </p:nvGrpSpPr>
+      <p:grpSpPr>
+        <a:xfrm>
+          <a:off x="0" y="0"/>
+          <a:ext cx="0" cy="0"/>
+          <a:chOff x="0" y="0"/>
+          <a:chExt cx="0" cy="0"/>
+        </a:xfrm>
+      </p:grpSpPr>
+      <p:sp>
+        <p:nvSpPr>
+          <p:cNvPr id="2" name="Slide Image Placeholder 1"/>
+          <p:cNvSpPr>
+            <a:spLocks noGrp="1" noRot="1" noChangeAspect="1"/>
+          </p:cNvSpPr>
+          <p:nvPr>
+            <p:ph type="sldImg"/>
+          </p:nvPr>
+        </p:nvSpPr>
+        <p:spPr/>
+      </p:sp>
+      <p:sp>
+        <p:nvSpPr>
+          <p:cNvPr id="3" name="Notes Placeholder 2"/>
+          <p:cNvSpPr>
+            <a:spLocks noGrp="1"/>
+          </p:cNvSpPr>
+          <p:nvPr>
+            <p:ph type="body" idx="1"/>
+          </p:nvPr>
+        </p:nvSpPr>
+        <p:spPr/>
+        <p:txBody>
+          <a:bodyPr/>
+          <a:lstStyle/>
+          <a:p>
+            <a:r>
+              <a:rPr lang="en-US" dirty="0"/>
+              <a:t>Decision tress are among the most powerful supervised learning algorithms</a:t>
             </a:r>
           </a:p>
         </p:txBody>
@@ -629,6 +735,264 @@
             <a:fld id="{0837621E-2D94-4874-8D2F-F90746483814}" type="slidenum">
               <a:rPr lang="en-US" smtClean="0"/>
               <a:t>13</a:t>
+            </a:fld>
+            <a:endParaRPr lang="en-US"/>
+          </a:p>
+        </p:txBody>
+      </p:sp>
+    </p:spTree>
+    <p:extLst>
+      <p:ext uri="{BB962C8B-B14F-4D97-AF65-F5344CB8AC3E}">
+        <p14:creationId xmlns:p14="http://schemas.microsoft.com/office/powerpoint/2010/main" val="2101151970"/>
+      </p:ext>
+    </p:extLst>
+  </p:cSld>
+  <p:clrMapOvr>
+    <a:masterClrMapping/>
+  </p:clrMapOvr>
+</p:notes>
+</file>
+
+<file path=ppt/notesSlides/notesSlide12.xml><?xml version="1.0" encoding="utf-8"?>
+<p:notes xmlns:a="http://schemas.openxmlformats.org/drawingml/2006/main" xmlns:r="http://schemas.openxmlformats.org/officeDocument/2006/relationships" xmlns:p="http://schemas.openxmlformats.org/presentationml/2006/main">
+  <p:cSld>
+    <p:spTree>
+      <p:nvGrpSpPr>
+        <p:cNvPr id="1" name=""/>
+        <p:cNvGrpSpPr/>
+        <p:nvPr/>
+      </p:nvGrpSpPr>
+      <p:grpSpPr>
+        <a:xfrm>
+          <a:off x="0" y="0"/>
+          <a:ext cx="0" cy="0"/>
+          <a:chOff x="0" y="0"/>
+          <a:chExt cx="0" cy="0"/>
+        </a:xfrm>
+      </p:grpSpPr>
+      <p:sp>
+        <p:nvSpPr>
+          <p:cNvPr id="2" name="Slide Image Placeholder 1"/>
+          <p:cNvSpPr>
+            <a:spLocks noGrp="1" noRot="1" noChangeAspect="1"/>
+          </p:cNvSpPr>
+          <p:nvPr>
+            <p:ph type="sldImg"/>
+          </p:nvPr>
+        </p:nvSpPr>
+        <p:spPr/>
+      </p:sp>
+      <p:sp>
+        <p:nvSpPr>
+          <p:cNvPr id="3" name="Notes Placeholder 2"/>
+          <p:cNvSpPr>
+            <a:spLocks noGrp="1"/>
+          </p:cNvSpPr>
+          <p:nvPr>
+            <p:ph type="body" idx="1"/>
+          </p:nvPr>
+        </p:nvSpPr>
+        <p:spPr/>
+        <p:txBody>
+          <a:bodyPr/>
+          <a:lstStyle/>
+          <a:p>
+            <a:r>
+              <a:rPr lang="en-US" dirty="0"/>
+              <a:t>The random forest algorithm creates decision tress on data samples and then gets the prediction from each of them and finally selects the best solution by means of voting</a:t>
+            </a:r>
+          </a:p>
+        </p:txBody>
+      </p:sp>
+      <p:sp>
+        <p:nvSpPr>
+          <p:cNvPr id="4" name="Slide Number Placeholder 3"/>
+          <p:cNvSpPr>
+            <a:spLocks noGrp="1"/>
+          </p:cNvSpPr>
+          <p:nvPr>
+            <p:ph type="sldNum" sz="quarter" idx="5"/>
+          </p:nvPr>
+        </p:nvSpPr>
+        <p:spPr/>
+        <p:txBody>
+          <a:bodyPr/>
+          <a:lstStyle/>
+          <a:p>
+            <a:fld id="{0837621E-2D94-4874-8D2F-F90746483814}" type="slidenum">
+              <a:rPr lang="en-US" smtClean="0"/>
+              <a:t>14</a:t>
+            </a:fld>
+            <a:endParaRPr lang="en-US"/>
+          </a:p>
+        </p:txBody>
+      </p:sp>
+    </p:spTree>
+    <p:extLst>
+      <p:ext uri="{BB962C8B-B14F-4D97-AF65-F5344CB8AC3E}">
+        <p14:creationId xmlns:p14="http://schemas.microsoft.com/office/powerpoint/2010/main" val="1005491927"/>
+      </p:ext>
+    </p:extLst>
+  </p:cSld>
+  <p:clrMapOvr>
+    <a:masterClrMapping/>
+  </p:clrMapOvr>
+</p:notes>
+</file>
+
+<file path=ppt/notesSlides/notesSlide13.xml><?xml version="1.0" encoding="utf-8"?>
+<p:notes xmlns:a="http://schemas.openxmlformats.org/drawingml/2006/main" xmlns:r="http://schemas.openxmlformats.org/officeDocument/2006/relationships" xmlns:p="http://schemas.openxmlformats.org/presentationml/2006/main">
+  <p:cSld>
+    <p:spTree>
+      <p:nvGrpSpPr>
+        <p:cNvPr id="1" name=""/>
+        <p:cNvGrpSpPr/>
+        <p:nvPr/>
+      </p:nvGrpSpPr>
+      <p:grpSpPr>
+        <a:xfrm>
+          <a:off x="0" y="0"/>
+          <a:ext cx="0" cy="0"/>
+          <a:chOff x="0" y="0"/>
+          <a:chExt cx="0" cy="0"/>
+        </a:xfrm>
+      </p:grpSpPr>
+      <p:sp>
+        <p:nvSpPr>
+          <p:cNvPr id="2" name="Slide Image Placeholder 1"/>
+          <p:cNvSpPr>
+            <a:spLocks noGrp="1" noRot="1" noChangeAspect="1"/>
+          </p:cNvSpPr>
+          <p:nvPr>
+            <p:ph type="sldImg"/>
+          </p:nvPr>
+        </p:nvSpPr>
+        <p:spPr/>
+      </p:sp>
+      <p:sp>
+        <p:nvSpPr>
+          <p:cNvPr id="3" name="Notes Placeholder 2"/>
+          <p:cNvSpPr>
+            <a:spLocks noGrp="1"/>
+          </p:cNvSpPr>
+          <p:nvPr>
+            <p:ph type="body" idx="1"/>
+          </p:nvPr>
+        </p:nvSpPr>
+        <p:spPr/>
+        <p:txBody>
+          <a:bodyPr/>
+          <a:lstStyle/>
+          <a:p>
+            <a:endParaRPr lang="en-US" dirty="0"/>
+          </a:p>
+        </p:txBody>
+      </p:sp>
+      <p:sp>
+        <p:nvSpPr>
+          <p:cNvPr id="4" name="Slide Number Placeholder 3"/>
+          <p:cNvSpPr>
+            <a:spLocks noGrp="1"/>
+          </p:cNvSpPr>
+          <p:nvPr>
+            <p:ph type="sldNum" sz="quarter" idx="5"/>
+          </p:nvPr>
+        </p:nvSpPr>
+        <p:spPr/>
+        <p:txBody>
+          <a:bodyPr/>
+          <a:lstStyle/>
+          <a:p>
+            <a:fld id="{0837621E-2D94-4874-8D2F-F90746483814}" type="slidenum">
+              <a:rPr lang="en-US" smtClean="0"/>
+              <a:t>15</a:t>
+            </a:fld>
+            <a:endParaRPr lang="en-US"/>
+          </a:p>
+        </p:txBody>
+      </p:sp>
+    </p:spTree>
+    <p:extLst>
+      <p:ext uri="{BB962C8B-B14F-4D97-AF65-F5344CB8AC3E}">
+        <p14:creationId xmlns:p14="http://schemas.microsoft.com/office/powerpoint/2010/main" val="4272232645"/>
+      </p:ext>
+    </p:extLst>
+  </p:cSld>
+  <p:clrMapOvr>
+    <a:masterClrMapping/>
+  </p:clrMapOvr>
+</p:notes>
+</file>
+
+<file path=ppt/notesSlides/notesSlide14.xml><?xml version="1.0" encoding="utf-8"?>
+<p:notes xmlns:a="http://schemas.openxmlformats.org/drawingml/2006/main" xmlns:r="http://schemas.openxmlformats.org/officeDocument/2006/relationships" xmlns:p="http://schemas.openxmlformats.org/presentationml/2006/main">
+  <p:cSld>
+    <p:spTree>
+      <p:nvGrpSpPr>
+        <p:cNvPr id="1" name=""/>
+        <p:cNvGrpSpPr/>
+        <p:nvPr/>
+      </p:nvGrpSpPr>
+      <p:grpSpPr>
+        <a:xfrm>
+          <a:off x="0" y="0"/>
+          <a:ext cx="0" cy="0"/>
+          <a:chOff x="0" y="0"/>
+          <a:chExt cx="0" cy="0"/>
+        </a:xfrm>
+      </p:grpSpPr>
+      <p:sp>
+        <p:nvSpPr>
+          <p:cNvPr id="2" name="Slide Image Placeholder 1"/>
+          <p:cNvSpPr>
+            <a:spLocks noGrp="1" noRot="1" noChangeAspect="1"/>
+          </p:cNvSpPr>
+          <p:nvPr>
+            <p:ph type="sldImg"/>
+          </p:nvPr>
+        </p:nvSpPr>
+        <p:spPr/>
+      </p:sp>
+      <p:sp>
+        <p:nvSpPr>
+          <p:cNvPr id="3" name="Notes Placeholder 2"/>
+          <p:cNvSpPr>
+            <a:spLocks noGrp="1"/>
+          </p:cNvSpPr>
+          <p:nvPr>
+            <p:ph type="body" idx="1"/>
+          </p:nvPr>
+        </p:nvSpPr>
+        <p:spPr/>
+        <p:txBody>
+          <a:bodyPr/>
+          <a:lstStyle/>
+          <a:p>
+            <a:r>
+              <a:rPr lang="en-US" dirty="0"/>
+              <a:t>We have a fully functioning and interactive dashboard in Tableau. Our analysis will be displayed with a storyboard that provides clear data visualizations. Follow the link to see the charts and graphs that show insightful relationships in our data and images of our analysis.</a:t>
+            </a:r>
+          </a:p>
+        </p:txBody>
+      </p:sp>
+      <p:sp>
+        <p:nvSpPr>
+          <p:cNvPr id="4" name="Slide Number Placeholder 3"/>
+          <p:cNvSpPr>
+            <a:spLocks noGrp="1"/>
+          </p:cNvSpPr>
+          <p:nvPr>
+            <p:ph type="sldNum" sz="quarter" idx="5"/>
+          </p:nvPr>
+        </p:nvSpPr>
+        <p:spPr/>
+        <p:txBody>
+          <a:bodyPr/>
+          <a:lstStyle/>
+          <a:p>
+            <a:fld id="{0837621E-2D94-4874-8D2F-F90746483814}" type="slidenum">
+              <a:rPr lang="en-US" smtClean="0"/>
+              <a:t>17</a:t>
             </a:fld>
             <a:endParaRPr lang="en-US"/>
           </a:p>
@@ -995,7 +1359,7 @@
             </a:pPr>
             <a:r>
               <a:rPr lang="en-US" dirty="0"/>
-              <a:t>To prepare the data for the machine learning models we created our features and targets.</a:t>
+              <a:t>Our data set downloaded from Kaggle was already split into training and testing csv files.</a:t>
             </a:r>
           </a:p>
           <a:p>
@@ -1016,7 +1380,10 @@
               <a:tabLst/>
               <a:defRPr/>
             </a:pPr>
-            <a:endParaRPr lang="en-US" dirty="0"/>
+            <a:r>
+              <a:rPr lang="en-US" dirty="0"/>
+              <a:t>The training data is necessary to teach the machine learning algorithms. </a:t>
+            </a:r>
           </a:p>
           <a:p>
             <a:pPr marL="0" marR="0" lvl="0" indent="0" algn="l" defTabSz="914400" rtl="0" eaLnBrk="1" fontAlgn="auto" latinLnBrk="0" hangingPunct="1">
@@ -1038,7 +1405,73 @@
             </a:pPr>
             <a:r>
               <a:rPr lang="en-US" dirty="0"/>
-              <a:t>The unique() function is used to find the unique elements of an array. It returns the sorted unique elements of an array.</a:t>
+              <a:t>The testing data helps validate the accuracy of the algorithm’s training.</a:t>
+            </a:r>
+          </a:p>
+          <a:p>
+            <a:pPr marL="0" marR="0" lvl="0" indent="0" algn="l" defTabSz="914400" rtl="0" eaLnBrk="1" fontAlgn="auto" latinLnBrk="0" hangingPunct="1">
+              <a:lnSpc>
+                <a:spcPct val="100000"/>
+              </a:lnSpc>
+              <a:spcBef>
+                <a:spcPts val="0"/>
+              </a:spcBef>
+              <a:spcAft>
+                <a:spcPts val="0"/>
+              </a:spcAft>
+              <a:buClrTx/>
+              <a:buSzTx/>
+              <a:buFontTx/>
+              <a:buNone/>
+              <a:tabLst/>
+              <a:defRPr/>
+            </a:pPr>
+            <a:r>
+              <a:rPr lang="en-US" dirty="0"/>
+              <a:t>To prepare the data for the machine learning models we created target and removed it from the features data.</a:t>
+            </a:r>
+          </a:p>
+          <a:p>
+            <a:pPr marL="0" marR="0" lvl="0" indent="0" algn="l" defTabSz="914400" rtl="0" eaLnBrk="1" fontAlgn="auto" latinLnBrk="0" hangingPunct="1">
+              <a:lnSpc>
+                <a:spcPct val="100000"/>
+              </a:lnSpc>
+              <a:spcBef>
+                <a:spcPts val="0"/>
+              </a:spcBef>
+              <a:spcAft>
+                <a:spcPts val="0"/>
+              </a:spcAft>
+              <a:buClrTx/>
+              <a:buSzTx/>
+              <a:buFontTx/>
+              <a:buNone/>
+              <a:tabLst/>
+              <a:defRPr/>
+            </a:pPr>
+            <a:endParaRPr lang="en-US" dirty="0"/>
+          </a:p>
+          <a:p>
+            <a:pPr marL="0" marR="0" lvl="0" indent="0" algn="l" defTabSz="914400" rtl="0" eaLnBrk="1" fontAlgn="auto" latinLnBrk="0" hangingPunct="1">
+              <a:lnSpc>
+                <a:spcPct val="100000"/>
+              </a:lnSpc>
+              <a:spcBef>
+                <a:spcPts val="0"/>
+              </a:spcBef>
+              <a:spcAft>
+                <a:spcPts val="0"/>
+              </a:spcAft>
+              <a:buClrTx/>
+              <a:buSzTx/>
+              <a:buFontTx/>
+              <a:buNone/>
+              <a:tabLst/>
+              <a:defRPr/>
+            </a:pPr>
+            <a:r>
+              <a:rPr lang="en-US" dirty="0"/>
+              <a:t>Remove? - The unique() function is used to find the unique elements of an array. It returns the sorted unique elements of an array.</a:t>
             </a:r>
           </a:p>
           <a:p>
@@ -1250,15 +1683,7 @@
             </a:r>
             <a:r>
               <a:rPr lang="en-US" dirty="0"/>
-              <a:t> as three </a:t>
-            </a:r>
-            <a:r>
-              <a:rPr lang="en-US" dirty="0" err="1"/>
-              <a:t>seperate</a:t>
-            </a:r>
-            <a:r>
-              <a:rPr lang="en-US" dirty="0"/>
-              <a:t> tables.</a:t>
+              <a:t> as three separate tables.</a:t>
             </a:r>
           </a:p>
           <a:p>
@@ -1272,7 +1697,7 @@
             </a:r>
             <a:r>
               <a:rPr lang="en-US" dirty="0"/>
-              <a:t> for use during the project.</a:t>
+              <a:t> for use throughout the project.</a:t>
             </a:r>
           </a:p>
           <a:p>
@@ -1312,7 +1737,7 @@
           <a:p>
             <a:r>
               <a:rPr lang="en-US" dirty="0"/>
-              <a:t>Using from </a:t>
+              <a:t>Using ‘from </a:t>
             </a:r>
             <a:r>
               <a:rPr lang="en-US" dirty="0" err="1"/>
@@ -1328,7 +1753,7 @@
             </a:r>
             <a:r>
               <a:rPr lang="en-US" dirty="0"/>
-              <a:t> the </a:t>
+              <a:t>’ the </a:t>
             </a:r>
             <a:r>
               <a:rPr lang="en-US" dirty="0" err="1"/>
@@ -1594,8 +2019,29 @@
           <a:p>
             <a:r>
               <a:rPr lang="en-US" dirty="0"/>
-              <a:t>With a clean data set the data analysis phase can begin. There are many modeling techniques that can be used to analyze data. Our binary dataset is optimal for a logistical regression model because the prediction is categorical. A machine learning logistical regression algorithm can be used to predict the outcome of dependent variables based on previous training data. </a:t>
-            </a:r>
+              <a:t>With a clean data set the data analysis phase can begin. </a:t>
+            </a:r>
+          </a:p>
+          <a:p>
+            <a:r>
+              <a:rPr lang="en-US" dirty="0"/>
+              <a:t>There are many modeling techniques that can be used to analyze data. </a:t>
+            </a:r>
+          </a:p>
+          <a:p>
+            <a:r>
+              <a:rPr lang="en-US" dirty="0"/>
+              <a:t>Supervised learning models use labeled input and output data.</a:t>
+            </a:r>
+          </a:p>
+          <a:p>
+            <a:r>
+              <a:rPr lang="en-US" dirty="0"/>
+              <a:t>We choose 4 supervised learning models: logistic regression, decision tree, random forest and naïve bayes.</a:t>
+            </a:r>
+          </a:p>
+          <a:p>
+            <a:endParaRPr lang="en-US" dirty="0"/>
           </a:p>
           <a:p>
             <a:endParaRPr lang="en-US" dirty="0"/>
@@ -1821,7 +2267,7 @@
           <a:p>
             <a:fld id="{4AAD347D-5ACD-4C99-B74B-A9C85AD731AF}" type="datetimeFigureOut">
               <a:rPr lang="en-US" dirty="0"/>
-              <a:t>11/6/2021</a:t>
+              <a:t>11/7/2021</a:t>
             </a:fld>
             <a:endParaRPr lang="en-US" dirty="0"/>
           </a:p>
@@ -2091,7 +2537,7 @@
           <a:p>
             <a:fld id="{4509A250-FF31-4206-8172-F9D3106AACB1}" type="datetimeFigureOut">
               <a:rPr lang="en-US" dirty="0"/>
-              <a:t>11/6/2021</a:t>
+              <a:t>11/7/2021</a:t>
             </a:fld>
             <a:endParaRPr lang="en-US" dirty="0"/>
           </a:p>
@@ -2280,7 +2726,7 @@
           <a:p>
             <a:fld id="{4509A250-FF31-4206-8172-F9D3106AACB1}" type="datetimeFigureOut">
               <a:rPr lang="en-US" dirty="0"/>
-              <a:t>11/6/2021</a:t>
+              <a:t>11/7/2021</a:t>
             </a:fld>
             <a:endParaRPr lang="en-US" dirty="0"/>
           </a:p>
@@ -2543,7 +2989,7 @@
           <a:p>
             <a:fld id="{4509A250-FF31-4206-8172-F9D3106AACB1}" type="datetimeFigureOut">
               <a:rPr lang="en-US" dirty="0"/>
-              <a:t>11/6/2021</a:t>
+              <a:t>11/7/2021</a:t>
             </a:fld>
             <a:endParaRPr lang="en-US" dirty="0"/>
           </a:p>
@@ -2870,7 +3316,7 @@
           <a:p>
             <a:fld id="{4509A250-FF31-4206-8172-F9D3106AACB1}" type="datetimeFigureOut">
               <a:rPr lang="en-US" dirty="0"/>
-              <a:t>11/6/2021</a:t>
+              <a:t>11/7/2021</a:t>
             </a:fld>
             <a:endParaRPr lang="en-US" dirty="0"/>
           </a:p>
@@ -3475,7 +3921,7 @@
           <a:p>
             <a:fld id="{4509A250-FF31-4206-8172-F9D3106AACB1}" type="datetimeFigureOut">
               <a:rPr lang="en-US" dirty="0"/>
-              <a:t>11/6/2021</a:t>
+              <a:t>11/7/2021</a:t>
             </a:fld>
             <a:endParaRPr lang="en-US" dirty="0"/>
           </a:p>
@@ -4317,7 +4763,7 @@
           <a:p>
             <a:fld id="{4509A250-FF31-4206-8172-F9D3106AACB1}" type="datetimeFigureOut">
               <a:rPr lang="en-US" dirty="0"/>
-              <a:t>11/6/2021</a:t>
+              <a:t>11/7/2021</a:t>
             </a:fld>
             <a:endParaRPr lang="en-US" dirty="0"/>
           </a:p>
@@ -4482,7 +4928,7 @@
           <a:p>
             <a:fld id="{4509A250-FF31-4206-8172-F9D3106AACB1}" type="datetimeFigureOut">
               <a:rPr lang="en-US" dirty="0"/>
-              <a:t>11/6/2021</a:t>
+              <a:t>11/7/2021</a:t>
             </a:fld>
             <a:endParaRPr lang="en-US" dirty="0"/>
           </a:p>
@@ -4657,7 +5103,7 @@
           <a:p>
             <a:fld id="{4509A250-FF31-4206-8172-F9D3106AACB1}" type="datetimeFigureOut">
               <a:rPr lang="en-US" dirty="0"/>
-              <a:t>11/6/2021</a:t>
+              <a:t>11/7/2021</a:t>
             </a:fld>
             <a:endParaRPr lang="en-US" dirty="0"/>
           </a:p>
@@ -4822,7 +5268,7 @@
           <a:p>
             <a:fld id="{4509A250-FF31-4206-8172-F9D3106AACB1}" type="datetimeFigureOut">
               <a:rPr lang="en-US" dirty="0"/>
-              <a:t>11/6/2021</a:t>
+              <a:t>11/7/2021</a:t>
             </a:fld>
             <a:endParaRPr lang="en-US" dirty="0"/>
           </a:p>
@@ -5061,7 +5507,7 @@
           <a:p>
             <a:fld id="{4509A250-FF31-4206-8172-F9D3106AACB1}" type="datetimeFigureOut">
               <a:rPr lang="en-US" dirty="0"/>
-              <a:t>11/6/2021</a:t>
+              <a:t>11/7/2021</a:t>
             </a:fld>
             <a:endParaRPr lang="en-US" dirty="0"/>
           </a:p>
@@ -5348,7 +5794,7 @@
           <a:p>
             <a:fld id="{4509A250-FF31-4206-8172-F9D3106AACB1}" type="datetimeFigureOut">
               <a:rPr lang="en-US" dirty="0"/>
-              <a:t>11/6/2021</a:t>
+              <a:t>11/7/2021</a:t>
             </a:fld>
             <a:endParaRPr lang="en-US" dirty="0"/>
           </a:p>
@@ -5781,7 +6227,7 @@
           <a:p>
             <a:fld id="{4509A250-FF31-4206-8172-F9D3106AACB1}" type="datetimeFigureOut">
               <a:rPr lang="en-US" dirty="0"/>
-              <a:t>11/6/2021</a:t>
+              <a:t>11/7/2021</a:t>
             </a:fld>
             <a:endParaRPr lang="en-US" dirty="0"/>
           </a:p>
@@ -5894,7 +6340,7 @@
           <a:p>
             <a:fld id="{4509A250-FF31-4206-8172-F9D3106AACB1}" type="datetimeFigureOut">
               <a:rPr lang="en-US" dirty="0"/>
-              <a:t>11/6/2021</a:t>
+              <a:t>11/7/2021</a:t>
             </a:fld>
             <a:endParaRPr lang="en-US" dirty="0"/>
           </a:p>
@@ -5984,7 +6430,7 @@
           <a:p>
             <a:fld id="{4509A250-FF31-4206-8172-F9D3106AACB1}" type="datetimeFigureOut">
               <a:rPr lang="en-US" dirty="0"/>
-              <a:t>11/6/2021</a:t>
+              <a:t>11/7/2021</a:t>
             </a:fld>
             <a:endParaRPr lang="en-US" dirty="0"/>
           </a:p>
@@ -6258,7 +6704,7 @@
           <a:p>
             <a:fld id="{4509A250-FF31-4206-8172-F9D3106AACB1}" type="datetimeFigureOut">
               <a:rPr lang="en-US" dirty="0"/>
-              <a:t>11/6/2021</a:t>
+              <a:t>11/7/2021</a:t>
             </a:fld>
             <a:endParaRPr lang="en-US" dirty="0"/>
           </a:p>
@@ -6528,7 +6974,7 @@
           <a:p>
             <a:fld id="{4509A250-FF31-4206-8172-F9D3106AACB1}" type="datetimeFigureOut">
               <a:rPr lang="en-US" dirty="0"/>
-              <a:t>11/6/2021</a:t>
+              <a:t>11/7/2021</a:t>
             </a:fld>
             <a:endParaRPr lang="en-US" dirty="0"/>
           </a:p>
@@ -6952,7 +7398,7 @@
           <a:p>
             <a:fld id="{4509A250-FF31-4206-8172-F9D3106AACB1}" type="datetimeFigureOut">
               <a:rPr lang="en-US" dirty="0"/>
-              <a:t>11/6/2021</a:t>
+              <a:t>11/7/2021</a:t>
             </a:fld>
             <a:endParaRPr lang="en-US" dirty="0"/>
           </a:p>
@@ -7737,7 +8183,7 @@
           <a:p>
             <a:r>
               <a:rPr lang="en-US" dirty="0"/>
-              <a:t>Choosing a model</a:t>
+              <a:t>Supervised Learning Models:</a:t>
             </a:r>
           </a:p>
           <a:p>
@@ -7831,7 +8277,7 @@
           <a:p>
             <a:r>
               <a:rPr lang="en-US" dirty="0"/>
-              <a:t>Machine Learning</a:t>
+              <a:t>Machine Learning – Logistical Regression</a:t>
             </a:r>
           </a:p>
         </p:txBody>
@@ -7857,7 +8303,46 @@
           <a:bodyPr/>
           <a:lstStyle/>
           <a:p>
-            <a:endParaRPr lang="en-US"/>
+            <a:r>
+              <a:rPr lang="en-US" dirty="0"/>
+              <a:t>Benefits</a:t>
+            </a:r>
+          </a:p>
+          <a:p>
+            <a:pPr lvl="1"/>
+            <a:r>
+              <a:rPr lang="en-US" dirty="0"/>
+              <a:t>Good for binary datasets</a:t>
+            </a:r>
+          </a:p>
+          <a:p>
+            <a:pPr lvl="1"/>
+            <a:r>
+              <a:rPr lang="en-US" dirty="0"/>
+              <a:t>Less inclined to overfit</a:t>
+            </a:r>
+          </a:p>
+          <a:p>
+            <a:endParaRPr lang="en-US" dirty="0"/>
+          </a:p>
+          <a:p>
+            <a:pPr marL="0" indent="0">
+              <a:buNone/>
+            </a:pPr>
+            <a:endParaRPr lang="en-US" dirty="0"/>
+          </a:p>
+          <a:p>
+            <a:r>
+              <a:rPr lang="en-US" dirty="0"/>
+              <a:t>Limitations</a:t>
+            </a:r>
+          </a:p>
+          <a:p>
+            <a:pPr lvl="1"/>
+            <a:r>
+              <a:rPr lang="en-US" dirty="0"/>
+              <a:t>Requires a large sample size</a:t>
+            </a:r>
           </a:p>
         </p:txBody>
       </p:sp>
@@ -7896,7 +8381,7 @@
           <p:cNvPr id="2" name="Title 1">
             <a:extLst>
               <a:ext uri="{FF2B5EF4-FFF2-40B4-BE49-F238E27FC236}">
-                <a16:creationId xmlns:a16="http://schemas.microsoft.com/office/drawing/2014/main" id="{0D8C7776-FDA1-4F89-ACE0-A5C058D0589D}"/>
+                <a16:creationId xmlns:a16="http://schemas.microsoft.com/office/drawing/2014/main" id="{6E28F757-57B2-4B04-9283-FA574FD47DA1}"/>
               </a:ext>
             </a:extLst>
           </p:cNvPr>
@@ -7914,7 +8399,7 @@
           <a:p>
             <a:r>
               <a:rPr lang="en-US" dirty="0"/>
-              <a:t>Dashboard</a:t>
+              <a:t>Machine Learning – Decision Tree</a:t>
             </a:r>
           </a:p>
         </p:txBody>
@@ -7924,7 +8409,7 @@
           <p:cNvPr id="3" name="Content Placeholder 2">
             <a:extLst>
               <a:ext uri="{FF2B5EF4-FFF2-40B4-BE49-F238E27FC236}">
-                <a16:creationId xmlns:a16="http://schemas.microsoft.com/office/drawing/2014/main" id="{7F889976-0B08-40AE-9EB7-1DE55CE6DF65}"/>
+                <a16:creationId xmlns:a16="http://schemas.microsoft.com/office/drawing/2014/main" id="{0B8C2DD4-FE9F-4DB0-A174-04A3B52DE626}"/>
               </a:ext>
             </a:extLst>
           </p:cNvPr>
@@ -7941,23 +8426,45 @@
           <a:lstStyle/>
           <a:p>
             <a:r>
-              <a:rPr lang="en-US" sz="2800" dirty="0"/>
-              <a:t>Interactive storyboard created in Tableau</a:t>
-            </a:r>
-          </a:p>
-          <a:p>
-            <a:pPr marL="0" indent="0">
-              <a:buNone/>
-            </a:pPr>
-            <a:endParaRPr lang="en-US" dirty="0"/>
-          </a:p>
-          <a:p>
-            <a:pPr marL="0" indent="0">
-              <a:buNone/>
-            </a:pPr>
-            <a:r>
-              <a:rPr lang="en-US" dirty="0"/>
-              <a:t>Follow the link below:</a:t>
+              <a:rPr lang="en-US" dirty="0"/>
+              <a:t>Benefits</a:t>
+            </a:r>
+          </a:p>
+          <a:p>
+            <a:pPr lvl="1"/>
+            <a:r>
+              <a:rPr lang="en-US" dirty="0"/>
+              <a:t>Less data preparation effort</a:t>
+            </a:r>
+          </a:p>
+          <a:p>
+            <a:pPr lvl="1"/>
+            <a:r>
+              <a:rPr lang="en-US" dirty="0"/>
+              <a:t>Intuitive and easy to explain</a:t>
+            </a:r>
+          </a:p>
+          <a:p>
+            <a:endParaRPr lang="en-US" dirty="0"/>
+          </a:p>
+          <a:p>
+            <a:r>
+              <a:rPr lang="en-US" dirty="0"/>
+              <a:t>Limitations</a:t>
+            </a:r>
+          </a:p>
+          <a:p>
+            <a:pPr lvl="1"/>
+            <a:r>
+              <a:rPr lang="en-US" dirty="0"/>
+              <a:t>Small changes in data can cause large changes in structure</a:t>
+            </a:r>
+          </a:p>
+          <a:p>
+            <a:pPr lvl="1"/>
+            <a:r>
+              <a:rPr lang="en-US" dirty="0"/>
+              <a:t>More significant model training time</a:t>
             </a:r>
           </a:p>
         </p:txBody>
@@ -7965,7 +8472,7 @@
     </p:spTree>
     <p:extLst>
       <p:ext uri="{BB962C8B-B14F-4D97-AF65-F5344CB8AC3E}">
-        <p14:creationId xmlns:p14="http://schemas.microsoft.com/office/powerpoint/2010/main" val="1688324141"/>
+        <p14:creationId xmlns:p14="http://schemas.microsoft.com/office/powerpoint/2010/main" val="279358244"/>
       </p:ext>
     </p:extLst>
   </p:cSld>
@@ -7975,7 +8482,7 @@
 </p:sld>
 </file>
 
-<file path=ppt/slides/slide2.xml><?xml version="1.0" encoding="utf-8"?>
+<file path=ppt/slides/slide14.xml><?xml version="1.0" encoding="utf-8"?>
 <p:sld xmlns:a="http://schemas.openxmlformats.org/drawingml/2006/main" xmlns:r="http://schemas.openxmlformats.org/officeDocument/2006/relationships" xmlns:p="http://schemas.openxmlformats.org/presentationml/2006/main">
   <p:cSld>
     <p:spTree>
@@ -7997,7 +8504,7 @@
           <p:cNvPr id="2" name="Title 1">
             <a:extLst>
               <a:ext uri="{FF2B5EF4-FFF2-40B4-BE49-F238E27FC236}">
-                <a16:creationId xmlns:a16="http://schemas.microsoft.com/office/drawing/2014/main" id="{D758362C-ABAD-4436-8BB9-062BA36322E7}"/>
+                <a16:creationId xmlns:a16="http://schemas.microsoft.com/office/drawing/2014/main" id="{6E28F757-57B2-4B04-9283-FA574FD47DA1}"/>
               </a:ext>
             </a:extLst>
           </p:cNvPr>
@@ -8015,7 +8522,7 @@
           <a:p>
             <a:r>
               <a:rPr lang="en-US" dirty="0"/>
-              <a:t>Disease Prediction using Machine Learning</a:t>
+              <a:t>Machine Learning – Random Forest</a:t>
             </a:r>
           </a:p>
         </p:txBody>
@@ -8025,7 +8532,7 @@
           <p:cNvPr id="3" name="Content Placeholder 2">
             <a:extLst>
               <a:ext uri="{FF2B5EF4-FFF2-40B4-BE49-F238E27FC236}">
-                <a16:creationId xmlns:a16="http://schemas.microsoft.com/office/drawing/2014/main" id="{8B2325B3-2749-4BDA-A7F6-36A97F538A10}"/>
+                <a16:creationId xmlns:a16="http://schemas.microsoft.com/office/drawing/2014/main" id="{0B8C2DD4-FE9F-4DB0-A174-04A3B52DE626}"/>
               </a:ext>
             </a:extLst>
           </p:cNvPr>
@@ -8043,62 +8550,66 @@
           <a:p>
             <a:r>
               <a:rPr lang="en-US" dirty="0"/>
-              <a:t>Reason Why the Topic was Selected</a:t>
+              <a:t>Benefits</a:t>
             </a:r>
           </a:p>
           <a:p>
             <a:pPr lvl="1"/>
             <a:r>
               <a:rPr lang="en-US" dirty="0"/>
-              <a:t>Developing a model where a list of symptoms can be input to make disease predictions can help diagnosing diseases faster</a:t>
-            </a:r>
-          </a:p>
-          <a:p>
-            <a:pPr marL="457200" lvl="1" indent="0">
-              <a:buNone/>
-            </a:pPr>
-            <a:endParaRPr lang="en-US" dirty="0"/>
-          </a:p>
-          <a:p>
-            <a:r>
-              <a:rPr lang="en-US" dirty="0"/>
-              <a:t>Description of the Data Source</a:t>
+              <a:t>Reduced chance of overfitting</a:t>
             </a:r>
           </a:p>
           <a:p>
             <a:pPr lvl="1"/>
             <a:r>
               <a:rPr lang="en-US" dirty="0"/>
-              <a:t>The data used is two csv files downloaded from Kaggle. </a:t>
+              <a:t>Primarily used for classification</a:t>
             </a:r>
           </a:p>
           <a:p>
             <a:pPr lvl="1"/>
             <a:r>
               <a:rPr lang="en-US" dirty="0"/>
-              <a:t>The dataset utilized from a csv testing and csv training file.</a:t>
+              <a:t>Flexible and possess high accuracy</a:t>
             </a:r>
           </a:p>
           <a:p>
             <a:pPr lvl="1"/>
             <a:r>
               <a:rPr lang="en-US" dirty="0"/>
-              <a:t>The source of the data from the author is not disclosed.</a:t>
-            </a:r>
-          </a:p>
-          <a:p>
-            <a:endParaRPr lang="en-US" dirty="0"/>
+              <a:t>Work well for a large range of data items</a:t>
+            </a:r>
+          </a:p>
+          <a:p>
+            <a:endParaRPr lang="en-US" dirty="0"/>
+          </a:p>
+          <a:p>
+            <a:r>
+              <a:rPr lang="en-US" dirty="0"/>
+              <a:t>Limitations</a:t>
+            </a:r>
           </a:p>
           <a:p>
             <a:pPr lvl="1"/>
-            <a:endParaRPr lang="en-US" dirty="0"/>
+            <a:r>
+              <a:rPr lang="en-US" dirty="0"/>
+              <a:t>Complexity</a:t>
+            </a:r>
+          </a:p>
+          <a:p>
+            <a:pPr lvl="1"/>
+            <a:r>
+              <a:rPr lang="en-US" dirty="0"/>
+              <a:t>Time consuming</a:t>
+            </a:r>
           </a:p>
         </p:txBody>
       </p:sp>
     </p:spTree>
     <p:extLst>
       <p:ext uri="{BB962C8B-B14F-4D97-AF65-F5344CB8AC3E}">
-        <p14:creationId xmlns:p14="http://schemas.microsoft.com/office/powerpoint/2010/main" val="90614384"/>
+        <p14:creationId xmlns:p14="http://schemas.microsoft.com/office/powerpoint/2010/main" val="1912035148"/>
       </p:ext>
     </p:extLst>
   </p:cSld>
@@ -8108,7 +8619,7 @@
 </p:sld>
 </file>
 
-<file path=ppt/slides/slide3.xml><?xml version="1.0" encoding="utf-8"?>
+<file path=ppt/slides/slide15.xml><?xml version="1.0" encoding="utf-8"?>
 <p:sld xmlns:a="http://schemas.openxmlformats.org/drawingml/2006/main" xmlns:r="http://schemas.openxmlformats.org/officeDocument/2006/relationships" xmlns:p="http://schemas.openxmlformats.org/presentationml/2006/main">
   <p:cSld>
     <p:spTree>
@@ -8130,7 +8641,7 @@
           <p:cNvPr id="2" name="Title 1">
             <a:extLst>
               <a:ext uri="{FF2B5EF4-FFF2-40B4-BE49-F238E27FC236}">
-                <a16:creationId xmlns:a16="http://schemas.microsoft.com/office/drawing/2014/main" id="{D758362C-ABAD-4436-8BB9-062BA36322E7}"/>
+                <a16:creationId xmlns:a16="http://schemas.microsoft.com/office/drawing/2014/main" id="{6E28F757-57B2-4B04-9283-FA574FD47DA1}"/>
               </a:ext>
             </a:extLst>
           </p:cNvPr>
@@ -8148,7 +8659,7 @@
           <a:p>
             <a:r>
               <a:rPr lang="en-US" dirty="0"/>
-              <a:t>Disease Prediction using Machine Learning</a:t>
+              <a:t>Machine Learning – Naïve Bayes</a:t>
             </a:r>
           </a:p>
         </p:txBody>
@@ -8158,7 +8669,7 @@
           <p:cNvPr id="3" name="Content Placeholder 2">
             <a:extLst>
               <a:ext uri="{FF2B5EF4-FFF2-40B4-BE49-F238E27FC236}">
-                <a16:creationId xmlns:a16="http://schemas.microsoft.com/office/drawing/2014/main" id="{8B2325B3-2749-4BDA-A7F6-36A97F538A10}"/>
+                <a16:creationId xmlns:a16="http://schemas.microsoft.com/office/drawing/2014/main" id="{0B8C2DD4-FE9F-4DB0-A174-04A3B52DE626}"/>
               </a:ext>
             </a:extLst>
           </p:cNvPr>
@@ -8176,40 +8687,52 @@
           <a:p>
             <a:r>
               <a:rPr lang="en-US" dirty="0"/>
-              <a:t>Questions We Hope to Answer with the Data</a:t>
-            </a:r>
-          </a:p>
-          <a:p>
-            <a:pPr marL="0" indent="0">
-              <a:buNone/>
-            </a:pPr>
-            <a:r>
-              <a:rPr lang="en-US" dirty="0"/>
-              <a:t>		1. Can our machine learning model be used to predict the 			correct disease based on symptoms entered?</a:t>
-            </a:r>
-          </a:p>
-          <a:p>
-            <a:pPr marL="0" indent="0">
-              <a:buNone/>
-            </a:pPr>
-            <a:r>
-              <a:rPr lang="en-US" dirty="0"/>
-              <a:t>		2. How many symptoms need to be present to increase the 	accuracy of the model?</a:t>
-            </a:r>
-          </a:p>
-          <a:p>
-            <a:endParaRPr lang="en-US" dirty="0"/>
+              <a:t>Benefits</a:t>
+            </a:r>
           </a:p>
           <a:p>
             <a:pPr lvl="1"/>
-            <a:endParaRPr lang="en-US" dirty="0"/>
+            <a:r>
+              <a:rPr lang="en-US" dirty="0"/>
+              <a:t>Straight-forward algorithm</a:t>
+            </a:r>
+          </a:p>
+          <a:p>
+            <a:pPr lvl="1"/>
+            <a:r>
+              <a:rPr lang="en-US" dirty="0"/>
+              <a:t>Low risk of overfitting</a:t>
+            </a:r>
+          </a:p>
+          <a:p>
+            <a:endParaRPr lang="en-US" dirty="0"/>
+          </a:p>
+          <a:p>
+            <a:r>
+              <a:rPr lang="en-US" dirty="0"/>
+              <a:t>Limitations</a:t>
+            </a:r>
+          </a:p>
+          <a:p>
+            <a:pPr lvl="1"/>
+            <a:r>
+              <a:rPr lang="en-US" dirty="0"/>
+              <a:t>Not ideal for data with complex features</a:t>
+            </a:r>
+          </a:p>
+          <a:p>
+            <a:pPr lvl="1"/>
+            <a:r>
+              <a:rPr lang="en-US" dirty="0"/>
+              <a:t>Biased nature</a:t>
+            </a:r>
           </a:p>
         </p:txBody>
       </p:sp>
     </p:spTree>
     <p:extLst>
       <p:ext uri="{BB962C8B-B14F-4D97-AF65-F5344CB8AC3E}">
-        <p14:creationId xmlns:p14="http://schemas.microsoft.com/office/powerpoint/2010/main" val="410826181"/>
+        <p14:creationId xmlns:p14="http://schemas.microsoft.com/office/powerpoint/2010/main" val="2246024886"/>
       </p:ext>
     </p:extLst>
   </p:cSld>
@@ -8219,7 +8742,7 @@
 </p:sld>
 </file>
 
-<file path=ppt/slides/slide4.xml><?xml version="1.0" encoding="utf-8"?>
+<file path=ppt/slides/slide16.xml><?xml version="1.0" encoding="utf-8"?>
 <p:sld xmlns:a="http://schemas.openxmlformats.org/drawingml/2006/main" xmlns:r="http://schemas.openxmlformats.org/officeDocument/2006/relationships" xmlns:p="http://schemas.openxmlformats.org/presentationml/2006/main">
   <p:cSld>
     <p:spTree>
@@ -8241,7 +8764,7 @@
           <p:cNvPr id="2" name="Title 1">
             <a:extLst>
               <a:ext uri="{FF2B5EF4-FFF2-40B4-BE49-F238E27FC236}">
-                <a16:creationId xmlns:a16="http://schemas.microsoft.com/office/drawing/2014/main" id="{7FA67A2B-8F06-4C08-AA3B-735A11D451AE}"/>
+                <a16:creationId xmlns:a16="http://schemas.microsoft.com/office/drawing/2014/main" id="{26ABED05-BFD0-448C-ADE8-E912DD36F457}"/>
               </a:ext>
             </a:extLst>
           </p:cNvPr>
@@ -8259,7 +8782,7 @@
           <a:p>
             <a:r>
               <a:rPr lang="en-US" dirty="0"/>
-              <a:t>Technologies and Languages</a:t>
+              <a:t>Test Patient 1</a:t>
             </a:r>
           </a:p>
         </p:txBody>
@@ -8269,7 +8792,7 @@
           <p:cNvPr id="3" name="Content Placeholder 2">
             <a:extLst>
               <a:ext uri="{FF2B5EF4-FFF2-40B4-BE49-F238E27FC236}">
-                <a16:creationId xmlns:a16="http://schemas.microsoft.com/office/drawing/2014/main" id="{59929EAB-D0FC-4492-9485-EBC78DA3EDFB}"/>
+                <a16:creationId xmlns:a16="http://schemas.microsoft.com/office/drawing/2014/main" id="{8451B911-B308-4EFE-BF9C-AEFDC418E7B1}"/>
               </a:ext>
             </a:extLst>
           </p:cNvPr>
@@ -8280,375 +8803,65 @@
             <p:ph idx="1"/>
           </p:nvPr>
         </p:nvSpPr>
-        <p:spPr/>
-        <p:txBody>
-          <a:bodyPr/>
-          <a:lstStyle/>
-          <a:p>
-            <a:r>
-              <a:rPr lang="en-US" dirty="0"/>
-              <a:t>Python</a:t>
-            </a:r>
-          </a:p>
-          <a:p>
-            <a:pPr lvl="1"/>
-            <a:r>
-              <a:rPr lang="en-US" dirty="0"/>
-              <a:t>Pandas</a:t>
-            </a:r>
-          </a:p>
-          <a:p>
-            <a:pPr lvl="1"/>
-            <a:r>
-              <a:rPr lang="en-US" dirty="0" err="1"/>
-              <a:t>MatPlotLib</a:t>
-            </a:r>
-            <a:endParaRPr lang="en-US" dirty="0"/>
-          </a:p>
-          <a:p>
-            <a:r>
-              <a:rPr lang="en-US" dirty="0" err="1"/>
-              <a:t>pgAdmin</a:t>
-            </a:r>
-            <a:endParaRPr lang="en-US" dirty="0"/>
-          </a:p>
-          <a:p>
-            <a:r>
-              <a:rPr lang="en-US" dirty="0"/>
-              <a:t>PostgreSQL</a:t>
-            </a:r>
-          </a:p>
-          <a:p>
-            <a:r>
-              <a:rPr lang="en-US" dirty="0"/>
-              <a:t>Tableau</a:t>
-            </a:r>
-          </a:p>
-          <a:p>
-            <a:endParaRPr lang="en-US" dirty="0"/>
-          </a:p>
-          <a:p>
-            <a:endParaRPr lang="en-US" dirty="0"/>
-          </a:p>
-        </p:txBody>
-      </p:sp>
-    </p:spTree>
-    <p:extLst>
-      <p:ext uri="{BB962C8B-B14F-4D97-AF65-F5344CB8AC3E}">
-        <p14:creationId xmlns:p14="http://schemas.microsoft.com/office/powerpoint/2010/main" val="2959090660"/>
-      </p:ext>
-    </p:extLst>
-  </p:cSld>
-  <p:clrMapOvr>
-    <a:masterClrMapping/>
-  </p:clrMapOvr>
-</p:sld>
-</file>
-
-<file path=ppt/slides/slide5.xml><?xml version="1.0" encoding="utf-8"?>
-<p:sld xmlns:a="http://schemas.openxmlformats.org/drawingml/2006/main" xmlns:r="http://schemas.openxmlformats.org/officeDocument/2006/relationships" xmlns:p="http://schemas.openxmlformats.org/presentationml/2006/main">
-  <p:cSld>
-    <p:spTree>
-      <p:nvGrpSpPr>
-        <p:cNvPr id="1" name=""/>
-        <p:cNvGrpSpPr/>
-        <p:nvPr/>
-      </p:nvGrpSpPr>
-      <p:grpSpPr>
-        <a:xfrm>
-          <a:off x="0" y="0"/>
-          <a:ext cx="0" cy="0"/>
-          <a:chOff x="0" y="0"/>
-          <a:chExt cx="0" cy="0"/>
-        </a:xfrm>
-      </p:grpSpPr>
-      <p:sp>
-        <p:nvSpPr>
-          <p:cNvPr id="2" name="Title 1">
+        <p:spPr>
+          <a:xfrm>
+            <a:off x="711240" y="1697277"/>
+            <a:ext cx="3359719" cy="720246"/>
+          </a:xfrm>
+        </p:spPr>
+        <p:txBody>
+          <a:bodyPr/>
+          <a:lstStyle/>
+          <a:p>
+            <a:r>
+              <a:rPr lang="en-US" dirty="0"/>
+              <a:t>Accuracy Score:</a:t>
+            </a:r>
+          </a:p>
+          <a:p>
+            <a:endParaRPr lang="en-US" dirty="0"/>
+          </a:p>
+          <a:p>
+            <a:endParaRPr lang="en-US" dirty="0"/>
+          </a:p>
+        </p:txBody>
+      </p:sp>
+      <p:pic>
+        <p:nvPicPr>
+          <p:cNvPr id="5" name="Picture 4">
             <a:extLst>
               <a:ext uri="{FF2B5EF4-FFF2-40B4-BE49-F238E27FC236}">
-                <a16:creationId xmlns:a16="http://schemas.microsoft.com/office/drawing/2014/main" id="{723334D1-B7E0-45E3-AF80-4731396B9AAC}"/>
-              </a:ext>
-            </a:extLst>
-          </p:cNvPr>
-          <p:cNvSpPr>
-            <a:spLocks noGrp="1"/>
-          </p:cNvSpPr>
-          <p:nvPr>
-            <p:ph type="title"/>
-          </p:nvPr>
-        </p:nvSpPr>
-        <p:spPr/>
-        <p:txBody>
-          <a:bodyPr/>
-          <a:lstStyle/>
-          <a:p>
-            <a:r>
-              <a:rPr lang="en-US" dirty="0"/>
-              <a:t>Data Exploration Phase</a:t>
-            </a:r>
-          </a:p>
-        </p:txBody>
-      </p:sp>
-      <p:sp>
-        <p:nvSpPr>
-          <p:cNvPr id="3" name="Text Placeholder 2">
-            <a:extLst>
-              <a:ext uri="{FF2B5EF4-FFF2-40B4-BE49-F238E27FC236}">
-                <a16:creationId xmlns:a16="http://schemas.microsoft.com/office/drawing/2014/main" id="{FEDEB578-263A-4026-8966-6821C32338B9}"/>
-              </a:ext>
-            </a:extLst>
-          </p:cNvPr>
-          <p:cNvSpPr>
-            <a:spLocks noGrp="1"/>
-          </p:cNvSpPr>
-          <p:nvPr>
-            <p:ph type="body" idx="1"/>
-          </p:nvPr>
-        </p:nvSpPr>
-        <p:spPr>
-          <a:xfrm>
-            <a:off x="1103312" y="1161729"/>
-            <a:ext cx="4396338" cy="576262"/>
-          </a:xfrm>
-        </p:spPr>
-        <p:txBody>
-          <a:bodyPr/>
-          <a:lstStyle/>
-          <a:p>
-            <a:r>
-              <a:rPr lang="en-US" b="1" u="sng" dirty="0"/>
-              <a:t>Preprocessing Data</a:t>
-            </a:r>
-          </a:p>
-        </p:txBody>
-      </p:sp>
-      <p:sp>
-        <p:nvSpPr>
-          <p:cNvPr id="4" name="Content Placeholder 3">
-            <a:extLst>
-              <a:ext uri="{FF2B5EF4-FFF2-40B4-BE49-F238E27FC236}">
-                <a16:creationId xmlns:a16="http://schemas.microsoft.com/office/drawing/2014/main" id="{113B55E9-5F54-4095-9350-D567D2D57927}"/>
-              </a:ext>
-            </a:extLst>
-          </p:cNvPr>
-          <p:cNvSpPr>
-            <a:spLocks noGrp="1"/>
-          </p:cNvSpPr>
-          <p:nvPr>
-            <p:ph sz="half" idx="2"/>
-          </p:nvPr>
-        </p:nvSpPr>
-        <p:spPr>
-          <a:xfrm>
-            <a:off x="1103311" y="1853248"/>
-            <a:ext cx="4992689" cy="3741738"/>
-          </a:xfrm>
-        </p:spPr>
-        <p:txBody>
-          <a:bodyPr/>
-          <a:lstStyle/>
-          <a:p>
-            <a:r>
-              <a:rPr lang="en-US" dirty="0"/>
-              <a:t>Data Types evaluated</a:t>
-            </a:r>
-          </a:p>
-          <a:p>
-            <a:pPr lvl="1"/>
-            <a:r>
-              <a:rPr lang="en-US" dirty="0"/>
-              <a:t>train_data.info()</a:t>
-            </a:r>
-          </a:p>
-          <a:p>
-            <a:pPr lvl="1"/>
-            <a:r>
-              <a:rPr lang="en-US" dirty="0"/>
-              <a:t>test_data.info()</a:t>
-            </a:r>
-          </a:p>
-          <a:p>
-            <a:pPr lvl="1"/>
-            <a:r>
-              <a:rPr lang="en-US" dirty="0"/>
-              <a:t>train_data.describe()</a:t>
-            </a:r>
-          </a:p>
-          <a:p>
-            <a:pPr lvl="1"/>
-            <a:r>
-              <a:rPr lang="en-US" dirty="0"/>
-              <a:t>test_data.describe()</a:t>
-            </a:r>
-          </a:p>
-          <a:p>
-            <a:r>
-              <a:rPr lang="en-US" dirty="0"/>
-              <a:t>Null values removed</a:t>
-            </a:r>
-          </a:p>
-          <a:p>
-            <a:pPr lvl="1"/>
-            <a:r>
-              <a:rPr lang="en-US" dirty="0" err="1"/>
-              <a:t>train_data.isnull</a:t>
-            </a:r>
-            <a:r>
-              <a:rPr lang="en-US" dirty="0"/>
-              <a:t>().any()</a:t>
-            </a:r>
-          </a:p>
-          <a:p>
-            <a:pPr lvl="1"/>
-            <a:r>
-              <a:rPr lang="en-US" dirty="0" err="1"/>
-              <a:t>train_data.drop</a:t>
-            </a:r>
-            <a:r>
-              <a:rPr lang="en-US" dirty="0"/>
-              <a:t>(["Unnamed: 133"], axis=1, </a:t>
-            </a:r>
-            <a:r>
-              <a:rPr lang="en-US" dirty="0" err="1"/>
-              <a:t>inplace</a:t>
-            </a:r>
-            <a:r>
-              <a:rPr lang="en-US" dirty="0"/>
-              <a:t>=True)</a:t>
-            </a:r>
-          </a:p>
-          <a:p>
-            <a:endParaRPr lang="en-US" dirty="0"/>
-          </a:p>
-        </p:txBody>
-      </p:sp>
-      <p:pic>
-        <p:nvPicPr>
-          <p:cNvPr id="8" name="Content Placeholder 7">
-            <a:extLst>
-              <a:ext uri="{FF2B5EF4-FFF2-40B4-BE49-F238E27FC236}">
-                <a16:creationId xmlns:a16="http://schemas.microsoft.com/office/drawing/2014/main" id="{4FB8A4E8-B36B-445E-A0C9-9BCC9FA6EC03}"/>
+                <a16:creationId xmlns:a16="http://schemas.microsoft.com/office/drawing/2014/main" id="{6EF7B6EB-0E40-40DB-8476-104D9DF10DD7}"/>
               </a:ext>
             </a:extLst>
           </p:cNvPr>
           <p:cNvPicPr>
-            <a:picLocks noGrp="1" noChangeAspect="1"/>
+            <a:picLocks noChangeAspect="1"/>
           </p:cNvPicPr>
-          <p:nvPr>
-            <p:ph sz="quarter" idx="4"/>
-          </p:nvPr>
+          <p:nvPr/>
         </p:nvPicPr>
         <p:blipFill>
-          <a:blip r:embed="rId3"/>
+          <a:blip r:embed="rId2"/>
           <a:stretch>
             <a:fillRect/>
           </a:stretch>
         </p:blipFill>
         <p:spPr>
           <a:xfrm>
-            <a:off x="6759463" y="1853248"/>
-            <a:ext cx="4619682" cy="3239481"/>
+            <a:off x="4563455" y="2369144"/>
+            <a:ext cx="7115175" cy="3562350"/>
           </a:xfrm>
+          <a:prstGeom prst="rect">
+            <a:avLst/>
+          </a:prstGeom>
         </p:spPr>
       </p:pic>
-    </p:spTree>
-    <p:extLst>
-      <p:ext uri="{BB962C8B-B14F-4D97-AF65-F5344CB8AC3E}">
-        <p14:creationId xmlns:p14="http://schemas.microsoft.com/office/powerpoint/2010/main" val="3363762451"/>
-      </p:ext>
-    </p:extLst>
-  </p:cSld>
-  <p:clrMapOvr>
-    <a:masterClrMapping/>
-  </p:clrMapOvr>
-</p:sld>
-</file>
-
-<file path=ppt/slides/slide6.xml><?xml version="1.0" encoding="utf-8"?>
-<p:sld xmlns:a="http://schemas.openxmlformats.org/drawingml/2006/main" xmlns:r="http://schemas.openxmlformats.org/officeDocument/2006/relationships" xmlns:p="http://schemas.openxmlformats.org/presentationml/2006/main">
-  <p:cSld>
-    <p:spTree>
-      <p:nvGrpSpPr>
-        <p:cNvPr id="1" name=""/>
-        <p:cNvGrpSpPr/>
-        <p:nvPr/>
-      </p:nvGrpSpPr>
-      <p:grpSpPr>
-        <a:xfrm>
-          <a:off x="0" y="0"/>
-          <a:ext cx="0" cy="0"/>
-          <a:chOff x="0" y="0"/>
-          <a:chExt cx="0" cy="0"/>
-        </a:xfrm>
-      </p:grpSpPr>
-      <p:sp>
-        <p:nvSpPr>
-          <p:cNvPr id="2" name="Title 1">
+      <p:pic>
+        <p:nvPicPr>
+          <p:cNvPr id="9" name="Picture 8">
             <a:extLst>
               <a:ext uri="{FF2B5EF4-FFF2-40B4-BE49-F238E27FC236}">
-                <a16:creationId xmlns:a16="http://schemas.microsoft.com/office/drawing/2014/main" id="{2E48FF0A-0204-4E26-9EF8-D41CBE569E98}"/>
-              </a:ext>
-            </a:extLst>
-          </p:cNvPr>
-          <p:cNvSpPr>
-            <a:spLocks noGrp="1"/>
-          </p:cNvSpPr>
-          <p:nvPr>
-            <p:ph type="title"/>
-          </p:nvPr>
-        </p:nvSpPr>
-        <p:spPr/>
-        <p:txBody>
-          <a:bodyPr/>
-          <a:lstStyle/>
-          <a:p>
-            <a:r>
-              <a:rPr lang="en-US" dirty="0"/>
-              <a:t>Training and Testing Data</a:t>
-            </a:r>
-          </a:p>
-        </p:txBody>
-      </p:sp>
-      <p:sp>
-        <p:nvSpPr>
-          <p:cNvPr id="3" name="Content Placeholder 2">
-            <a:extLst>
-              <a:ext uri="{FF2B5EF4-FFF2-40B4-BE49-F238E27FC236}">
-                <a16:creationId xmlns:a16="http://schemas.microsoft.com/office/drawing/2014/main" id="{262B6239-AE27-4B7C-ADDC-8920468BBDFC}"/>
-              </a:ext>
-            </a:extLst>
-          </p:cNvPr>
-          <p:cNvSpPr>
-            <a:spLocks noGrp="1"/>
-          </p:cNvSpPr>
-          <p:nvPr>
-            <p:ph idx="1"/>
-          </p:nvPr>
-        </p:nvSpPr>
-        <p:spPr>
-          <a:xfrm>
-            <a:off x="1103313" y="2052918"/>
-            <a:ext cx="4598240" cy="4195481"/>
-          </a:xfrm>
-        </p:spPr>
-        <p:txBody>
-          <a:bodyPr/>
-          <a:lstStyle/>
-          <a:p>
-            <a:r>
-              <a:rPr lang="en-US" dirty="0"/>
-              <a:t>Create Feature</a:t>
-            </a:r>
-          </a:p>
-        </p:txBody>
-      </p:sp>
-      <p:pic>
-        <p:nvPicPr>
-          <p:cNvPr id="5" name="Picture 4">
-            <a:extLst>
-              <a:ext uri="{FF2B5EF4-FFF2-40B4-BE49-F238E27FC236}">
-                <a16:creationId xmlns:a16="http://schemas.microsoft.com/office/drawing/2014/main" id="{2689E90B-E9F4-46F8-88A8-DFAE10944A9A}"/>
+                <a16:creationId xmlns:a16="http://schemas.microsoft.com/office/drawing/2014/main" id="{4B7EA9C7-7842-4992-B6BA-7AB491BE14E6}"/>
               </a:ext>
             </a:extLst>
           </p:cNvPr>
@@ -8665,8 +8878,8 @@
         </p:blipFill>
         <p:spPr>
           <a:xfrm>
-            <a:off x="1232232" y="2693502"/>
-            <a:ext cx="4171950" cy="1019175"/>
+            <a:off x="1001234" y="2369144"/>
+            <a:ext cx="2581210" cy="2393486"/>
           </a:xfrm>
           <a:prstGeom prst="rect">
             <a:avLst/>
@@ -8675,10 +8888,10 @@
       </p:pic>
       <p:sp>
         <p:nvSpPr>
-          <p:cNvPr id="6" name="Content Placeholder 2">
+          <p:cNvPr id="10" name="Content Placeholder 2">
             <a:extLst>
               <a:ext uri="{FF2B5EF4-FFF2-40B4-BE49-F238E27FC236}">
-                <a16:creationId xmlns:a16="http://schemas.microsoft.com/office/drawing/2014/main" id="{63DA0C8B-725B-4F78-8907-98C458D0FFAD}"/>
+                <a16:creationId xmlns:a16="http://schemas.microsoft.com/office/drawing/2014/main" id="{5AEFA8B2-F965-4E07-90C2-582D2A4BC49A}"/>
               </a:ext>
             </a:extLst>
           </p:cNvPr>
@@ -8689,8 +8902,8 @@
         </p:nvSpPr>
         <p:spPr>
           <a:xfrm>
-            <a:off x="6224920" y="2052917"/>
-            <a:ext cx="4992688" cy="4195481"/>
+            <a:off x="4563455" y="1697277"/>
+            <a:ext cx="3359719" cy="720246"/>
           </a:xfrm>
           <a:prstGeom prst="rect">
             <a:avLst/>
@@ -8903,7 +9116,1073 @@
           <a:p>
             <a:r>
               <a:rPr lang="en-US" dirty="0"/>
-              <a:t>Create Target</a:t>
+              <a:t>GUI:</a:t>
+            </a:r>
+          </a:p>
+          <a:p>
+            <a:endParaRPr lang="en-US" dirty="0"/>
+          </a:p>
+          <a:p>
+            <a:endParaRPr lang="en-US" dirty="0"/>
+          </a:p>
+        </p:txBody>
+      </p:sp>
+    </p:spTree>
+    <p:extLst>
+      <p:ext uri="{BB962C8B-B14F-4D97-AF65-F5344CB8AC3E}">
+        <p14:creationId xmlns:p14="http://schemas.microsoft.com/office/powerpoint/2010/main" val="154218335"/>
+      </p:ext>
+    </p:extLst>
+  </p:cSld>
+  <p:clrMapOvr>
+    <a:masterClrMapping/>
+  </p:clrMapOvr>
+</p:sld>
+</file>
+
+<file path=ppt/slides/slide17.xml><?xml version="1.0" encoding="utf-8"?>
+<p:sld xmlns:a="http://schemas.openxmlformats.org/drawingml/2006/main" xmlns:r="http://schemas.openxmlformats.org/officeDocument/2006/relationships" xmlns:p="http://schemas.openxmlformats.org/presentationml/2006/main">
+  <p:cSld>
+    <p:spTree>
+      <p:nvGrpSpPr>
+        <p:cNvPr id="1" name=""/>
+        <p:cNvGrpSpPr/>
+        <p:nvPr/>
+      </p:nvGrpSpPr>
+      <p:grpSpPr>
+        <a:xfrm>
+          <a:off x="0" y="0"/>
+          <a:ext cx="0" cy="0"/>
+          <a:chOff x="0" y="0"/>
+          <a:chExt cx="0" cy="0"/>
+        </a:xfrm>
+      </p:grpSpPr>
+      <p:sp>
+        <p:nvSpPr>
+          <p:cNvPr id="2" name="Title 1">
+            <a:extLst>
+              <a:ext uri="{FF2B5EF4-FFF2-40B4-BE49-F238E27FC236}">
+                <a16:creationId xmlns:a16="http://schemas.microsoft.com/office/drawing/2014/main" id="{0D8C7776-FDA1-4F89-ACE0-A5C058D0589D}"/>
+              </a:ext>
+            </a:extLst>
+          </p:cNvPr>
+          <p:cNvSpPr>
+            <a:spLocks noGrp="1"/>
+          </p:cNvSpPr>
+          <p:nvPr>
+            <p:ph type="title"/>
+          </p:nvPr>
+        </p:nvSpPr>
+        <p:spPr/>
+        <p:txBody>
+          <a:bodyPr/>
+          <a:lstStyle/>
+          <a:p>
+            <a:r>
+              <a:rPr lang="en-US" dirty="0"/>
+              <a:t>Dashboard</a:t>
+            </a:r>
+          </a:p>
+        </p:txBody>
+      </p:sp>
+      <p:sp>
+        <p:nvSpPr>
+          <p:cNvPr id="3" name="Content Placeholder 2">
+            <a:extLst>
+              <a:ext uri="{FF2B5EF4-FFF2-40B4-BE49-F238E27FC236}">
+                <a16:creationId xmlns:a16="http://schemas.microsoft.com/office/drawing/2014/main" id="{7F889976-0B08-40AE-9EB7-1DE55CE6DF65}"/>
+              </a:ext>
+            </a:extLst>
+          </p:cNvPr>
+          <p:cNvSpPr>
+            <a:spLocks noGrp="1"/>
+          </p:cNvSpPr>
+          <p:nvPr>
+            <p:ph idx="1"/>
+          </p:nvPr>
+        </p:nvSpPr>
+        <p:spPr/>
+        <p:txBody>
+          <a:bodyPr/>
+          <a:lstStyle/>
+          <a:p>
+            <a:r>
+              <a:rPr lang="en-US" sz="2800" dirty="0"/>
+              <a:t>Interactive storyboard created in Tableau</a:t>
+            </a:r>
+          </a:p>
+          <a:p>
+            <a:pPr marL="0" indent="0">
+              <a:buNone/>
+            </a:pPr>
+            <a:endParaRPr lang="en-US" dirty="0"/>
+          </a:p>
+          <a:p>
+            <a:pPr marL="0" indent="0">
+              <a:buNone/>
+            </a:pPr>
+            <a:r>
+              <a:rPr lang="en-US" dirty="0"/>
+              <a:t>Follow the link below:</a:t>
+            </a:r>
+          </a:p>
+        </p:txBody>
+      </p:sp>
+    </p:spTree>
+    <p:extLst>
+      <p:ext uri="{BB962C8B-B14F-4D97-AF65-F5344CB8AC3E}">
+        <p14:creationId xmlns:p14="http://schemas.microsoft.com/office/powerpoint/2010/main" val="1688324141"/>
+      </p:ext>
+    </p:extLst>
+  </p:cSld>
+  <p:clrMapOvr>
+    <a:masterClrMapping/>
+  </p:clrMapOvr>
+</p:sld>
+</file>
+
+<file path=ppt/slides/slide2.xml><?xml version="1.0" encoding="utf-8"?>
+<p:sld xmlns:a="http://schemas.openxmlformats.org/drawingml/2006/main" xmlns:r="http://schemas.openxmlformats.org/officeDocument/2006/relationships" xmlns:p="http://schemas.openxmlformats.org/presentationml/2006/main">
+  <p:cSld>
+    <p:spTree>
+      <p:nvGrpSpPr>
+        <p:cNvPr id="1" name=""/>
+        <p:cNvGrpSpPr/>
+        <p:nvPr/>
+      </p:nvGrpSpPr>
+      <p:grpSpPr>
+        <a:xfrm>
+          <a:off x="0" y="0"/>
+          <a:ext cx="0" cy="0"/>
+          <a:chOff x="0" y="0"/>
+          <a:chExt cx="0" cy="0"/>
+        </a:xfrm>
+      </p:grpSpPr>
+      <p:sp>
+        <p:nvSpPr>
+          <p:cNvPr id="2" name="Title 1">
+            <a:extLst>
+              <a:ext uri="{FF2B5EF4-FFF2-40B4-BE49-F238E27FC236}">
+                <a16:creationId xmlns:a16="http://schemas.microsoft.com/office/drawing/2014/main" id="{D758362C-ABAD-4436-8BB9-062BA36322E7}"/>
+              </a:ext>
+            </a:extLst>
+          </p:cNvPr>
+          <p:cNvSpPr>
+            <a:spLocks noGrp="1"/>
+          </p:cNvSpPr>
+          <p:nvPr>
+            <p:ph type="title"/>
+          </p:nvPr>
+        </p:nvSpPr>
+        <p:spPr/>
+        <p:txBody>
+          <a:bodyPr/>
+          <a:lstStyle/>
+          <a:p>
+            <a:r>
+              <a:rPr lang="en-US" dirty="0"/>
+              <a:t>Disease Prediction using Machine Learning</a:t>
+            </a:r>
+          </a:p>
+        </p:txBody>
+      </p:sp>
+      <p:sp>
+        <p:nvSpPr>
+          <p:cNvPr id="3" name="Content Placeholder 2">
+            <a:extLst>
+              <a:ext uri="{FF2B5EF4-FFF2-40B4-BE49-F238E27FC236}">
+                <a16:creationId xmlns:a16="http://schemas.microsoft.com/office/drawing/2014/main" id="{8B2325B3-2749-4BDA-A7F6-36A97F538A10}"/>
+              </a:ext>
+            </a:extLst>
+          </p:cNvPr>
+          <p:cNvSpPr>
+            <a:spLocks noGrp="1"/>
+          </p:cNvSpPr>
+          <p:nvPr>
+            <p:ph idx="1"/>
+          </p:nvPr>
+        </p:nvSpPr>
+        <p:spPr/>
+        <p:txBody>
+          <a:bodyPr/>
+          <a:lstStyle/>
+          <a:p>
+            <a:r>
+              <a:rPr lang="en-US" dirty="0"/>
+              <a:t>Reason Why the Topic was Selected</a:t>
+            </a:r>
+          </a:p>
+          <a:p>
+            <a:pPr lvl="1"/>
+            <a:r>
+              <a:rPr lang="en-US" dirty="0"/>
+              <a:t>Developing a model where a list of symptoms can be input to make disease predictions can help diagnosing diseases faster</a:t>
+            </a:r>
+          </a:p>
+          <a:p>
+            <a:pPr marL="457200" lvl="1" indent="0">
+              <a:buNone/>
+            </a:pPr>
+            <a:endParaRPr lang="en-US" dirty="0"/>
+          </a:p>
+          <a:p>
+            <a:r>
+              <a:rPr lang="en-US" dirty="0"/>
+              <a:t>Description of the Data Source</a:t>
+            </a:r>
+          </a:p>
+          <a:p>
+            <a:pPr lvl="1"/>
+            <a:r>
+              <a:rPr lang="en-US" dirty="0"/>
+              <a:t>The data used is two csv files downloaded from Kaggle. </a:t>
+            </a:r>
+          </a:p>
+          <a:p>
+            <a:pPr lvl="1"/>
+            <a:r>
+              <a:rPr lang="en-US" dirty="0"/>
+              <a:t>The dataset utilized from a csv testing and csv training file.</a:t>
+            </a:r>
+          </a:p>
+          <a:p>
+            <a:pPr lvl="1"/>
+            <a:r>
+              <a:rPr lang="en-US" dirty="0"/>
+              <a:t>The source of the data from the author is not disclosed.</a:t>
+            </a:r>
+          </a:p>
+          <a:p>
+            <a:endParaRPr lang="en-US" dirty="0"/>
+          </a:p>
+          <a:p>
+            <a:pPr lvl="1"/>
+            <a:endParaRPr lang="en-US" dirty="0"/>
+          </a:p>
+        </p:txBody>
+      </p:sp>
+    </p:spTree>
+    <p:extLst>
+      <p:ext uri="{BB962C8B-B14F-4D97-AF65-F5344CB8AC3E}">
+        <p14:creationId xmlns:p14="http://schemas.microsoft.com/office/powerpoint/2010/main" val="90614384"/>
+      </p:ext>
+    </p:extLst>
+  </p:cSld>
+  <p:clrMapOvr>
+    <a:masterClrMapping/>
+  </p:clrMapOvr>
+</p:sld>
+</file>
+
+<file path=ppt/slides/slide3.xml><?xml version="1.0" encoding="utf-8"?>
+<p:sld xmlns:a="http://schemas.openxmlformats.org/drawingml/2006/main" xmlns:r="http://schemas.openxmlformats.org/officeDocument/2006/relationships" xmlns:p="http://schemas.openxmlformats.org/presentationml/2006/main">
+  <p:cSld>
+    <p:spTree>
+      <p:nvGrpSpPr>
+        <p:cNvPr id="1" name=""/>
+        <p:cNvGrpSpPr/>
+        <p:nvPr/>
+      </p:nvGrpSpPr>
+      <p:grpSpPr>
+        <a:xfrm>
+          <a:off x="0" y="0"/>
+          <a:ext cx="0" cy="0"/>
+          <a:chOff x="0" y="0"/>
+          <a:chExt cx="0" cy="0"/>
+        </a:xfrm>
+      </p:grpSpPr>
+      <p:sp>
+        <p:nvSpPr>
+          <p:cNvPr id="2" name="Title 1">
+            <a:extLst>
+              <a:ext uri="{FF2B5EF4-FFF2-40B4-BE49-F238E27FC236}">
+                <a16:creationId xmlns:a16="http://schemas.microsoft.com/office/drawing/2014/main" id="{D758362C-ABAD-4436-8BB9-062BA36322E7}"/>
+              </a:ext>
+            </a:extLst>
+          </p:cNvPr>
+          <p:cNvSpPr>
+            <a:spLocks noGrp="1"/>
+          </p:cNvSpPr>
+          <p:nvPr>
+            <p:ph type="title"/>
+          </p:nvPr>
+        </p:nvSpPr>
+        <p:spPr/>
+        <p:txBody>
+          <a:bodyPr/>
+          <a:lstStyle/>
+          <a:p>
+            <a:r>
+              <a:rPr lang="en-US" dirty="0"/>
+              <a:t>Disease Prediction using Machine Learning</a:t>
+            </a:r>
+          </a:p>
+        </p:txBody>
+      </p:sp>
+      <p:sp>
+        <p:nvSpPr>
+          <p:cNvPr id="3" name="Content Placeholder 2">
+            <a:extLst>
+              <a:ext uri="{FF2B5EF4-FFF2-40B4-BE49-F238E27FC236}">
+                <a16:creationId xmlns:a16="http://schemas.microsoft.com/office/drawing/2014/main" id="{8B2325B3-2749-4BDA-A7F6-36A97F538A10}"/>
+              </a:ext>
+            </a:extLst>
+          </p:cNvPr>
+          <p:cNvSpPr>
+            <a:spLocks noGrp="1"/>
+          </p:cNvSpPr>
+          <p:nvPr>
+            <p:ph idx="1"/>
+          </p:nvPr>
+        </p:nvSpPr>
+        <p:spPr/>
+        <p:txBody>
+          <a:bodyPr/>
+          <a:lstStyle/>
+          <a:p>
+            <a:r>
+              <a:rPr lang="en-US" dirty="0"/>
+              <a:t>Questions We Hope to Answer with the Data</a:t>
+            </a:r>
+          </a:p>
+          <a:p>
+            <a:pPr marL="0" indent="0">
+              <a:buNone/>
+            </a:pPr>
+            <a:r>
+              <a:rPr lang="en-US" dirty="0"/>
+              <a:t>		1. Can our machine learning model be used to predict the 			correct disease based on symptoms entered?</a:t>
+            </a:r>
+          </a:p>
+          <a:p>
+            <a:pPr marL="0" indent="0">
+              <a:buNone/>
+            </a:pPr>
+            <a:r>
+              <a:rPr lang="en-US" dirty="0"/>
+              <a:t>		2. How many symptoms need to be present to increase the 	accuracy of the model?</a:t>
+            </a:r>
+          </a:p>
+          <a:p>
+            <a:endParaRPr lang="en-US" dirty="0"/>
+          </a:p>
+          <a:p>
+            <a:pPr lvl="1"/>
+            <a:endParaRPr lang="en-US" dirty="0"/>
+          </a:p>
+        </p:txBody>
+      </p:sp>
+    </p:spTree>
+    <p:extLst>
+      <p:ext uri="{BB962C8B-B14F-4D97-AF65-F5344CB8AC3E}">
+        <p14:creationId xmlns:p14="http://schemas.microsoft.com/office/powerpoint/2010/main" val="410826181"/>
+      </p:ext>
+    </p:extLst>
+  </p:cSld>
+  <p:clrMapOvr>
+    <a:masterClrMapping/>
+  </p:clrMapOvr>
+</p:sld>
+</file>
+
+<file path=ppt/slides/slide4.xml><?xml version="1.0" encoding="utf-8"?>
+<p:sld xmlns:a="http://schemas.openxmlformats.org/drawingml/2006/main" xmlns:r="http://schemas.openxmlformats.org/officeDocument/2006/relationships" xmlns:p="http://schemas.openxmlformats.org/presentationml/2006/main">
+  <p:cSld>
+    <p:spTree>
+      <p:nvGrpSpPr>
+        <p:cNvPr id="1" name=""/>
+        <p:cNvGrpSpPr/>
+        <p:nvPr/>
+      </p:nvGrpSpPr>
+      <p:grpSpPr>
+        <a:xfrm>
+          <a:off x="0" y="0"/>
+          <a:ext cx="0" cy="0"/>
+          <a:chOff x="0" y="0"/>
+          <a:chExt cx="0" cy="0"/>
+        </a:xfrm>
+      </p:grpSpPr>
+      <p:sp>
+        <p:nvSpPr>
+          <p:cNvPr id="2" name="Title 1">
+            <a:extLst>
+              <a:ext uri="{FF2B5EF4-FFF2-40B4-BE49-F238E27FC236}">
+                <a16:creationId xmlns:a16="http://schemas.microsoft.com/office/drawing/2014/main" id="{7FA67A2B-8F06-4C08-AA3B-735A11D451AE}"/>
+              </a:ext>
+            </a:extLst>
+          </p:cNvPr>
+          <p:cNvSpPr>
+            <a:spLocks noGrp="1"/>
+          </p:cNvSpPr>
+          <p:nvPr>
+            <p:ph type="title"/>
+          </p:nvPr>
+        </p:nvSpPr>
+        <p:spPr/>
+        <p:txBody>
+          <a:bodyPr/>
+          <a:lstStyle/>
+          <a:p>
+            <a:r>
+              <a:rPr lang="en-US" dirty="0"/>
+              <a:t>Technologies and Languages</a:t>
+            </a:r>
+          </a:p>
+        </p:txBody>
+      </p:sp>
+      <p:sp>
+        <p:nvSpPr>
+          <p:cNvPr id="3" name="Content Placeholder 2">
+            <a:extLst>
+              <a:ext uri="{FF2B5EF4-FFF2-40B4-BE49-F238E27FC236}">
+                <a16:creationId xmlns:a16="http://schemas.microsoft.com/office/drawing/2014/main" id="{59929EAB-D0FC-4492-9485-EBC78DA3EDFB}"/>
+              </a:ext>
+            </a:extLst>
+          </p:cNvPr>
+          <p:cNvSpPr>
+            <a:spLocks noGrp="1"/>
+          </p:cNvSpPr>
+          <p:nvPr>
+            <p:ph idx="1"/>
+          </p:nvPr>
+        </p:nvSpPr>
+        <p:spPr/>
+        <p:txBody>
+          <a:bodyPr/>
+          <a:lstStyle/>
+          <a:p>
+            <a:r>
+              <a:rPr lang="en-US" dirty="0" err="1"/>
+              <a:t>Jupyter</a:t>
+            </a:r>
+            <a:r>
+              <a:rPr lang="en-US" dirty="0"/>
+              <a:t> Notebook</a:t>
+            </a:r>
+          </a:p>
+          <a:p>
+            <a:r>
+              <a:rPr lang="en-US" dirty="0"/>
+              <a:t>Python</a:t>
+            </a:r>
+          </a:p>
+          <a:p>
+            <a:pPr lvl="1"/>
+            <a:r>
+              <a:rPr lang="en-US" dirty="0"/>
+              <a:t>Pandas</a:t>
+            </a:r>
+          </a:p>
+          <a:p>
+            <a:pPr lvl="1"/>
+            <a:r>
+              <a:rPr lang="en-US" dirty="0" err="1"/>
+              <a:t>MatPlotLib</a:t>
+            </a:r>
+            <a:endParaRPr lang="en-US" dirty="0"/>
+          </a:p>
+          <a:p>
+            <a:r>
+              <a:rPr lang="en-US" dirty="0" err="1"/>
+              <a:t>pgAdmin</a:t>
+            </a:r>
+            <a:endParaRPr lang="en-US" dirty="0"/>
+          </a:p>
+          <a:p>
+            <a:r>
+              <a:rPr lang="en-US" dirty="0"/>
+              <a:t>PostgreSQL</a:t>
+            </a:r>
+          </a:p>
+          <a:p>
+            <a:r>
+              <a:rPr lang="en-US" dirty="0"/>
+              <a:t>Tableau</a:t>
+            </a:r>
+          </a:p>
+          <a:p>
+            <a:endParaRPr lang="en-US" dirty="0"/>
+          </a:p>
+          <a:p>
+            <a:pPr marL="0" indent="0">
+              <a:buNone/>
+            </a:pPr>
+            <a:endParaRPr lang="en-US" dirty="0"/>
+          </a:p>
+        </p:txBody>
+      </p:sp>
+    </p:spTree>
+    <p:extLst>
+      <p:ext uri="{BB962C8B-B14F-4D97-AF65-F5344CB8AC3E}">
+        <p14:creationId xmlns:p14="http://schemas.microsoft.com/office/powerpoint/2010/main" val="2959090660"/>
+      </p:ext>
+    </p:extLst>
+  </p:cSld>
+  <p:clrMapOvr>
+    <a:masterClrMapping/>
+  </p:clrMapOvr>
+</p:sld>
+</file>
+
+<file path=ppt/slides/slide5.xml><?xml version="1.0" encoding="utf-8"?>
+<p:sld xmlns:a="http://schemas.openxmlformats.org/drawingml/2006/main" xmlns:r="http://schemas.openxmlformats.org/officeDocument/2006/relationships" xmlns:p="http://schemas.openxmlformats.org/presentationml/2006/main">
+  <p:cSld>
+    <p:spTree>
+      <p:nvGrpSpPr>
+        <p:cNvPr id="1" name=""/>
+        <p:cNvGrpSpPr/>
+        <p:nvPr/>
+      </p:nvGrpSpPr>
+      <p:grpSpPr>
+        <a:xfrm>
+          <a:off x="0" y="0"/>
+          <a:ext cx="0" cy="0"/>
+          <a:chOff x="0" y="0"/>
+          <a:chExt cx="0" cy="0"/>
+        </a:xfrm>
+      </p:grpSpPr>
+      <p:sp>
+        <p:nvSpPr>
+          <p:cNvPr id="2" name="Title 1">
+            <a:extLst>
+              <a:ext uri="{FF2B5EF4-FFF2-40B4-BE49-F238E27FC236}">
+                <a16:creationId xmlns:a16="http://schemas.microsoft.com/office/drawing/2014/main" id="{723334D1-B7E0-45E3-AF80-4731396B9AAC}"/>
+              </a:ext>
+            </a:extLst>
+          </p:cNvPr>
+          <p:cNvSpPr>
+            <a:spLocks noGrp="1"/>
+          </p:cNvSpPr>
+          <p:nvPr>
+            <p:ph type="title"/>
+          </p:nvPr>
+        </p:nvSpPr>
+        <p:spPr/>
+        <p:txBody>
+          <a:bodyPr/>
+          <a:lstStyle/>
+          <a:p>
+            <a:r>
+              <a:rPr lang="en-US" dirty="0"/>
+              <a:t>Data Exploration Phase</a:t>
+            </a:r>
+          </a:p>
+        </p:txBody>
+      </p:sp>
+      <p:sp>
+        <p:nvSpPr>
+          <p:cNvPr id="3" name="Text Placeholder 2">
+            <a:extLst>
+              <a:ext uri="{FF2B5EF4-FFF2-40B4-BE49-F238E27FC236}">
+                <a16:creationId xmlns:a16="http://schemas.microsoft.com/office/drawing/2014/main" id="{FEDEB578-263A-4026-8966-6821C32338B9}"/>
+              </a:ext>
+            </a:extLst>
+          </p:cNvPr>
+          <p:cNvSpPr>
+            <a:spLocks noGrp="1"/>
+          </p:cNvSpPr>
+          <p:nvPr>
+            <p:ph type="body" idx="1"/>
+          </p:nvPr>
+        </p:nvSpPr>
+        <p:spPr>
+          <a:xfrm>
+            <a:off x="1103312" y="1161729"/>
+            <a:ext cx="4396338" cy="576262"/>
+          </a:xfrm>
+        </p:spPr>
+        <p:txBody>
+          <a:bodyPr/>
+          <a:lstStyle/>
+          <a:p>
+            <a:r>
+              <a:rPr lang="en-US" b="1" u="sng" dirty="0"/>
+              <a:t>Preprocessing Data</a:t>
+            </a:r>
+          </a:p>
+        </p:txBody>
+      </p:sp>
+      <p:sp>
+        <p:nvSpPr>
+          <p:cNvPr id="4" name="Content Placeholder 3">
+            <a:extLst>
+              <a:ext uri="{FF2B5EF4-FFF2-40B4-BE49-F238E27FC236}">
+                <a16:creationId xmlns:a16="http://schemas.microsoft.com/office/drawing/2014/main" id="{113B55E9-5F54-4095-9350-D567D2D57927}"/>
+              </a:ext>
+            </a:extLst>
+          </p:cNvPr>
+          <p:cNvSpPr>
+            <a:spLocks noGrp="1"/>
+          </p:cNvSpPr>
+          <p:nvPr>
+            <p:ph sz="half" idx="2"/>
+          </p:nvPr>
+        </p:nvSpPr>
+        <p:spPr>
+          <a:xfrm>
+            <a:off x="1103311" y="1853248"/>
+            <a:ext cx="4992689" cy="3741738"/>
+          </a:xfrm>
+        </p:spPr>
+        <p:txBody>
+          <a:bodyPr/>
+          <a:lstStyle/>
+          <a:p>
+            <a:r>
+              <a:rPr lang="en-US" dirty="0"/>
+              <a:t>Data Types evaluated</a:t>
+            </a:r>
+          </a:p>
+          <a:p>
+            <a:pPr lvl="1"/>
+            <a:r>
+              <a:rPr lang="en-US" dirty="0"/>
+              <a:t>train_data.info()</a:t>
+            </a:r>
+          </a:p>
+          <a:p>
+            <a:pPr lvl="1"/>
+            <a:r>
+              <a:rPr lang="en-US" dirty="0"/>
+              <a:t>test_data.info()</a:t>
+            </a:r>
+          </a:p>
+          <a:p>
+            <a:pPr lvl="1"/>
+            <a:r>
+              <a:rPr lang="en-US" dirty="0"/>
+              <a:t>train_data.describe()</a:t>
+            </a:r>
+          </a:p>
+          <a:p>
+            <a:pPr lvl="1"/>
+            <a:r>
+              <a:rPr lang="en-US" dirty="0"/>
+              <a:t>test_data.describe()</a:t>
+            </a:r>
+          </a:p>
+          <a:p>
+            <a:r>
+              <a:rPr lang="en-US" dirty="0"/>
+              <a:t>Null values removed</a:t>
+            </a:r>
+          </a:p>
+          <a:p>
+            <a:pPr lvl="1"/>
+            <a:r>
+              <a:rPr lang="en-US" dirty="0" err="1"/>
+              <a:t>train_data.isnull</a:t>
+            </a:r>
+            <a:r>
+              <a:rPr lang="en-US" dirty="0"/>
+              <a:t>().any()</a:t>
+            </a:r>
+          </a:p>
+          <a:p>
+            <a:pPr lvl="1"/>
+            <a:r>
+              <a:rPr lang="en-US" dirty="0" err="1"/>
+              <a:t>train_data.drop</a:t>
+            </a:r>
+            <a:r>
+              <a:rPr lang="en-US" dirty="0"/>
+              <a:t>(["Unnamed: 133"], axis=1, </a:t>
+            </a:r>
+            <a:r>
+              <a:rPr lang="en-US" dirty="0" err="1"/>
+              <a:t>inplace</a:t>
+            </a:r>
+            <a:r>
+              <a:rPr lang="en-US" dirty="0"/>
+              <a:t>=True)</a:t>
+            </a:r>
+          </a:p>
+          <a:p>
+            <a:endParaRPr lang="en-US" dirty="0"/>
+          </a:p>
+        </p:txBody>
+      </p:sp>
+      <p:pic>
+        <p:nvPicPr>
+          <p:cNvPr id="8" name="Content Placeholder 7">
+            <a:extLst>
+              <a:ext uri="{FF2B5EF4-FFF2-40B4-BE49-F238E27FC236}">
+                <a16:creationId xmlns:a16="http://schemas.microsoft.com/office/drawing/2014/main" id="{4FB8A4E8-B36B-445E-A0C9-9BCC9FA6EC03}"/>
+              </a:ext>
+            </a:extLst>
+          </p:cNvPr>
+          <p:cNvPicPr>
+            <a:picLocks noGrp="1" noChangeAspect="1"/>
+          </p:cNvPicPr>
+          <p:nvPr>
+            <p:ph sz="quarter" idx="4"/>
+          </p:nvPr>
+        </p:nvPicPr>
+        <p:blipFill>
+          <a:blip r:embed="rId3"/>
+          <a:stretch>
+            <a:fillRect/>
+          </a:stretch>
+        </p:blipFill>
+        <p:spPr>
+          <a:xfrm>
+            <a:off x="6759463" y="1853248"/>
+            <a:ext cx="4619682" cy="3239481"/>
+          </a:xfrm>
+        </p:spPr>
+      </p:pic>
+    </p:spTree>
+    <p:extLst>
+      <p:ext uri="{BB962C8B-B14F-4D97-AF65-F5344CB8AC3E}">
+        <p14:creationId xmlns:p14="http://schemas.microsoft.com/office/powerpoint/2010/main" val="3363762451"/>
+      </p:ext>
+    </p:extLst>
+  </p:cSld>
+  <p:clrMapOvr>
+    <a:masterClrMapping/>
+  </p:clrMapOvr>
+</p:sld>
+</file>
+
+<file path=ppt/slides/slide6.xml><?xml version="1.0" encoding="utf-8"?>
+<p:sld xmlns:a="http://schemas.openxmlformats.org/drawingml/2006/main" xmlns:r="http://schemas.openxmlformats.org/officeDocument/2006/relationships" xmlns:p="http://schemas.openxmlformats.org/presentationml/2006/main">
+  <p:cSld>
+    <p:spTree>
+      <p:nvGrpSpPr>
+        <p:cNvPr id="1" name=""/>
+        <p:cNvGrpSpPr/>
+        <p:nvPr/>
+      </p:nvGrpSpPr>
+      <p:grpSpPr>
+        <a:xfrm>
+          <a:off x="0" y="0"/>
+          <a:ext cx="0" cy="0"/>
+          <a:chOff x="0" y="0"/>
+          <a:chExt cx="0" cy="0"/>
+        </a:xfrm>
+      </p:grpSpPr>
+      <p:sp>
+        <p:nvSpPr>
+          <p:cNvPr id="2" name="Title 1">
+            <a:extLst>
+              <a:ext uri="{FF2B5EF4-FFF2-40B4-BE49-F238E27FC236}">
+                <a16:creationId xmlns:a16="http://schemas.microsoft.com/office/drawing/2014/main" id="{2E48FF0A-0204-4E26-9EF8-D41CBE569E98}"/>
+              </a:ext>
+            </a:extLst>
+          </p:cNvPr>
+          <p:cNvSpPr>
+            <a:spLocks noGrp="1"/>
+          </p:cNvSpPr>
+          <p:nvPr>
+            <p:ph type="title"/>
+          </p:nvPr>
+        </p:nvSpPr>
+        <p:spPr/>
+        <p:txBody>
+          <a:bodyPr/>
+          <a:lstStyle/>
+          <a:p>
+            <a:r>
+              <a:rPr lang="en-US" dirty="0"/>
+              <a:t>Training and Testing Data</a:t>
+            </a:r>
+          </a:p>
+        </p:txBody>
+      </p:sp>
+      <p:sp>
+        <p:nvSpPr>
+          <p:cNvPr id="3" name="Content Placeholder 2">
+            <a:extLst>
+              <a:ext uri="{FF2B5EF4-FFF2-40B4-BE49-F238E27FC236}">
+                <a16:creationId xmlns:a16="http://schemas.microsoft.com/office/drawing/2014/main" id="{262B6239-AE27-4B7C-ADDC-8920468BBDFC}"/>
+              </a:ext>
+            </a:extLst>
+          </p:cNvPr>
+          <p:cNvSpPr>
+            <a:spLocks noGrp="1"/>
+          </p:cNvSpPr>
+          <p:nvPr>
+            <p:ph idx="1"/>
+          </p:nvPr>
+        </p:nvSpPr>
+        <p:spPr>
+          <a:xfrm>
+            <a:off x="1103313" y="2052918"/>
+            <a:ext cx="4598240" cy="4195481"/>
+          </a:xfrm>
+        </p:spPr>
+        <p:txBody>
+          <a:bodyPr/>
+          <a:lstStyle/>
+          <a:p>
+            <a:r>
+              <a:rPr lang="en-US" dirty="0"/>
+              <a:t>Remove target from Features Data</a:t>
+            </a:r>
+          </a:p>
+        </p:txBody>
+      </p:sp>
+      <p:pic>
+        <p:nvPicPr>
+          <p:cNvPr id="5" name="Picture 4">
+            <a:extLst>
+              <a:ext uri="{FF2B5EF4-FFF2-40B4-BE49-F238E27FC236}">
+                <a16:creationId xmlns:a16="http://schemas.microsoft.com/office/drawing/2014/main" id="{2689E90B-E9F4-46F8-88A8-DFAE10944A9A}"/>
+              </a:ext>
+            </a:extLst>
+          </p:cNvPr>
+          <p:cNvPicPr>
+            <a:picLocks noChangeAspect="1"/>
+          </p:cNvPicPr>
+          <p:nvPr/>
+        </p:nvPicPr>
+        <p:blipFill>
+          <a:blip r:embed="rId3"/>
+          <a:stretch>
+            <a:fillRect/>
+          </a:stretch>
+        </p:blipFill>
+        <p:spPr>
+          <a:xfrm>
+            <a:off x="1445463" y="2919412"/>
+            <a:ext cx="4171950" cy="1019175"/>
+          </a:xfrm>
+          <a:prstGeom prst="rect">
+            <a:avLst/>
+          </a:prstGeom>
+        </p:spPr>
+      </p:pic>
+      <p:sp>
+        <p:nvSpPr>
+          <p:cNvPr id="6" name="Content Placeholder 2">
+            <a:extLst>
+              <a:ext uri="{FF2B5EF4-FFF2-40B4-BE49-F238E27FC236}">
+                <a16:creationId xmlns:a16="http://schemas.microsoft.com/office/drawing/2014/main" id="{63DA0C8B-725B-4F78-8907-98C458D0FFAD}"/>
+              </a:ext>
+            </a:extLst>
+          </p:cNvPr>
+          <p:cNvSpPr txBox="1">
+            <a:spLocks/>
+          </p:cNvSpPr>
+          <p:nvPr/>
+        </p:nvSpPr>
+        <p:spPr>
+          <a:xfrm>
+            <a:off x="6224920" y="2052917"/>
+            <a:ext cx="5361066" cy="4195481"/>
+          </a:xfrm>
+          <a:prstGeom prst="rect">
+            <a:avLst/>
+          </a:prstGeom>
+        </p:spPr>
+        <p:txBody>
+          <a:bodyPr vert="horz" lIns="91440" tIns="45720" rIns="91440" bIns="45720" rtlCol="0">
+            <a:normAutofit/>
+          </a:bodyPr>
+          <a:lstStyle>
+            <a:lvl1pPr marL="342900" indent="-342900" algn="l" defTabSz="457200" rtl="0" eaLnBrk="1" latinLnBrk="0" hangingPunct="1">
+              <a:spcBef>
+                <a:spcPts val="1000"/>
+              </a:spcBef>
+              <a:spcAft>
+                <a:spcPts val="0"/>
+              </a:spcAft>
+              <a:buClr>
+                <a:schemeClr val="accent1"/>
+              </a:buClr>
+              <a:buSzPct val="80000"/>
+              <a:buFont typeface="Wingdings 3" charset="2"/>
+              <a:buChar char=""/>
+              <a:defRPr sz="2000" b="0" i="0" kern="1200">
+                <a:solidFill>
+                  <a:schemeClr val="tx1"/>
+                </a:solidFill>
+                <a:latin typeface="+mj-lt"/>
+                <a:ea typeface="+mj-ea"/>
+                <a:cs typeface="+mj-cs"/>
+              </a:defRPr>
+            </a:lvl1pPr>
+            <a:lvl2pPr marL="742950" indent="-285750" algn="l" defTabSz="457200" rtl="0" eaLnBrk="1" latinLnBrk="0" hangingPunct="1">
+              <a:spcBef>
+                <a:spcPts val="1000"/>
+              </a:spcBef>
+              <a:spcAft>
+                <a:spcPts val="0"/>
+              </a:spcAft>
+              <a:buClr>
+                <a:schemeClr val="accent1"/>
+              </a:buClr>
+              <a:buSzPct val="80000"/>
+              <a:buFont typeface="Wingdings 3" charset="2"/>
+              <a:buChar char=""/>
+              <a:defRPr sz="1800" b="0" i="0" kern="1200">
+                <a:solidFill>
+                  <a:schemeClr val="tx1"/>
+                </a:solidFill>
+                <a:latin typeface="+mj-lt"/>
+                <a:ea typeface="+mj-ea"/>
+                <a:cs typeface="+mj-cs"/>
+              </a:defRPr>
+            </a:lvl2pPr>
+            <a:lvl3pPr marL="1143000" indent="-228600" algn="l" defTabSz="457200" rtl="0" eaLnBrk="1" latinLnBrk="0" hangingPunct="1">
+              <a:spcBef>
+                <a:spcPts val="1000"/>
+              </a:spcBef>
+              <a:spcAft>
+                <a:spcPts val="0"/>
+              </a:spcAft>
+              <a:buClr>
+                <a:schemeClr val="accent1"/>
+              </a:buClr>
+              <a:buSzPct val="80000"/>
+              <a:buFont typeface="Wingdings 3" charset="2"/>
+              <a:buChar char=""/>
+              <a:defRPr sz="1600" b="0" i="0" kern="1200">
+                <a:solidFill>
+                  <a:schemeClr val="tx1"/>
+                </a:solidFill>
+                <a:latin typeface="+mj-lt"/>
+                <a:ea typeface="+mj-ea"/>
+                <a:cs typeface="+mj-cs"/>
+              </a:defRPr>
+            </a:lvl3pPr>
+            <a:lvl4pPr marL="1600200" indent="-228600" algn="l" defTabSz="457200" rtl="0" eaLnBrk="1" latinLnBrk="0" hangingPunct="1">
+              <a:spcBef>
+                <a:spcPts val="1000"/>
+              </a:spcBef>
+              <a:spcAft>
+                <a:spcPts val="0"/>
+              </a:spcAft>
+              <a:buClr>
+                <a:schemeClr val="accent1"/>
+              </a:buClr>
+              <a:buSzPct val="80000"/>
+              <a:buFont typeface="Wingdings 3" charset="2"/>
+              <a:buChar char=""/>
+              <a:defRPr sz="1400" b="0" i="0" kern="1200">
+                <a:solidFill>
+                  <a:schemeClr val="tx1"/>
+                </a:solidFill>
+                <a:latin typeface="+mj-lt"/>
+                <a:ea typeface="+mj-ea"/>
+                <a:cs typeface="+mj-cs"/>
+              </a:defRPr>
+            </a:lvl4pPr>
+            <a:lvl5pPr marL="2057400" indent="-228600" algn="l" defTabSz="457200" rtl="0" eaLnBrk="1" latinLnBrk="0" hangingPunct="1">
+              <a:spcBef>
+                <a:spcPts val="1000"/>
+              </a:spcBef>
+              <a:spcAft>
+                <a:spcPts val="0"/>
+              </a:spcAft>
+              <a:buClr>
+                <a:schemeClr val="accent1"/>
+              </a:buClr>
+              <a:buSzPct val="80000"/>
+              <a:buFont typeface="Wingdings 3" charset="2"/>
+              <a:buChar char=""/>
+              <a:defRPr sz="1400" b="0" i="0" kern="1200">
+                <a:solidFill>
+                  <a:schemeClr val="tx1"/>
+                </a:solidFill>
+                <a:latin typeface="+mj-lt"/>
+                <a:ea typeface="+mj-ea"/>
+                <a:cs typeface="+mj-cs"/>
+              </a:defRPr>
+            </a:lvl5pPr>
+            <a:lvl6pPr marL="2514600" indent="-228600" algn="l" defTabSz="457200" rtl="0" eaLnBrk="1" latinLnBrk="0" hangingPunct="1">
+              <a:spcBef>
+                <a:spcPts val="1000"/>
+              </a:spcBef>
+              <a:spcAft>
+                <a:spcPts val="0"/>
+              </a:spcAft>
+              <a:buClr>
+                <a:schemeClr val="accent1"/>
+              </a:buClr>
+              <a:buSzPct val="80000"/>
+              <a:buFont typeface="Wingdings 3" charset="2"/>
+              <a:buChar char=""/>
+              <a:defRPr sz="1400" b="0" i="0" kern="1200">
+                <a:solidFill>
+                  <a:schemeClr val="tx1"/>
+                </a:solidFill>
+                <a:latin typeface="+mj-lt"/>
+                <a:ea typeface="+mj-ea"/>
+                <a:cs typeface="+mj-cs"/>
+              </a:defRPr>
+            </a:lvl6pPr>
+            <a:lvl7pPr marL="2971800" indent="-228600" algn="l" defTabSz="457200" rtl="0" eaLnBrk="1" latinLnBrk="0" hangingPunct="1">
+              <a:spcBef>
+                <a:spcPts val="1000"/>
+              </a:spcBef>
+              <a:spcAft>
+                <a:spcPts val="0"/>
+              </a:spcAft>
+              <a:buClr>
+                <a:schemeClr val="accent1"/>
+              </a:buClr>
+              <a:buSzPct val="80000"/>
+              <a:buFont typeface="Wingdings 3" charset="2"/>
+              <a:buChar char=""/>
+              <a:defRPr sz="1400" b="0" i="0" kern="1200">
+                <a:solidFill>
+                  <a:schemeClr val="tx1"/>
+                </a:solidFill>
+                <a:latin typeface="+mj-lt"/>
+                <a:ea typeface="+mj-ea"/>
+                <a:cs typeface="+mj-cs"/>
+              </a:defRPr>
+            </a:lvl7pPr>
+            <a:lvl8pPr marL="3429000" indent="-228600" algn="l" defTabSz="457200" rtl="0" eaLnBrk="1" latinLnBrk="0" hangingPunct="1">
+              <a:spcBef>
+                <a:spcPts val="1000"/>
+              </a:spcBef>
+              <a:spcAft>
+                <a:spcPts val="0"/>
+              </a:spcAft>
+              <a:buClr>
+                <a:schemeClr val="accent1"/>
+              </a:buClr>
+              <a:buSzPct val="80000"/>
+              <a:buFont typeface="Wingdings 3" charset="2"/>
+              <a:buChar char=""/>
+              <a:defRPr sz="1400" b="0" i="0" kern="1200">
+                <a:solidFill>
+                  <a:schemeClr val="tx1"/>
+                </a:solidFill>
+                <a:latin typeface="+mj-lt"/>
+                <a:ea typeface="+mj-ea"/>
+                <a:cs typeface="+mj-cs"/>
+              </a:defRPr>
+            </a:lvl8pPr>
+            <a:lvl9pPr marL="3886200" indent="-228600" algn="l" defTabSz="457200" rtl="0" eaLnBrk="1" latinLnBrk="0" hangingPunct="1">
+              <a:spcBef>
+                <a:spcPts val="1000"/>
+              </a:spcBef>
+              <a:spcAft>
+                <a:spcPts val="0"/>
+              </a:spcAft>
+              <a:buClr>
+                <a:schemeClr val="accent1"/>
+              </a:buClr>
+              <a:buSzPct val="80000"/>
+              <a:buFont typeface="Wingdings 3" charset="2"/>
+              <a:buChar char=""/>
+              <a:defRPr sz="1400" b="0" i="0" kern="1200">
+                <a:solidFill>
+                  <a:schemeClr val="tx1"/>
+                </a:solidFill>
+                <a:latin typeface="+mj-lt"/>
+                <a:ea typeface="+mj-ea"/>
+                <a:cs typeface="+mj-cs"/>
+              </a:defRPr>
+            </a:lvl9pPr>
+          </a:lstStyle>
+          <a:p>
+            <a:r>
+              <a:rPr lang="en-US" dirty="0"/>
+              <a:t>Create Target (Dependent Variable)</a:t>
             </a:r>
           </a:p>
           <a:p>
@@ -8933,7 +10212,7 @@
         </p:blipFill>
         <p:spPr>
           <a:xfrm>
-            <a:off x="6589732" y="2553148"/>
+            <a:off x="6389354" y="2919412"/>
             <a:ext cx="5196632" cy="3481891"/>
           </a:xfrm>
           <a:prstGeom prst="rect">

</xml_diff>

<commit_message>
Segment 2 - updated with charts
</commit_message>
<xml_diff>
--- a/Team_Code Blue Final Project.pptx
+++ b/Team_Code Blue Final Project.pptx
@@ -5,13 +5,29 @@
     <p:sldMasterId id="2147483648" r:id="rId1"/>
   </p:sldMasterIdLst>
   <p:notesMasterIdLst>
-    <p:notesMasterId r:id="rId6"/>
+    <p:notesMasterId r:id="rId22"/>
   </p:notesMasterIdLst>
   <p:sldIdLst>
     <p:sldId id="256" r:id="rId2"/>
     <p:sldId id="258" r:id="rId3"/>
     <p:sldId id="259" r:id="rId4"/>
-    <p:sldId id="260" r:id="rId5"/>
+    <p:sldId id="266" r:id="rId5"/>
+    <p:sldId id="262" r:id="rId6"/>
+    <p:sldId id="263" r:id="rId7"/>
+    <p:sldId id="269" r:id="rId8"/>
+    <p:sldId id="265" r:id="rId9"/>
+    <p:sldId id="267" r:id="rId10"/>
+    <p:sldId id="268" r:id="rId11"/>
+    <p:sldId id="260" r:id="rId12"/>
+    <p:sldId id="270" r:id="rId13"/>
+    <p:sldId id="272" r:id="rId14"/>
+    <p:sldId id="271" r:id="rId15"/>
+    <p:sldId id="273" r:id="rId16"/>
+    <p:sldId id="274" r:id="rId17"/>
+    <p:sldId id="264" r:id="rId18"/>
+    <p:sldId id="275" r:id="rId19"/>
+    <p:sldId id="276" r:id="rId20"/>
+    <p:sldId id="277" r:id="rId21"/>
   </p:sldIdLst>
   <p:sldSz cx="12192000" cy="6858000"/>
   <p:notesSz cx="6858000" cy="9144000"/>
@@ -167,7 +183,7 @@
             </a:lvl1pPr>
           </a:lstStyle>
           <a:p>
-            <a:endParaRPr lang="en-US"/>
+            <a:endParaRPr lang="en-US" dirty="0"/>
           </a:p>
         </p:txBody>
       </p:sp>
@@ -200,9 +216,9 @@
           <a:p>
             <a:fld id="{0363ABCA-FF1C-45B5-BA0C-BA609BC88931}" type="datetimeFigureOut">
               <a:rPr lang="en-US" smtClean="0"/>
-              <a:t>11/4/2021</a:t>
+              <a:t>11/7/2021</a:t>
             </a:fld>
-            <a:endParaRPr lang="en-US"/>
+            <a:endParaRPr lang="en-US" dirty="0"/>
           </a:p>
         </p:txBody>
       </p:sp>
@@ -235,7 +251,7 @@
           <a:bodyPr vert="horz" lIns="91440" tIns="45720" rIns="91440" bIns="45720" rtlCol="0" anchor="ctr"/>
           <a:lstStyle/>
           <a:p>
-            <a:endParaRPr lang="en-US"/>
+            <a:endParaRPr lang="en-US" dirty="0"/>
           </a:p>
         </p:txBody>
       </p:sp>
@@ -325,7 +341,7 @@
             </a:lvl1pPr>
           </a:lstStyle>
           <a:p>
-            <a:endParaRPr lang="en-US"/>
+            <a:endParaRPr lang="en-US" dirty="0"/>
           </a:p>
         </p:txBody>
       </p:sp>
@@ -360,7 +376,7 @@
               <a:rPr lang="en-US" smtClean="0"/>
               <a:t>‹#›</a:t>
             </a:fld>
-            <a:endParaRPr lang="en-US"/>
+            <a:endParaRPr lang="en-US" dirty="0"/>
           </a:p>
         </p:txBody>
       </p:sp>
@@ -534,7 +550,7 @@
               <a:rPr lang="en-US" smtClean="0"/>
               <a:t>1</a:t>
             </a:fld>
-            <a:endParaRPr lang="en-US"/>
+            <a:endParaRPr lang="en-US" dirty="0"/>
           </a:p>
         </p:txBody>
       </p:sp>
@@ -542,6 +558,1703 @@
     <p:extLst>
       <p:ext uri="{BB962C8B-B14F-4D97-AF65-F5344CB8AC3E}">
         <p14:creationId xmlns:p14="http://schemas.microsoft.com/office/powerpoint/2010/main" val="441079491"/>
+      </p:ext>
+    </p:extLst>
+  </p:cSld>
+  <p:clrMapOvr>
+    <a:masterClrMapping/>
+  </p:clrMapOvr>
+</p:notes>
+</file>
+
+<file path=ppt/notesSlides/notesSlide10.xml><?xml version="1.0" encoding="utf-8"?>
+<p:notes xmlns:a="http://schemas.openxmlformats.org/drawingml/2006/main" xmlns:r="http://schemas.openxmlformats.org/officeDocument/2006/relationships" xmlns:p="http://schemas.openxmlformats.org/presentationml/2006/main">
+  <p:cSld>
+    <p:spTree>
+      <p:nvGrpSpPr>
+        <p:cNvPr id="1" name=""/>
+        <p:cNvGrpSpPr/>
+        <p:nvPr/>
+      </p:nvGrpSpPr>
+      <p:grpSpPr>
+        <a:xfrm>
+          <a:off x="0" y="0"/>
+          <a:ext cx="0" cy="0"/>
+          <a:chOff x="0" y="0"/>
+          <a:chExt cx="0" cy="0"/>
+        </a:xfrm>
+      </p:grpSpPr>
+      <p:sp>
+        <p:nvSpPr>
+          <p:cNvPr id="2" name="Slide Image Placeholder 1"/>
+          <p:cNvSpPr>
+            <a:spLocks noGrp="1" noRot="1" noChangeAspect="1"/>
+          </p:cNvSpPr>
+          <p:nvPr>
+            <p:ph type="sldImg"/>
+          </p:nvPr>
+        </p:nvSpPr>
+        <p:spPr/>
+      </p:sp>
+      <p:sp>
+        <p:nvSpPr>
+          <p:cNvPr id="3" name="Notes Placeholder 2"/>
+          <p:cNvSpPr>
+            <a:spLocks noGrp="1"/>
+          </p:cNvSpPr>
+          <p:nvPr>
+            <p:ph type="body" idx="1"/>
+          </p:nvPr>
+        </p:nvSpPr>
+        <p:spPr/>
+        <p:txBody>
+          <a:bodyPr/>
+          <a:lstStyle/>
+          <a:p>
+            <a:r>
+              <a:rPr lang="en-US" dirty="0"/>
+              <a:t>Our binary dataset is optimal for a logistical regression model. </a:t>
+            </a:r>
+          </a:p>
+          <a:p>
+            <a:r>
+              <a:rPr lang="en-US" dirty="0"/>
+              <a:t>A machine learning logistical regression algorithm can be used to predict the outcome of dependent variables based on training data.</a:t>
+            </a:r>
+          </a:p>
+          <a:p>
+            <a:r>
+              <a:rPr lang="en-US" dirty="0"/>
+              <a:t>It uses a combination of input variables to predict the probability of the input data belonging to categories.</a:t>
+            </a:r>
+          </a:p>
+          <a:p>
+            <a:endParaRPr lang="en-US" dirty="0"/>
+          </a:p>
+        </p:txBody>
+      </p:sp>
+      <p:sp>
+        <p:nvSpPr>
+          <p:cNvPr id="4" name="Slide Number Placeholder 3"/>
+          <p:cNvSpPr>
+            <a:spLocks noGrp="1"/>
+          </p:cNvSpPr>
+          <p:nvPr>
+            <p:ph type="sldNum" sz="quarter" idx="5"/>
+          </p:nvPr>
+        </p:nvSpPr>
+        <p:spPr/>
+        <p:txBody>
+          <a:bodyPr/>
+          <a:lstStyle/>
+          <a:p>
+            <a:fld id="{0837621E-2D94-4874-8D2F-F90746483814}" type="slidenum">
+              <a:rPr lang="en-US" smtClean="0"/>
+              <a:t>12</a:t>
+            </a:fld>
+            <a:endParaRPr lang="en-US" dirty="0"/>
+          </a:p>
+        </p:txBody>
+      </p:sp>
+    </p:spTree>
+    <p:extLst>
+      <p:ext uri="{BB962C8B-B14F-4D97-AF65-F5344CB8AC3E}">
+        <p14:creationId xmlns:p14="http://schemas.microsoft.com/office/powerpoint/2010/main" val="413936703"/>
+      </p:ext>
+    </p:extLst>
+  </p:cSld>
+  <p:clrMapOvr>
+    <a:masterClrMapping/>
+  </p:clrMapOvr>
+</p:notes>
+</file>
+
+<file path=ppt/notesSlides/notesSlide11.xml><?xml version="1.0" encoding="utf-8"?>
+<p:notes xmlns:a="http://schemas.openxmlformats.org/drawingml/2006/main" xmlns:r="http://schemas.openxmlformats.org/officeDocument/2006/relationships" xmlns:p="http://schemas.openxmlformats.org/presentationml/2006/main">
+  <p:cSld>
+    <p:spTree>
+      <p:nvGrpSpPr>
+        <p:cNvPr id="1" name=""/>
+        <p:cNvGrpSpPr/>
+        <p:nvPr/>
+      </p:nvGrpSpPr>
+      <p:grpSpPr>
+        <a:xfrm>
+          <a:off x="0" y="0"/>
+          <a:ext cx="0" cy="0"/>
+          <a:chOff x="0" y="0"/>
+          <a:chExt cx="0" cy="0"/>
+        </a:xfrm>
+      </p:grpSpPr>
+      <p:sp>
+        <p:nvSpPr>
+          <p:cNvPr id="2" name="Slide Image Placeholder 1"/>
+          <p:cNvSpPr>
+            <a:spLocks noGrp="1" noRot="1" noChangeAspect="1"/>
+          </p:cNvSpPr>
+          <p:nvPr>
+            <p:ph type="sldImg"/>
+          </p:nvPr>
+        </p:nvSpPr>
+        <p:spPr/>
+      </p:sp>
+      <p:sp>
+        <p:nvSpPr>
+          <p:cNvPr id="3" name="Notes Placeholder 2"/>
+          <p:cNvSpPr>
+            <a:spLocks noGrp="1"/>
+          </p:cNvSpPr>
+          <p:nvPr>
+            <p:ph type="body" idx="1"/>
+          </p:nvPr>
+        </p:nvSpPr>
+        <p:spPr/>
+        <p:txBody>
+          <a:bodyPr/>
+          <a:lstStyle/>
+          <a:p>
+            <a:r>
+              <a:rPr lang="en-US" dirty="0"/>
+              <a:t>Decision tress are among the most powerful supervised learning algorithms</a:t>
+            </a:r>
+          </a:p>
+        </p:txBody>
+      </p:sp>
+      <p:sp>
+        <p:nvSpPr>
+          <p:cNvPr id="4" name="Slide Number Placeholder 3"/>
+          <p:cNvSpPr>
+            <a:spLocks noGrp="1"/>
+          </p:cNvSpPr>
+          <p:nvPr>
+            <p:ph type="sldNum" sz="quarter" idx="5"/>
+          </p:nvPr>
+        </p:nvSpPr>
+        <p:spPr/>
+        <p:txBody>
+          <a:bodyPr/>
+          <a:lstStyle/>
+          <a:p>
+            <a:fld id="{0837621E-2D94-4874-8D2F-F90746483814}" type="slidenum">
+              <a:rPr lang="en-US" smtClean="0"/>
+              <a:t>13</a:t>
+            </a:fld>
+            <a:endParaRPr lang="en-US" dirty="0"/>
+          </a:p>
+        </p:txBody>
+      </p:sp>
+    </p:spTree>
+    <p:extLst>
+      <p:ext uri="{BB962C8B-B14F-4D97-AF65-F5344CB8AC3E}">
+        <p14:creationId xmlns:p14="http://schemas.microsoft.com/office/powerpoint/2010/main" val="2101151970"/>
+      </p:ext>
+    </p:extLst>
+  </p:cSld>
+  <p:clrMapOvr>
+    <a:masterClrMapping/>
+  </p:clrMapOvr>
+</p:notes>
+</file>
+
+<file path=ppt/notesSlides/notesSlide12.xml><?xml version="1.0" encoding="utf-8"?>
+<p:notes xmlns:a="http://schemas.openxmlformats.org/drawingml/2006/main" xmlns:r="http://schemas.openxmlformats.org/officeDocument/2006/relationships" xmlns:p="http://schemas.openxmlformats.org/presentationml/2006/main">
+  <p:cSld>
+    <p:spTree>
+      <p:nvGrpSpPr>
+        <p:cNvPr id="1" name=""/>
+        <p:cNvGrpSpPr/>
+        <p:nvPr/>
+      </p:nvGrpSpPr>
+      <p:grpSpPr>
+        <a:xfrm>
+          <a:off x="0" y="0"/>
+          <a:ext cx="0" cy="0"/>
+          <a:chOff x="0" y="0"/>
+          <a:chExt cx="0" cy="0"/>
+        </a:xfrm>
+      </p:grpSpPr>
+      <p:sp>
+        <p:nvSpPr>
+          <p:cNvPr id="2" name="Slide Image Placeholder 1"/>
+          <p:cNvSpPr>
+            <a:spLocks noGrp="1" noRot="1" noChangeAspect="1"/>
+          </p:cNvSpPr>
+          <p:nvPr>
+            <p:ph type="sldImg"/>
+          </p:nvPr>
+        </p:nvSpPr>
+        <p:spPr/>
+      </p:sp>
+      <p:sp>
+        <p:nvSpPr>
+          <p:cNvPr id="3" name="Notes Placeholder 2"/>
+          <p:cNvSpPr>
+            <a:spLocks noGrp="1"/>
+          </p:cNvSpPr>
+          <p:nvPr>
+            <p:ph type="body" idx="1"/>
+          </p:nvPr>
+        </p:nvSpPr>
+        <p:spPr/>
+        <p:txBody>
+          <a:bodyPr/>
+          <a:lstStyle/>
+          <a:p>
+            <a:r>
+              <a:rPr lang="en-US" dirty="0"/>
+              <a:t>The random forest algorithm creates decision tress on data samples and then gets the prediction from each of them and finally selects the best solution by means of voting</a:t>
+            </a:r>
+          </a:p>
+        </p:txBody>
+      </p:sp>
+      <p:sp>
+        <p:nvSpPr>
+          <p:cNvPr id="4" name="Slide Number Placeholder 3"/>
+          <p:cNvSpPr>
+            <a:spLocks noGrp="1"/>
+          </p:cNvSpPr>
+          <p:nvPr>
+            <p:ph type="sldNum" sz="quarter" idx="5"/>
+          </p:nvPr>
+        </p:nvSpPr>
+        <p:spPr/>
+        <p:txBody>
+          <a:bodyPr/>
+          <a:lstStyle/>
+          <a:p>
+            <a:fld id="{0837621E-2D94-4874-8D2F-F90746483814}" type="slidenum">
+              <a:rPr lang="en-US" smtClean="0"/>
+              <a:t>14</a:t>
+            </a:fld>
+            <a:endParaRPr lang="en-US" dirty="0"/>
+          </a:p>
+        </p:txBody>
+      </p:sp>
+    </p:spTree>
+    <p:extLst>
+      <p:ext uri="{BB962C8B-B14F-4D97-AF65-F5344CB8AC3E}">
+        <p14:creationId xmlns:p14="http://schemas.microsoft.com/office/powerpoint/2010/main" val="1005491927"/>
+      </p:ext>
+    </p:extLst>
+  </p:cSld>
+  <p:clrMapOvr>
+    <a:masterClrMapping/>
+  </p:clrMapOvr>
+</p:notes>
+</file>
+
+<file path=ppt/notesSlides/notesSlide13.xml><?xml version="1.0" encoding="utf-8"?>
+<p:notes xmlns:a="http://schemas.openxmlformats.org/drawingml/2006/main" xmlns:r="http://schemas.openxmlformats.org/officeDocument/2006/relationships" xmlns:p="http://schemas.openxmlformats.org/presentationml/2006/main">
+  <p:cSld>
+    <p:spTree>
+      <p:nvGrpSpPr>
+        <p:cNvPr id="1" name=""/>
+        <p:cNvGrpSpPr/>
+        <p:nvPr/>
+      </p:nvGrpSpPr>
+      <p:grpSpPr>
+        <a:xfrm>
+          <a:off x="0" y="0"/>
+          <a:ext cx="0" cy="0"/>
+          <a:chOff x="0" y="0"/>
+          <a:chExt cx="0" cy="0"/>
+        </a:xfrm>
+      </p:grpSpPr>
+      <p:sp>
+        <p:nvSpPr>
+          <p:cNvPr id="2" name="Slide Image Placeholder 1"/>
+          <p:cNvSpPr>
+            <a:spLocks noGrp="1" noRot="1" noChangeAspect="1"/>
+          </p:cNvSpPr>
+          <p:nvPr>
+            <p:ph type="sldImg"/>
+          </p:nvPr>
+        </p:nvSpPr>
+        <p:spPr/>
+      </p:sp>
+      <p:sp>
+        <p:nvSpPr>
+          <p:cNvPr id="3" name="Notes Placeholder 2"/>
+          <p:cNvSpPr>
+            <a:spLocks noGrp="1"/>
+          </p:cNvSpPr>
+          <p:nvPr>
+            <p:ph type="body" idx="1"/>
+          </p:nvPr>
+        </p:nvSpPr>
+        <p:spPr/>
+        <p:txBody>
+          <a:bodyPr/>
+          <a:lstStyle/>
+          <a:p>
+            <a:endParaRPr lang="en-US" dirty="0"/>
+          </a:p>
+        </p:txBody>
+      </p:sp>
+      <p:sp>
+        <p:nvSpPr>
+          <p:cNvPr id="4" name="Slide Number Placeholder 3"/>
+          <p:cNvSpPr>
+            <a:spLocks noGrp="1"/>
+          </p:cNvSpPr>
+          <p:nvPr>
+            <p:ph type="sldNum" sz="quarter" idx="5"/>
+          </p:nvPr>
+        </p:nvSpPr>
+        <p:spPr/>
+        <p:txBody>
+          <a:bodyPr/>
+          <a:lstStyle/>
+          <a:p>
+            <a:fld id="{0837621E-2D94-4874-8D2F-F90746483814}" type="slidenum">
+              <a:rPr lang="en-US" smtClean="0"/>
+              <a:t>15</a:t>
+            </a:fld>
+            <a:endParaRPr lang="en-US" dirty="0"/>
+          </a:p>
+        </p:txBody>
+      </p:sp>
+    </p:spTree>
+    <p:extLst>
+      <p:ext uri="{BB962C8B-B14F-4D97-AF65-F5344CB8AC3E}">
+        <p14:creationId xmlns:p14="http://schemas.microsoft.com/office/powerpoint/2010/main" val="4272232645"/>
+      </p:ext>
+    </p:extLst>
+  </p:cSld>
+  <p:clrMapOvr>
+    <a:masterClrMapping/>
+  </p:clrMapOvr>
+</p:notes>
+</file>
+
+<file path=ppt/notesSlides/notesSlide14.xml><?xml version="1.0" encoding="utf-8"?>
+<p:notes xmlns:a="http://schemas.openxmlformats.org/drawingml/2006/main" xmlns:r="http://schemas.openxmlformats.org/officeDocument/2006/relationships" xmlns:p="http://schemas.openxmlformats.org/presentationml/2006/main">
+  <p:cSld>
+    <p:spTree>
+      <p:nvGrpSpPr>
+        <p:cNvPr id="1" name=""/>
+        <p:cNvGrpSpPr/>
+        <p:nvPr/>
+      </p:nvGrpSpPr>
+      <p:grpSpPr>
+        <a:xfrm>
+          <a:off x="0" y="0"/>
+          <a:ext cx="0" cy="0"/>
+          <a:chOff x="0" y="0"/>
+          <a:chExt cx="0" cy="0"/>
+        </a:xfrm>
+      </p:grpSpPr>
+      <p:sp>
+        <p:nvSpPr>
+          <p:cNvPr id="2" name="Slide Image Placeholder 1"/>
+          <p:cNvSpPr>
+            <a:spLocks noGrp="1" noRot="1" noChangeAspect="1"/>
+          </p:cNvSpPr>
+          <p:nvPr>
+            <p:ph type="sldImg"/>
+          </p:nvPr>
+        </p:nvSpPr>
+        <p:spPr/>
+      </p:sp>
+      <p:sp>
+        <p:nvSpPr>
+          <p:cNvPr id="3" name="Notes Placeholder 2"/>
+          <p:cNvSpPr>
+            <a:spLocks noGrp="1"/>
+          </p:cNvSpPr>
+          <p:nvPr>
+            <p:ph type="body" idx="1"/>
+          </p:nvPr>
+        </p:nvSpPr>
+        <p:spPr/>
+        <p:txBody>
+          <a:bodyPr/>
+          <a:lstStyle/>
+          <a:p>
+            <a:r>
+              <a:rPr lang="en-US" dirty="0"/>
+              <a:t>We have a fully functioning and interactive dashboard in Tableau. Our analysis will be displayed with a storyboard that provides clear data visualizations. Follow the link to see the charts and graphs that show insightful relationships in our data and images of our analysis.</a:t>
+            </a:r>
+          </a:p>
+        </p:txBody>
+      </p:sp>
+      <p:sp>
+        <p:nvSpPr>
+          <p:cNvPr id="4" name="Slide Number Placeholder 3"/>
+          <p:cNvSpPr>
+            <a:spLocks noGrp="1"/>
+          </p:cNvSpPr>
+          <p:nvPr>
+            <p:ph type="sldNum" sz="quarter" idx="5"/>
+          </p:nvPr>
+        </p:nvSpPr>
+        <p:spPr/>
+        <p:txBody>
+          <a:bodyPr/>
+          <a:lstStyle/>
+          <a:p>
+            <a:fld id="{0837621E-2D94-4874-8D2F-F90746483814}" type="slidenum">
+              <a:rPr lang="en-US" smtClean="0"/>
+              <a:t>17</a:t>
+            </a:fld>
+            <a:endParaRPr lang="en-US" dirty="0"/>
+          </a:p>
+        </p:txBody>
+      </p:sp>
+    </p:spTree>
+    <p:extLst>
+      <p:ext uri="{BB962C8B-B14F-4D97-AF65-F5344CB8AC3E}">
+        <p14:creationId xmlns:p14="http://schemas.microsoft.com/office/powerpoint/2010/main" val="3021058822"/>
+      </p:ext>
+    </p:extLst>
+  </p:cSld>
+  <p:clrMapOvr>
+    <a:masterClrMapping/>
+  </p:clrMapOvr>
+</p:notes>
+</file>
+
+<file path=ppt/notesSlides/notesSlide15.xml><?xml version="1.0" encoding="utf-8"?>
+<p:notes xmlns:a="http://schemas.openxmlformats.org/drawingml/2006/main" xmlns:r="http://schemas.openxmlformats.org/officeDocument/2006/relationships" xmlns:p="http://schemas.openxmlformats.org/presentationml/2006/main">
+  <p:cSld>
+    <p:spTree>
+      <p:nvGrpSpPr>
+        <p:cNvPr id="1" name=""/>
+        <p:cNvGrpSpPr/>
+        <p:nvPr/>
+      </p:nvGrpSpPr>
+      <p:grpSpPr>
+        <a:xfrm>
+          <a:off x="0" y="0"/>
+          <a:ext cx="0" cy="0"/>
+          <a:chOff x="0" y="0"/>
+          <a:chExt cx="0" cy="0"/>
+        </a:xfrm>
+      </p:grpSpPr>
+      <p:sp>
+        <p:nvSpPr>
+          <p:cNvPr id="2" name="Slide Image Placeholder 1"/>
+          <p:cNvSpPr>
+            <a:spLocks noGrp="1" noRot="1" noChangeAspect="1"/>
+          </p:cNvSpPr>
+          <p:nvPr>
+            <p:ph type="sldImg"/>
+          </p:nvPr>
+        </p:nvSpPr>
+        <p:spPr/>
+      </p:sp>
+      <p:sp>
+        <p:nvSpPr>
+          <p:cNvPr id="3" name="Notes Placeholder 2"/>
+          <p:cNvSpPr>
+            <a:spLocks noGrp="1"/>
+          </p:cNvSpPr>
+          <p:nvPr>
+            <p:ph type="body" idx="1"/>
+          </p:nvPr>
+        </p:nvSpPr>
+        <p:spPr/>
+        <p:txBody>
+          <a:bodyPr/>
+          <a:lstStyle/>
+          <a:p>
+            <a:r>
+              <a:rPr lang="en-US" dirty="0"/>
+              <a:t>This chart displays our balanced dataset. </a:t>
+            </a:r>
+          </a:p>
+          <a:p>
+            <a:r>
+              <a:rPr lang="en-US" dirty="0"/>
+              <a:t>The absence of a symptom can be as important as the presence of a symptom. </a:t>
+            </a:r>
+          </a:p>
+          <a:p>
+            <a:r>
+              <a:rPr lang="en-US" dirty="0"/>
+              <a:t>This shows that each prognosis has a complete dataset.</a:t>
+            </a:r>
+          </a:p>
+        </p:txBody>
+      </p:sp>
+      <p:sp>
+        <p:nvSpPr>
+          <p:cNvPr id="4" name="Slide Number Placeholder 3"/>
+          <p:cNvSpPr>
+            <a:spLocks noGrp="1"/>
+          </p:cNvSpPr>
+          <p:nvPr>
+            <p:ph type="sldNum" sz="quarter" idx="5"/>
+          </p:nvPr>
+        </p:nvSpPr>
+        <p:spPr/>
+        <p:txBody>
+          <a:bodyPr/>
+          <a:lstStyle/>
+          <a:p>
+            <a:fld id="{0837621E-2D94-4874-8D2F-F90746483814}" type="slidenum">
+              <a:rPr lang="en-US" smtClean="0"/>
+              <a:t>18</a:t>
+            </a:fld>
+            <a:endParaRPr lang="en-US" dirty="0"/>
+          </a:p>
+        </p:txBody>
+      </p:sp>
+    </p:spTree>
+    <p:extLst>
+      <p:ext uri="{BB962C8B-B14F-4D97-AF65-F5344CB8AC3E}">
+        <p14:creationId xmlns:p14="http://schemas.microsoft.com/office/powerpoint/2010/main" val="562341445"/>
+      </p:ext>
+    </p:extLst>
+  </p:cSld>
+  <p:clrMapOvr>
+    <a:masterClrMapping/>
+  </p:clrMapOvr>
+</p:notes>
+</file>
+
+<file path=ppt/notesSlides/notesSlide16.xml><?xml version="1.0" encoding="utf-8"?>
+<p:notes xmlns:a="http://schemas.openxmlformats.org/drawingml/2006/main" xmlns:r="http://schemas.openxmlformats.org/officeDocument/2006/relationships" xmlns:p="http://schemas.openxmlformats.org/presentationml/2006/main">
+  <p:cSld>
+    <p:spTree>
+      <p:nvGrpSpPr>
+        <p:cNvPr id="1" name=""/>
+        <p:cNvGrpSpPr/>
+        <p:nvPr/>
+      </p:nvGrpSpPr>
+      <p:grpSpPr>
+        <a:xfrm>
+          <a:off x="0" y="0"/>
+          <a:ext cx="0" cy="0"/>
+          <a:chOff x="0" y="0"/>
+          <a:chExt cx="0" cy="0"/>
+        </a:xfrm>
+      </p:grpSpPr>
+      <p:sp>
+        <p:nvSpPr>
+          <p:cNvPr id="2" name="Slide Image Placeholder 1"/>
+          <p:cNvSpPr>
+            <a:spLocks noGrp="1" noRot="1" noChangeAspect="1"/>
+          </p:cNvSpPr>
+          <p:nvPr>
+            <p:ph type="sldImg"/>
+          </p:nvPr>
+        </p:nvSpPr>
+        <p:spPr/>
+      </p:sp>
+      <p:sp>
+        <p:nvSpPr>
+          <p:cNvPr id="3" name="Notes Placeholder 2"/>
+          <p:cNvSpPr>
+            <a:spLocks noGrp="1"/>
+          </p:cNvSpPr>
+          <p:nvPr>
+            <p:ph type="body" idx="1"/>
+          </p:nvPr>
+        </p:nvSpPr>
+        <p:spPr/>
+        <p:txBody>
+          <a:bodyPr/>
+          <a:lstStyle/>
+          <a:p>
+            <a:r>
+              <a:rPr lang="en-US" dirty="0"/>
+              <a:t>This visualization displays which prognosis have the most symptom frequency. </a:t>
+            </a:r>
+          </a:p>
+        </p:txBody>
+      </p:sp>
+      <p:sp>
+        <p:nvSpPr>
+          <p:cNvPr id="4" name="Slide Number Placeholder 3"/>
+          <p:cNvSpPr>
+            <a:spLocks noGrp="1"/>
+          </p:cNvSpPr>
+          <p:nvPr>
+            <p:ph type="sldNum" sz="quarter" idx="5"/>
+          </p:nvPr>
+        </p:nvSpPr>
+        <p:spPr/>
+        <p:txBody>
+          <a:bodyPr/>
+          <a:lstStyle/>
+          <a:p>
+            <a:fld id="{0837621E-2D94-4874-8D2F-F90746483814}" type="slidenum">
+              <a:rPr lang="en-US" smtClean="0"/>
+              <a:t>19</a:t>
+            </a:fld>
+            <a:endParaRPr lang="en-US" dirty="0"/>
+          </a:p>
+        </p:txBody>
+      </p:sp>
+    </p:spTree>
+    <p:extLst>
+      <p:ext uri="{BB962C8B-B14F-4D97-AF65-F5344CB8AC3E}">
+        <p14:creationId xmlns:p14="http://schemas.microsoft.com/office/powerpoint/2010/main" val="4163135165"/>
+      </p:ext>
+    </p:extLst>
+  </p:cSld>
+  <p:clrMapOvr>
+    <a:masterClrMapping/>
+  </p:clrMapOvr>
+</p:notes>
+</file>
+
+<file path=ppt/notesSlides/notesSlide17.xml><?xml version="1.0" encoding="utf-8"?>
+<p:notes xmlns:a="http://schemas.openxmlformats.org/drawingml/2006/main" xmlns:r="http://schemas.openxmlformats.org/officeDocument/2006/relationships" xmlns:p="http://schemas.openxmlformats.org/presentationml/2006/main">
+  <p:cSld>
+    <p:spTree>
+      <p:nvGrpSpPr>
+        <p:cNvPr id="1" name=""/>
+        <p:cNvGrpSpPr/>
+        <p:nvPr/>
+      </p:nvGrpSpPr>
+      <p:grpSpPr>
+        <a:xfrm>
+          <a:off x="0" y="0"/>
+          <a:ext cx="0" cy="0"/>
+          <a:chOff x="0" y="0"/>
+          <a:chExt cx="0" cy="0"/>
+        </a:xfrm>
+      </p:grpSpPr>
+      <p:sp>
+        <p:nvSpPr>
+          <p:cNvPr id="2" name="Slide Image Placeholder 1"/>
+          <p:cNvSpPr>
+            <a:spLocks noGrp="1" noRot="1" noChangeAspect="1"/>
+          </p:cNvSpPr>
+          <p:nvPr>
+            <p:ph type="sldImg"/>
+          </p:nvPr>
+        </p:nvSpPr>
+        <p:spPr/>
+      </p:sp>
+      <p:sp>
+        <p:nvSpPr>
+          <p:cNvPr id="3" name="Notes Placeholder 2"/>
+          <p:cNvSpPr>
+            <a:spLocks noGrp="1"/>
+          </p:cNvSpPr>
+          <p:nvPr>
+            <p:ph type="body" idx="1"/>
+          </p:nvPr>
+        </p:nvSpPr>
+        <p:spPr/>
+        <p:txBody>
+          <a:bodyPr/>
+          <a:lstStyle/>
+          <a:p>
+            <a:r>
+              <a:rPr lang="en-US" dirty="0"/>
+              <a:t>In tableau this interactive chart allows us to select a symptom and easily see based off color how many diseases have it.</a:t>
+            </a:r>
+          </a:p>
+        </p:txBody>
+      </p:sp>
+      <p:sp>
+        <p:nvSpPr>
+          <p:cNvPr id="4" name="Slide Number Placeholder 3"/>
+          <p:cNvSpPr>
+            <a:spLocks noGrp="1"/>
+          </p:cNvSpPr>
+          <p:nvPr>
+            <p:ph type="sldNum" sz="quarter" idx="5"/>
+          </p:nvPr>
+        </p:nvSpPr>
+        <p:spPr/>
+        <p:txBody>
+          <a:bodyPr/>
+          <a:lstStyle/>
+          <a:p>
+            <a:fld id="{0837621E-2D94-4874-8D2F-F90746483814}" type="slidenum">
+              <a:rPr lang="en-US" smtClean="0"/>
+              <a:t>20</a:t>
+            </a:fld>
+            <a:endParaRPr lang="en-US" dirty="0"/>
+          </a:p>
+        </p:txBody>
+      </p:sp>
+    </p:spTree>
+    <p:extLst>
+      <p:ext uri="{BB962C8B-B14F-4D97-AF65-F5344CB8AC3E}">
+        <p14:creationId xmlns:p14="http://schemas.microsoft.com/office/powerpoint/2010/main" val="3573313510"/>
+      </p:ext>
+    </p:extLst>
+  </p:cSld>
+  <p:clrMapOvr>
+    <a:masterClrMapping/>
+  </p:clrMapOvr>
+</p:notes>
+</file>
+
+<file path=ppt/notesSlides/notesSlide2.xml><?xml version="1.0" encoding="utf-8"?>
+<p:notes xmlns:a="http://schemas.openxmlformats.org/drawingml/2006/main" xmlns:r="http://schemas.openxmlformats.org/officeDocument/2006/relationships" xmlns:p="http://schemas.openxmlformats.org/presentationml/2006/main">
+  <p:cSld>
+    <p:spTree>
+      <p:nvGrpSpPr>
+        <p:cNvPr id="1" name=""/>
+        <p:cNvGrpSpPr/>
+        <p:nvPr/>
+      </p:nvGrpSpPr>
+      <p:grpSpPr>
+        <a:xfrm>
+          <a:off x="0" y="0"/>
+          <a:ext cx="0" cy="0"/>
+          <a:chOff x="0" y="0"/>
+          <a:chExt cx="0" cy="0"/>
+        </a:xfrm>
+      </p:grpSpPr>
+      <p:sp>
+        <p:nvSpPr>
+          <p:cNvPr id="2" name="Slide Image Placeholder 1"/>
+          <p:cNvSpPr>
+            <a:spLocks noGrp="1" noRot="1" noChangeAspect="1"/>
+          </p:cNvSpPr>
+          <p:nvPr>
+            <p:ph type="sldImg"/>
+          </p:nvPr>
+        </p:nvSpPr>
+        <p:spPr/>
+      </p:sp>
+      <p:sp>
+        <p:nvSpPr>
+          <p:cNvPr id="3" name="Notes Placeholder 2"/>
+          <p:cNvSpPr>
+            <a:spLocks noGrp="1"/>
+          </p:cNvSpPr>
+          <p:nvPr>
+            <p:ph type="body" idx="1"/>
+          </p:nvPr>
+        </p:nvSpPr>
+        <p:spPr/>
+        <p:txBody>
+          <a:bodyPr/>
+          <a:lstStyle/>
+          <a:p>
+            <a:r>
+              <a:rPr lang="en-US" dirty="0"/>
+              <a:t>To develop our disease prediction machine learning model required the use of multiple technologies and programming languages. We used Jupyter Notebook to write Python code for both data preprocessing and our machine learning model. A SQL database was created with pgAdmin. A Tableau storyboard was developed for interactive data visualizations. The following slides will provide detailed explanations of how each technology was used. </a:t>
+            </a:r>
+          </a:p>
+        </p:txBody>
+      </p:sp>
+      <p:sp>
+        <p:nvSpPr>
+          <p:cNvPr id="4" name="Slide Number Placeholder 3"/>
+          <p:cNvSpPr>
+            <a:spLocks noGrp="1"/>
+          </p:cNvSpPr>
+          <p:nvPr>
+            <p:ph type="sldNum" sz="quarter" idx="5"/>
+          </p:nvPr>
+        </p:nvSpPr>
+        <p:spPr/>
+        <p:txBody>
+          <a:bodyPr/>
+          <a:lstStyle/>
+          <a:p>
+            <a:fld id="{0837621E-2D94-4874-8D2F-F90746483814}" type="slidenum">
+              <a:rPr lang="en-US" smtClean="0"/>
+              <a:t>4</a:t>
+            </a:fld>
+            <a:endParaRPr lang="en-US" dirty="0"/>
+          </a:p>
+        </p:txBody>
+      </p:sp>
+    </p:spTree>
+    <p:extLst>
+      <p:ext uri="{BB962C8B-B14F-4D97-AF65-F5344CB8AC3E}">
+        <p14:creationId xmlns:p14="http://schemas.microsoft.com/office/powerpoint/2010/main" val="1884022343"/>
+      </p:ext>
+    </p:extLst>
+  </p:cSld>
+  <p:clrMapOvr>
+    <a:masterClrMapping/>
+  </p:clrMapOvr>
+</p:notes>
+</file>
+
+<file path=ppt/notesSlides/notesSlide3.xml><?xml version="1.0" encoding="utf-8"?>
+<p:notes xmlns:a="http://schemas.openxmlformats.org/drawingml/2006/main" xmlns:r="http://schemas.openxmlformats.org/officeDocument/2006/relationships" xmlns:p="http://schemas.openxmlformats.org/presentationml/2006/main">
+  <p:cSld>
+    <p:spTree>
+      <p:nvGrpSpPr>
+        <p:cNvPr id="1" name=""/>
+        <p:cNvGrpSpPr/>
+        <p:nvPr/>
+      </p:nvGrpSpPr>
+      <p:grpSpPr>
+        <a:xfrm>
+          <a:off x="0" y="0"/>
+          <a:ext cx="0" cy="0"/>
+          <a:chOff x="0" y="0"/>
+          <a:chExt cx="0" cy="0"/>
+        </a:xfrm>
+      </p:grpSpPr>
+      <p:sp>
+        <p:nvSpPr>
+          <p:cNvPr id="2" name="Slide Image Placeholder 1"/>
+          <p:cNvSpPr>
+            <a:spLocks noGrp="1" noRot="1" noChangeAspect="1"/>
+          </p:cNvSpPr>
+          <p:nvPr>
+            <p:ph type="sldImg"/>
+          </p:nvPr>
+        </p:nvSpPr>
+        <p:spPr/>
+      </p:sp>
+      <p:sp>
+        <p:nvSpPr>
+          <p:cNvPr id="3" name="Notes Placeholder 2"/>
+          <p:cNvSpPr>
+            <a:spLocks noGrp="1"/>
+          </p:cNvSpPr>
+          <p:nvPr>
+            <p:ph type="body" idx="1"/>
+          </p:nvPr>
+        </p:nvSpPr>
+        <p:spPr/>
+        <p:txBody>
+          <a:bodyPr/>
+          <a:lstStyle/>
+          <a:p>
+            <a:pPr marL="0" marR="0" lvl="0" indent="0" algn="l" defTabSz="914400" rtl="0" eaLnBrk="1" fontAlgn="auto" latinLnBrk="0" hangingPunct="1">
+              <a:lnSpc>
+                <a:spcPct val="100000"/>
+              </a:lnSpc>
+              <a:spcBef>
+                <a:spcPts val="0"/>
+              </a:spcBef>
+              <a:spcAft>
+                <a:spcPts val="0"/>
+              </a:spcAft>
+              <a:buClrTx/>
+              <a:buSzTx/>
+              <a:buFontTx/>
+              <a:buNone/>
+              <a:tabLst/>
+              <a:defRPr/>
+            </a:pPr>
+            <a:r>
+              <a:rPr lang="en-US" dirty="0"/>
+              <a:t>To begin the preprocessing the two CSV datasets were imported and assigned as to variables train_data and test_test.  A key part of the data exploration phase is preprocessing the data. This allows us to learn about the data characteristics and identify potential problems. We used the pandas info and describe functions to explore the data. For the model to function correctly all data in both data sets has to be in the correct data type. We also needed to isolate columns with null data and drop that data. The isnull with any functions identified the null values then the drop function was used to remove it from the data frame.</a:t>
+            </a:r>
+          </a:p>
+          <a:p>
+            <a:pPr marL="0" marR="0" lvl="0" indent="0" algn="l" defTabSz="914400" rtl="0" eaLnBrk="1" fontAlgn="auto" latinLnBrk="0" hangingPunct="1">
+              <a:lnSpc>
+                <a:spcPct val="100000"/>
+              </a:lnSpc>
+              <a:spcBef>
+                <a:spcPts val="0"/>
+              </a:spcBef>
+              <a:spcAft>
+                <a:spcPts val="0"/>
+              </a:spcAft>
+              <a:buClrTx/>
+              <a:buSzTx/>
+              <a:buFontTx/>
+              <a:buNone/>
+              <a:tabLst/>
+              <a:defRPr/>
+            </a:pPr>
+            <a:endParaRPr lang="en-US" dirty="0"/>
+          </a:p>
+          <a:p>
+            <a:endParaRPr lang="en-US" dirty="0"/>
+          </a:p>
+        </p:txBody>
+      </p:sp>
+      <p:sp>
+        <p:nvSpPr>
+          <p:cNvPr id="4" name="Slide Number Placeholder 3"/>
+          <p:cNvSpPr>
+            <a:spLocks noGrp="1"/>
+          </p:cNvSpPr>
+          <p:nvPr>
+            <p:ph type="sldNum" sz="quarter" idx="5"/>
+          </p:nvPr>
+        </p:nvSpPr>
+        <p:spPr/>
+        <p:txBody>
+          <a:bodyPr/>
+          <a:lstStyle/>
+          <a:p>
+            <a:fld id="{0837621E-2D94-4874-8D2F-F90746483814}" type="slidenum">
+              <a:rPr lang="en-US" smtClean="0"/>
+              <a:t>5</a:t>
+            </a:fld>
+            <a:endParaRPr lang="en-US" dirty="0"/>
+          </a:p>
+        </p:txBody>
+      </p:sp>
+    </p:spTree>
+    <p:extLst>
+      <p:ext uri="{BB962C8B-B14F-4D97-AF65-F5344CB8AC3E}">
+        <p14:creationId xmlns:p14="http://schemas.microsoft.com/office/powerpoint/2010/main" val="2020664582"/>
+      </p:ext>
+    </p:extLst>
+  </p:cSld>
+  <p:clrMapOvr>
+    <a:masterClrMapping/>
+  </p:clrMapOvr>
+</p:notes>
+</file>
+
+<file path=ppt/notesSlides/notesSlide4.xml><?xml version="1.0" encoding="utf-8"?>
+<p:notes xmlns:a="http://schemas.openxmlformats.org/drawingml/2006/main" xmlns:r="http://schemas.openxmlformats.org/officeDocument/2006/relationships" xmlns:p="http://schemas.openxmlformats.org/presentationml/2006/main">
+  <p:cSld>
+    <p:spTree>
+      <p:nvGrpSpPr>
+        <p:cNvPr id="1" name=""/>
+        <p:cNvGrpSpPr/>
+        <p:nvPr/>
+      </p:nvGrpSpPr>
+      <p:grpSpPr>
+        <a:xfrm>
+          <a:off x="0" y="0"/>
+          <a:ext cx="0" cy="0"/>
+          <a:chOff x="0" y="0"/>
+          <a:chExt cx="0" cy="0"/>
+        </a:xfrm>
+      </p:grpSpPr>
+      <p:sp>
+        <p:nvSpPr>
+          <p:cNvPr id="2" name="Slide Image Placeholder 1"/>
+          <p:cNvSpPr>
+            <a:spLocks noGrp="1" noRot="1" noChangeAspect="1"/>
+          </p:cNvSpPr>
+          <p:nvPr>
+            <p:ph type="sldImg"/>
+          </p:nvPr>
+        </p:nvSpPr>
+        <p:spPr/>
+      </p:sp>
+      <p:sp>
+        <p:nvSpPr>
+          <p:cNvPr id="3" name="Notes Placeholder 2"/>
+          <p:cNvSpPr>
+            <a:spLocks noGrp="1"/>
+          </p:cNvSpPr>
+          <p:nvPr>
+            <p:ph type="body" idx="1"/>
+          </p:nvPr>
+        </p:nvSpPr>
+        <p:spPr/>
+        <p:txBody>
+          <a:bodyPr/>
+          <a:lstStyle/>
+          <a:p>
+            <a:pPr marL="0" marR="0" lvl="0" indent="0" algn="l" defTabSz="914400" rtl="0" eaLnBrk="1" fontAlgn="auto" latinLnBrk="0" hangingPunct="1">
+              <a:lnSpc>
+                <a:spcPct val="100000"/>
+              </a:lnSpc>
+              <a:spcBef>
+                <a:spcPts val="0"/>
+              </a:spcBef>
+              <a:spcAft>
+                <a:spcPts val="0"/>
+              </a:spcAft>
+              <a:buClrTx/>
+              <a:buSzTx/>
+              <a:buFontTx/>
+              <a:buNone/>
+              <a:tabLst/>
+              <a:defRPr/>
+            </a:pPr>
+            <a:r>
+              <a:rPr lang="en-US" dirty="0"/>
+              <a:t>Machine learning utilizes both training and testing data.</a:t>
+            </a:r>
+          </a:p>
+          <a:p>
+            <a:pPr marL="0" marR="0" lvl="0" indent="0" algn="l" defTabSz="914400" rtl="0" eaLnBrk="1" fontAlgn="auto" latinLnBrk="0" hangingPunct="1">
+              <a:lnSpc>
+                <a:spcPct val="100000"/>
+              </a:lnSpc>
+              <a:spcBef>
+                <a:spcPts val="0"/>
+              </a:spcBef>
+              <a:spcAft>
+                <a:spcPts val="0"/>
+              </a:spcAft>
+              <a:buClrTx/>
+              <a:buSzTx/>
+              <a:buFontTx/>
+              <a:buNone/>
+              <a:tabLst/>
+              <a:defRPr/>
+            </a:pPr>
+            <a:r>
+              <a:rPr lang="en-US" dirty="0"/>
+              <a:t>Our data set downloaded from Kaggle was already split into training and testing csv files.</a:t>
+            </a:r>
+          </a:p>
+          <a:p>
+            <a:pPr marL="0" marR="0" lvl="0" indent="0" algn="l" defTabSz="914400" rtl="0" eaLnBrk="1" fontAlgn="auto" latinLnBrk="0" hangingPunct="1">
+              <a:lnSpc>
+                <a:spcPct val="100000"/>
+              </a:lnSpc>
+              <a:spcBef>
+                <a:spcPts val="0"/>
+              </a:spcBef>
+              <a:spcAft>
+                <a:spcPts val="0"/>
+              </a:spcAft>
+              <a:buClrTx/>
+              <a:buSzTx/>
+              <a:buFontTx/>
+              <a:buNone/>
+              <a:tabLst/>
+              <a:defRPr/>
+            </a:pPr>
+            <a:r>
+              <a:rPr lang="en-US" dirty="0"/>
+              <a:t>The training data is necessary to teach the machine learning algorithms. </a:t>
+            </a:r>
+          </a:p>
+          <a:p>
+            <a:pPr marL="0" marR="0" lvl="0" indent="0" algn="l" defTabSz="914400" rtl="0" eaLnBrk="1" fontAlgn="auto" latinLnBrk="0" hangingPunct="1">
+              <a:lnSpc>
+                <a:spcPct val="100000"/>
+              </a:lnSpc>
+              <a:spcBef>
+                <a:spcPts val="0"/>
+              </a:spcBef>
+              <a:spcAft>
+                <a:spcPts val="0"/>
+              </a:spcAft>
+              <a:buClrTx/>
+              <a:buSzTx/>
+              <a:buFontTx/>
+              <a:buNone/>
+              <a:tabLst/>
+              <a:defRPr/>
+            </a:pPr>
+            <a:r>
+              <a:rPr lang="en-US" dirty="0"/>
+              <a:t>The testing data helps validate the accuracy of the algorithm’s training.</a:t>
+            </a:r>
+          </a:p>
+          <a:p>
+            <a:pPr marL="0" marR="0" lvl="0" indent="0" algn="l" defTabSz="914400" rtl="0" eaLnBrk="1" fontAlgn="auto" latinLnBrk="0" hangingPunct="1">
+              <a:lnSpc>
+                <a:spcPct val="100000"/>
+              </a:lnSpc>
+              <a:spcBef>
+                <a:spcPts val="0"/>
+              </a:spcBef>
+              <a:spcAft>
+                <a:spcPts val="0"/>
+              </a:spcAft>
+              <a:buClrTx/>
+              <a:buSzTx/>
+              <a:buFontTx/>
+              <a:buNone/>
+              <a:tabLst/>
+              <a:defRPr/>
+            </a:pPr>
+            <a:r>
+              <a:rPr lang="en-US" dirty="0"/>
+              <a:t>To prepare the data for the machine learning models we created target and removed it from the features data.</a:t>
+            </a:r>
+          </a:p>
+          <a:p>
+            <a:pPr marL="0" marR="0" lvl="0" indent="0" algn="l" defTabSz="914400" rtl="0" eaLnBrk="1" fontAlgn="auto" latinLnBrk="0" hangingPunct="1">
+              <a:lnSpc>
+                <a:spcPct val="100000"/>
+              </a:lnSpc>
+              <a:spcBef>
+                <a:spcPts val="0"/>
+              </a:spcBef>
+              <a:spcAft>
+                <a:spcPts val="0"/>
+              </a:spcAft>
+              <a:buClrTx/>
+              <a:buSzTx/>
+              <a:buFontTx/>
+              <a:buNone/>
+              <a:tabLst/>
+              <a:defRPr/>
+            </a:pPr>
+            <a:endParaRPr lang="en-US" dirty="0"/>
+          </a:p>
+          <a:p>
+            <a:pPr marL="0" marR="0" lvl="0" indent="0" algn="l" defTabSz="914400" rtl="0" eaLnBrk="1" fontAlgn="auto" latinLnBrk="0" hangingPunct="1">
+              <a:lnSpc>
+                <a:spcPct val="100000"/>
+              </a:lnSpc>
+              <a:spcBef>
+                <a:spcPts val="0"/>
+              </a:spcBef>
+              <a:spcAft>
+                <a:spcPts val="0"/>
+              </a:spcAft>
+              <a:buClrTx/>
+              <a:buSzTx/>
+              <a:buFontTx/>
+              <a:buNone/>
+              <a:tabLst/>
+              <a:defRPr/>
+            </a:pPr>
+            <a:r>
+              <a:rPr lang="en-US" dirty="0"/>
+              <a:t>Remove? - The unique() function is used to find the unique elements of an array. It returns the sorted unique elements of an array.</a:t>
+            </a:r>
+          </a:p>
+          <a:p>
+            <a:endParaRPr lang="en-US" dirty="0"/>
+          </a:p>
+        </p:txBody>
+      </p:sp>
+      <p:sp>
+        <p:nvSpPr>
+          <p:cNvPr id="4" name="Slide Number Placeholder 3"/>
+          <p:cNvSpPr>
+            <a:spLocks noGrp="1"/>
+          </p:cNvSpPr>
+          <p:nvPr>
+            <p:ph type="sldNum" sz="quarter" idx="5"/>
+          </p:nvPr>
+        </p:nvSpPr>
+        <p:spPr/>
+        <p:txBody>
+          <a:bodyPr/>
+          <a:lstStyle/>
+          <a:p>
+            <a:fld id="{0837621E-2D94-4874-8D2F-F90746483814}" type="slidenum">
+              <a:rPr lang="en-US" smtClean="0"/>
+              <a:t>6</a:t>
+            </a:fld>
+            <a:endParaRPr lang="en-US" dirty="0"/>
+          </a:p>
+        </p:txBody>
+      </p:sp>
+    </p:spTree>
+    <p:extLst>
+      <p:ext uri="{BB962C8B-B14F-4D97-AF65-F5344CB8AC3E}">
+        <p14:creationId xmlns:p14="http://schemas.microsoft.com/office/powerpoint/2010/main" val="3665236893"/>
+      </p:ext>
+    </p:extLst>
+  </p:cSld>
+  <p:clrMapOvr>
+    <a:masterClrMapping/>
+  </p:clrMapOvr>
+</p:notes>
+</file>
+
+<file path=ppt/notesSlides/notesSlide5.xml><?xml version="1.0" encoding="utf-8"?>
+<p:notes xmlns:a="http://schemas.openxmlformats.org/drawingml/2006/main" xmlns:r="http://schemas.openxmlformats.org/officeDocument/2006/relationships" xmlns:p="http://schemas.openxmlformats.org/presentationml/2006/main">
+  <p:cSld>
+    <p:spTree>
+      <p:nvGrpSpPr>
+        <p:cNvPr id="1" name=""/>
+        <p:cNvGrpSpPr/>
+        <p:nvPr/>
+      </p:nvGrpSpPr>
+      <p:grpSpPr>
+        <a:xfrm>
+          <a:off x="0" y="0"/>
+          <a:ext cx="0" cy="0"/>
+          <a:chOff x="0" y="0"/>
+          <a:chExt cx="0" cy="0"/>
+        </a:xfrm>
+      </p:grpSpPr>
+      <p:sp>
+        <p:nvSpPr>
+          <p:cNvPr id="2" name="Slide Image Placeholder 1"/>
+          <p:cNvSpPr>
+            <a:spLocks noGrp="1" noRot="1" noChangeAspect="1"/>
+          </p:cNvSpPr>
+          <p:nvPr>
+            <p:ph type="sldImg"/>
+          </p:nvPr>
+        </p:nvSpPr>
+        <p:spPr/>
+      </p:sp>
+      <p:sp>
+        <p:nvSpPr>
+          <p:cNvPr id="3" name="Notes Placeholder 2"/>
+          <p:cNvSpPr>
+            <a:spLocks noGrp="1"/>
+          </p:cNvSpPr>
+          <p:nvPr>
+            <p:ph type="body" idx="1"/>
+          </p:nvPr>
+        </p:nvSpPr>
+        <p:spPr/>
+        <p:txBody>
+          <a:bodyPr/>
+          <a:lstStyle/>
+          <a:p>
+            <a:r>
+              <a:rPr lang="en-US" dirty="0"/>
+              <a:t>A list of symptoms for all diseases was created to allow for a GUI in our machine learning model where symptoms could be selected from a drop down box.</a:t>
+            </a:r>
+          </a:p>
+          <a:p>
+            <a:endParaRPr lang="en-US" dirty="0"/>
+          </a:p>
+        </p:txBody>
+      </p:sp>
+      <p:sp>
+        <p:nvSpPr>
+          <p:cNvPr id="4" name="Slide Number Placeholder 3"/>
+          <p:cNvSpPr>
+            <a:spLocks noGrp="1"/>
+          </p:cNvSpPr>
+          <p:nvPr>
+            <p:ph type="sldNum" sz="quarter" idx="5"/>
+          </p:nvPr>
+        </p:nvSpPr>
+        <p:spPr/>
+        <p:txBody>
+          <a:bodyPr/>
+          <a:lstStyle/>
+          <a:p>
+            <a:fld id="{0837621E-2D94-4874-8D2F-F90746483814}" type="slidenum">
+              <a:rPr lang="en-US" smtClean="0"/>
+              <a:t>7</a:t>
+            </a:fld>
+            <a:endParaRPr lang="en-US" dirty="0"/>
+          </a:p>
+        </p:txBody>
+      </p:sp>
+    </p:spTree>
+    <p:extLst>
+      <p:ext uri="{BB962C8B-B14F-4D97-AF65-F5344CB8AC3E}">
+        <p14:creationId xmlns:p14="http://schemas.microsoft.com/office/powerpoint/2010/main" val="2106080391"/>
+      </p:ext>
+    </p:extLst>
+  </p:cSld>
+  <p:clrMapOvr>
+    <a:masterClrMapping/>
+  </p:clrMapOvr>
+</p:notes>
+</file>
+
+<file path=ppt/notesSlides/notesSlide6.xml><?xml version="1.0" encoding="utf-8"?>
+<p:notes xmlns:a="http://schemas.openxmlformats.org/drawingml/2006/main" xmlns:r="http://schemas.openxmlformats.org/officeDocument/2006/relationships" xmlns:p="http://schemas.openxmlformats.org/presentationml/2006/main">
+  <p:cSld>
+    <p:spTree>
+      <p:nvGrpSpPr>
+        <p:cNvPr id="1" name=""/>
+        <p:cNvGrpSpPr/>
+        <p:nvPr/>
+      </p:nvGrpSpPr>
+      <p:grpSpPr>
+        <a:xfrm>
+          <a:off x="0" y="0"/>
+          <a:ext cx="0" cy="0"/>
+          <a:chOff x="0" y="0"/>
+          <a:chExt cx="0" cy="0"/>
+        </a:xfrm>
+      </p:grpSpPr>
+      <p:sp>
+        <p:nvSpPr>
+          <p:cNvPr id="2" name="Slide Image Placeholder 1"/>
+          <p:cNvSpPr>
+            <a:spLocks noGrp="1" noRot="1" noChangeAspect="1"/>
+          </p:cNvSpPr>
+          <p:nvPr>
+            <p:ph type="sldImg"/>
+          </p:nvPr>
+        </p:nvSpPr>
+        <p:spPr/>
+      </p:sp>
+      <p:sp>
+        <p:nvSpPr>
+          <p:cNvPr id="3" name="Notes Placeholder 2"/>
+          <p:cNvSpPr>
+            <a:spLocks noGrp="1"/>
+          </p:cNvSpPr>
+          <p:nvPr>
+            <p:ph type="body" idx="1"/>
+          </p:nvPr>
+        </p:nvSpPr>
+        <p:spPr/>
+        <p:txBody>
+          <a:bodyPr/>
+          <a:lstStyle/>
+          <a:p>
+            <a:r>
+              <a:rPr lang="en-US" dirty="0"/>
+              <a:t>The preprocessed train_data, test_data and sympt_df data sets were exported into PostgresSQL as three separate tables.</a:t>
+            </a:r>
+          </a:p>
+          <a:p>
+            <a:r>
+              <a:rPr lang="en-US" dirty="0"/>
+              <a:t>This created a static database in pgAdmin for use throughout the project.</a:t>
+            </a:r>
+          </a:p>
+          <a:p>
+            <a:r>
+              <a:rPr lang="en-US" dirty="0"/>
+              <a:t>There is a detailed ERD the displays the relationships.</a:t>
+            </a:r>
+          </a:p>
+          <a:p>
+            <a:r>
+              <a:rPr lang="en-US" dirty="0"/>
+              <a:t>A join was performed on the tables.</a:t>
+            </a:r>
+          </a:p>
+          <a:p>
+            <a:r>
+              <a:rPr lang="en-US" dirty="0"/>
+              <a:t>The database interfaces with [</a:t>
+            </a:r>
+            <a:r>
+              <a:rPr lang="en-US" dirty="0" err="1"/>
+              <a:t>Disease_Prediction_ML.ipynb</a:t>
+            </a:r>
+            <a:r>
+              <a:rPr lang="en-US" dirty="0"/>
+              <a:t>](</a:t>
+            </a:r>
+            <a:r>
+              <a:rPr lang="en-US" dirty="0" err="1"/>
+              <a:t>Disease_Prediction_ML.ipynb</a:t>
+            </a:r>
+            <a:r>
+              <a:rPr lang="en-US" dirty="0"/>
+              <a:t>).</a:t>
+            </a:r>
+          </a:p>
+          <a:p>
+            <a:r>
+              <a:rPr lang="en-US" dirty="0"/>
+              <a:t>Using ‘from </a:t>
+            </a:r>
+            <a:r>
+              <a:rPr lang="en-US" dirty="0" err="1"/>
+              <a:t>sqlalchemy</a:t>
+            </a:r>
+            <a:r>
+              <a:rPr lang="en-US" dirty="0"/>
+              <a:t> import </a:t>
+            </a:r>
+            <a:r>
+              <a:rPr lang="en-US" dirty="0" err="1"/>
+              <a:t>create_engine</a:t>
+            </a:r>
+            <a:r>
+              <a:rPr lang="en-US" dirty="0"/>
+              <a:t>’ the PostgresSQL data is used in our machine learning model.</a:t>
+            </a:r>
+          </a:p>
+          <a:p>
+            <a:endParaRPr lang="en-US" dirty="0"/>
+          </a:p>
+        </p:txBody>
+      </p:sp>
+      <p:sp>
+        <p:nvSpPr>
+          <p:cNvPr id="4" name="Slide Number Placeholder 3"/>
+          <p:cNvSpPr>
+            <a:spLocks noGrp="1"/>
+          </p:cNvSpPr>
+          <p:nvPr>
+            <p:ph type="sldNum" sz="quarter" idx="5"/>
+          </p:nvPr>
+        </p:nvSpPr>
+        <p:spPr/>
+        <p:txBody>
+          <a:bodyPr/>
+          <a:lstStyle/>
+          <a:p>
+            <a:fld id="{0837621E-2D94-4874-8D2F-F90746483814}" type="slidenum">
+              <a:rPr lang="en-US" smtClean="0"/>
+              <a:t>8</a:t>
+            </a:fld>
+            <a:endParaRPr lang="en-US"/>
+          </a:p>
+        </p:txBody>
+      </p:sp>
+    </p:spTree>
+    <p:extLst>
+      <p:ext uri="{BB962C8B-B14F-4D97-AF65-F5344CB8AC3E}">
+        <p14:creationId xmlns:p14="http://schemas.microsoft.com/office/powerpoint/2010/main" val="3209129602"/>
+      </p:ext>
+    </p:extLst>
+  </p:cSld>
+  <p:clrMapOvr>
+    <a:masterClrMapping/>
+  </p:clrMapOvr>
+</p:notes>
+</file>
+
+<file path=ppt/notesSlides/notesSlide7.xml><?xml version="1.0" encoding="utf-8"?>
+<p:notes xmlns:a="http://schemas.openxmlformats.org/drawingml/2006/main" xmlns:r="http://schemas.openxmlformats.org/officeDocument/2006/relationships" xmlns:p="http://schemas.openxmlformats.org/presentationml/2006/main">
+  <p:cSld>
+    <p:spTree>
+      <p:nvGrpSpPr>
+        <p:cNvPr id="1" name=""/>
+        <p:cNvGrpSpPr/>
+        <p:nvPr/>
+      </p:nvGrpSpPr>
+      <p:grpSpPr>
+        <a:xfrm>
+          <a:off x="0" y="0"/>
+          <a:ext cx="0" cy="0"/>
+          <a:chOff x="0" y="0"/>
+          <a:chExt cx="0" cy="0"/>
+        </a:xfrm>
+      </p:grpSpPr>
+      <p:sp>
+        <p:nvSpPr>
+          <p:cNvPr id="2" name="Slide Image Placeholder 1"/>
+          <p:cNvSpPr>
+            <a:spLocks noGrp="1" noRot="1" noChangeAspect="1"/>
+          </p:cNvSpPr>
+          <p:nvPr>
+            <p:ph type="sldImg"/>
+          </p:nvPr>
+        </p:nvSpPr>
+        <p:spPr/>
+      </p:sp>
+      <p:sp>
+        <p:nvSpPr>
+          <p:cNvPr id="3" name="Notes Placeholder 2"/>
+          <p:cNvSpPr>
+            <a:spLocks noGrp="1"/>
+          </p:cNvSpPr>
+          <p:nvPr>
+            <p:ph type="body" idx="1"/>
+          </p:nvPr>
+        </p:nvSpPr>
+        <p:spPr/>
+        <p:txBody>
+          <a:bodyPr/>
+          <a:lstStyle/>
+          <a:p>
+            <a:endParaRPr lang="en-US" dirty="0"/>
+          </a:p>
+        </p:txBody>
+      </p:sp>
+      <p:sp>
+        <p:nvSpPr>
+          <p:cNvPr id="4" name="Slide Number Placeholder 3"/>
+          <p:cNvSpPr>
+            <a:spLocks noGrp="1"/>
+          </p:cNvSpPr>
+          <p:nvPr>
+            <p:ph type="sldNum" sz="quarter" idx="5"/>
+          </p:nvPr>
+        </p:nvSpPr>
+        <p:spPr/>
+        <p:txBody>
+          <a:bodyPr/>
+          <a:lstStyle/>
+          <a:p>
+            <a:fld id="{0837621E-2D94-4874-8D2F-F90746483814}" type="slidenum">
+              <a:rPr lang="en-US" smtClean="0"/>
+              <a:t>9</a:t>
+            </a:fld>
+            <a:endParaRPr lang="en-US" dirty="0"/>
+          </a:p>
+        </p:txBody>
+      </p:sp>
+    </p:spTree>
+    <p:extLst>
+      <p:ext uri="{BB962C8B-B14F-4D97-AF65-F5344CB8AC3E}">
+        <p14:creationId xmlns:p14="http://schemas.microsoft.com/office/powerpoint/2010/main" val="51153677"/>
+      </p:ext>
+    </p:extLst>
+  </p:cSld>
+  <p:clrMapOvr>
+    <a:masterClrMapping/>
+  </p:clrMapOvr>
+</p:notes>
+</file>
+
+<file path=ppt/notesSlides/notesSlide8.xml><?xml version="1.0" encoding="utf-8"?>
+<p:notes xmlns:a="http://schemas.openxmlformats.org/drawingml/2006/main" xmlns:r="http://schemas.openxmlformats.org/officeDocument/2006/relationships" xmlns:p="http://schemas.openxmlformats.org/presentationml/2006/main">
+  <p:cSld>
+    <p:spTree>
+      <p:nvGrpSpPr>
+        <p:cNvPr id="1" name=""/>
+        <p:cNvGrpSpPr/>
+        <p:nvPr/>
+      </p:nvGrpSpPr>
+      <p:grpSpPr>
+        <a:xfrm>
+          <a:off x="0" y="0"/>
+          <a:ext cx="0" cy="0"/>
+          <a:chOff x="0" y="0"/>
+          <a:chExt cx="0" cy="0"/>
+        </a:xfrm>
+      </p:grpSpPr>
+      <p:sp>
+        <p:nvSpPr>
+          <p:cNvPr id="2" name="Slide Image Placeholder 1"/>
+          <p:cNvSpPr>
+            <a:spLocks noGrp="1" noRot="1" noChangeAspect="1"/>
+          </p:cNvSpPr>
+          <p:nvPr>
+            <p:ph type="sldImg"/>
+          </p:nvPr>
+        </p:nvSpPr>
+        <p:spPr/>
+      </p:sp>
+      <p:sp>
+        <p:nvSpPr>
+          <p:cNvPr id="3" name="Notes Placeholder 2"/>
+          <p:cNvSpPr>
+            <a:spLocks noGrp="1"/>
+          </p:cNvSpPr>
+          <p:nvPr>
+            <p:ph type="body" idx="1"/>
+          </p:nvPr>
+        </p:nvSpPr>
+        <p:spPr/>
+        <p:txBody>
+          <a:bodyPr/>
+          <a:lstStyle/>
+          <a:p>
+            <a:endParaRPr lang="en-US" dirty="0"/>
+          </a:p>
+        </p:txBody>
+      </p:sp>
+      <p:sp>
+        <p:nvSpPr>
+          <p:cNvPr id="4" name="Slide Number Placeholder 3"/>
+          <p:cNvSpPr>
+            <a:spLocks noGrp="1"/>
+          </p:cNvSpPr>
+          <p:nvPr>
+            <p:ph type="sldNum" sz="quarter" idx="5"/>
+          </p:nvPr>
+        </p:nvSpPr>
+        <p:spPr/>
+        <p:txBody>
+          <a:bodyPr/>
+          <a:lstStyle/>
+          <a:p>
+            <a:fld id="{0837621E-2D94-4874-8D2F-F90746483814}" type="slidenum">
+              <a:rPr lang="en-US" smtClean="0"/>
+              <a:t>10</a:t>
+            </a:fld>
+            <a:endParaRPr lang="en-US" dirty="0"/>
+          </a:p>
+        </p:txBody>
+      </p:sp>
+    </p:spTree>
+    <p:extLst>
+      <p:ext uri="{BB962C8B-B14F-4D97-AF65-F5344CB8AC3E}">
+        <p14:creationId xmlns:p14="http://schemas.microsoft.com/office/powerpoint/2010/main" val="3728578688"/>
+      </p:ext>
+    </p:extLst>
+  </p:cSld>
+  <p:clrMapOvr>
+    <a:masterClrMapping/>
+  </p:clrMapOvr>
+</p:notes>
+</file>
+
+<file path=ppt/notesSlides/notesSlide9.xml><?xml version="1.0" encoding="utf-8"?>
+<p:notes xmlns:a="http://schemas.openxmlformats.org/drawingml/2006/main" xmlns:r="http://schemas.openxmlformats.org/officeDocument/2006/relationships" xmlns:p="http://schemas.openxmlformats.org/presentationml/2006/main">
+  <p:cSld>
+    <p:spTree>
+      <p:nvGrpSpPr>
+        <p:cNvPr id="1" name=""/>
+        <p:cNvGrpSpPr/>
+        <p:nvPr/>
+      </p:nvGrpSpPr>
+      <p:grpSpPr>
+        <a:xfrm>
+          <a:off x="0" y="0"/>
+          <a:ext cx="0" cy="0"/>
+          <a:chOff x="0" y="0"/>
+          <a:chExt cx="0" cy="0"/>
+        </a:xfrm>
+      </p:grpSpPr>
+      <p:sp>
+        <p:nvSpPr>
+          <p:cNvPr id="2" name="Slide Image Placeholder 1"/>
+          <p:cNvSpPr>
+            <a:spLocks noGrp="1" noRot="1" noChangeAspect="1"/>
+          </p:cNvSpPr>
+          <p:nvPr>
+            <p:ph type="sldImg"/>
+          </p:nvPr>
+        </p:nvSpPr>
+        <p:spPr/>
+      </p:sp>
+      <p:sp>
+        <p:nvSpPr>
+          <p:cNvPr id="3" name="Notes Placeholder 2"/>
+          <p:cNvSpPr>
+            <a:spLocks noGrp="1"/>
+          </p:cNvSpPr>
+          <p:nvPr>
+            <p:ph type="body" idx="1"/>
+          </p:nvPr>
+        </p:nvSpPr>
+        <p:spPr/>
+        <p:txBody>
+          <a:bodyPr/>
+          <a:lstStyle/>
+          <a:p>
+            <a:r>
+              <a:rPr lang="en-US" dirty="0"/>
+              <a:t>With a clean data set the data analysis phase can begin. </a:t>
+            </a:r>
+          </a:p>
+          <a:p>
+            <a:r>
+              <a:rPr lang="en-US" dirty="0"/>
+              <a:t>There are many modeling techniques that can be used to analyze data. </a:t>
+            </a:r>
+          </a:p>
+          <a:p>
+            <a:r>
+              <a:rPr lang="en-US" dirty="0"/>
+              <a:t>Supervised learning models use labeled input and output data.</a:t>
+            </a:r>
+          </a:p>
+          <a:p>
+            <a:r>
+              <a:rPr lang="en-US" dirty="0"/>
+              <a:t>We choose 4 supervised learning models: logistic regression, decision tree, random forest and naïve bayes.</a:t>
+            </a:r>
+          </a:p>
+          <a:p>
+            <a:endParaRPr lang="en-US" dirty="0"/>
+          </a:p>
+          <a:p>
+            <a:endParaRPr lang="en-US" dirty="0"/>
+          </a:p>
+        </p:txBody>
+      </p:sp>
+      <p:sp>
+        <p:nvSpPr>
+          <p:cNvPr id="4" name="Slide Number Placeholder 3"/>
+          <p:cNvSpPr>
+            <a:spLocks noGrp="1"/>
+          </p:cNvSpPr>
+          <p:nvPr>
+            <p:ph type="sldNum" sz="quarter" idx="5"/>
+          </p:nvPr>
+        </p:nvSpPr>
+        <p:spPr/>
+        <p:txBody>
+          <a:bodyPr/>
+          <a:lstStyle/>
+          <a:p>
+            <a:fld id="{0837621E-2D94-4874-8D2F-F90746483814}" type="slidenum">
+              <a:rPr lang="en-US" smtClean="0"/>
+              <a:t>11</a:t>
+            </a:fld>
+            <a:endParaRPr lang="en-US" dirty="0"/>
+          </a:p>
+        </p:txBody>
+      </p:sp>
+    </p:spTree>
+    <p:extLst>
+      <p:ext uri="{BB962C8B-B14F-4D97-AF65-F5344CB8AC3E}">
+        <p14:creationId xmlns:p14="http://schemas.microsoft.com/office/powerpoint/2010/main" val="2308451573"/>
       </p:ext>
     </p:extLst>
   </p:cSld>
@@ -734,7 +2447,7 @@
           <a:p>
             <a:fld id="{4AAD347D-5ACD-4C99-B74B-A9C85AD731AF}" type="datetimeFigureOut">
               <a:rPr lang="en-US" dirty="0"/>
-              <a:t>11/4/2021</a:t>
+              <a:t>11/7/2021</a:t>
             </a:fld>
             <a:endParaRPr lang="en-US" dirty="0"/>
           </a:p>
@@ -913,10 +2626,9 @@
           </a:lstStyle>
           <a:p>
             <a:r>
-              <a:rPr lang="en-US"/>
+              <a:rPr lang="en-US" dirty="0"/>
               <a:t>Click icon to add picture</a:t>
             </a:r>
-            <a:endParaRPr lang="en-US" dirty="0"/>
           </a:p>
         </p:txBody>
       </p:sp>
@@ -1004,7 +2716,7 @@
           <a:p>
             <a:fld id="{4509A250-FF31-4206-8172-F9D3106AACB1}" type="datetimeFigureOut">
               <a:rPr lang="en-US" dirty="0"/>
-              <a:t>11/4/2021</a:t>
+              <a:t>11/7/2021</a:t>
             </a:fld>
             <a:endParaRPr lang="en-US" dirty="0"/>
           </a:p>
@@ -1193,7 +2905,7 @@
           <a:p>
             <a:fld id="{4509A250-FF31-4206-8172-F9D3106AACB1}" type="datetimeFigureOut">
               <a:rPr lang="en-US" dirty="0"/>
-              <a:t>11/4/2021</a:t>
+              <a:t>11/7/2021</a:t>
             </a:fld>
             <a:endParaRPr lang="en-US" dirty="0"/>
           </a:p>
@@ -1456,7 +3168,7 @@
           <a:p>
             <a:fld id="{4509A250-FF31-4206-8172-F9D3106AACB1}" type="datetimeFigureOut">
               <a:rPr lang="en-US" dirty="0"/>
-              <a:t>11/4/2021</a:t>
+              <a:t>11/7/2021</a:t>
             </a:fld>
             <a:endParaRPr lang="en-US" dirty="0"/>
           </a:p>
@@ -1783,7 +3495,7 @@
           <a:p>
             <a:fld id="{4509A250-FF31-4206-8172-F9D3106AACB1}" type="datetimeFigureOut">
               <a:rPr lang="en-US" dirty="0"/>
-              <a:t>11/4/2021</a:t>
+              <a:t>11/7/2021</a:t>
             </a:fld>
             <a:endParaRPr lang="en-US" dirty="0"/>
           </a:p>
@@ -2388,7 +4100,7 @@
           <a:p>
             <a:fld id="{4509A250-FF31-4206-8172-F9D3106AACB1}" type="datetimeFigureOut">
               <a:rPr lang="en-US" dirty="0"/>
-              <a:t>11/4/2021</a:t>
+              <a:t>11/7/2021</a:t>
             </a:fld>
             <a:endParaRPr lang="en-US" dirty="0"/>
           </a:p>
@@ -2631,10 +4343,9 @@
           </a:lstStyle>
           <a:p>
             <a:r>
-              <a:rPr lang="en-US"/>
+              <a:rPr lang="en-US" dirty="0"/>
               <a:t>Click icon to add picture</a:t>
             </a:r>
-            <a:endParaRPr lang="en-US" dirty="0"/>
           </a:p>
         </p:txBody>
       </p:sp>
@@ -2848,10 +4559,9 @@
           </a:lstStyle>
           <a:p>
             <a:r>
-              <a:rPr lang="en-US"/>
+              <a:rPr lang="en-US" dirty="0"/>
               <a:t>Click icon to add picture</a:t>
             </a:r>
-            <a:endParaRPr lang="en-US" dirty="0"/>
           </a:p>
         </p:txBody>
       </p:sp>
@@ -3065,10 +4775,9 @@
           </a:lstStyle>
           <a:p>
             <a:r>
-              <a:rPr lang="en-US"/>
+              <a:rPr lang="en-US" dirty="0"/>
               <a:t>Click icon to add picture</a:t>
             </a:r>
-            <a:endParaRPr lang="en-US" dirty="0"/>
           </a:p>
         </p:txBody>
       </p:sp>
@@ -3230,7 +4939,7 @@
           <a:p>
             <a:fld id="{4509A250-FF31-4206-8172-F9D3106AACB1}" type="datetimeFigureOut">
               <a:rPr lang="en-US" dirty="0"/>
-              <a:t>11/4/2021</a:t>
+              <a:t>11/7/2021</a:t>
             </a:fld>
             <a:endParaRPr lang="en-US" dirty="0"/>
           </a:p>
@@ -3395,7 +5104,7 @@
           <a:p>
             <a:fld id="{4509A250-FF31-4206-8172-F9D3106AACB1}" type="datetimeFigureOut">
               <a:rPr lang="en-US" dirty="0"/>
-              <a:t>11/4/2021</a:t>
+              <a:t>11/7/2021</a:t>
             </a:fld>
             <a:endParaRPr lang="en-US" dirty="0"/>
           </a:p>
@@ -3570,7 +5279,7 @@
           <a:p>
             <a:fld id="{4509A250-FF31-4206-8172-F9D3106AACB1}" type="datetimeFigureOut">
               <a:rPr lang="en-US" dirty="0"/>
-              <a:t>11/4/2021</a:t>
+              <a:t>11/7/2021</a:t>
             </a:fld>
             <a:endParaRPr lang="en-US" dirty="0"/>
           </a:p>
@@ -3735,7 +5444,7 @@
           <a:p>
             <a:fld id="{4509A250-FF31-4206-8172-F9D3106AACB1}" type="datetimeFigureOut">
               <a:rPr lang="en-US" dirty="0"/>
-              <a:t>11/4/2021</a:t>
+              <a:t>11/7/2021</a:t>
             </a:fld>
             <a:endParaRPr lang="en-US" dirty="0"/>
           </a:p>
@@ -3974,7 +5683,7 @@
           <a:p>
             <a:fld id="{4509A250-FF31-4206-8172-F9D3106AACB1}" type="datetimeFigureOut">
               <a:rPr lang="en-US" dirty="0"/>
-              <a:t>11/4/2021</a:t>
+              <a:t>11/7/2021</a:t>
             </a:fld>
             <a:endParaRPr lang="en-US" dirty="0"/>
           </a:p>
@@ -4261,7 +5970,7 @@
           <a:p>
             <a:fld id="{4509A250-FF31-4206-8172-F9D3106AACB1}" type="datetimeFigureOut">
               <a:rPr lang="en-US" dirty="0"/>
-              <a:t>11/4/2021</a:t>
+              <a:t>11/7/2021</a:t>
             </a:fld>
             <a:endParaRPr lang="en-US" dirty="0"/>
           </a:p>
@@ -4694,7 +6403,7 @@
           <a:p>
             <a:fld id="{4509A250-FF31-4206-8172-F9D3106AACB1}" type="datetimeFigureOut">
               <a:rPr lang="en-US" dirty="0"/>
-              <a:t>11/4/2021</a:t>
+              <a:t>11/7/2021</a:t>
             </a:fld>
             <a:endParaRPr lang="en-US" dirty="0"/>
           </a:p>
@@ -4807,7 +6516,7 @@
           <a:p>
             <a:fld id="{4509A250-FF31-4206-8172-F9D3106AACB1}" type="datetimeFigureOut">
               <a:rPr lang="en-US" dirty="0"/>
-              <a:t>11/4/2021</a:t>
+              <a:t>11/7/2021</a:t>
             </a:fld>
             <a:endParaRPr lang="en-US" dirty="0"/>
           </a:p>
@@ -4897,7 +6606,7 @@
           <a:p>
             <a:fld id="{4509A250-FF31-4206-8172-F9D3106AACB1}" type="datetimeFigureOut">
               <a:rPr lang="en-US" dirty="0"/>
-              <a:t>11/4/2021</a:t>
+              <a:t>11/7/2021</a:t>
             </a:fld>
             <a:endParaRPr lang="en-US" dirty="0"/>
           </a:p>
@@ -5171,7 +6880,7 @@
           <a:p>
             <a:fld id="{4509A250-FF31-4206-8172-F9D3106AACB1}" type="datetimeFigureOut">
               <a:rPr lang="en-US" dirty="0"/>
-              <a:t>11/4/2021</a:t>
+              <a:t>11/7/2021</a:t>
             </a:fld>
             <a:endParaRPr lang="en-US" dirty="0"/>
           </a:p>
@@ -5350,10 +7059,9 @@
           </a:lstStyle>
           <a:p>
             <a:r>
-              <a:rPr lang="en-US"/>
+              <a:rPr lang="en-US" dirty="0"/>
               <a:t>Click icon to add picture</a:t>
             </a:r>
-            <a:endParaRPr lang="en-US" dirty="0"/>
           </a:p>
         </p:txBody>
       </p:sp>
@@ -5441,7 +7149,7 @@
           <a:p>
             <a:fld id="{4509A250-FF31-4206-8172-F9D3106AACB1}" type="datetimeFigureOut">
               <a:rPr lang="en-US" dirty="0"/>
-              <a:t>11/4/2021</a:t>
+              <a:t>11/7/2021</a:t>
             </a:fld>
             <a:endParaRPr lang="en-US" dirty="0"/>
           </a:p>
@@ -5865,7 +7573,7 @@
           <a:p>
             <a:fld id="{4509A250-FF31-4206-8172-F9D3106AACB1}" type="datetimeFigureOut">
               <a:rPr lang="en-US" dirty="0"/>
-              <a:t>11/4/2021</a:t>
+              <a:t>11/7/2021</a:t>
             </a:fld>
             <a:endParaRPr lang="en-US" dirty="0"/>
           </a:p>
@@ -6380,8 +8088,8 @@
         </p:nvSpPr>
         <p:spPr>
           <a:xfrm>
-            <a:off x="1154955" y="1447800"/>
-            <a:ext cx="8825658" cy="2790713"/>
+            <a:off x="864348" y="638287"/>
+            <a:ext cx="10463304" cy="2944009"/>
           </a:xfrm>
         </p:spPr>
         <p:txBody>
@@ -6413,7 +8121,7 @@
         </p:nvSpPr>
         <p:spPr>
           <a:xfrm>
-            <a:off x="1154955" y="4238513"/>
+            <a:off x="982832" y="4195482"/>
             <a:ext cx="8825658" cy="1400287"/>
           </a:xfrm>
         </p:spPr>
@@ -6429,33 +8137,13 @@
           <a:p>
             <a:r>
               <a:rPr lang="en-US" dirty="0"/>
-              <a:t>Frank Sullivan, jade bible, john </a:t>
-            </a:r>
-            <a:r>
-              <a:rPr lang="en-US" dirty="0" err="1"/>
-              <a:t>setzer</a:t>
-            </a:r>
-            <a:r>
-              <a:rPr lang="en-US" dirty="0"/>
-              <a:t>,</a:t>
-            </a:r>
-          </a:p>
-          <a:p>
-            <a:r>
-              <a:rPr lang="en-US" dirty="0" err="1"/>
-              <a:t>morgan</a:t>
-            </a:r>
-            <a:r>
-              <a:rPr lang="en-US" dirty="0"/>
-              <a:t> </a:t>
-            </a:r>
-            <a:r>
-              <a:rPr lang="en-US" dirty="0" err="1"/>
-              <a:t>behr</a:t>
-            </a:r>
-            <a:r>
-              <a:rPr lang="en-US" dirty="0"/>
-              <a:t>, summer bell</a:t>
+              <a:t>Frank Sullivan, jade bible, john setzer,</a:t>
+            </a:r>
+          </a:p>
+          <a:p>
+            <a:r>
+              <a:rPr lang="en-US" dirty="0"/>
+              <a:t>morgan behr, summer bell</a:t>
             </a:r>
           </a:p>
           <a:p>
@@ -6473,6 +8161,1490 @@
     <p:extLst>
       <p:ext uri="{BB962C8B-B14F-4D97-AF65-F5344CB8AC3E}">
         <p14:creationId xmlns:p14="http://schemas.microsoft.com/office/powerpoint/2010/main" val="536422157"/>
+      </p:ext>
+    </p:extLst>
+  </p:cSld>
+  <p:clrMapOvr>
+    <a:masterClrMapping/>
+  </p:clrMapOvr>
+</p:sld>
+</file>
+
+<file path=ppt/slides/slide10.xml><?xml version="1.0" encoding="utf-8"?>
+<p:sld xmlns:a="http://schemas.openxmlformats.org/drawingml/2006/main" xmlns:r="http://schemas.openxmlformats.org/officeDocument/2006/relationships" xmlns:p="http://schemas.openxmlformats.org/presentationml/2006/main">
+  <p:cSld>
+    <p:spTree>
+      <p:nvGrpSpPr>
+        <p:cNvPr id="1" name=""/>
+        <p:cNvGrpSpPr/>
+        <p:nvPr/>
+      </p:nvGrpSpPr>
+      <p:grpSpPr>
+        <a:xfrm>
+          <a:off x="0" y="0"/>
+          <a:ext cx="0" cy="0"/>
+          <a:chOff x="0" y="0"/>
+          <a:chExt cx="0" cy="0"/>
+        </a:xfrm>
+      </p:grpSpPr>
+      <p:sp>
+        <p:nvSpPr>
+          <p:cNvPr id="2" name="Title 1">
+            <a:extLst>
+              <a:ext uri="{FF2B5EF4-FFF2-40B4-BE49-F238E27FC236}">
+                <a16:creationId xmlns:a16="http://schemas.microsoft.com/office/drawing/2014/main" id="{52A2E9C3-F530-467F-91D5-B565842DB174}"/>
+              </a:ext>
+            </a:extLst>
+          </p:cNvPr>
+          <p:cNvSpPr>
+            <a:spLocks noGrp="1"/>
+          </p:cNvSpPr>
+          <p:nvPr>
+            <p:ph type="title"/>
+          </p:nvPr>
+        </p:nvSpPr>
+        <p:spPr/>
+        <p:txBody>
+          <a:bodyPr/>
+          <a:lstStyle/>
+          <a:p>
+            <a:r>
+              <a:rPr lang="en-US" dirty="0"/>
+              <a:t>Database - pgAdmin </a:t>
+            </a:r>
+            <a:br>
+              <a:rPr lang="en-US" dirty="0"/>
+            </a:br>
+            <a:endParaRPr lang="en-US" dirty="0"/>
+          </a:p>
+        </p:txBody>
+      </p:sp>
+      <p:pic>
+        <p:nvPicPr>
+          <p:cNvPr id="4" name="Picture 3">
+            <a:extLst>
+              <a:ext uri="{FF2B5EF4-FFF2-40B4-BE49-F238E27FC236}">
+                <a16:creationId xmlns:a16="http://schemas.microsoft.com/office/drawing/2014/main" id="{0AC9D65A-834E-4CD7-84F5-768446241EA0}"/>
+              </a:ext>
+            </a:extLst>
+          </p:cNvPr>
+          <p:cNvPicPr>
+            <a:picLocks noChangeAspect="1"/>
+          </p:cNvPicPr>
+          <p:nvPr/>
+        </p:nvPicPr>
+        <p:blipFill>
+          <a:blip r:embed="rId3"/>
+          <a:stretch>
+            <a:fillRect/>
+          </a:stretch>
+        </p:blipFill>
+        <p:spPr>
+          <a:xfrm>
+            <a:off x="724343" y="1593333"/>
+            <a:ext cx="5750885" cy="4531457"/>
+          </a:xfrm>
+          <a:prstGeom prst="rect">
+            <a:avLst/>
+          </a:prstGeom>
+        </p:spPr>
+      </p:pic>
+    </p:spTree>
+    <p:extLst>
+      <p:ext uri="{BB962C8B-B14F-4D97-AF65-F5344CB8AC3E}">
+        <p14:creationId xmlns:p14="http://schemas.microsoft.com/office/powerpoint/2010/main" val="1507510308"/>
+      </p:ext>
+    </p:extLst>
+  </p:cSld>
+  <p:clrMapOvr>
+    <a:masterClrMapping/>
+  </p:clrMapOvr>
+</p:sld>
+</file>
+
+<file path=ppt/slides/slide11.xml><?xml version="1.0" encoding="utf-8"?>
+<p:sld xmlns:a="http://schemas.openxmlformats.org/drawingml/2006/main" xmlns:r="http://schemas.openxmlformats.org/officeDocument/2006/relationships" xmlns:p="http://schemas.openxmlformats.org/presentationml/2006/main">
+  <p:cSld>
+    <p:spTree>
+      <p:nvGrpSpPr>
+        <p:cNvPr id="1" name=""/>
+        <p:cNvGrpSpPr/>
+        <p:nvPr/>
+      </p:nvGrpSpPr>
+      <p:grpSpPr>
+        <a:xfrm>
+          <a:off x="0" y="0"/>
+          <a:ext cx="0" cy="0"/>
+          <a:chOff x="0" y="0"/>
+          <a:chExt cx="0" cy="0"/>
+        </a:xfrm>
+      </p:grpSpPr>
+      <p:sp>
+        <p:nvSpPr>
+          <p:cNvPr id="2" name="Title 1">
+            <a:extLst>
+              <a:ext uri="{FF2B5EF4-FFF2-40B4-BE49-F238E27FC236}">
+                <a16:creationId xmlns:a16="http://schemas.microsoft.com/office/drawing/2014/main" id="{D758362C-ABAD-4436-8BB9-062BA36322E7}"/>
+              </a:ext>
+            </a:extLst>
+          </p:cNvPr>
+          <p:cNvSpPr>
+            <a:spLocks noGrp="1"/>
+          </p:cNvSpPr>
+          <p:nvPr>
+            <p:ph type="title"/>
+          </p:nvPr>
+        </p:nvSpPr>
+        <p:spPr/>
+        <p:txBody>
+          <a:bodyPr/>
+          <a:lstStyle/>
+          <a:p>
+            <a:r>
+              <a:rPr lang="en-US" dirty="0"/>
+              <a:t>Data Analysis Phase</a:t>
+            </a:r>
+          </a:p>
+        </p:txBody>
+      </p:sp>
+      <p:sp>
+        <p:nvSpPr>
+          <p:cNvPr id="3" name="Content Placeholder 2">
+            <a:extLst>
+              <a:ext uri="{FF2B5EF4-FFF2-40B4-BE49-F238E27FC236}">
+                <a16:creationId xmlns:a16="http://schemas.microsoft.com/office/drawing/2014/main" id="{8B2325B3-2749-4BDA-A7F6-36A97F538A10}"/>
+              </a:ext>
+            </a:extLst>
+          </p:cNvPr>
+          <p:cNvSpPr>
+            <a:spLocks noGrp="1"/>
+          </p:cNvSpPr>
+          <p:nvPr>
+            <p:ph idx="1"/>
+          </p:nvPr>
+        </p:nvSpPr>
+        <p:spPr/>
+        <p:txBody>
+          <a:bodyPr/>
+          <a:lstStyle/>
+          <a:p>
+            <a:r>
+              <a:rPr lang="en-US" dirty="0"/>
+              <a:t>Supervised Learning Models:</a:t>
+            </a:r>
+          </a:p>
+          <a:p>
+            <a:pPr lvl="1" indent="-342900">
+              <a:buAutoNum type="arabicPeriod"/>
+            </a:pPr>
+            <a:r>
+              <a:rPr lang="en-US" dirty="0"/>
+              <a:t>Logistic Regression</a:t>
+            </a:r>
+          </a:p>
+          <a:p>
+            <a:pPr lvl="1" indent="-342900">
+              <a:buAutoNum type="arabicPeriod"/>
+            </a:pPr>
+            <a:r>
+              <a:rPr lang="en-US" dirty="0"/>
+              <a:t>Decision Tree</a:t>
+            </a:r>
+          </a:p>
+          <a:p>
+            <a:pPr lvl="1" indent="-342900">
+              <a:buAutoNum type="arabicPeriod"/>
+            </a:pPr>
+            <a:r>
+              <a:rPr lang="en-US" dirty="0"/>
+              <a:t>Random Forest</a:t>
+            </a:r>
+          </a:p>
+          <a:p>
+            <a:pPr lvl="1" indent="-342900">
+              <a:buAutoNum type="arabicPeriod"/>
+            </a:pPr>
+            <a:r>
+              <a:rPr lang="en-US" dirty="0"/>
+              <a:t>Naïve Bayes</a:t>
+            </a:r>
+          </a:p>
+        </p:txBody>
+      </p:sp>
+    </p:spTree>
+    <p:extLst>
+      <p:ext uri="{BB962C8B-B14F-4D97-AF65-F5344CB8AC3E}">
+        <p14:creationId xmlns:p14="http://schemas.microsoft.com/office/powerpoint/2010/main" val="2883907546"/>
+      </p:ext>
+    </p:extLst>
+  </p:cSld>
+  <p:clrMapOvr>
+    <a:masterClrMapping/>
+  </p:clrMapOvr>
+</p:sld>
+</file>
+
+<file path=ppt/slides/slide12.xml><?xml version="1.0" encoding="utf-8"?>
+<p:sld xmlns:a="http://schemas.openxmlformats.org/drawingml/2006/main" xmlns:r="http://schemas.openxmlformats.org/officeDocument/2006/relationships" xmlns:p="http://schemas.openxmlformats.org/presentationml/2006/main">
+  <p:cSld>
+    <p:spTree>
+      <p:nvGrpSpPr>
+        <p:cNvPr id="1" name=""/>
+        <p:cNvGrpSpPr/>
+        <p:nvPr/>
+      </p:nvGrpSpPr>
+      <p:grpSpPr>
+        <a:xfrm>
+          <a:off x="0" y="0"/>
+          <a:ext cx="0" cy="0"/>
+          <a:chOff x="0" y="0"/>
+          <a:chExt cx="0" cy="0"/>
+        </a:xfrm>
+      </p:grpSpPr>
+      <p:sp>
+        <p:nvSpPr>
+          <p:cNvPr id="2" name="Title 1">
+            <a:extLst>
+              <a:ext uri="{FF2B5EF4-FFF2-40B4-BE49-F238E27FC236}">
+                <a16:creationId xmlns:a16="http://schemas.microsoft.com/office/drawing/2014/main" id="{6E28F757-57B2-4B04-9283-FA574FD47DA1}"/>
+              </a:ext>
+            </a:extLst>
+          </p:cNvPr>
+          <p:cNvSpPr>
+            <a:spLocks noGrp="1"/>
+          </p:cNvSpPr>
+          <p:nvPr>
+            <p:ph type="title"/>
+          </p:nvPr>
+        </p:nvSpPr>
+        <p:spPr/>
+        <p:txBody>
+          <a:bodyPr/>
+          <a:lstStyle/>
+          <a:p>
+            <a:r>
+              <a:rPr lang="en-US" dirty="0"/>
+              <a:t>Machine Learning – Logistical Regression</a:t>
+            </a:r>
+          </a:p>
+        </p:txBody>
+      </p:sp>
+      <p:sp>
+        <p:nvSpPr>
+          <p:cNvPr id="3" name="Content Placeholder 2">
+            <a:extLst>
+              <a:ext uri="{FF2B5EF4-FFF2-40B4-BE49-F238E27FC236}">
+                <a16:creationId xmlns:a16="http://schemas.microsoft.com/office/drawing/2014/main" id="{0B8C2DD4-FE9F-4DB0-A174-04A3B52DE626}"/>
+              </a:ext>
+            </a:extLst>
+          </p:cNvPr>
+          <p:cNvSpPr>
+            <a:spLocks noGrp="1"/>
+          </p:cNvSpPr>
+          <p:nvPr>
+            <p:ph idx="1"/>
+          </p:nvPr>
+        </p:nvSpPr>
+        <p:spPr/>
+        <p:txBody>
+          <a:bodyPr/>
+          <a:lstStyle/>
+          <a:p>
+            <a:r>
+              <a:rPr lang="en-US" dirty="0"/>
+              <a:t>Benefits</a:t>
+            </a:r>
+          </a:p>
+          <a:p>
+            <a:pPr lvl="1"/>
+            <a:r>
+              <a:rPr lang="en-US" dirty="0"/>
+              <a:t>Good for binary datasets</a:t>
+            </a:r>
+          </a:p>
+          <a:p>
+            <a:pPr lvl="1"/>
+            <a:r>
+              <a:rPr lang="en-US" dirty="0"/>
+              <a:t>Less inclined to overfit</a:t>
+            </a:r>
+          </a:p>
+          <a:p>
+            <a:endParaRPr lang="en-US" dirty="0"/>
+          </a:p>
+          <a:p>
+            <a:pPr marL="0" indent="0">
+              <a:buNone/>
+            </a:pPr>
+            <a:endParaRPr lang="en-US" dirty="0"/>
+          </a:p>
+          <a:p>
+            <a:r>
+              <a:rPr lang="en-US" dirty="0"/>
+              <a:t>Limitations</a:t>
+            </a:r>
+          </a:p>
+          <a:p>
+            <a:pPr lvl="1"/>
+            <a:r>
+              <a:rPr lang="en-US" dirty="0"/>
+              <a:t>Requires a large sample size</a:t>
+            </a:r>
+          </a:p>
+        </p:txBody>
+      </p:sp>
+    </p:spTree>
+    <p:extLst>
+      <p:ext uri="{BB962C8B-B14F-4D97-AF65-F5344CB8AC3E}">
+        <p14:creationId xmlns:p14="http://schemas.microsoft.com/office/powerpoint/2010/main" val="1953016850"/>
+      </p:ext>
+    </p:extLst>
+  </p:cSld>
+  <p:clrMapOvr>
+    <a:masterClrMapping/>
+  </p:clrMapOvr>
+</p:sld>
+</file>
+
+<file path=ppt/slides/slide13.xml><?xml version="1.0" encoding="utf-8"?>
+<p:sld xmlns:a="http://schemas.openxmlformats.org/drawingml/2006/main" xmlns:r="http://schemas.openxmlformats.org/officeDocument/2006/relationships" xmlns:p="http://schemas.openxmlformats.org/presentationml/2006/main">
+  <p:cSld>
+    <p:spTree>
+      <p:nvGrpSpPr>
+        <p:cNvPr id="1" name=""/>
+        <p:cNvGrpSpPr/>
+        <p:nvPr/>
+      </p:nvGrpSpPr>
+      <p:grpSpPr>
+        <a:xfrm>
+          <a:off x="0" y="0"/>
+          <a:ext cx="0" cy="0"/>
+          <a:chOff x="0" y="0"/>
+          <a:chExt cx="0" cy="0"/>
+        </a:xfrm>
+      </p:grpSpPr>
+      <p:sp>
+        <p:nvSpPr>
+          <p:cNvPr id="2" name="Title 1">
+            <a:extLst>
+              <a:ext uri="{FF2B5EF4-FFF2-40B4-BE49-F238E27FC236}">
+                <a16:creationId xmlns:a16="http://schemas.microsoft.com/office/drawing/2014/main" id="{6E28F757-57B2-4B04-9283-FA574FD47DA1}"/>
+              </a:ext>
+            </a:extLst>
+          </p:cNvPr>
+          <p:cNvSpPr>
+            <a:spLocks noGrp="1"/>
+          </p:cNvSpPr>
+          <p:nvPr>
+            <p:ph type="title"/>
+          </p:nvPr>
+        </p:nvSpPr>
+        <p:spPr/>
+        <p:txBody>
+          <a:bodyPr/>
+          <a:lstStyle/>
+          <a:p>
+            <a:r>
+              <a:rPr lang="en-US" dirty="0"/>
+              <a:t>Machine Learning – Decision Tree</a:t>
+            </a:r>
+          </a:p>
+        </p:txBody>
+      </p:sp>
+      <p:sp>
+        <p:nvSpPr>
+          <p:cNvPr id="3" name="Content Placeholder 2">
+            <a:extLst>
+              <a:ext uri="{FF2B5EF4-FFF2-40B4-BE49-F238E27FC236}">
+                <a16:creationId xmlns:a16="http://schemas.microsoft.com/office/drawing/2014/main" id="{0B8C2DD4-FE9F-4DB0-A174-04A3B52DE626}"/>
+              </a:ext>
+            </a:extLst>
+          </p:cNvPr>
+          <p:cNvSpPr>
+            <a:spLocks noGrp="1"/>
+          </p:cNvSpPr>
+          <p:nvPr>
+            <p:ph idx="1"/>
+          </p:nvPr>
+        </p:nvSpPr>
+        <p:spPr/>
+        <p:txBody>
+          <a:bodyPr/>
+          <a:lstStyle/>
+          <a:p>
+            <a:r>
+              <a:rPr lang="en-US" dirty="0"/>
+              <a:t>Benefits</a:t>
+            </a:r>
+          </a:p>
+          <a:p>
+            <a:pPr lvl="1"/>
+            <a:r>
+              <a:rPr lang="en-US" dirty="0"/>
+              <a:t>Less data preparation effort</a:t>
+            </a:r>
+          </a:p>
+          <a:p>
+            <a:pPr lvl="1"/>
+            <a:r>
+              <a:rPr lang="en-US" dirty="0"/>
+              <a:t>Intuitive and easy to explain</a:t>
+            </a:r>
+          </a:p>
+          <a:p>
+            <a:endParaRPr lang="en-US" dirty="0"/>
+          </a:p>
+          <a:p>
+            <a:r>
+              <a:rPr lang="en-US" dirty="0"/>
+              <a:t>Limitations</a:t>
+            </a:r>
+          </a:p>
+          <a:p>
+            <a:pPr lvl="1"/>
+            <a:r>
+              <a:rPr lang="en-US" dirty="0"/>
+              <a:t>Small changes in data can cause large changes in structure</a:t>
+            </a:r>
+          </a:p>
+          <a:p>
+            <a:pPr lvl="1"/>
+            <a:r>
+              <a:rPr lang="en-US" dirty="0"/>
+              <a:t>More significant model training time</a:t>
+            </a:r>
+          </a:p>
+        </p:txBody>
+      </p:sp>
+    </p:spTree>
+    <p:extLst>
+      <p:ext uri="{BB962C8B-B14F-4D97-AF65-F5344CB8AC3E}">
+        <p14:creationId xmlns:p14="http://schemas.microsoft.com/office/powerpoint/2010/main" val="279358244"/>
+      </p:ext>
+    </p:extLst>
+  </p:cSld>
+  <p:clrMapOvr>
+    <a:masterClrMapping/>
+  </p:clrMapOvr>
+</p:sld>
+</file>
+
+<file path=ppt/slides/slide14.xml><?xml version="1.0" encoding="utf-8"?>
+<p:sld xmlns:a="http://schemas.openxmlformats.org/drawingml/2006/main" xmlns:r="http://schemas.openxmlformats.org/officeDocument/2006/relationships" xmlns:p="http://schemas.openxmlformats.org/presentationml/2006/main">
+  <p:cSld>
+    <p:spTree>
+      <p:nvGrpSpPr>
+        <p:cNvPr id="1" name=""/>
+        <p:cNvGrpSpPr/>
+        <p:nvPr/>
+      </p:nvGrpSpPr>
+      <p:grpSpPr>
+        <a:xfrm>
+          <a:off x="0" y="0"/>
+          <a:ext cx="0" cy="0"/>
+          <a:chOff x="0" y="0"/>
+          <a:chExt cx="0" cy="0"/>
+        </a:xfrm>
+      </p:grpSpPr>
+      <p:sp>
+        <p:nvSpPr>
+          <p:cNvPr id="2" name="Title 1">
+            <a:extLst>
+              <a:ext uri="{FF2B5EF4-FFF2-40B4-BE49-F238E27FC236}">
+                <a16:creationId xmlns:a16="http://schemas.microsoft.com/office/drawing/2014/main" id="{6E28F757-57B2-4B04-9283-FA574FD47DA1}"/>
+              </a:ext>
+            </a:extLst>
+          </p:cNvPr>
+          <p:cNvSpPr>
+            <a:spLocks noGrp="1"/>
+          </p:cNvSpPr>
+          <p:nvPr>
+            <p:ph type="title"/>
+          </p:nvPr>
+        </p:nvSpPr>
+        <p:spPr/>
+        <p:txBody>
+          <a:bodyPr/>
+          <a:lstStyle/>
+          <a:p>
+            <a:r>
+              <a:rPr lang="en-US" dirty="0"/>
+              <a:t>Machine Learning – Random Forest</a:t>
+            </a:r>
+          </a:p>
+        </p:txBody>
+      </p:sp>
+      <p:sp>
+        <p:nvSpPr>
+          <p:cNvPr id="3" name="Content Placeholder 2">
+            <a:extLst>
+              <a:ext uri="{FF2B5EF4-FFF2-40B4-BE49-F238E27FC236}">
+                <a16:creationId xmlns:a16="http://schemas.microsoft.com/office/drawing/2014/main" id="{0B8C2DD4-FE9F-4DB0-A174-04A3B52DE626}"/>
+              </a:ext>
+            </a:extLst>
+          </p:cNvPr>
+          <p:cNvSpPr>
+            <a:spLocks noGrp="1"/>
+          </p:cNvSpPr>
+          <p:nvPr>
+            <p:ph idx="1"/>
+          </p:nvPr>
+        </p:nvSpPr>
+        <p:spPr/>
+        <p:txBody>
+          <a:bodyPr/>
+          <a:lstStyle/>
+          <a:p>
+            <a:r>
+              <a:rPr lang="en-US" dirty="0"/>
+              <a:t>Benefits</a:t>
+            </a:r>
+          </a:p>
+          <a:p>
+            <a:pPr lvl="1"/>
+            <a:r>
+              <a:rPr lang="en-US" dirty="0"/>
+              <a:t>Reduced chance of overfitting</a:t>
+            </a:r>
+          </a:p>
+          <a:p>
+            <a:pPr lvl="1"/>
+            <a:r>
+              <a:rPr lang="en-US" dirty="0"/>
+              <a:t>Primarily used for classification</a:t>
+            </a:r>
+          </a:p>
+          <a:p>
+            <a:pPr lvl="1"/>
+            <a:r>
+              <a:rPr lang="en-US" dirty="0"/>
+              <a:t>Flexible and possess high accuracy</a:t>
+            </a:r>
+          </a:p>
+          <a:p>
+            <a:pPr lvl="1"/>
+            <a:r>
+              <a:rPr lang="en-US" dirty="0"/>
+              <a:t>Work well for a large range of data items</a:t>
+            </a:r>
+          </a:p>
+          <a:p>
+            <a:endParaRPr lang="en-US" dirty="0"/>
+          </a:p>
+          <a:p>
+            <a:r>
+              <a:rPr lang="en-US" dirty="0"/>
+              <a:t>Limitations</a:t>
+            </a:r>
+          </a:p>
+          <a:p>
+            <a:pPr lvl="1"/>
+            <a:r>
+              <a:rPr lang="en-US" dirty="0"/>
+              <a:t>Complexity</a:t>
+            </a:r>
+          </a:p>
+          <a:p>
+            <a:pPr lvl="1"/>
+            <a:r>
+              <a:rPr lang="en-US" dirty="0"/>
+              <a:t>Time consuming</a:t>
+            </a:r>
+          </a:p>
+        </p:txBody>
+      </p:sp>
+    </p:spTree>
+    <p:extLst>
+      <p:ext uri="{BB962C8B-B14F-4D97-AF65-F5344CB8AC3E}">
+        <p14:creationId xmlns:p14="http://schemas.microsoft.com/office/powerpoint/2010/main" val="1912035148"/>
+      </p:ext>
+    </p:extLst>
+  </p:cSld>
+  <p:clrMapOvr>
+    <a:masterClrMapping/>
+  </p:clrMapOvr>
+</p:sld>
+</file>
+
+<file path=ppt/slides/slide15.xml><?xml version="1.0" encoding="utf-8"?>
+<p:sld xmlns:a="http://schemas.openxmlformats.org/drawingml/2006/main" xmlns:r="http://schemas.openxmlformats.org/officeDocument/2006/relationships" xmlns:p="http://schemas.openxmlformats.org/presentationml/2006/main">
+  <p:cSld>
+    <p:spTree>
+      <p:nvGrpSpPr>
+        <p:cNvPr id="1" name=""/>
+        <p:cNvGrpSpPr/>
+        <p:nvPr/>
+      </p:nvGrpSpPr>
+      <p:grpSpPr>
+        <a:xfrm>
+          <a:off x="0" y="0"/>
+          <a:ext cx="0" cy="0"/>
+          <a:chOff x="0" y="0"/>
+          <a:chExt cx="0" cy="0"/>
+        </a:xfrm>
+      </p:grpSpPr>
+      <p:sp>
+        <p:nvSpPr>
+          <p:cNvPr id="2" name="Title 1">
+            <a:extLst>
+              <a:ext uri="{FF2B5EF4-FFF2-40B4-BE49-F238E27FC236}">
+                <a16:creationId xmlns:a16="http://schemas.microsoft.com/office/drawing/2014/main" id="{6E28F757-57B2-4B04-9283-FA574FD47DA1}"/>
+              </a:ext>
+            </a:extLst>
+          </p:cNvPr>
+          <p:cNvSpPr>
+            <a:spLocks noGrp="1"/>
+          </p:cNvSpPr>
+          <p:nvPr>
+            <p:ph type="title"/>
+          </p:nvPr>
+        </p:nvSpPr>
+        <p:spPr/>
+        <p:txBody>
+          <a:bodyPr/>
+          <a:lstStyle/>
+          <a:p>
+            <a:r>
+              <a:rPr lang="en-US" dirty="0"/>
+              <a:t>Machine Learning – Naïve Bayes</a:t>
+            </a:r>
+          </a:p>
+        </p:txBody>
+      </p:sp>
+      <p:sp>
+        <p:nvSpPr>
+          <p:cNvPr id="3" name="Content Placeholder 2">
+            <a:extLst>
+              <a:ext uri="{FF2B5EF4-FFF2-40B4-BE49-F238E27FC236}">
+                <a16:creationId xmlns:a16="http://schemas.microsoft.com/office/drawing/2014/main" id="{0B8C2DD4-FE9F-4DB0-A174-04A3B52DE626}"/>
+              </a:ext>
+            </a:extLst>
+          </p:cNvPr>
+          <p:cNvSpPr>
+            <a:spLocks noGrp="1"/>
+          </p:cNvSpPr>
+          <p:nvPr>
+            <p:ph idx="1"/>
+          </p:nvPr>
+        </p:nvSpPr>
+        <p:spPr/>
+        <p:txBody>
+          <a:bodyPr/>
+          <a:lstStyle/>
+          <a:p>
+            <a:r>
+              <a:rPr lang="en-US" dirty="0"/>
+              <a:t>Benefits</a:t>
+            </a:r>
+          </a:p>
+          <a:p>
+            <a:pPr lvl="1"/>
+            <a:r>
+              <a:rPr lang="en-US" dirty="0"/>
+              <a:t>Straight-forward algorithm</a:t>
+            </a:r>
+          </a:p>
+          <a:p>
+            <a:pPr lvl="1"/>
+            <a:r>
+              <a:rPr lang="en-US" dirty="0"/>
+              <a:t>Low risk of overfitting</a:t>
+            </a:r>
+          </a:p>
+          <a:p>
+            <a:endParaRPr lang="en-US" dirty="0"/>
+          </a:p>
+          <a:p>
+            <a:r>
+              <a:rPr lang="en-US" dirty="0"/>
+              <a:t>Limitations</a:t>
+            </a:r>
+          </a:p>
+          <a:p>
+            <a:pPr lvl="1"/>
+            <a:r>
+              <a:rPr lang="en-US" dirty="0"/>
+              <a:t>Not ideal for data with complex features</a:t>
+            </a:r>
+          </a:p>
+          <a:p>
+            <a:pPr lvl="1"/>
+            <a:r>
+              <a:rPr lang="en-US" dirty="0"/>
+              <a:t>Biased nature</a:t>
+            </a:r>
+          </a:p>
+        </p:txBody>
+      </p:sp>
+    </p:spTree>
+    <p:extLst>
+      <p:ext uri="{BB962C8B-B14F-4D97-AF65-F5344CB8AC3E}">
+        <p14:creationId xmlns:p14="http://schemas.microsoft.com/office/powerpoint/2010/main" val="2246024886"/>
+      </p:ext>
+    </p:extLst>
+  </p:cSld>
+  <p:clrMapOvr>
+    <a:masterClrMapping/>
+  </p:clrMapOvr>
+</p:sld>
+</file>
+
+<file path=ppt/slides/slide16.xml><?xml version="1.0" encoding="utf-8"?>
+<p:sld xmlns:a="http://schemas.openxmlformats.org/drawingml/2006/main" xmlns:r="http://schemas.openxmlformats.org/officeDocument/2006/relationships" xmlns:p="http://schemas.openxmlformats.org/presentationml/2006/main">
+  <p:cSld>
+    <p:spTree>
+      <p:nvGrpSpPr>
+        <p:cNvPr id="1" name=""/>
+        <p:cNvGrpSpPr/>
+        <p:nvPr/>
+      </p:nvGrpSpPr>
+      <p:grpSpPr>
+        <a:xfrm>
+          <a:off x="0" y="0"/>
+          <a:ext cx="0" cy="0"/>
+          <a:chOff x="0" y="0"/>
+          <a:chExt cx="0" cy="0"/>
+        </a:xfrm>
+      </p:grpSpPr>
+      <p:sp>
+        <p:nvSpPr>
+          <p:cNvPr id="2" name="Title 1">
+            <a:extLst>
+              <a:ext uri="{FF2B5EF4-FFF2-40B4-BE49-F238E27FC236}">
+                <a16:creationId xmlns:a16="http://schemas.microsoft.com/office/drawing/2014/main" id="{26ABED05-BFD0-448C-ADE8-E912DD36F457}"/>
+              </a:ext>
+            </a:extLst>
+          </p:cNvPr>
+          <p:cNvSpPr>
+            <a:spLocks noGrp="1"/>
+          </p:cNvSpPr>
+          <p:nvPr>
+            <p:ph type="title"/>
+          </p:nvPr>
+        </p:nvSpPr>
+        <p:spPr/>
+        <p:txBody>
+          <a:bodyPr/>
+          <a:lstStyle/>
+          <a:p>
+            <a:r>
+              <a:rPr lang="en-US" dirty="0"/>
+              <a:t>Test Patient 1</a:t>
+            </a:r>
+          </a:p>
+        </p:txBody>
+      </p:sp>
+      <p:sp>
+        <p:nvSpPr>
+          <p:cNvPr id="3" name="Content Placeholder 2">
+            <a:extLst>
+              <a:ext uri="{FF2B5EF4-FFF2-40B4-BE49-F238E27FC236}">
+                <a16:creationId xmlns:a16="http://schemas.microsoft.com/office/drawing/2014/main" id="{8451B911-B308-4EFE-BF9C-AEFDC418E7B1}"/>
+              </a:ext>
+            </a:extLst>
+          </p:cNvPr>
+          <p:cNvSpPr>
+            <a:spLocks noGrp="1"/>
+          </p:cNvSpPr>
+          <p:nvPr>
+            <p:ph idx="1"/>
+          </p:nvPr>
+        </p:nvSpPr>
+        <p:spPr>
+          <a:xfrm>
+            <a:off x="711240" y="1697277"/>
+            <a:ext cx="3359719" cy="720246"/>
+          </a:xfrm>
+        </p:spPr>
+        <p:txBody>
+          <a:bodyPr/>
+          <a:lstStyle/>
+          <a:p>
+            <a:r>
+              <a:rPr lang="en-US" dirty="0"/>
+              <a:t>Accuracy Score:</a:t>
+            </a:r>
+          </a:p>
+          <a:p>
+            <a:endParaRPr lang="en-US" dirty="0"/>
+          </a:p>
+          <a:p>
+            <a:endParaRPr lang="en-US" dirty="0"/>
+          </a:p>
+        </p:txBody>
+      </p:sp>
+      <p:pic>
+        <p:nvPicPr>
+          <p:cNvPr id="5" name="Picture 4">
+            <a:extLst>
+              <a:ext uri="{FF2B5EF4-FFF2-40B4-BE49-F238E27FC236}">
+                <a16:creationId xmlns:a16="http://schemas.microsoft.com/office/drawing/2014/main" id="{6EF7B6EB-0E40-40DB-8476-104D9DF10DD7}"/>
+              </a:ext>
+            </a:extLst>
+          </p:cNvPr>
+          <p:cNvPicPr>
+            <a:picLocks noChangeAspect="1"/>
+          </p:cNvPicPr>
+          <p:nvPr/>
+        </p:nvPicPr>
+        <p:blipFill>
+          <a:blip r:embed="rId2"/>
+          <a:stretch>
+            <a:fillRect/>
+          </a:stretch>
+        </p:blipFill>
+        <p:spPr>
+          <a:xfrm>
+            <a:off x="4563455" y="2369144"/>
+            <a:ext cx="7115175" cy="3562350"/>
+          </a:xfrm>
+          <a:prstGeom prst="rect">
+            <a:avLst/>
+          </a:prstGeom>
+        </p:spPr>
+      </p:pic>
+      <p:pic>
+        <p:nvPicPr>
+          <p:cNvPr id="9" name="Picture 8">
+            <a:extLst>
+              <a:ext uri="{FF2B5EF4-FFF2-40B4-BE49-F238E27FC236}">
+                <a16:creationId xmlns:a16="http://schemas.microsoft.com/office/drawing/2014/main" id="{4B7EA9C7-7842-4992-B6BA-7AB491BE14E6}"/>
+              </a:ext>
+            </a:extLst>
+          </p:cNvPr>
+          <p:cNvPicPr>
+            <a:picLocks noChangeAspect="1"/>
+          </p:cNvPicPr>
+          <p:nvPr/>
+        </p:nvPicPr>
+        <p:blipFill>
+          <a:blip r:embed="rId3"/>
+          <a:stretch>
+            <a:fillRect/>
+          </a:stretch>
+        </p:blipFill>
+        <p:spPr>
+          <a:xfrm>
+            <a:off x="1001234" y="2369144"/>
+            <a:ext cx="2581210" cy="2393486"/>
+          </a:xfrm>
+          <a:prstGeom prst="rect">
+            <a:avLst/>
+          </a:prstGeom>
+        </p:spPr>
+      </p:pic>
+      <p:sp>
+        <p:nvSpPr>
+          <p:cNvPr id="10" name="Content Placeholder 2">
+            <a:extLst>
+              <a:ext uri="{FF2B5EF4-FFF2-40B4-BE49-F238E27FC236}">
+                <a16:creationId xmlns:a16="http://schemas.microsoft.com/office/drawing/2014/main" id="{5AEFA8B2-F965-4E07-90C2-582D2A4BC49A}"/>
+              </a:ext>
+            </a:extLst>
+          </p:cNvPr>
+          <p:cNvSpPr txBox="1">
+            <a:spLocks/>
+          </p:cNvSpPr>
+          <p:nvPr/>
+        </p:nvSpPr>
+        <p:spPr>
+          <a:xfrm>
+            <a:off x="4563455" y="1697277"/>
+            <a:ext cx="3359719" cy="720246"/>
+          </a:xfrm>
+          <a:prstGeom prst="rect">
+            <a:avLst/>
+          </a:prstGeom>
+        </p:spPr>
+        <p:txBody>
+          <a:bodyPr vert="horz" lIns="91440" tIns="45720" rIns="91440" bIns="45720" rtlCol="0">
+            <a:normAutofit/>
+          </a:bodyPr>
+          <a:lstStyle>
+            <a:lvl1pPr marL="342900" indent="-342900" algn="l" defTabSz="457200" rtl="0" eaLnBrk="1" latinLnBrk="0" hangingPunct="1">
+              <a:spcBef>
+                <a:spcPts val="1000"/>
+              </a:spcBef>
+              <a:spcAft>
+                <a:spcPts val="0"/>
+              </a:spcAft>
+              <a:buClr>
+                <a:schemeClr val="accent1"/>
+              </a:buClr>
+              <a:buSzPct val="80000"/>
+              <a:buFont typeface="Wingdings 3" charset="2"/>
+              <a:buChar char=""/>
+              <a:defRPr sz="2000" b="0" i="0" kern="1200">
+                <a:solidFill>
+                  <a:schemeClr val="tx1"/>
+                </a:solidFill>
+                <a:latin typeface="+mj-lt"/>
+                <a:ea typeface="+mj-ea"/>
+                <a:cs typeface="+mj-cs"/>
+              </a:defRPr>
+            </a:lvl1pPr>
+            <a:lvl2pPr marL="742950" indent="-285750" algn="l" defTabSz="457200" rtl="0" eaLnBrk="1" latinLnBrk="0" hangingPunct="1">
+              <a:spcBef>
+                <a:spcPts val="1000"/>
+              </a:spcBef>
+              <a:spcAft>
+                <a:spcPts val="0"/>
+              </a:spcAft>
+              <a:buClr>
+                <a:schemeClr val="accent1"/>
+              </a:buClr>
+              <a:buSzPct val="80000"/>
+              <a:buFont typeface="Wingdings 3" charset="2"/>
+              <a:buChar char=""/>
+              <a:defRPr sz="1800" b="0" i="0" kern="1200">
+                <a:solidFill>
+                  <a:schemeClr val="tx1"/>
+                </a:solidFill>
+                <a:latin typeface="+mj-lt"/>
+                <a:ea typeface="+mj-ea"/>
+                <a:cs typeface="+mj-cs"/>
+              </a:defRPr>
+            </a:lvl2pPr>
+            <a:lvl3pPr marL="1143000" indent="-228600" algn="l" defTabSz="457200" rtl="0" eaLnBrk="1" latinLnBrk="0" hangingPunct="1">
+              <a:spcBef>
+                <a:spcPts val="1000"/>
+              </a:spcBef>
+              <a:spcAft>
+                <a:spcPts val="0"/>
+              </a:spcAft>
+              <a:buClr>
+                <a:schemeClr val="accent1"/>
+              </a:buClr>
+              <a:buSzPct val="80000"/>
+              <a:buFont typeface="Wingdings 3" charset="2"/>
+              <a:buChar char=""/>
+              <a:defRPr sz="1600" b="0" i="0" kern="1200">
+                <a:solidFill>
+                  <a:schemeClr val="tx1"/>
+                </a:solidFill>
+                <a:latin typeface="+mj-lt"/>
+                <a:ea typeface="+mj-ea"/>
+                <a:cs typeface="+mj-cs"/>
+              </a:defRPr>
+            </a:lvl3pPr>
+            <a:lvl4pPr marL="1600200" indent="-228600" algn="l" defTabSz="457200" rtl="0" eaLnBrk="1" latinLnBrk="0" hangingPunct="1">
+              <a:spcBef>
+                <a:spcPts val="1000"/>
+              </a:spcBef>
+              <a:spcAft>
+                <a:spcPts val="0"/>
+              </a:spcAft>
+              <a:buClr>
+                <a:schemeClr val="accent1"/>
+              </a:buClr>
+              <a:buSzPct val="80000"/>
+              <a:buFont typeface="Wingdings 3" charset="2"/>
+              <a:buChar char=""/>
+              <a:defRPr sz="1400" b="0" i="0" kern="1200">
+                <a:solidFill>
+                  <a:schemeClr val="tx1"/>
+                </a:solidFill>
+                <a:latin typeface="+mj-lt"/>
+                <a:ea typeface="+mj-ea"/>
+                <a:cs typeface="+mj-cs"/>
+              </a:defRPr>
+            </a:lvl4pPr>
+            <a:lvl5pPr marL="2057400" indent="-228600" algn="l" defTabSz="457200" rtl="0" eaLnBrk="1" latinLnBrk="0" hangingPunct="1">
+              <a:spcBef>
+                <a:spcPts val="1000"/>
+              </a:spcBef>
+              <a:spcAft>
+                <a:spcPts val="0"/>
+              </a:spcAft>
+              <a:buClr>
+                <a:schemeClr val="accent1"/>
+              </a:buClr>
+              <a:buSzPct val="80000"/>
+              <a:buFont typeface="Wingdings 3" charset="2"/>
+              <a:buChar char=""/>
+              <a:defRPr sz="1400" b="0" i="0" kern="1200">
+                <a:solidFill>
+                  <a:schemeClr val="tx1"/>
+                </a:solidFill>
+                <a:latin typeface="+mj-lt"/>
+                <a:ea typeface="+mj-ea"/>
+                <a:cs typeface="+mj-cs"/>
+              </a:defRPr>
+            </a:lvl5pPr>
+            <a:lvl6pPr marL="2514600" indent="-228600" algn="l" defTabSz="457200" rtl="0" eaLnBrk="1" latinLnBrk="0" hangingPunct="1">
+              <a:spcBef>
+                <a:spcPts val="1000"/>
+              </a:spcBef>
+              <a:spcAft>
+                <a:spcPts val="0"/>
+              </a:spcAft>
+              <a:buClr>
+                <a:schemeClr val="accent1"/>
+              </a:buClr>
+              <a:buSzPct val="80000"/>
+              <a:buFont typeface="Wingdings 3" charset="2"/>
+              <a:buChar char=""/>
+              <a:defRPr sz="1400" b="0" i="0" kern="1200">
+                <a:solidFill>
+                  <a:schemeClr val="tx1"/>
+                </a:solidFill>
+                <a:latin typeface="+mj-lt"/>
+                <a:ea typeface="+mj-ea"/>
+                <a:cs typeface="+mj-cs"/>
+              </a:defRPr>
+            </a:lvl6pPr>
+            <a:lvl7pPr marL="2971800" indent="-228600" algn="l" defTabSz="457200" rtl="0" eaLnBrk="1" latinLnBrk="0" hangingPunct="1">
+              <a:spcBef>
+                <a:spcPts val="1000"/>
+              </a:spcBef>
+              <a:spcAft>
+                <a:spcPts val="0"/>
+              </a:spcAft>
+              <a:buClr>
+                <a:schemeClr val="accent1"/>
+              </a:buClr>
+              <a:buSzPct val="80000"/>
+              <a:buFont typeface="Wingdings 3" charset="2"/>
+              <a:buChar char=""/>
+              <a:defRPr sz="1400" b="0" i="0" kern="1200">
+                <a:solidFill>
+                  <a:schemeClr val="tx1"/>
+                </a:solidFill>
+                <a:latin typeface="+mj-lt"/>
+                <a:ea typeface="+mj-ea"/>
+                <a:cs typeface="+mj-cs"/>
+              </a:defRPr>
+            </a:lvl7pPr>
+            <a:lvl8pPr marL="3429000" indent="-228600" algn="l" defTabSz="457200" rtl="0" eaLnBrk="1" latinLnBrk="0" hangingPunct="1">
+              <a:spcBef>
+                <a:spcPts val="1000"/>
+              </a:spcBef>
+              <a:spcAft>
+                <a:spcPts val="0"/>
+              </a:spcAft>
+              <a:buClr>
+                <a:schemeClr val="accent1"/>
+              </a:buClr>
+              <a:buSzPct val="80000"/>
+              <a:buFont typeface="Wingdings 3" charset="2"/>
+              <a:buChar char=""/>
+              <a:defRPr sz="1400" b="0" i="0" kern="1200">
+                <a:solidFill>
+                  <a:schemeClr val="tx1"/>
+                </a:solidFill>
+                <a:latin typeface="+mj-lt"/>
+                <a:ea typeface="+mj-ea"/>
+                <a:cs typeface="+mj-cs"/>
+              </a:defRPr>
+            </a:lvl8pPr>
+            <a:lvl9pPr marL="3886200" indent="-228600" algn="l" defTabSz="457200" rtl="0" eaLnBrk="1" latinLnBrk="0" hangingPunct="1">
+              <a:spcBef>
+                <a:spcPts val="1000"/>
+              </a:spcBef>
+              <a:spcAft>
+                <a:spcPts val="0"/>
+              </a:spcAft>
+              <a:buClr>
+                <a:schemeClr val="accent1"/>
+              </a:buClr>
+              <a:buSzPct val="80000"/>
+              <a:buFont typeface="Wingdings 3" charset="2"/>
+              <a:buChar char=""/>
+              <a:defRPr sz="1400" b="0" i="0" kern="1200">
+                <a:solidFill>
+                  <a:schemeClr val="tx1"/>
+                </a:solidFill>
+                <a:latin typeface="+mj-lt"/>
+                <a:ea typeface="+mj-ea"/>
+                <a:cs typeface="+mj-cs"/>
+              </a:defRPr>
+            </a:lvl9pPr>
+          </a:lstStyle>
+          <a:p>
+            <a:r>
+              <a:rPr lang="en-US" dirty="0"/>
+              <a:t>GUI:</a:t>
+            </a:r>
+          </a:p>
+          <a:p>
+            <a:endParaRPr lang="en-US" dirty="0"/>
+          </a:p>
+          <a:p>
+            <a:endParaRPr lang="en-US" dirty="0"/>
+          </a:p>
+        </p:txBody>
+      </p:sp>
+    </p:spTree>
+    <p:extLst>
+      <p:ext uri="{BB962C8B-B14F-4D97-AF65-F5344CB8AC3E}">
+        <p14:creationId xmlns:p14="http://schemas.microsoft.com/office/powerpoint/2010/main" val="154218335"/>
+      </p:ext>
+    </p:extLst>
+  </p:cSld>
+  <p:clrMapOvr>
+    <a:masterClrMapping/>
+  </p:clrMapOvr>
+</p:sld>
+</file>
+
+<file path=ppt/slides/slide17.xml><?xml version="1.0" encoding="utf-8"?>
+<p:sld xmlns:a="http://schemas.openxmlformats.org/drawingml/2006/main" xmlns:r="http://schemas.openxmlformats.org/officeDocument/2006/relationships" xmlns:p="http://schemas.openxmlformats.org/presentationml/2006/main">
+  <p:cSld>
+    <p:spTree>
+      <p:nvGrpSpPr>
+        <p:cNvPr id="1" name=""/>
+        <p:cNvGrpSpPr/>
+        <p:nvPr/>
+      </p:nvGrpSpPr>
+      <p:grpSpPr>
+        <a:xfrm>
+          <a:off x="0" y="0"/>
+          <a:ext cx="0" cy="0"/>
+          <a:chOff x="0" y="0"/>
+          <a:chExt cx="0" cy="0"/>
+        </a:xfrm>
+      </p:grpSpPr>
+      <p:sp>
+        <p:nvSpPr>
+          <p:cNvPr id="2" name="Title 1">
+            <a:extLst>
+              <a:ext uri="{FF2B5EF4-FFF2-40B4-BE49-F238E27FC236}">
+                <a16:creationId xmlns:a16="http://schemas.microsoft.com/office/drawing/2014/main" id="{0D8C7776-FDA1-4F89-ACE0-A5C058D0589D}"/>
+              </a:ext>
+            </a:extLst>
+          </p:cNvPr>
+          <p:cNvSpPr>
+            <a:spLocks noGrp="1"/>
+          </p:cNvSpPr>
+          <p:nvPr>
+            <p:ph type="title"/>
+          </p:nvPr>
+        </p:nvSpPr>
+        <p:spPr/>
+        <p:txBody>
+          <a:bodyPr/>
+          <a:lstStyle/>
+          <a:p>
+            <a:r>
+              <a:rPr lang="en-US" dirty="0"/>
+              <a:t>Dashboard</a:t>
+            </a:r>
+          </a:p>
+        </p:txBody>
+      </p:sp>
+      <p:sp>
+        <p:nvSpPr>
+          <p:cNvPr id="3" name="Content Placeholder 2">
+            <a:extLst>
+              <a:ext uri="{FF2B5EF4-FFF2-40B4-BE49-F238E27FC236}">
+                <a16:creationId xmlns:a16="http://schemas.microsoft.com/office/drawing/2014/main" id="{7F889976-0B08-40AE-9EB7-1DE55CE6DF65}"/>
+              </a:ext>
+            </a:extLst>
+          </p:cNvPr>
+          <p:cNvSpPr>
+            <a:spLocks noGrp="1"/>
+          </p:cNvSpPr>
+          <p:nvPr>
+            <p:ph idx="1"/>
+          </p:nvPr>
+        </p:nvSpPr>
+        <p:spPr/>
+        <p:txBody>
+          <a:bodyPr/>
+          <a:lstStyle/>
+          <a:p>
+            <a:r>
+              <a:rPr lang="en-US" sz="2800" dirty="0"/>
+              <a:t>Interactive storyboard created in Tableau</a:t>
+            </a:r>
+          </a:p>
+          <a:p>
+            <a:pPr marL="0" indent="0">
+              <a:buNone/>
+            </a:pPr>
+            <a:endParaRPr lang="en-US" dirty="0"/>
+          </a:p>
+          <a:p>
+            <a:pPr marL="0" indent="0">
+              <a:buNone/>
+            </a:pPr>
+            <a:r>
+              <a:rPr lang="en-US" dirty="0"/>
+              <a:t>Follow the link below: </a:t>
+            </a:r>
+          </a:p>
+          <a:p>
+            <a:pPr marL="0" indent="0">
+              <a:buNone/>
+            </a:pPr>
+            <a:endParaRPr lang="en-US" dirty="0"/>
+          </a:p>
+        </p:txBody>
+      </p:sp>
+    </p:spTree>
+    <p:extLst>
+      <p:ext uri="{BB962C8B-B14F-4D97-AF65-F5344CB8AC3E}">
+        <p14:creationId xmlns:p14="http://schemas.microsoft.com/office/powerpoint/2010/main" val="1688324141"/>
+      </p:ext>
+    </p:extLst>
+  </p:cSld>
+  <p:clrMapOvr>
+    <a:masterClrMapping/>
+  </p:clrMapOvr>
+</p:sld>
+</file>
+
+<file path=ppt/slides/slide18.xml><?xml version="1.0" encoding="utf-8"?>
+<p:sld xmlns:a="http://schemas.openxmlformats.org/drawingml/2006/main" xmlns:r="http://schemas.openxmlformats.org/officeDocument/2006/relationships" xmlns:p="http://schemas.openxmlformats.org/presentationml/2006/main">
+  <p:cSld>
+    <p:spTree>
+      <p:nvGrpSpPr>
+        <p:cNvPr id="1" name=""/>
+        <p:cNvGrpSpPr/>
+        <p:nvPr/>
+      </p:nvGrpSpPr>
+      <p:grpSpPr>
+        <a:xfrm>
+          <a:off x="0" y="0"/>
+          <a:ext cx="0" cy="0"/>
+          <a:chOff x="0" y="0"/>
+          <a:chExt cx="0" cy="0"/>
+        </a:xfrm>
+      </p:grpSpPr>
+      <p:sp>
+        <p:nvSpPr>
+          <p:cNvPr id="2" name="Title 1">
+            <a:extLst>
+              <a:ext uri="{FF2B5EF4-FFF2-40B4-BE49-F238E27FC236}">
+                <a16:creationId xmlns:a16="http://schemas.microsoft.com/office/drawing/2014/main" id="{0D8C7776-FDA1-4F89-ACE0-A5C058D0589D}"/>
+              </a:ext>
+            </a:extLst>
+          </p:cNvPr>
+          <p:cNvSpPr>
+            <a:spLocks noGrp="1"/>
+          </p:cNvSpPr>
+          <p:nvPr>
+            <p:ph type="title"/>
+          </p:nvPr>
+        </p:nvSpPr>
+        <p:spPr/>
+        <p:txBody>
+          <a:bodyPr/>
+          <a:lstStyle/>
+          <a:p>
+            <a:r>
+              <a:rPr lang="en-US" dirty="0"/>
+              <a:t>Dashboard - Charts</a:t>
+            </a:r>
+          </a:p>
+        </p:txBody>
+      </p:sp>
+      <p:sp>
+        <p:nvSpPr>
+          <p:cNvPr id="3" name="Content Placeholder 2">
+            <a:extLst>
+              <a:ext uri="{FF2B5EF4-FFF2-40B4-BE49-F238E27FC236}">
+                <a16:creationId xmlns:a16="http://schemas.microsoft.com/office/drawing/2014/main" id="{7F889976-0B08-40AE-9EB7-1DE55CE6DF65}"/>
+              </a:ext>
+            </a:extLst>
+          </p:cNvPr>
+          <p:cNvSpPr>
+            <a:spLocks noGrp="1"/>
+          </p:cNvSpPr>
+          <p:nvPr>
+            <p:ph idx="1"/>
+          </p:nvPr>
+        </p:nvSpPr>
+        <p:spPr>
+          <a:xfrm>
+            <a:off x="646111" y="1409290"/>
+            <a:ext cx="8946541" cy="679524"/>
+          </a:xfrm>
+        </p:spPr>
+        <p:txBody>
+          <a:bodyPr/>
+          <a:lstStyle/>
+          <a:p>
+            <a:pPr marL="0" indent="0">
+              <a:buNone/>
+            </a:pPr>
+            <a:r>
+              <a:rPr lang="en-US" sz="2800" dirty="0"/>
+              <a:t>Balanced Dataset</a:t>
+            </a:r>
+          </a:p>
+          <a:p>
+            <a:pPr marL="0" indent="0">
+              <a:buNone/>
+            </a:pPr>
+            <a:endParaRPr lang="en-US" dirty="0"/>
+          </a:p>
+        </p:txBody>
+      </p:sp>
+      <p:pic>
+        <p:nvPicPr>
+          <p:cNvPr id="5" name="Picture 4">
+            <a:extLst>
+              <a:ext uri="{FF2B5EF4-FFF2-40B4-BE49-F238E27FC236}">
+                <a16:creationId xmlns:a16="http://schemas.microsoft.com/office/drawing/2014/main" id="{E5B5C948-1F97-42EE-A943-CE137B40B9F8}"/>
+              </a:ext>
+            </a:extLst>
+          </p:cNvPr>
+          <p:cNvPicPr>
+            <a:picLocks noChangeAspect="1"/>
+          </p:cNvPicPr>
+          <p:nvPr/>
+        </p:nvPicPr>
+        <p:blipFill>
+          <a:blip r:embed="rId3"/>
+          <a:stretch>
+            <a:fillRect/>
+          </a:stretch>
+        </p:blipFill>
+        <p:spPr>
+          <a:xfrm>
+            <a:off x="646111" y="2184531"/>
+            <a:ext cx="7267575" cy="4333875"/>
+          </a:xfrm>
+          <a:prstGeom prst="rect">
+            <a:avLst/>
+          </a:prstGeom>
+        </p:spPr>
+      </p:pic>
+    </p:spTree>
+    <p:extLst>
+      <p:ext uri="{BB962C8B-B14F-4D97-AF65-F5344CB8AC3E}">
+        <p14:creationId xmlns:p14="http://schemas.microsoft.com/office/powerpoint/2010/main" val="3257558936"/>
+      </p:ext>
+    </p:extLst>
+  </p:cSld>
+  <p:clrMapOvr>
+    <a:masterClrMapping/>
+  </p:clrMapOvr>
+</p:sld>
+</file>
+
+<file path=ppt/slides/slide19.xml><?xml version="1.0" encoding="utf-8"?>
+<p:sld xmlns:a="http://schemas.openxmlformats.org/drawingml/2006/main" xmlns:r="http://schemas.openxmlformats.org/officeDocument/2006/relationships" xmlns:p="http://schemas.openxmlformats.org/presentationml/2006/main">
+  <p:cSld>
+    <p:spTree>
+      <p:nvGrpSpPr>
+        <p:cNvPr id="1" name=""/>
+        <p:cNvGrpSpPr/>
+        <p:nvPr/>
+      </p:nvGrpSpPr>
+      <p:grpSpPr>
+        <a:xfrm>
+          <a:off x="0" y="0"/>
+          <a:ext cx="0" cy="0"/>
+          <a:chOff x="0" y="0"/>
+          <a:chExt cx="0" cy="0"/>
+        </a:xfrm>
+      </p:grpSpPr>
+      <p:sp>
+        <p:nvSpPr>
+          <p:cNvPr id="2" name="Title 1">
+            <a:extLst>
+              <a:ext uri="{FF2B5EF4-FFF2-40B4-BE49-F238E27FC236}">
+                <a16:creationId xmlns:a16="http://schemas.microsoft.com/office/drawing/2014/main" id="{0D8C7776-FDA1-4F89-ACE0-A5C058D0589D}"/>
+              </a:ext>
+            </a:extLst>
+          </p:cNvPr>
+          <p:cNvSpPr>
+            <a:spLocks noGrp="1"/>
+          </p:cNvSpPr>
+          <p:nvPr>
+            <p:ph type="title"/>
+          </p:nvPr>
+        </p:nvSpPr>
+        <p:spPr/>
+        <p:txBody>
+          <a:bodyPr/>
+          <a:lstStyle/>
+          <a:p>
+            <a:r>
+              <a:rPr lang="en-US" dirty="0"/>
+              <a:t>Dashboard - Charts</a:t>
+            </a:r>
+          </a:p>
+        </p:txBody>
+      </p:sp>
+      <p:sp>
+        <p:nvSpPr>
+          <p:cNvPr id="3" name="Content Placeholder 2">
+            <a:extLst>
+              <a:ext uri="{FF2B5EF4-FFF2-40B4-BE49-F238E27FC236}">
+                <a16:creationId xmlns:a16="http://schemas.microsoft.com/office/drawing/2014/main" id="{7F889976-0B08-40AE-9EB7-1DE55CE6DF65}"/>
+              </a:ext>
+            </a:extLst>
+          </p:cNvPr>
+          <p:cNvSpPr>
+            <a:spLocks noGrp="1"/>
+          </p:cNvSpPr>
+          <p:nvPr>
+            <p:ph idx="1"/>
+          </p:nvPr>
+        </p:nvSpPr>
+        <p:spPr>
+          <a:xfrm>
+            <a:off x="646111" y="1409290"/>
+            <a:ext cx="8946541" cy="679524"/>
+          </a:xfrm>
+        </p:spPr>
+        <p:txBody>
+          <a:bodyPr/>
+          <a:lstStyle/>
+          <a:p>
+            <a:pPr marL="0" indent="0">
+              <a:buNone/>
+            </a:pPr>
+            <a:r>
+              <a:rPr lang="en-US" sz="2800" dirty="0"/>
+              <a:t>Diseases &amp; Symptoms</a:t>
+            </a:r>
+          </a:p>
+          <a:p>
+            <a:pPr marL="0" indent="0">
+              <a:buNone/>
+            </a:pPr>
+            <a:endParaRPr lang="en-US" dirty="0"/>
+          </a:p>
+        </p:txBody>
+      </p:sp>
+      <p:pic>
+        <p:nvPicPr>
+          <p:cNvPr id="6" name="Picture 5">
+            <a:extLst>
+              <a:ext uri="{FF2B5EF4-FFF2-40B4-BE49-F238E27FC236}">
+                <a16:creationId xmlns:a16="http://schemas.microsoft.com/office/drawing/2014/main" id="{33E3439E-3911-426B-9265-AFCD8257E8D6}"/>
+              </a:ext>
+            </a:extLst>
+          </p:cNvPr>
+          <p:cNvPicPr>
+            <a:picLocks noChangeAspect="1"/>
+          </p:cNvPicPr>
+          <p:nvPr/>
+        </p:nvPicPr>
+        <p:blipFill>
+          <a:blip r:embed="rId3"/>
+          <a:stretch>
+            <a:fillRect/>
+          </a:stretch>
+        </p:blipFill>
+        <p:spPr>
+          <a:xfrm>
+            <a:off x="646111" y="2036681"/>
+            <a:ext cx="7305675" cy="4362450"/>
+          </a:xfrm>
+          <a:prstGeom prst="rect">
+            <a:avLst/>
+          </a:prstGeom>
+        </p:spPr>
+      </p:pic>
+    </p:spTree>
+    <p:extLst>
+      <p:ext uri="{BB962C8B-B14F-4D97-AF65-F5344CB8AC3E}">
+        <p14:creationId xmlns:p14="http://schemas.microsoft.com/office/powerpoint/2010/main" val="1712365041"/>
       </p:ext>
     </p:extLst>
   </p:cSld>
@@ -6557,8 +9729,14 @@
             <a:pPr lvl="1"/>
             <a:r>
               <a:rPr lang="en-US" dirty="0"/>
-              <a:t>Developing a model where select symptoms can be input to make disease predictions can help diagnosing diseases faster</a:t>
-            </a:r>
+              <a:t>Developing a model where a list of symptoms can be input to make disease predictions can help diagnosing diseases faster</a:t>
+            </a:r>
+          </a:p>
+          <a:p>
+            <a:pPr marL="457200" lvl="1" indent="0">
+              <a:buNone/>
+            </a:pPr>
+            <a:endParaRPr lang="en-US" dirty="0"/>
           </a:p>
           <a:p>
             <a:r>
@@ -6570,14 +9748,14 @@
             <a:pPr lvl="1"/>
             <a:r>
               <a:rPr lang="en-US" dirty="0"/>
-              <a:t>The data we used is two csv file downloaded from Kaggle. </a:t>
+              <a:t>The data used is two csv files downloaded from Kaggle. </a:t>
             </a:r>
           </a:p>
           <a:p>
             <a:pPr lvl="1"/>
             <a:r>
               <a:rPr lang="en-US" dirty="0"/>
-              <a:t>The dataset provided is in a csv testing and csv training file.</a:t>
+              <a:t>The dataset utilized from a csv testing and csv training file.</a:t>
             </a:r>
           </a:p>
           <a:p>
@@ -6600,6 +9778,136 @@
     <p:extLst>
       <p:ext uri="{BB962C8B-B14F-4D97-AF65-F5344CB8AC3E}">
         <p14:creationId xmlns:p14="http://schemas.microsoft.com/office/powerpoint/2010/main" val="90614384"/>
+      </p:ext>
+    </p:extLst>
+  </p:cSld>
+  <p:clrMapOvr>
+    <a:masterClrMapping/>
+  </p:clrMapOvr>
+</p:sld>
+</file>
+
+<file path=ppt/slides/slide20.xml><?xml version="1.0" encoding="utf-8"?>
+<p:sld xmlns:a="http://schemas.openxmlformats.org/drawingml/2006/main" xmlns:r="http://schemas.openxmlformats.org/officeDocument/2006/relationships" xmlns:p="http://schemas.openxmlformats.org/presentationml/2006/main">
+  <p:cSld>
+    <p:spTree>
+      <p:nvGrpSpPr>
+        <p:cNvPr id="1" name=""/>
+        <p:cNvGrpSpPr/>
+        <p:nvPr/>
+      </p:nvGrpSpPr>
+      <p:grpSpPr>
+        <a:xfrm>
+          <a:off x="0" y="0"/>
+          <a:ext cx="0" cy="0"/>
+          <a:chOff x="0" y="0"/>
+          <a:chExt cx="0" cy="0"/>
+        </a:xfrm>
+      </p:grpSpPr>
+      <p:sp>
+        <p:nvSpPr>
+          <p:cNvPr id="2" name="Title 1">
+            <a:extLst>
+              <a:ext uri="{FF2B5EF4-FFF2-40B4-BE49-F238E27FC236}">
+                <a16:creationId xmlns:a16="http://schemas.microsoft.com/office/drawing/2014/main" id="{0D8C7776-FDA1-4F89-ACE0-A5C058D0589D}"/>
+              </a:ext>
+            </a:extLst>
+          </p:cNvPr>
+          <p:cNvSpPr>
+            <a:spLocks noGrp="1"/>
+          </p:cNvSpPr>
+          <p:nvPr>
+            <p:ph type="title"/>
+          </p:nvPr>
+        </p:nvSpPr>
+        <p:spPr/>
+        <p:txBody>
+          <a:bodyPr/>
+          <a:lstStyle/>
+          <a:p>
+            <a:r>
+              <a:rPr lang="en-US" dirty="0"/>
+              <a:t>Dashboard - Charts</a:t>
+            </a:r>
+          </a:p>
+        </p:txBody>
+      </p:sp>
+      <p:sp>
+        <p:nvSpPr>
+          <p:cNvPr id="3" name="Content Placeholder 2">
+            <a:extLst>
+              <a:ext uri="{FF2B5EF4-FFF2-40B4-BE49-F238E27FC236}">
+                <a16:creationId xmlns:a16="http://schemas.microsoft.com/office/drawing/2014/main" id="{7F889976-0B08-40AE-9EB7-1DE55CE6DF65}"/>
+              </a:ext>
+            </a:extLst>
+          </p:cNvPr>
+          <p:cNvSpPr>
+            <a:spLocks noGrp="1"/>
+          </p:cNvSpPr>
+          <p:nvPr>
+            <p:ph idx="1"/>
+          </p:nvPr>
+        </p:nvSpPr>
+        <p:spPr>
+          <a:xfrm>
+            <a:off x="646111" y="1409290"/>
+            <a:ext cx="8946541" cy="679524"/>
+          </a:xfrm>
+        </p:spPr>
+        <p:txBody>
+          <a:bodyPr/>
+          <a:lstStyle/>
+          <a:p>
+            <a:pPr marL="0" indent="0">
+              <a:buNone/>
+            </a:pPr>
+            <a:r>
+              <a:rPr lang="en-US" sz="2800" dirty="0"/>
+              <a:t>Diseases &amp; Symptoms </a:t>
+            </a:r>
+          </a:p>
+          <a:p>
+            <a:pPr marL="0" indent="0">
+              <a:buNone/>
+            </a:pPr>
+            <a:endParaRPr lang="en-US" dirty="0"/>
+          </a:p>
+        </p:txBody>
+      </p:sp>
+      <p:pic>
+        <p:nvPicPr>
+          <p:cNvPr id="5" name="Picture 4">
+            <a:extLst>
+              <a:ext uri="{FF2B5EF4-FFF2-40B4-BE49-F238E27FC236}">
+                <a16:creationId xmlns:a16="http://schemas.microsoft.com/office/drawing/2014/main" id="{D60D223F-1FDB-421F-BD69-4A0A23BF850E}"/>
+              </a:ext>
+            </a:extLst>
+          </p:cNvPr>
+          <p:cNvPicPr>
+            <a:picLocks noChangeAspect="1"/>
+          </p:cNvPicPr>
+          <p:nvPr/>
+        </p:nvPicPr>
+        <p:blipFill>
+          <a:blip r:embed="rId3"/>
+          <a:stretch>
+            <a:fillRect/>
+          </a:stretch>
+        </p:blipFill>
+        <p:spPr>
+          <a:xfrm>
+            <a:off x="750909" y="2088814"/>
+            <a:ext cx="7258050" cy="4371975"/>
+          </a:xfrm>
+          <a:prstGeom prst="rect">
+            <a:avLst/>
+          </a:prstGeom>
+        </p:spPr>
+      </p:pic>
+    </p:spTree>
+    <p:extLst>
+      <p:ext uri="{BB962C8B-B14F-4D97-AF65-F5344CB8AC3E}">
+        <p14:creationId xmlns:p14="http://schemas.microsoft.com/office/powerpoint/2010/main" val="3824004871"/>
       </p:ext>
     </p:extLst>
   </p:cSld>
@@ -6742,7 +10050,7 @@
           <p:cNvPr id="2" name="Title 1">
             <a:extLst>
               <a:ext uri="{FF2B5EF4-FFF2-40B4-BE49-F238E27FC236}">
-                <a16:creationId xmlns:a16="http://schemas.microsoft.com/office/drawing/2014/main" id="{D758362C-ABAD-4436-8BB9-062BA36322E7}"/>
+                <a16:creationId xmlns:a16="http://schemas.microsoft.com/office/drawing/2014/main" id="{7FA67A2B-8F06-4C08-AA3B-735A11D451AE}"/>
               </a:ext>
             </a:extLst>
           </p:cNvPr>
@@ -6760,7 +10068,7 @@
           <a:p>
             <a:r>
               <a:rPr lang="en-US" dirty="0"/>
-              <a:t>Disease Prediction using Machine Learning</a:t>
+              <a:t>Technologies and Languages</a:t>
             </a:r>
           </a:p>
         </p:txBody>
@@ -6770,7 +10078,7 @@
           <p:cNvPr id="3" name="Content Placeholder 2">
             <a:extLst>
               <a:ext uri="{FF2B5EF4-FFF2-40B4-BE49-F238E27FC236}">
-                <a16:creationId xmlns:a16="http://schemas.microsoft.com/office/drawing/2014/main" id="{8B2325B3-2749-4BDA-A7F6-36A97F538A10}"/>
+                <a16:creationId xmlns:a16="http://schemas.microsoft.com/office/drawing/2014/main" id="{59929EAB-D0FC-4492-9485-EBC78DA3EDFB}"/>
               </a:ext>
             </a:extLst>
           </p:cNvPr>
@@ -6788,41 +10096,54 @@
           <a:p>
             <a:r>
               <a:rPr lang="en-US" dirty="0"/>
-              <a:t>Description of Data Exploration and Analysis </a:t>
-            </a:r>
-            <a:r>
-              <a:rPr lang="en-US" dirty="0" err="1"/>
-              <a:t>Phas</a:t>
-            </a:r>
-            <a:r>
-              <a:rPr lang="en-US" dirty="0"/>
-              <a:t>	e</a:t>
+              <a:t>Jupyter Notebook</a:t>
+            </a:r>
+          </a:p>
+          <a:p>
+            <a:r>
+              <a:rPr lang="en-US" dirty="0"/>
+              <a:t>Python</a:t>
             </a:r>
           </a:p>
           <a:p>
             <a:pPr lvl="1"/>
             <a:r>
               <a:rPr lang="en-US" dirty="0"/>
-              <a:t>A key part of the data exploration phase is preprocessing the data.	</a:t>
-            </a:r>
-          </a:p>
-          <a:p>
-            <a:pPr lvl="2"/>
-            <a:r>
-              <a:rPr lang="en-US" dirty="0"/>
-              <a:t>Data Types evaluated</a:t>
-            </a:r>
-          </a:p>
-          <a:p>
-            <a:pPr lvl="2"/>
-            <a:r>
-              <a:rPr lang="en-US" dirty="0"/>
-              <a:t>Null </a:t>
-            </a:r>
-            <a:r>
-              <a:rPr lang="en-US"/>
-              <a:t>values removed</a:t>
-            </a:r>
+              <a:t>Pandas</a:t>
+            </a:r>
+          </a:p>
+          <a:p>
+            <a:pPr lvl="1"/>
+            <a:r>
+              <a:rPr lang="en-US" dirty="0"/>
+              <a:t>MatPlotLib</a:t>
+            </a:r>
+          </a:p>
+          <a:p>
+            <a:r>
+              <a:rPr lang="en-US" dirty="0"/>
+              <a:t>pgAdmin</a:t>
+            </a:r>
+          </a:p>
+          <a:p>
+            <a:r>
+              <a:rPr lang="en-US" dirty="0"/>
+              <a:t>PostgreSQL</a:t>
+            </a:r>
+          </a:p>
+          <a:p>
+            <a:r>
+              <a:rPr lang="en-US" dirty="0"/>
+              <a:t>Tableau</a:t>
+            </a:r>
+          </a:p>
+          <a:p>
+            <a:endParaRPr lang="en-US" dirty="0"/>
+          </a:p>
+          <a:p>
+            <a:pPr marL="0" indent="0">
+              <a:buNone/>
+            </a:pPr>
             <a:endParaRPr lang="en-US" dirty="0"/>
           </a:p>
         </p:txBody>
@@ -6830,7 +10151,936 @@
     </p:spTree>
     <p:extLst>
       <p:ext uri="{BB962C8B-B14F-4D97-AF65-F5344CB8AC3E}">
-        <p14:creationId xmlns:p14="http://schemas.microsoft.com/office/powerpoint/2010/main" val="2883907546"/>
+        <p14:creationId xmlns:p14="http://schemas.microsoft.com/office/powerpoint/2010/main" val="2959090660"/>
+      </p:ext>
+    </p:extLst>
+  </p:cSld>
+  <p:clrMapOvr>
+    <a:masterClrMapping/>
+  </p:clrMapOvr>
+</p:sld>
+</file>
+
+<file path=ppt/slides/slide5.xml><?xml version="1.0" encoding="utf-8"?>
+<p:sld xmlns:a="http://schemas.openxmlformats.org/drawingml/2006/main" xmlns:r="http://schemas.openxmlformats.org/officeDocument/2006/relationships" xmlns:p="http://schemas.openxmlformats.org/presentationml/2006/main">
+  <p:cSld>
+    <p:spTree>
+      <p:nvGrpSpPr>
+        <p:cNvPr id="1" name=""/>
+        <p:cNvGrpSpPr/>
+        <p:nvPr/>
+      </p:nvGrpSpPr>
+      <p:grpSpPr>
+        <a:xfrm>
+          <a:off x="0" y="0"/>
+          <a:ext cx="0" cy="0"/>
+          <a:chOff x="0" y="0"/>
+          <a:chExt cx="0" cy="0"/>
+        </a:xfrm>
+      </p:grpSpPr>
+      <p:sp>
+        <p:nvSpPr>
+          <p:cNvPr id="2" name="Title 1">
+            <a:extLst>
+              <a:ext uri="{FF2B5EF4-FFF2-40B4-BE49-F238E27FC236}">
+                <a16:creationId xmlns:a16="http://schemas.microsoft.com/office/drawing/2014/main" id="{723334D1-B7E0-45E3-AF80-4731396B9AAC}"/>
+              </a:ext>
+            </a:extLst>
+          </p:cNvPr>
+          <p:cNvSpPr>
+            <a:spLocks noGrp="1"/>
+          </p:cNvSpPr>
+          <p:nvPr>
+            <p:ph type="title"/>
+          </p:nvPr>
+        </p:nvSpPr>
+        <p:spPr/>
+        <p:txBody>
+          <a:bodyPr/>
+          <a:lstStyle/>
+          <a:p>
+            <a:r>
+              <a:rPr lang="en-US" dirty="0"/>
+              <a:t>Data Exploration Phase</a:t>
+            </a:r>
+          </a:p>
+        </p:txBody>
+      </p:sp>
+      <p:sp>
+        <p:nvSpPr>
+          <p:cNvPr id="3" name="Text Placeholder 2">
+            <a:extLst>
+              <a:ext uri="{FF2B5EF4-FFF2-40B4-BE49-F238E27FC236}">
+                <a16:creationId xmlns:a16="http://schemas.microsoft.com/office/drawing/2014/main" id="{FEDEB578-263A-4026-8966-6821C32338B9}"/>
+              </a:ext>
+            </a:extLst>
+          </p:cNvPr>
+          <p:cNvSpPr>
+            <a:spLocks noGrp="1"/>
+          </p:cNvSpPr>
+          <p:nvPr>
+            <p:ph type="body" idx="1"/>
+          </p:nvPr>
+        </p:nvSpPr>
+        <p:spPr>
+          <a:xfrm>
+            <a:off x="1103312" y="1161729"/>
+            <a:ext cx="4396338" cy="576262"/>
+          </a:xfrm>
+        </p:spPr>
+        <p:txBody>
+          <a:bodyPr/>
+          <a:lstStyle/>
+          <a:p>
+            <a:r>
+              <a:rPr lang="en-US" b="1" u="sng" dirty="0"/>
+              <a:t>Preprocessing Data</a:t>
+            </a:r>
+          </a:p>
+        </p:txBody>
+      </p:sp>
+      <p:sp>
+        <p:nvSpPr>
+          <p:cNvPr id="4" name="Content Placeholder 3">
+            <a:extLst>
+              <a:ext uri="{FF2B5EF4-FFF2-40B4-BE49-F238E27FC236}">
+                <a16:creationId xmlns:a16="http://schemas.microsoft.com/office/drawing/2014/main" id="{113B55E9-5F54-4095-9350-D567D2D57927}"/>
+              </a:ext>
+            </a:extLst>
+          </p:cNvPr>
+          <p:cNvSpPr>
+            <a:spLocks noGrp="1"/>
+          </p:cNvSpPr>
+          <p:nvPr>
+            <p:ph sz="half" idx="2"/>
+          </p:nvPr>
+        </p:nvSpPr>
+        <p:spPr>
+          <a:xfrm>
+            <a:off x="1103311" y="1853248"/>
+            <a:ext cx="4992689" cy="3741738"/>
+          </a:xfrm>
+        </p:spPr>
+        <p:txBody>
+          <a:bodyPr/>
+          <a:lstStyle/>
+          <a:p>
+            <a:r>
+              <a:rPr lang="en-US" dirty="0"/>
+              <a:t>Data Types evaluated</a:t>
+            </a:r>
+          </a:p>
+          <a:p>
+            <a:pPr lvl="1"/>
+            <a:r>
+              <a:rPr lang="en-US" dirty="0"/>
+              <a:t>train_data.info()</a:t>
+            </a:r>
+          </a:p>
+          <a:p>
+            <a:pPr lvl="1"/>
+            <a:r>
+              <a:rPr lang="en-US" dirty="0"/>
+              <a:t>test_data.info()</a:t>
+            </a:r>
+          </a:p>
+          <a:p>
+            <a:pPr lvl="1"/>
+            <a:r>
+              <a:rPr lang="en-US" dirty="0"/>
+              <a:t>train_data.describe()</a:t>
+            </a:r>
+          </a:p>
+          <a:p>
+            <a:pPr lvl="1"/>
+            <a:r>
+              <a:rPr lang="en-US" dirty="0"/>
+              <a:t>test_data.describe()</a:t>
+            </a:r>
+          </a:p>
+          <a:p>
+            <a:r>
+              <a:rPr lang="en-US" dirty="0"/>
+              <a:t>Null values removed</a:t>
+            </a:r>
+          </a:p>
+          <a:p>
+            <a:pPr lvl="1"/>
+            <a:r>
+              <a:rPr lang="en-US" dirty="0"/>
+              <a:t>train_data.isnull().any()</a:t>
+            </a:r>
+          </a:p>
+          <a:p>
+            <a:pPr lvl="1"/>
+            <a:r>
+              <a:rPr lang="en-US" dirty="0"/>
+              <a:t>train_data.drop(["Unnamed: 133"], axis=1, inplace=True)</a:t>
+            </a:r>
+          </a:p>
+          <a:p>
+            <a:endParaRPr lang="en-US" dirty="0"/>
+          </a:p>
+        </p:txBody>
+      </p:sp>
+      <p:pic>
+        <p:nvPicPr>
+          <p:cNvPr id="8" name="Content Placeholder 7">
+            <a:extLst>
+              <a:ext uri="{FF2B5EF4-FFF2-40B4-BE49-F238E27FC236}">
+                <a16:creationId xmlns:a16="http://schemas.microsoft.com/office/drawing/2014/main" id="{4FB8A4E8-B36B-445E-A0C9-9BCC9FA6EC03}"/>
+              </a:ext>
+            </a:extLst>
+          </p:cNvPr>
+          <p:cNvPicPr>
+            <a:picLocks noGrp="1" noChangeAspect="1"/>
+          </p:cNvPicPr>
+          <p:nvPr>
+            <p:ph sz="quarter" idx="4"/>
+          </p:nvPr>
+        </p:nvPicPr>
+        <p:blipFill>
+          <a:blip r:embed="rId3"/>
+          <a:stretch>
+            <a:fillRect/>
+          </a:stretch>
+        </p:blipFill>
+        <p:spPr>
+          <a:xfrm>
+            <a:off x="6759463" y="1853248"/>
+            <a:ext cx="4619682" cy="3239481"/>
+          </a:xfrm>
+        </p:spPr>
+      </p:pic>
+    </p:spTree>
+    <p:extLst>
+      <p:ext uri="{BB962C8B-B14F-4D97-AF65-F5344CB8AC3E}">
+        <p14:creationId xmlns:p14="http://schemas.microsoft.com/office/powerpoint/2010/main" val="3363762451"/>
+      </p:ext>
+    </p:extLst>
+  </p:cSld>
+  <p:clrMapOvr>
+    <a:masterClrMapping/>
+  </p:clrMapOvr>
+</p:sld>
+</file>
+
+<file path=ppt/slides/slide6.xml><?xml version="1.0" encoding="utf-8"?>
+<p:sld xmlns:a="http://schemas.openxmlformats.org/drawingml/2006/main" xmlns:r="http://schemas.openxmlformats.org/officeDocument/2006/relationships" xmlns:p="http://schemas.openxmlformats.org/presentationml/2006/main">
+  <p:cSld>
+    <p:spTree>
+      <p:nvGrpSpPr>
+        <p:cNvPr id="1" name=""/>
+        <p:cNvGrpSpPr/>
+        <p:nvPr/>
+      </p:nvGrpSpPr>
+      <p:grpSpPr>
+        <a:xfrm>
+          <a:off x="0" y="0"/>
+          <a:ext cx="0" cy="0"/>
+          <a:chOff x="0" y="0"/>
+          <a:chExt cx="0" cy="0"/>
+        </a:xfrm>
+      </p:grpSpPr>
+      <p:sp>
+        <p:nvSpPr>
+          <p:cNvPr id="2" name="Title 1">
+            <a:extLst>
+              <a:ext uri="{FF2B5EF4-FFF2-40B4-BE49-F238E27FC236}">
+                <a16:creationId xmlns:a16="http://schemas.microsoft.com/office/drawing/2014/main" id="{2E48FF0A-0204-4E26-9EF8-D41CBE569E98}"/>
+              </a:ext>
+            </a:extLst>
+          </p:cNvPr>
+          <p:cNvSpPr>
+            <a:spLocks noGrp="1"/>
+          </p:cNvSpPr>
+          <p:nvPr>
+            <p:ph type="title"/>
+          </p:nvPr>
+        </p:nvSpPr>
+        <p:spPr/>
+        <p:txBody>
+          <a:bodyPr/>
+          <a:lstStyle/>
+          <a:p>
+            <a:r>
+              <a:rPr lang="en-US" dirty="0"/>
+              <a:t>Training and Testing Data</a:t>
+            </a:r>
+          </a:p>
+        </p:txBody>
+      </p:sp>
+      <p:sp>
+        <p:nvSpPr>
+          <p:cNvPr id="3" name="Content Placeholder 2">
+            <a:extLst>
+              <a:ext uri="{FF2B5EF4-FFF2-40B4-BE49-F238E27FC236}">
+                <a16:creationId xmlns:a16="http://schemas.microsoft.com/office/drawing/2014/main" id="{262B6239-AE27-4B7C-ADDC-8920468BBDFC}"/>
+              </a:ext>
+            </a:extLst>
+          </p:cNvPr>
+          <p:cNvSpPr>
+            <a:spLocks noGrp="1"/>
+          </p:cNvSpPr>
+          <p:nvPr>
+            <p:ph idx="1"/>
+          </p:nvPr>
+        </p:nvSpPr>
+        <p:spPr>
+          <a:xfrm>
+            <a:off x="1103313" y="2052918"/>
+            <a:ext cx="4598240" cy="4195481"/>
+          </a:xfrm>
+        </p:spPr>
+        <p:txBody>
+          <a:bodyPr/>
+          <a:lstStyle/>
+          <a:p>
+            <a:r>
+              <a:rPr lang="en-US" dirty="0"/>
+              <a:t>Remove target from Features Data</a:t>
+            </a:r>
+          </a:p>
+        </p:txBody>
+      </p:sp>
+      <p:pic>
+        <p:nvPicPr>
+          <p:cNvPr id="5" name="Picture 4">
+            <a:extLst>
+              <a:ext uri="{FF2B5EF4-FFF2-40B4-BE49-F238E27FC236}">
+                <a16:creationId xmlns:a16="http://schemas.microsoft.com/office/drawing/2014/main" id="{2689E90B-E9F4-46F8-88A8-DFAE10944A9A}"/>
+              </a:ext>
+            </a:extLst>
+          </p:cNvPr>
+          <p:cNvPicPr>
+            <a:picLocks noChangeAspect="1"/>
+          </p:cNvPicPr>
+          <p:nvPr/>
+        </p:nvPicPr>
+        <p:blipFill>
+          <a:blip r:embed="rId3"/>
+          <a:stretch>
+            <a:fillRect/>
+          </a:stretch>
+        </p:blipFill>
+        <p:spPr>
+          <a:xfrm>
+            <a:off x="1445463" y="2919412"/>
+            <a:ext cx="4171950" cy="1019175"/>
+          </a:xfrm>
+          <a:prstGeom prst="rect">
+            <a:avLst/>
+          </a:prstGeom>
+        </p:spPr>
+      </p:pic>
+      <p:sp>
+        <p:nvSpPr>
+          <p:cNvPr id="6" name="Content Placeholder 2">
+            <a:extLst>
+              <a:ext uri="{FF2B5EF4-FFF2-40B4-BE49-F238E27FC236}">
+                <a16:creationId xmlns:a16="http://schemas.microsoft.com/office/drawing/2014/main" id="{63DA0C8B-725B-4F78-8907-98C458D0FFAD}"/>
+              </a:ext>
+            </a:extLst>
+          </p:cNvPr>
+          <p:cNvSpPr txBox="1">
+            <a:spLocks/>
+          </p:cNvSpPr>
+          <p:nvPr/>
+        </p:nvSpPr>
+        <p:spPr>
+          <a:xfrm>
+            <a:off x="6224920" y="2052917"/>
+            <a:ext cx="5361066" cy="4195481"/>
+          </a:xfrm>
+          <a:prstGeom prst="rect">
+            <a:avLst/>
+          </a:prstGeom>
+        </p:spPr>
+        <p:txBody>
+          <a:bodyPr vert="horz" lIns="91440" tIns="45720" rIns="91440" bIns="45720" rtlCol="0">
+            <a:normAutofit/>
+          </a:bodyPr>
+          <a:lstStyle>
+            <a:lvl1pPr marL="342900" indent="-342900" algn="l" defTabSz="457200" rtl="0" eaLnBrk="1" latinLnBrk="0" hangingPunct="1">
+              <a:spcBef>
+                <a:spcPts val="1000"/>
+              </a:spcBef>
+              <a:spcAft>
+                <a:spcPts val="0"/>
+              </a:spcAft>
+              <a:buClr>
+                <a:schemeClr val="accent1"/>
+              </a:buClr>
+              <a:buSzPct val="80000"/>
+              <a:buFont typeface="Wingdings 3" charset="2"/>
+              <a:buChar char=""/>
+              <a:defRPr sz="2000" b="0" i="0" kern="1200">
+                <a:solidFill>
+                  <a:schemeClr val="tx1"/>
+                </a:solidFill>
+                <a:latin typeface="+mj-lt"/>
+                <a:ea typeface="+mj-ea"/>
+                <a:cs typeface="+mj-cs"/>
+              </a:defRPr>
+            </a:lvl1pPr>
+            <a:lvl2pPr marL="742950" indent="-285750" algn="l" defTabSz="457200" rtl="0" eaLnBrk="1" latinLnBrk="0" hangingPunct="1">
+              <a:spcBef>
+                <a:spcPts val="1000"/>
+              </a:spcBef>
+              <a:spcAft>
+                <a:spcPts val="0"/>
+              </a:spcAft>
+              <a:buClr>
+                <a:schemeClr val="accent1"/>
+              </a:buClr>
+              <a:buSzPct val="80000"/>
+              <a:buFont typeface="Wingdings 3" charset="2"/>
+              <a:buChar char=""/>
+              <a:defRPr sz="1800" b="0" i="0" kern="1200">
+                <a:solidFill>
+                  <a:schemeClr val="tx1"/>
+                </a:solidFill>
+                <a:latin typeface="+mj-lt"/>
+                <a:ea typeface="+mj-ea"/>
+                <a:cs typeface="+mj-cs"/>
+              </a:defRPr>
+            </a:lvl2pPr>
+            <a:lvl3pPr marL="1143000" indent="-228600" algn="l" defTabSz="457200" rtl="0" eaLnBrk="1" latinLnBrk="0" hangingPunct="1">
+              <a:spcBef>
+                <a:spcPts val="1000"/>
+              </a:spcBef>
+              <a:spcAft>
+                <a:spcPts val="0"/>
+              </a:spcAft>
+              <a:buClr>
+                <a:schemeClr val="accent1"/>
+              </a:buClr>
+              <a:buSzPct val="80000"/>
+              <a:buFont typeface="Wingdings 3" charset="2"/>
+              <a:buChar char=""/>
+              <a:defRPr sz="1600" b="0" i="0" kern="1200">
+                <a:solidFill>
+                  <a:schemeClr val="tx1"/>
+                </a:solidFill>
+                <a:latin typeface="+mj-lt"/>
+                <a:ea typeface="+mj-ea"/>
+                <a:cs typeface="+mj-cs"/>
+              </a:defRPr>
+            </a:lvl3pPr>
+            <a:lvl4pPr marL="1600200" indent="-228600" algn="l" defTabSz="457200" rtl="0" eaLnBrk="1" latinLnBrk="0" hangingPunct="1">
+              <a:spcBef>
+                <a:spcPts val="1000"/>
+              </a:spcBef>
+              <a:spcAft>
+                <a:spcPts val="0"/>
+              </a:spcAft>
+              <a:buClr>
+                <a:schemeClr val="accent1"/>
+              </a:buClr>
+              <a:buSzPct val="80000"/>
+              <a:buFont typeface="Wingdings 3" charset="2"/>
+              <a:buChar char=""/>
+              <a:defRPr sz="1400" b="0" i="0" kern="1200">
+                <a:solidFill>
+                  <a:schemeClr val="tx1"/>
+                </a:solidFill>
+                <a:latin typeface="+mj-lt"/>
+                <a:ea typeface="+mj-ea"/>
+                <a:cs typeface="+mj-cs"/>
+              </a:defRPr>
+            </a:lvl4pPr>
+            <a:lvl5pPr marL="2057400" indent="-228600" algn="l" defTabSz="457200" rtl="0" eaLnBrk="1" latinLnBrk="0" hangingPunct="1">
+              <a:spcBef>
+                <a:spcPts val="1000"/>
+              </a:spcBef>
+              <a:spcAft>
+                <a:spcPts val="0"/>
+              </a:spcAft>
+              <a:buClr>
+                <a:schemeClr val="accent1"/>
+              </a:buClr>
+              <a:buSzPct val="80000"/>
+              <a:buFont typeface="Wingdings 3" charset="2"/>
+              <a:buChar char=""/>
+              <a:defRPr sz="1400" b="0" i="0" kern="1200">
+                <a:solidFill>
+                  <a:schemeClr val="tx1"/>
+                </a:solidFill>
+                <a:latin typeface="+mj-lt"/>
+                <a:ea typeface="+mj-ea"/>
+                <a:cs typeface="+mj-cs"/>
+              </a:defRPr>
+            </a:lvl5pPr>
+            <a:lvl6pPr marL="2514600" indent="-228600" algn="l" defTabSz="457200" rtl="0" eaLnBrk="1" latinLnBrk="0" hangingPunct="1">
+              <a:spcBef>
+                <a:spcPts val="1000"/>
+              </a:spcBef>
+              <a:spcAft>
+                <a:spcPts val="0"/>
+              </a:spcAft>
+              <a:buClr>
+                <a:schemeClr val="accent1"/>
+              </a:buClr>
+              <a:buSzPct val="80000"/>
+              <a:buFont typeface="Wingdings 3" charset="2"/>
+              <a:buChar char=""/>
+              <a:defRPr sz="1400" b="0" i="0" kern="1200">
+                <a:solidFill>
+                  <a:schemeClr val="tx1"/>
+                </a:solidFill>
+                <a:latin typeface="+mj-lt"/>
+                <a:ea typeface="+mj-ea"/>
+                <a:cs typeface="+mj-cs"/>
+              </a:defRPr>
+            </a:lvl6pPr>
+            <a:lvl7pPr marL="2971800" indent="-228600" algn="l" defTabSz="457200" rtl="0" eaLnBrk="1" latinLnBrk="0" hangingPunct="1">
+              <a:spcBef>
+                <a:spcPts val="1000"/>
+              </a:spcBef>
+              <a:spcAft>
+                <a:spcPts val="0"/>
+              </a:spcAft>
+              <a:buClr>
+                <a:schemeClr val="accent1"/>
+              </a:buClr>
+              <a:buSzPct val="80000"/>
+              <a:buFont typeface="Wingdings 3" charset="2"/>
+              <a:buChar char=""/>
+              <a:defRPr sz="1400" b="0" i="0" kern="1200">
+                <a:solidFill>
+                  <a:schemeClr val="tx1"/>
+                </a:solidFill>
+                <a:latin typeface="+mj-lt"/>
+                <a:ea typeface="+mj-ea"/>
+                <a:cs typeface="+mj-cs"/>
+              </a:defRPr>
+            </a:lvl7pPr>
+            <a:lvl8pPr marL="3429000" indent="-228600" algn="l" defTabSz="457200" rtl="0" eaLnBrk="1" latinLnBrk="0" hangingPunct="1">
+              <a:spcBef>
+                <a:spcPts val="1000"/>
+              </a:spcBef>
+              <a:spcAft>
+                <a:spcPts val="0"/>
+              </a:spcAft>
+              <a:buClr>
+                <a:schemeClr val="accent1"/>
+              </a:buClr>
+              <a:buSzPct val="80000"/>
+              <a:buFont typeface="Wingdings 3" charset="2"/>
+              <a:buChar char=""/>
+              <a:defRPr sz="1400" b="0" i="0" kern="1200">
+                <a:solidFill>
+                  <a:schemeClr val="tx1"/>
+                </a:solidFill>
+                <a:latin typeface="+mj-lt"/>
+                <a:ea typeface="+mj-ea"/>
+                <a:cs typeface="+mj-cs"/>
+              </a:defRPr>
+            </a:lvl8pPr>
+            <a:lvl9pPr marL="3886200" indent="-228600" algn="l" defTabSz="457200" rtl="0" eaLnBrk="1" latinLnBrk="0" hangingPunct="1">
+              <a:spcBef>
+                <a:spcPts val="1000"/>
+              </a:spcBef>
+              <a:spcAft>
+                <a:spcPts val="0"/>
+              </a:spcAft>
+              <a:buClr>
+                <a:schemeClr val="accent1"/>
+              </a:buClr>
+              <a:buSzPct val="80000"/>
+              <a:buFont typeface="Wingdings 3" charset="2"/>
+              <a:buChar char=""/>
+              <a:defRPr sz="1400" b="0" i="0" kern="1200">
+                <a:solidFill>
+                  <a:schemeClr val="tx1"/>
+                </a:solidFill>
+                <a:latin typeface="+mj-lt"/>
+                <a:ea typeface="+mj-ea"/>
+                <a:cs typeface="+mj-cs"/>
+              </a:defRPr>
+            </a:lvl9pPr>
+          </a:lstStyle>
+          <a:p>
+            <a:r>
+              <a:rPr lang="en-US" dirty="0"/>
+              <a:t>Create Target (Dependent Variable)</a:t>
+            </a:r>
+          </a:p>
+          <a:p>
+            <a:endParaRPr lang="en-US" dirty="0"/>
+          </a:p>
+        </p:txBody>
+      </p:sp>
+      <p:pic>
+        <p:nvPicPr>
+          <p:cNvPr id="8" name="Picture 7">
+            <a:extLst>
+              <a:ext uri="{FF2B5EF4-FFF2-40B4-BE49-F238E27FC236}">
+                <a16:creationId xmlns:a16="http://schemas.microsoft.com/office/drawing/2014/main" id="{59D7E894-A33B-49CA-988F-7C6282A68F8C}"/>
+              </a:ext>
+            </a:extLst>
+          </p:cNvPr>
+          <p:cNvPicPr>
+            <a:picLocks noChangeAspect="1"/>
+          </p:cNvPicPr>
+          <p:nvPr/>
+        </p:nvPicPr>
+        <p:blipFill>
+          <a:blip r:embed="rId4"/>
+          <a:stretch>
+            <a:fillRect/>
+          </a:stretch>
+        </p:blipFill>
+        <p:spPr>
+          <a:xfrm>
+            <a:off x="6389354" y="2919412"/>
+            <a:ext cx="5196632" cy="3481891"/>
+          </a:xfrm>
+          <a:prstGeom prst="rect">
+            <a:avLst/>
+          </a:prstGeom>
+        </p:spPr>
+      </p:pic>
+    </p:spTree>
+    <p:extLst>
+      <p:ext uri="{BB962C8B-B14F-4D97-AF65-F5344CB8AC3E}">
+        <p14:creationId xmlns:p14="http://schemas.microsoft.com/office/powerpoint/2010/main" val="486515582"/>
+      </p:ext>
+    </p:extLst>
+  </p:cSld>
+  <p:clrMapOvr>
+    <a:masterClrMapping/>
+  </p:clrMapOvr>
+</p:sld>
+</file>
+
+<file path=ppt/slides/slide7.xml><?xml version="1.0" encoding="utf-8"?>
+<p:sld xmlns:a="http://schemas.openxmlformats.org/drawingml/2006/main" xmlns:r="http://schemas.openxmlformats.org/officeDocument/2006/relationships" xmlns:p="http://schemas.openxmlformats.org/presentationml/2006/main">
+  <p:cSld>
+    <p:spTree>
+      <p:nvGrpSpPr>
+        <p:cNvPr id="1" name=""/>
+        <p:cNvGrpSpPr/>
+        <p:nvPr/>
+      </p:nvGrpSpPr>
+      <p:grpSpPr>
+        <a:xfrm>
+          <a:off x="0" y="0"/>
+          <a:ext cx="0" cy="0"/>
+          <a:chOff x="0" y="0"/>
+          <a:chExt cx="0" cy="0"/>
+        </a:xfrm>
+      </p:grpSpPr>
+      <p:sp>
+        <p:nvSpPr>
+          <p:cNvPr id="2" name="Title 1">
+            <a:extLst>
+              <a:ext uri="{FF2B5EF4-FFF2-40B4-BE49-F238E27FC236}">
+                <a16:creationId xmlns:a16="http://schemas.microsoft.com/office/drawing/2014/main" id="{317EA6FF-B935-4595-886F-B65A9CD94EB3}"/>
+              </a:ext>
+            </a:extLst>
+          </p:cNvPr>
+          <p:cNvSpPr>
+            <a:spLocks noGrp="1"/>
+          </p:cNvSpPr>
+          <p:nvPr>
+            <p:ph type="title"/>
+          </p:nvPr>
+        </p:nvSpPr>
+        <p:spPr/>
+        <p:txBody>
+          <a:bodyPr/>
+          <a:lstStyle/>
+          <a:p>
+            <a:r>
+              <a:rPr lang="en-US" dirty="0"/>
+              <a:t>Create Symptoms DataFrame by Disease</a:t>
+            </a:r>
+          </a:p>
+        </p:txBody>
+      </p:sp>
+      <p:sp>
+        <p:nvSpPr>
+          <p:cNvPr id="3" name="Content Placeholder 2">
+            <a:extLst>
+              <a:ext uri="{FF2B5EF4-FFF2-40B4-BE49-F238E27FC236}">
+                <a16:creationId xmlns:a16="http://schemas.microsoft.com/office/drawing/2014/main" id="{97160B89-84B4-43D9-BEC0-4226A28EC36B}"/>
+              </a:ext>
+            </a:extLst>
+          </p:cNvPr>
+          <p:cNvSpPr>
+            <a:spLocks noGrp="1"/>
+          </p:cNvSpPr>
+          <p:nvPr>
+            <p:ph idx="1"/>
+          </p:nvPr>
+        </p:nvSpPr>
+        <p:spPr/>
+        <p:txBody>
+          <a:bodyPr/>
+          <a:lstStyle/>
+          <a:p>
+            <a:endParaRPr lang="en-US" dirty="0"/>
+          </a:p>
+        </p:txBody>
+      </p:sp>
+    </p:spTree>
+    <p:extLst>
+      <p:ext uri="{BB962C8B-B14F-4D97-AF65-F5344CB8AC3E}">
+        <p14:creationId xmlns:p14="http://schemas.microsoft.com/office/powerpoint/2010/main" val="749126173"/>
+      </p:ext>
+    </p:extLst>
+  </p:cSld>
+  <p:clrMapOvr>
+    <a:masterClrMapping/>
+  </p:clrMapOvr>
+</p:sld>
+</file>
+
+<file path=ppt/slides/slide8.xml><?xml version="1.0" encoding="utf-8"?>
+<p:sld xmlns:a="http://schemas.openxmlformats.org/drawingml/2006/main" xmlns:r="http://schemas.openxmlformats.org/officeDocument/2006/relationships" xmlns:p="http://schemas.openxmlformats.org/presentationml/2006/main">
+  <p:cSld>
+    <p:spTree>
+      <p:nvGrpSpPr>
+        <p:cNvPr id="1" name=""/>
+        <p:cNvGrpSpPr/>
+        <p:nvPr/>
+      </p:nvGrpSpPr>
+      <p:grpSpPr>
+        <a:xfrm>
+          <a:off x="0" y="0"/>
+          <a:ext cx="0" cy="0"/>
+          <a:chOff x="0" y="0"/>
+          <a:chExt cx="0" cy="0"/>
+        </a:xfrm>
+      </p:grpSpPr>
+      <p:sp>
+        <p:nvSpPr>
+          <p:cNvPr id="2" name="Title 1">
+            <a:extLst>
+              <a:ext uri="{FF2B5EF4-FFF2-40B4-BE49-F238E27FC236}">
+                <a16:creationId xmlns:a16="http://schemas.microsoft.com/office/drawing/2014/main" id="{52A2E9C3-F530-467F-91D5-B565842DB174}"/>
+              </a:ext>
+            </a:extLst>
+          </p:cNvPr>
+          <p:cNvSpPr>
+            <a:spLocks noGrp="1"/>
+          </p:cNvSpPr>
+          <p:nvPr>
+            <p:ph type="title"/>
+          </p:nvPr>
+        </p:nvSpPr>
+        <p:spPr/>
+        <p:txBody>
+          <a:bodyPr/>
+          <a:lstStyle/>
+          <a:p>
+            <a:r>
+              <a:rPr lang="en-US" dirty="0"/>
+              <a:t>Database - pgAdmin </a:t>
+            </a:r>
+            <a:br>
+              <a:rPr lang="en-US" dirty="0"/>
+            </a:br>
+            <a:endParaRPr lang="en-US" dirty="0"/>
+          </a:p>
+        </p:txBody>
+      </p:sp>
+      <p:sp>
+        <p:nvSpPr>
+          <p:cNvPr id="3" name="Content Placeholder 2">
+            <a:extLst>
+              <a:ext uri="{FF2B5EF4-FFF2-40B4-BE49-F238E27FC236}">
+                <a16:creationId xmlns:a16="http://schemas.microsoft.com/office/drawing/2014/main" id="{D4A12589-BAD7-4848-8481-8095BDA2E573}"/>
+              </a:ext>
+            </a:extLst>
+          </p:cNvPr>
+          <p:cNvSpPr>
+            <a:spLocks noGrp="1"/>
+          </p:cNvSpPr>
+          <p:nvPr>
+            <p:ph idx="1"/>
+          </p:nvPr>
+        </p:nvSpPr>
+        <p:spPr>
+          <a:xfrm>
+            <a:off x="1103312" y="2052918"/>
+            <a:ext cx="2830735" cy="4195481"/>
+          </a:xfrm>
+        </p:spPr>
+        <p:txBody>
+          <a:bodyPr/>
+          <a:lstStyle/>
+          <a:p>
+            <a:r>
+              <a:rPr lang="en-US" dirty="0"/>
+              <a:t>3 Tables:</a:t>
+            </a:r>
+          </a:p>
+          <a:p>
+            <a:pPr marL="857250" lvl="1" indent="-457200">
+              <a:buFont typeface="+mj-lt"/>
+              <a:buAutoNum type="arabicPeriod"/>
+            </a:pPr>
+            <a:r>
+              <a:rPr lang="en-US" sz="2000" dirty="0"/>
+              <a:t>Train_data</a:t>
+            </a:r>
+          </a:p>
+          <a:p>
+            <a:pPr marL="857250" lvl="1" indent="-457200">
+              <a:buFont typeface="+mj-lt"/>
+              <a:buAutoNum type="arabicPeriod"/>
+            </a:pPr>
+            <a:r>
+              <a:rPr lang="en-US" sz="2000" dirty="0"/>
+              <a:t>Test_data</a:t>
+            </a:r>
+          </a:p>
+          <a:p>
+            <a:pPr marL="857250" lvl="1" indent="-457200">
+              <a:buFont typeface="+mj-lt"/>
+              <a:buAutoNum type="arabicPeriod"/>
+            </a:pPr>
+            <a:r>
+              <a:rPr lang="en-US" sz="2000" dirty="0"/>
+              <a:t>Sypt_df</a:t>
+            </a:r>
+          </a:p>
+          <a:p>
+            <a:pPr marL="400050" lvl="1" indent="0">
+              <a:buNone/>
+            </a:pPr>
+            <a:endParaRPr lang="en-US" dirty="0"/>
+          </a:p>
+        </p:txBody>
+      </p:sp>
+      <p:pic>
+        <p:nvPicPr>
+          <p:cNvPr id="13" name="Picture 12">
+            <a:extLst>
+              <a:ext uri="{FF2B5EF4-FFF2-40B4-BE49-F238E27FC236}">
+                <a16:creationId xmlns:a16="http://schemas.microsoft.com/office/drawing/2014/main" id="{99C1090C-9E8F-4A9F-8E69-B35F6C359460}"/>
+              </a:ext>
+            </a:extLst>
+          </p:cNvPr>
+          <p:cNvPicPr>
+            <a:picLocks noChangeAspect="1"/>
+          </p:cNvPicPr>
+          <p:nvPr/>
+        </p:nvPicPr>
+        <p:blipFill>
+          <a:blip r:embed="rId3"/>
+          <a:stretch>
+            <a:fillRect/>
+          </a:stretch>
+        </p:blipFill>
+        <p:spPr>
+          <a:xfrm>
+            <a:off x="4052333" y="2201714"/>
+            <a:ext cx="7277100" cy="3305175"/>
+          </a:xfrm>
+          <a:prstGeom prst="rect">
+            <a:avLst/>
+          </a:prstGeom>
+        </p:spPr>
+      </p:pic>
+    </p:spTree>
+    <p:extLst>
+      <p:ext uri="{BB962C8B-B14F-4D97-AF65-F5344CB8AC3E}">
+        <p14:creationId xmlns:p14="http://schemas.microsoft.com/office/powerpoint/2010/main" val="1202981632"/>
+      </p:ext>
+    </p:extLst>
+  </p:cSld>
+  <p:clrMapOvr>
+    <a:masterClrMapping/>
+  </p:clrMapOvr>
+</p:sld>
+</file>
+
+<file path=ppt/slides/slide9.xml><?xml version="1.0" encoding="utf-8"?>
+<p:sld xmlns:a="http://schemas.openxmlformats.org/drawingml/2006/main" xmlns:r="http://schemas.openxmlformats.org/officeDocument/2006/relationships" xmlns:p="http://schemas.openxmlformats.org/presentationml/2006/main">
+  <p:cSld>
+    <p:spTree>
+      <p:nvGrpSpPr>
+        <p:cNvPr id="1" name=""/>
+        <p:cNvGrpSpPr/>
+        <p:nvPr/>
+      </p:nvGrpSpPr>
+      <p:grpSpPr>
+        <a:xfrm>
+          <a:off x="0" y="0"/>
+          <a:ext cx="0" cy="0"/>
+          <a:chOff x="0" y="0"/>
+          <a:chExt cx="0" cy="0"/>
+        </a:xfrm>
+      </p:grpSpPr>
+      <p:sp>
+        <p:nvSpPr>
+          <p:cNvPr id="2" name="Title 1">
+            <a:extLst>
+              <a:ext uri="{FF2B5EF4-FFF2-40B4-BE49-F238E27FC236}">
+                <a16:creationId xmlns:a16="http://schemas.microsoft.com/office/drawing/2014/main" id="{52A2E9C3-F530-467F-91D5-B565842DB174}"/>
+              </a:ext>
+            </a:extLst>
+          </p:cNvPr>
+          <p:cNvSpPr>
+            <a:spLocks noGrp="1"/>
+          </p:cNvSpPr>
+          <p:nvPr>
+            <p:ph type="title"/>
+          </p:nvPr>
+        </p:nvSpPr>
+        <p:spPr/>
+        <p:txBody>
+          <a:bodyPr/>
+          <a:lstStyle/>
+          <a:p>
+            <a:r>
+              <a:rPr lang="en-US" dirty="0"/>
+              <a:t>Database - pgAdmin </a:t>
+            </a:r>
+            <a:br>
+              <a:rPr lang="en-US" dirty="0"/>
+            </a:br>
+            <a:endParaRPr lang="en-US" dirty="0"/>
+          </a:p>
+        </p:txBody>
+      </p:sp>
+      <p:pic>
+        <p:nvPicPr>
+          <p:cNvPr id="5" name="Picture 4">
+            <a:extLst>
+              <a:ext uri="{FF2B5EF4-FFF2-40B4-BE49-F238E27FC236}">
+                <a16:creationId xmlns:a16="http://schemas.microsoft.com/office/drawing/2014/main" id="{CA13A414-A5AD-4F5E-88AA-6CA2E2DED866}"/>
+              </a:ext>
+            </a:extLst>
+          </p:cNvPr>
+          <p:cNvPicPr>
+            <a:picLocks noChangeAspect="1"/>
+          </p:cNvPicPr>
+          <p:nvPr/>
+        </p:nvPicPr>
+        <p:blipFill>
+          <a:blip r:embed="rId3"/>
+          <a:stretch>
+            <a:fillRect/>
+          </a:stretch>
+        </p:blipFill>
+        <p:spPr>
+          <a:xfrm>
+            <a:off x="881283" y="1853248"/>
+            <a:ext cx="7324725" cy="3438525"/>
+          </a:xfrm>
+          <a:prstGeom prst="rect">
+            <a:avLst/>
+          </a:prstGeom>
+        </p:spPr>
+      </p:pic>
+    </p:spTree>
+    <p:extLst>
+      <p:ext uri="{BB962C8B-B14F-4D97-AF65-F5344CB8AC3E}">
+        <p14:creationId xmlns:p14="http://schemas.microsoft.com/office/powerpoint/2010/main" val="2419336511"/>
       </p:ext>
     </p:extLst>
   </p:cSld>

</xml_diff>

<commit_message>
Segment 2 - added charts
</commit_message>
<xml_diff>
--- a/Team_Code Blue Final Project.pptx
+++ b/Team_Code Blue Final Project.pptx
@@ -5,7 +5,7 @@
     <p:sldMasterId id="2147483648" r:id="rId1"/>
   </p:sldMasterIdLst>
   <p:notesMasterIdLst>
-    <p:notesMasterId r:id="rId19"/>
+    <p:notesMasterId r:id="rId22"/>
   </p:notesMasterIdLst>
   <p:sldIdLst>
     <p:sldId id="256" r:id="rId2"/>
@@ -25,6 +25,9 @@
     <p:sldId id="273" r:id="rId16"/>
     <p:sldId id="274" r:id="rId17"/>
     <p:sldId id="264" r:id="rId18"/>
+    <p:sldId id="275" r:id="rId19"/>
+    <p:sldId id="276" r:id="rId20"/>
+    <p:sldId id="277" r:id="rId21"/>
   </p:sldIdLst>
   <p:sldSz cx="12192000" cy="6858000"/>
   <p:notesSz cx="6858000" cy="9144000"/>
@@ -1002,6 +1005,279 @@
     <p:extLst>
       <p:ext uri="{BB962C8B-B14F-4D97-AF65-F5344CB8AC3E}">
         <p14:creationId xmlns:p14="http://schemas.microsoft.com/office/powerpoint/2010/main" val="3021058822"/>
+      </p:ext>
+    </p:extLst>
+  </p:cSld>
+  <p:clrMapOvr>
+    <a:masterClrMapping/>
+  </p:clrMapOvr>
+</p:notes>
+</file>
+
+<file path=ppt/notesSlides/notesSlide15.xml><?xml version="1.0" encoding="utf-8"?>
+<p:notes xmlns:a="http://schemas.openxmlformats.org/drawingml/2006/main" xmlns:r="http://schemas.openxmlformats.org/officeDocument/2006/relationships" xmlns:p="http://schemas.openxmlformats.org/presentationml/2006/main">
+  <p:cSld>
+    <p:spTree>
+      <p:nvGrpSpPr>
+        <p:cNvPr id="1" name=""/>
+        <p:cNvGrpSpPr/>
+        <p:nvPr/>
+      </p:nvGrpSpPr>
+      <p:grpSpPr>
+        <a:xfrm>
+          <a:off x="0" y="0"/>
+          <a:ext cx="0" cy="0"/>
+          <a:chOff x="0" y="0"/>
+          <a:chExt cx="0" cy="0"/>
+        </a:xfrm>
+      </p:grpSpPr>
+      <p:sp>
+        <p:nvSpPr>
+          <p:cNvPr id="2" name="Slide Image Placeholder 1"/>
+          <p:cNvSpPr>
+            <a:spLocks noGrp="1" noRot="1" noChangeAspect="1"/>
+          </p:cNvSpPr>
+          <p:nvPr>
+            <p:ph type="sldImg"/>
+          </p:nvPr>
+        </p:nvSpPr>
+        <p:spPr/>
+      </p:sp>
+      <p:sp>
+        <p:nvSpPr>
+          <p:cNvPr id="3" name="Notes Placeholder 2"/>
+          <p:cNvSpPr>
+            <a:spLocks noGrp="1"/>
+          </p:cNvSpPr>
+          <p:nvPr>
+            <p:ph type="body" idx="1"/>
+          </p:nvPr>
+        </p:nvSpPr>
+        <p:spPr/>
+        <p:txBody>
+          <a:bodyPr/>
+          <a:lstStyle/>
+          <a:p>
+            <a:r>
+              <a:rPr lang="en-US" dirty="0"/>
+              <a:t>This chart displays our balanced dataset. </a:t>
+            </a:r>
+          </a:p>
+          <a:p>
+            <a:r>
+              <a:rPr lang="en-US" dirty="0"/>
+              <a:t>The absence of a symptom can be as important as the presence of a symptom. </a:t>
+            </a:r>
+          </a:p>
+          <a:p>
+            <a:r>
+              <a:rPr lang="en-US" dirty="0"/>
+              <a:t>This shows that each prognosis has a complete dataset.</a:t>
+            </a:r>
+          </a:p>
+        </p:txBody>
+      </p:sp>
+      <p:sp>
+        <p:nvSpPr>
+          <p:cNvPr id="4" name="Slide Number Placeholder 3"/>
+          <p:cNvSpPr>
+            <a:spLocks noGrp="1"/>
+          </p:cNvSpPr>
+          <p:nvPr>
+            <p:ph type="sldNum" sz="quarter" idx="5"/>
+          </p:nvPr>
+        </p:nvSpPr>
+        <p:spPr/>
+        <p:txBody>
+          <a:bodyPr/>
+          <a:lstStyle/>
+          <a:p>
+            <a:fld id="{0837621E-2D94-4874-8D2F-F90746483814}" type="slidenum">
+              <a:rPr lang="en-US" smtClean="0"/>
+              <a:t>18</a:t>
+            </a:fld>
+            <a:endParaRPr lang="en-US" dirty="0"/>
+          </a:p>
+        </p:txBody>
+      </p:sp>
+    </p:spTree>
+    <p:extLst>
+      <p:ext uri="{BB962C8B-B14F-4D97-AF65-F5344CB8AC3E}">
+        <p14:creationId xmlns:p14="http://schemas.microsoft.com/office/powerpoint/2010/main" val="562341445"/>
+      </p:ext>
+    </p:extLst>
+  </p:cSld>
+  <p:clrMapOvr>
+    <a:masterClrMapping/>
+  </p:clrMapOvr>
+</p:notes>
+</file>
+
+<file path=ppt/notesSlides/notesSlide16.xml><?xml version="1.0" encoding="utf-8"?>
+<p:notes xmlns:a="http://schemas.openxmlformats.org/drawingml/2006/main" xmlns:r="http://schemas.openxmlformats.org/officeDocument/2006/relationships" xmlns:p="http://schemas.openxmlformats.org/presentationml/2006/main">
+  <p:cSld>
+    <p:spTree>
+      <p:nvGrpSpPr>
+        <p:cNvPr id="1" name=""/>
+        <p:cNvGrpSpPr/>
+        <p:nvPr/>
+      </p:nvGrpSpPr>
+      <p:grpSpPr>
+        <a:xfrm>
+          <a:off x="0" y="0"/>
+          <a:ext cx="0" cy="0"/>
+          <a:chOff x="0" y="0"/>
+          <a:chExt cx="0" cy="0"/>
+        </a:xfrm>
+      </p:grpSpPr>
+      <p:sp>
+        <p:nvSpPr>
+          <p:cNvPr id="2" name="Slide Image Placeholder 1"/>
+          <p:cNvSpPr>
+            <a:spLocks noGrp="1" noRot="1" noChangeAspect="1"/>
+          </p:cNvSpPr>
+          <p:nvPr>
+            <p:ph type="sldImg"/>
+          </p:nvPr>
+        </p:nvSpPr>
+        <p:spPr/>
+      </p:sp>
+      <p:sp>
+        <p:nvSpPr>
+          <p:cNvPr id="3" name="Notes Placeholder 2"/>
+          <p:cNvSpPr>
+            <a:spLocks noGrp="1"/>
+          </p:cNvSpPr>
+          <p:nvPr>
+            <p:ph type="body" idx="1"/>
+          </p:nvPr>
+        </p:nvSpPr>
+        <p:spPr/>
+        <p:txBody>
+          <a:bodyPr/>
+          <a:lstStyle/>
+          <a:p>
+            <a:r>
+              <a:rPr lang="en-US" dirty="0"/>
+              <a:t>This visualization displays which prognosis have the most symptom frequency. </a:t>
+            </a:r>
+          </a:p>
+        </p:txBody>
+      </p:sp>
+      <p:sp>
+        <p:nvSpPr>
+          <p:cNvPr id="4" name="Slide Number Placeholder 3"/>
+          <p:cNvSpPr>
+            <a:spLocks noGrp="1"/>
+          </p:cNvSpPr>
+          <p:nvPr>
+            <p:ph type="sldNum" sz="quarter" idx="5"/>
+          </p:nvPr>
+        </p:nvSpPr>
+        <p:spPr/>
+        <p:txBody>
+          <a:bodyPr/>
+          <a:lstStyle/>
+          <a:p>
+            <a:fld id="{0837621E-2D94-4874-8D2F-F90746483814}" type="slidenum">
+              <a:rPr lang="en-US" smtClean="0"/>
+              <a:t>19</a:t>
+            </a:fld>
+            <a:endParaRPr lang="en-US" dirty="0"/>
+          </a:p>
+        </p:txBody>
+      </p:sp>
+    </p:spTree>
+    <p:extLst>
+      <p:ext uri="{BB962C8B-B14F-4D97-AF65-F5344CB8AC3E}">
+        <p14:creationId xmlns:p14="http://schemas.microsoft.com/office/powerpoint/2010/main" val="4163135165"/>
+      </p:ext>
+    </p:extLst>
+  </p:cSld>
+  <p:clrMapOvr>
+    <a:masterClrMapping/>
+  </p:clrMapOvr>
+</p:notes>
+</file>
+
+<file path=ppt/notesSlides/notesSlide17.xml><?xml version="1.0" encoding="utf-8"?>
+<p:notes xmlns:a="http://schemas.openxmlformats.org/drawingml/2006/main" xmlns:r="http://schemas.openxmlformats.org/officeDocument/2006/relationships" xmlns:p="http://schemas.openxmlformats.org/presentationml/2006/main">
+  <p:cSld>
+    <p:spTree>
+      <p:nvGrpSpPr>
+        <p:cNvPr id="1" name=""/>
+        <p:cNvGrpSpPr/>
+        <p:nvPr/>
+      </p:nvGrpSpPr>
+      <p:grpSpPr>
+        <a:xfrm>
+          <a:off x="0" y="0"/>
+          <a:ext cx="0" cy="0"/>
+          <a:chOff x="0" y="0"/>
+          <a:chExt cx="0" cy="0"/>
+        </a:xfrm>
+      </p:grpSpPr>
+      <p:sp>
+        <p:nvSpPr>
+          <p:cNvPr id="2" name="Slide Image Placeholder 1"/>
+          <p:cNvSpPr>
+            <a:spLocks noGrp="1" noRot="1" noChangeAspect="1"/>
+          </p:cNvSpPr>
+          <p:nvPr>
+            <p:ph type="sldImg"/>
+          </p:nvPr>
+        </p:nvSpPr>
+        <p:spPr/>
+      </p:sp>
+      <p:sp>
+        <p:nvSpPr>
+          <p:cNvPr id="3" name="Notes Placeholder 2"/>
+          <p:cNvSpPr>
+            <a:spLocks noGrp="1"/>
+          </p:cNvSpPr>
+          <p:nvPr>
+            <p:ph type="body" idx="1"/>
+          </p:nvPr>
+        </p:nvSpPr>
+        <p:spPr/>
+        <p:txBody>
+          <a:bodyPr/>
+          <a:lstStyle/>
+          <a:p>
+            <a:r>
+              <a:rPr lang="en-US" dirty="0"/>
+              <a:t>In tableau this interactive chart allows us to select a symptom and easily see based off color how many diseases have it.</a:t>
+            </a:r>
+          </a:p>
+        </p:txBody>
+      </p:sp>
+      <p:sp>
+        <p:nvSpPr>
+          <p:cNvPr id="4" name="Slide Number Placeholder 3"/>
+          <p:cNvSpPr>
+            <a:spLocks noGrp="1"/>
+          </p:cNvSpPr>
+          <p:nvPr>
+            <p:ph type="sldNum" sz="quarter" idx="5"/>
+          </p:nvPr>
+        </p:nvSpPr>
+        <p:spPr/>
+        <p:txBody>
+          <a:bodyPr/>
+          <a:lstStyle/>
+          <a:p>
+            <a:fld id="{0837621E-2D94-4874-8D2F-F90746483814}" type="slidenum">
+              <a:rPr lang="en-US" smtClean="0"/>
+              <a:t>20</a:t>
+            </a:fld>
+            <a:endParaRPr lang="en-US" dirty="0"/>
+          </a:p>
+        </p:txBody>
+      </p:sp>
+    </p:spTree>
+    <p:extLst>
+      <p:ext uri="{BB962C8B-B14F-4D97-AF65-F5344CB8AC3E}">
+        <p14:creationId xmlns:p14="http://schemas.microsoft.com/office/powerpoint/2010/main" val="3573313510"/>
       </p:ext>
     </p:extLst>
   </p:cSld>
@@ -9094,8 +9370,14 @@
             </a:pPr>
             <a:r>
               <a:rPr lang="en-US" dirty="0"/>
-              <a:t>Follow the link below:</a:t>
-            </a:r>
+              <a:t>Follow the link below: </a:t>
+            </a:r>
+          </a:p>
+          <a:p>
+            <a:pPr marL="0" indent="0">
+              <a:buNone/>
+            </a:pPr>
+            <a:endParaRPr lang="en-US" dirty="0"/>
           </a:p>
         </p:txBody>
       </p:sp>
@@ -9103,6 +9385,266 @@
     <p:extLst>
       <p:ext uri="{BB962C8B-B14F-4D97-AF65-F5344CB8AC3E}">
         <p14:creationId xmlns:p14="http://schemas.microsoft.com/office/powerpoint/2010/main" val="1688324141"/>
+      </p:ext>
+    </p:extLst>
+  </p:cSld>
+  <p:clrMapOvr>
+    <a:masterClrMapping/>
+  </p:clrMapOvr>
+</p:sld>
+</file>
+
+<file path=ppt/slides/slide18.xml><?xml version="1.0" encoding="utf-8"?>
+<p:sld xmlns:a="http://schemas.openxmlformats.org/drawingml/2006/main" xmlns:r="http://schemas.openxmlformats.org/officeDocument/2006/relationships" xmlns:p="http://schemas.openxmlformats.org/presentationml/2006/main">
+  <p:cSld>
+    <p:spTree>
+      <p:nvGrpSpPr>
+        <p:cNvPr id="1" name=""/>
+        <p:cNvGrpSpPr/>
+        <p:nvPr/>
+      </p:nvGrpSpPr>
+      <p:grpSpPr>
+        <a:xfrm>
+          <a:off x="0" y="0"/>
+          <a:ext cx="0" cy="0"/>
+          <a:chOff x="0" y="0"/>
+          <a:chExt cx="0" cy="0"/>
+        </a:xfrm>
+      </p:grpSpPr>
+      <p:sp>
+        <p:nvSpPr>
+          <p:cNvPr id="2" name="Title 1">
+            <a:extLst>
+              <a:ext uri="{FF2B5EF4-FFF2-40B4-BE49-F238E27FC236}">
+                <a16:creationId xmlns:a16="http://schemas.microsoft.com/office/drawing/2014/main" id="{0D8C7776-FDA1-4F89-ACE0-A5C058D0589D}"/>
+              </a:ext>
+            </a:extLst>
+          </p:cNvPr>
+          <p:cNvSpPr>
+            <a:spLocks noGrp="1"/>
+          </p:cNvSpPr>
+          <p:nvPr>
+            <p:ph type="title"/>
+          </p:nvPr>
+        </p:nvSpPr>
+        <p:spPr/>
+        <p:txBody>
+          <a:bodyPr/>
+          <a:lstStyle/>
+          <a:p>
+            <a:r>
+              <a:rPr lang="en-US" dirty="0"/>
+              <a:t>Dashboard - Charts</a:t>
+            </a:r>
+          </a:p>
+        </p:txBody>
+      </p:sp>
+      <p:sp>
+        <p:nvSpPr>
+          <p:cNvPr id="3" name="Content Placeholder 2">
+            <a:extLst>
+              <a:ext uri="{FF2B5EF4-FFF2-40B4-BE49-F238E27FC236}">
+                <a16:creationId xmlns:a16="http://schemas.microsoft.com/office/drawing/2014/main" id="{7F889976-0B08-40AE-9EB7-1DE55CE6DF65}"/>
+              </a:ext>
+            </a:extLst>
+          </p:cNvPr>
+          <p:cNvSpPr>
+            <a:spLocks noGrp="1"/>
+          </p:cNvSpPr>
+          <p:nvPr>
+            <p:ph idx="1"/>
+          </p:nvPr>
+        </p:nvSpPr>
+        <p:spPr>
+          <a:xfrm>
+            <a:off x="646111" y="1409290"/>
+            <a:ext cx="8946541" cy="679524"/>
+          </a:xfrm>
+        </p:spPr>
+        <p:txBody>
+          <a:bodyPr/>
+          <a:lstStyle/>
+          <a:p>
+            <a:pPr marL="0" indent="0">
+              <a:buNone/>
+            </a:pPr>
+            <a:r>
+              <a:rPr lang="en-US" sz="2800" dirty="0"/>
+              <a:t>Balanced Dataset</a:t>
+            </a:r>
+          </a:p>
+          <a:p>
+            <a:pPr marL="0" indent="0">
+              <a:buNone/>
+            </a:pPr>
+            <a:endParaRPr lang="en-US" dirty="0"/>
+          </a:p>
+        </p:txBody>
+      </p:sp>
+      <p:pic>
+        <p:nvPicPr>
+          <p:cNvPr id="5" name="Picture 4">
+            <a:extLst>
+              <a:ext uri="{FF2B5EF4-FFF2-40B4-BE49-F238E27FC236}">
+                <a16:creationId xmlns:a16="http://schemas.microsoft.com/office/drawing/2014/main" id="{E5B5C948-1F97-42EE-A943-CE137B40B9F8}"/>
+              </a:ext>
+            </a:extLst>
+          </p:cNvPr>
+          <p:cNvPicPr>
+            <a:picLocks noChangeAspect="1"/>
+          </p:cNvPicPr>
+          <p:nvPr/>
+        </p:nvPicPr>
+        <p:blipFill>
+          <a:blip r:embed="rId3"/>
+          <a:stretch>
+            <a:fillRect/>
+          </a:stretch>
+        </p:blipFill>
+        <p:spPr>
+          <a:xfrm>
+            <a:off x="646111" y="2184531"/>
+            <a:ext cx="7267575" cy="4333875"/>
+          </a:xfrm>
+          <a:prstGeom prst="rect">
+            <a:avLst/>
+          </a:prstGeom>
+        </p:spPr>
+      </p:pic>
+    </p:spTree>
+    <p:extLst>
+      <p:ext uri="{BB962C8B-B14F-4D97-AF65-F5344CB8AC3E}">
+        <p14:creationId xmlns:p14="http://schemas.microsoft.com/office/powerpoint/2010/main" val="3257558936"/>
+      </p:ext>
+    </p:extLst>
+  </p:cSld>
+  <p:clrMapOvr>
+    <a:masterClrMapping/>
+  </p:clrMapOvr>
+</p:sld>
+</file>
+
+<file path=ppt/slides/slide19.xml><?xml version="1.0" encoding="utf-8"?>
+<p:sld xmlns:a="http://schemas.openxmlformats.org/drawingml/2006/main" xmlns:r="http://schemas.openxmlformats.org/officeDocument/2006/relationships" xmlns:p="http://schemas.openxmlformats.org/presentationml/2006/main">
+  <p:cSld>
+    <p:spTree>
+      <p:nvGrpSpPr>
+        <p:cNvPr id="1" name=""/>
+        <p:cNvGrpSpPr/>
+        <p:nvPr/>
+      </p:nvGrpSpPr>
+      <p:grpSpPr>
+        <a:xfrm>
+          <a:off x="0" y="0"/>
+          <a:ext cx="0" cy="0"/>
+          <a:chOff x="0" y="0"/>
+          <a:chExt cx="0" cy="0"/>
+        </a:xfrm>
+      </p:grpSpPr>
+      <p:sp>
+        <p:nvSpPr>
+          <p:cNvPr id="2" name="Title 1">
+            <a:extLst>
+              <a:ext uri="{FF2B5EF4-FFF2-40B4-BE49-F238E27FC236}">
+                <a16:creationId xmlns:a16="http://schemas.microsoft.com/office/drawing/2014/main" id="{0D8C7776-FDA1-4F89-ACE0-A5C058D0589D}"/>
+              </a:ext>
+            </a:extLst>
+          </p:cNvPr>
+          <p:cNvSpPr>
+            <a:spLocks noGrp="1"/>
+          </p:cNvSpPr>
+          <p:nvPr>
+            <p:ph type="title"/>
+          </p:nvPr>
+        </p:nvSpPr>
+        <p:spPr/>
+        <p:txBody>
+          <a:bodyPr/>
+          <a:lstStyle/>
+          <a:p>
+            <a:r>
+              <a:rPr lang="en-US" dirty="0"/>
+              <a:t>Dashboard - Charts</a:t>
+            </a:r>
+          </a:p>
+        </p:txBody>
+      </p:sp>
+      <p:sp>
+        <p:nvSpPr>
+          <p:cNvPr id="3" name="Content Placeholder 2">
+            <a:extLst>
+              <a:ext uri="{FF2B5EF4-FFF2-40B4-BE49-F238E27FC236}">
+                <a16:creationId xmlns:a16="http://schemas.microsoft.com/office/drawing/2014/main" id="{7F889976-0B08-40AE-9EB7-1DE55CE6DF65}"/>
+              </a:ext>
+            </a:extLst>
+          </p:cNvPr>
+          <p:cNvSpPr>
+            <a:spLocks noGrp="1"/>
+          </p:cNvSpPr>
+          <p:nvPr>
+            <p:ph idx="1"/>
+          </p:nvPr>
+        </p:nvSpPr>
+        <p:spPr>
+          <a:xfrm>
+            <a:off x="646111" y="1409290"/>
+            <a:ext cx="8946541" cy="679524"/>
+          </a:xfrm>
+        </p:spPr>
+        <p:txBody>
+          <a:bodyPr/>
+          <a:lstStyle/>
+          <a:p>
+            <a:pPr marL="0" indent="0">
+              <a:buNone/>
+            </a:pPr>
+            <a:r>
+              <a:rPr lang="en-US" sz="2800" dirty="0"/>
+              <a:t>Diseases &amp; Symptoms</a:t>
+            </a:r>
+          </a:p>
+          <a:p>
+            <a:pPr marL="0" indent="0">
+              <a:buNone/>
+            </a:pPr>
+            <a:endParaRPr lang="en-US" dirty="0"/>
+          </a:p>
+        </p:txBody>
+      </p:sp>
+      <p:pic>
+        <p:nvPicPr>
+          <p:cNvPr id="6" name="Picture 5">
+            <a:extLst>
+              <a:ext uri="{FF2B5EF4-FFF2-40B4-BE49-F238E27FC236}">
+                <a16:creationId xmlns:a16="http://schemas.microsoft.com/office/drawing/2014/main" id="{33E3439E-3911-426B-9265-AFCD8257E8D6}"/>
+              </a:ext>
+            </a:extLst>
+          </p:cNvPr>
+          <p:cNvPicPr>
+            <a:picLocks noChangeAspect="1"/>
+          </p:cNvPicPr>
+          <p:nvPr/>
+        </p:nvPicPr>
+        <p:blipFill>
+          <a:blip r:embed="rId3"/>
+          <a:stretch>
+            <a:fillRect/>
+          </a:stretch>
+        </p:blipFill>
+        <p:spPr>
+          <a:xfrm>
+            <a:off x="646111" y="2036681"/>
+            <a:ext cx="7305675" cy="4362450"/>
+          </a:xfrm>
+          <a:prstGeom prst="rect">
+            <a:avLst/>
+          </a:prstGeom>
+        </p:spPr>
+      </p:pic>
+    </p:spTree>
+    <p:extLst>
+      <p:ext uri="{BB962C8B-B14F-4D97-AF65-F5344CB8AC3E}">
+        <p14:creationId xmlns:p14="http://schemas.microsoft.com/office/powerpoint/2010/main" val="1712365041"/>
       </p:ext>
     </p:extLst>
   </p:cSld>
@@ -9236,6 +9778,136 @@
     <p:extLst>
       <p:ext uri="{BB962C8B-B14F-4D97-AF65-F5344CB8AC3E}">
         <p14:creationId xmlns:p14="http://schemas.microsoft.com/office/powerpoint/2010/main" val="90614384"/>
+      </p:ext>
+    </p:extLst>
+  </p:cSld>
+  <p:clrMapOvr>
+    <a:masterClrMapping/>
+  </p:clrMapOvr>
+</p:sld>
+</file>
+
+<file path=ppt/slides/slide20.xml><?xml version="1.0" encoding="utf-8"?>
+<p:sld xmlns:a="http://schemas.openxmlformats.org/drawingml/2006/main" xmlns:r="http://schemas.openxmlformats.org/officeDocument/2006/relationships" xmlns:p="http://schemas.openxmlformats.org/presentationml/2006/main">
+  <p:cSld>
+    <p:spTree>
+      <p:nvGrpSpPr>
+        <p:cNvPr id="1" name=""/>
+        <p:cNvGrpSpPr/>
+        <p:nvPr/>
+      </p:nvGrpSpPr>
+      <p:grpSpPr>
+        <a:xfrm>
+          <a:off x="0" y="0"/>
+          <a:ext cx="0" cy="0"/>
+          <a:chOff x="0" y="0"/>
+          <a:chExt cx="0" cy="0"/>
+        </a:xfrm>
+      </p:grpSpPr>
+      <p:sp>
+        <p:nvSpPr>
+          <p:cNvPr id="2" name="Title 1">
+            <a:extLst>
+              <a:ext uri="{FF2B5EF4-FFF2-40B4-BE49-F238E27FC236}">
+                <a16:creationId xmlns:a16="http://schemas.microsoft.com/office/drawing/2014/main" id="{0D8C7776-FDA1-4F89-ACE0-A5C058D0589D}"/>
+              </a:ext>
+            </a:extLst>
+          </p:cNvPr>
+          <p:cNvSpPr>
+            <a:spLocks noGrp="1"/>
+          </p:cNvSpPr>
+          <p:nvPr>
+            <p:ph type="title"/>
+          </p:nvPr>
+        </p:nvSpPr>
+        <p:spPr/>
+        <p:txBody>
+          <a:bodyPr/>
+          <a:lstStyle/>
+          <a:p>
+            <a:r>
+              <a:rPr lang="en-US" dirty="0"/>
+              <a:t>Dashboard - Charts</a:t>
+            </a:r>
+          </a:p>
+        </p:txBody>
+      </p:sp>
+      <p:sp>
+        <p:nvSpPr>
+          <p:cNvPr id="3" name="Content Placeholder 2">
+            <a:extLst>
+              <a:ext uri="{FF2B5EF4-FFF2-40B4-BE49-F238E27FC236}">
+                <a16:creationId xmlns:a16="http://schemas.microsoft.com/office/drawing/2014/main" id="{7F889976-0B08-40AE-9EB7-1DE55CE6DF65}"/>
+              </a:ext>
+            </a:extLst>
+          </p:cNvPr>
+          <p:cNvSpPr>
+            <a:spLocks noGrp="1"/>
+          </p:cNvSpPr>
+          <p:nvPr>
+            <p:ph idx="1"/>
+          </p:nvPr>
+        </p:nvSpPr>
+        <p:spPr>
+          <a:xfrm>
+            <a:off x="646111" y="1409290"/>
+            <a:ext cx="8946541" cy="679524"/>
+          </a:xfrm>
+        </p:spPr>
+        <p:txBody>
+          <a:bodyPr/>
+          <a:lstStyle/>
+          <a:p>
+            <a:pPr marL="0" indent="0">
+              <a:buNone/>
+            </a:pPr>
+            <a:r>
+              <a:rPr lang="en-US" sz="2800" dirty="0"/>
+              <a:t>Diseases &amp; Symptoms </a:t>
+            </a:r>
+          </a:p>
+          <a:p>
+            <a:pPr marL="0" indent="0">
+              <a:buNone/>
+            </a:pPr>
+            <a:endParaRPr lang="en-US" dirty="0"/>
+          </a:p>
+        </p:txBody>
+      </p:sp>
+      <p:pic>
+        <p:nvPicPr>
+          <p:cNvPr id="5" name="Picture 4">
+            <a:extLst>
+              <a:ext uri="{FF2B5EF4-FFF2-40B4-BE49-F238E27FC236}">
+                <a16:creationId xmlns:a16="http://schemas.microsoft.com/office/drawing/2014/main" id="{D60D223F-1FDB-421F-BD69-4A0A23BF850E}"/>
+              </a:ext>
+            </a:extLst>
+          </p:cNvPr>
+          <p:cNvPicPr>
+            <a:picLocks noChangeAspect="1"/>
+          </p:cNvPicPr>
+          <p:nvPr/>
+        </p:nvPicPr>
+        <p:blipFill>
+          <a:blip r:embed="rId3"/>
+          <a:stretch>
+            <a:fillRect/>
+          </a:stretch>
+        </p:blipFill>
+        <p:spPr>
+          <a:xfrm>
+            <a:off x="750909" y="2088814"/>
+            <a:ext cx="7258050" cy="4371975"/>
+          </a:xfrm>
+          <a:prstGeom prst="rect">
+            <a:avLst/>
+          </a:prstGeom>
+        </p:spPr>
+      </p:pic>
+    </p:spTree>
+    <p:extLst>
+      <p:ext uri="{BB962C8B-B14F-4D97-AF65-F5344CB8AC3E}">
+        <p14:creationId xmlns:p14="http://schemas.microsoft.com/office/powerpoint/2010/main" val="3824004871"/>
       </p:ext>
     </p:extLst>
   </p:cSld>

</xml_diff>